<commit_message>
Added slides for RELRO.
</commit_message>
<xml_diff>
--- a/CppZeroCost/2025/RU.pptx
+++ b/CppZeroCost/2025/RU.pptx
@@ -52,8 +52,13 @@
     <p:sldId id="303" r:id="rId46"/>
     <p:sldId id="304" r:id="rId47"/>
     <p:sldId id="305" r:id="rId48"/>
-    <p:sldId id="270" r:id="rId49"/>
-    <p:sldId id="271" r:id="rId50"/>
+    <p:sldId id="306" r:id="rId49"/>
+    <p:sldId id="307" r:id="rId50"/>
+    <p:sldId id="308" r:id="rId51"/>
+    <p:sldId id="309" r:id="rId52"/>
+    <p:sldId id="310" r:id="rId53"/>
+    <p:sldId id="270" r:id="rId54"/>
+    <p:sldId id="271" r:id="rId55"/>
   </p:sldIdLst>
   <p:sldSz cx="12192000" cy="6858000"/>
   <p:notesSz cx="6858000" cy="9144000"/>
@@ -3836,12 +3841,8 @@
           <a:p>
             <a:pPr lvl="1"/>
             <a:r>
-              <a:rPr lang="ru-RU"/>
-              <a:t>Рандомизация расположения </a:t>
-            </a:r>
-            <a:r>
-              <a:rPr lang="ru-RU" dirty="0"/>
-              <a:t>основных сегментов программы (стека, кучи, библиотек)</a:t>
+              <a:rPr lang="ru-RU" dirty="0"/>
+              <a:t>Рандомизация расположения основных сегментов программы (стека, кучи, библиотек)</a:t>
             </a:r>
             <a:endParaRPr lang="en-US" dirty="0"/>
           </a:p>
@@ -12677,14 +12678,14 @@
               <a:buNone/>
             </a:pPr>
             <a:r>
-              <a:rPr lang="en-US" dirty="0">
+              <a:rPr lang="en-US" b="1" dirty="0">
                 <a:latin typeface="Courier New" panose="02070309020205020404" pitchFamily="49" charset="0"/>
                 <a:cs typeface="Courier New" panose="02070309020205020404" pitchFamily="49" charset="0"/>
               </a:rPr>
               <a:t>$   </a:t>
             </a:r>
             <a:r>
-              <a:rPr lang="en-US" dirty="0">
+              <a:rPr lang="en-US" b="1" dirty="0">
                 <a:solidFill>
                   <a:srgbClr val="FF0000"/>
                 </a:solidFill>
@@ -12694,7 +12695,7 @@
               <a:t># </a:t>
             </a:r>
             <a:r>
-              <a:rPr lang="ru-RU" dirty="0">
+              <a:rPr lang="ru-RU" b="1" dirty="0">
                 <a:solidFill>
                   <a:srgbClr val="FF0000"/>
                 </a:solidFill>
@@ -12704,7 +12705,7 @@
               <a:t>Получен доступ к </a:t>
             </a:r>
             <a:r>
-              <a:rPr lang="en-US" dirty="0">
+              <a:rPr lang="en-US" b="1" dirty="0">
                 <a:solidFill>
                   <a:srgbClr val="FF0000"/>
                 </a:solidFill>
@@ -14840,7 +14841,10 @@
               <a:rPr lang="ru-RU" dirty="0"/>
               <a:t>Защита таблиц диспетчеризации</a:t>
             </a:r>
-            <a:endParaRPr lang="en-US" dirty="0"/>
+            <a:r>
+              <a:rPr lang="en-US" dirty="0"/>
+              <a:t> (Full RELRO)</a:t>
+            </a:r>
           </a:p>
         </p:txBody>
       </p:sp>
@@ -14904,7 +14908,7 @@
           <p:cNvPr id="2" name="Title 1">
             <a:extLst>
               <a:ext uri="{FF2B5EF4-FFF2-40B4-BE49-F238E27FC236}">
-                <a16:creationId xmlns:a16="http://schemas.microsoft.com/office/drawing/2014/main" id="{CA3C8DD7-2659-4877-AB44-B521617A7883}"/>
+                <a16:creationId xmlns:a16="http://schemas.microsoft.com/office/drawing/2014/main" id="{79D54F9B-D85E-4A7D-B3C8-992DF11CFA1A}"/>
               </a:ext>
             </a:extLst>
           </p:cNvPr>
@@ -14922,7 +14926,7 @@
           <a:p>
             <a:r>
               <a:rPr lang="ru-RU" dirty="0"/>
-              <a:t>Спасибо за внимание</a:t>
+              <a:t>Введение</a:t>
             </a:r>
             <a:endParaRPr lang="en-US" dirty="0"/>
           </a:p>
@@ -14933,7 +14937,7 @@
           <p:cNvPr id="3" name="Content Placeholder 2">
             <a:extLst>
               <a:ext uri="{FF2B5EF4-FFF2-40B4-BE49-F238E27FC236}">
-                <a16:creationId xmlns:a16="http://schemas.microsoft.com/office/drawing/2014/main" id="{1A014712-4ABE-498A-9B77-26D4F051DB7C}"/>
+                <a16:creationId xmlns:a16="http://schemas.microsoft.com/office/drawing/2014/main" id="{2C19D856-8E17-488B-A10C-4EB946202AAC}"/>
               </a:ext>
             </a:extLst>
           </p:cNvPr>
@@ -14946,16 +14950,85 @@
         </p:nvSpPr>
         <p:spPr/>
         <p:txBody>
-          <a:bodyPr/>
+          <a:bodyPr>
+            <a:normAutofit lnSpcReduction="10000"/>
+          </a:bodyPr>
           <a:lstStyle/>
           <a:p>
             <a:r>
               <a:rPr lang="ru-RU" dirty="0"/>
-              <a:t>Вопросы</a:t>
-            </a:r>
-            <a:r>
-              <a:rPr lang="en-US" dirty="0"/>
-              <a:t> ?</a:t>
+              <a:t>Вызовы функции из динамических библиотек делаются через специальные трамплины (PLT</a:t>
+            </a:r>
+            <a:r>
+              <a:rPr lang="en-US" dirty="0"/>
+              <a:t> </a:t>
+            </a:r>
+            <a:r>
+              <a:rPr lang="ru-RU" dirty="0"/>
+              <a:t>stubs</a:t>
+            </a:r>
+            <a:r>
+              <a:rPr lang="en-US" dirty="0"/>
+              <a:t>)</a:t>
+            </a:r>
+            <a:endParaRPr lang="ru-RU" dirty="0"/>
+          </a:p>
+          <a:p>
+            <a:r>
+              <a:rPr lang="ru-RU" dirty="0"/>
+              <a:t>Функции-трамплины читают и обновляют таблицу </a:t>
+            </a:r>
+            <a:r>
+              <a:rPr lang="en-US" dirty="0"/>
+              <a:t>GOT, </a:t>
+            </a:r>
+            <a:r>
+              <a:rPr lang="ru-RU" dirty="0"/>
+              <a:t>содержащую указатели на функции</a:t>
+            </a:r>
+          </a:p>
+          <a:p>
+            <a:r>
+              <a:rPr lang="ru-RU" dirty="0"/>
+              <a:t>Таблицу приходится держать в writable-сегменте и у хакеров есть возможность её скомпрометировать</a:t>
+            </a:r>
+            <a:endParaRPr lang="en-US" dirty="0"/>
+          </a:p>
+          <a:p>
+            <a:pPr lvl="1"/>
+            <a:r>
+              <a:rPr lang="ru-RU" dirty="0"/>
+              <a:t>Более редкая атака чем buffer overflow</a:t>
+            </a:r>
+            <a:r>
+              <a:rPr lang="en-US" dirty="0"/>
+              <a:t> </a:t>
+            </a:r>
+            <a:r>
+              <a:rPr lang="ru-RU" dirty="0"/>
+              <a:t>(мне неизвестны соответствующие </a:t>
+            </a:r>
+            <a:r>
+              <a:rPr lang="en-US" dirty="0"/>
+              <a:t>CVE)</a:t>
+            </a:r>
+            <a:endParaRPr lang="ru-RU" dirty="0"/>
+          </a:p>
+          <a:p>
+            <a:r>
+              <a:rPr lang="ru-RU" dirty="0"/>
+              <a:t>Решение (</a:t>
+            </a:r>
+            <a:r>
+              <a:rPr lang="en-US" dirty="0"/>
+              <a:t>read-only relocations, RELRO):</a:t>
+            </a:r>
+          </a:p>
+          <a:p>
+            <a:pPr lvl="1"/>
+            <a:r>
+              <a:rPr lang="ru-RU" dirty="0"/>
+              <a:t>Инициализировать содержимое таблицы на старте программы и сразу пометить сегмент как readonly</a:t>
             </a:r>
           </a:p>
         </p:txBody>
@@ -14963,7 +15036,7 @@
     </p:spTree>
     <p:extLst>
       <p:ext uri="{BB962C8B-B14F-4D97-AF65-F5344CB8AC3E}">
-        <p14:creationId xmlns:p14="http://schemas.microsoft.com/office/powerpoint/2010/main" val="836139563"/>
+        <p14:creationId xmlns:p14="http://schemas.microsoft.com/office/powerpoint/2010/main" val="195272044"/>
       </p:ext>
     </p:extLst>
   </p:cSld>
@@ -14995,7 +15068,7 @@
           <p:cNvPr id="2" name="Title 1">
             <a:extLst>
               <a:ext uri="{FF2B5EF4-FFF2-40B4-BE49-F238E27FC236}">
-                <a16:creationId xmlns:a16="http://schemas.microsoft.com/office/drawing/2014/main" id="{CAC7532A-964A-431E-A4F5-80DD903BB997}"/>
+                <a16:creationId xmlns:a16="http://schemas.microsoft.com/office/drawing/2014/main" id="{85B21148-5860-44A4-AE49-C30B1B34A335}"/>
               </a:ext>
             </a:extLst>
           </p:cNvPr>
@@ -15012,9 +15085,10 @@
           <a:lstStyle/>
           <a:p>
             <a:r>
-              <a:rPr lang="en-US" dirty="0"/>
-              <a:t>TODO</a:t>
-            </a:r>
+              <a:rPr lang="ru-RU" dirty="0"/>
+              <a:t>Пример</a:t>
+            </a:r>
+            <a:endParaRPr lang="en-US" dirty="0"/>
           </a:p>
         </p:txBody>
       </p:sp>
@@ -15023,7 +15097,7 @@
           <p:cNvPr id="3" name="Content Placeholder 2">
             <a:extLst>
               <a:ext uri="{FF2B5EF4-FFF2-40B4-BE49-F238E27FC236}">
-                <a16:creationId xmlns:a16="http://schemas.microsoft.com/office/drawing/2014/main" id="{4C484971-452F-45F6-AD84-582487E77763}"/>
+                <a16:creationId xmlns:a16="http://schemas.microsoft.com/office/drawing/2014/main" id="{E5FFA250-9936-4C85-AAFE-41FFF9CE9603}"/>
               </a:ext>
             </a:extLst>
           </p:cNvPr>
@@ -15034,152 +15108,765 @@
             <p:ph idx="1"/>
           </p:nvPr>
         </p:nvSpPr>
-        <p:spPr/>
+        <p:spPr>
+          <a:xfrm>
+            <a:off x="838200" y="1568824"/>
+            <a:ext cx="5257800" cy="4608139"/>
+          </a:xfrm>
+        </p:spPr>
         <p:txBody>
           <a:bodyPr>
-            <a:normAutofit lnSpcReduction="10000"/>
+            <a:normAutofit fontScale="55000" lnSpcReduction="20000"/>
           </a:bodyPr>
           <a:lstStyle/>
           <a:p>
-            <a:r>
-              <a:rPr lang="ru-RU" dirty="0"/>
-              <a:t>Информация о замерах</a:t>
-            </a:r>
-            <a:r>
-              <a:rPr lang="en-US" dirty="0"/>
+            <a:pPr marL="0" indent="0">
+              <a:buNone/>
+            </a:pPr>
+            <a:r>
+              <a:rPr lang="en-US" dirty="0">
+                <a:latin typeface="Courier New" panose="02070309020205020404" pitchFamily="49" charset="0"/>
+                <a:cs typeface="Courier New" panose="02070309020205020404" pitchFamily="49" charset="0"/>
+              </a:rPr>
+              <a:t>#include &lt;</a:t>
+            </a:r>
+            <a:r>
+              <a:rPr lang="en-US" dirty="0" err="1">
+                <a:latin typeface="Courier New" panose="02070309020205020404" pitchFamily="49" charset="0"/>
+                <a:cs typeface="Courier New" panose="02070309020205020404" pitchFamily="49" charset="0"/>
+              </a:rPr>
+              <a:t>stdio.h</a:t>
+            </a:r>
+            <a:r>
+              <a:rPr lang="en-US" dirty="0">
+                <a:latin typeface="Courier New" panose="02070309020205020404" pitchFamily="49" charset="0"/>
+                <a:cs typeface="Courier New" panose="02070309020205020404" pitchFamily="49" charset="0"/>
+              </a:rPr>
+              <a:t>&gt;</a:t>
+            </a:r>
+          </a:p>
+          <a:p>
+            <a:pPr marL="0" indent="0">
+              <a:buNone/>
+            </a:pPr>
+            <a:endParaRPr lang="en-US" dirty="0">
+              <a:latin typeface="Courier New" panose="02070309020205020404" pitchFamily="49" charset="0"/>
+              <a:cs typeface="Courier New" panose="02070309020205020404" pitchFamily="49" charset="0"/>
+            </a:endParaRPr>
+          </a:p>
+          <a:p>
+            <a:pPr marL="0" indent="0">
+              <a:buNone/>
+            </a:pPr>
+            <a:r>
+              <a:rPr lang="en-US" dirty="0">
+                <a:latin typeface="Courier New" panose="02070309020205020404" pitchFamily="49" charset="0"/>
+                <a:cs typeface="Courier New" panose="02070309020205020404" pitchFamily="49" charset="0"/>
+              </a:rPr>
+              <a:t>void shellcode() {</a:t>
+            </a:r>
+          </a:p>
+          <a:p>
+            <a:pPr marL="0" indent="0">
+              <a:buNone/>
+            </a:pPr>
+            <a:r>
+              <a:rPr lang="en-US" dirty="0">
+                <a:latin typeface="Courier New" panose="02070309020205020404" pitchFamily="49" charset="0"/>
+                <a:cs typeface="Courier New" panose="02070309020205020404" pitchFamily="49" charset="0"/>
+              </a:rPr>
+              <a:t>  </a:t>
+            </a:r>
+            <a:r>
+              <a:rPr lang="en-US" dirty="0" err="1">
+                <a:latin typeface="Courier New" panose="02070309020205020404" pitchFamily="49" charset="0"/>
+                <a:cs typeface="Courier New" panose="02070309020205020404" pitchFamily="49" charset="0"/>
+              </a:rPr>
+              <a:t>printf</a:t>
+            </a:r>
+            <a:r>
+              <a:rPr lang="en-US" dirty="0">
+                <a:latin typeface="Courier New" panose="02070309020205020404" pitchFamily="49" charset="0"/>
+                <a:cs typeface="Courier New" panose="02070309020205020404" pitchFamily="49" charset="0"/>
+              </a:rPr>
+              <a:t>("You have </a:t>
+            </a:r>
+            <a:r>
+              <a:rPr lang="en-US" dirty="0" err="1">
+                <a:latin typeface="Courier New" panose="02070309020205020404" pitchFamily="49" charset="0"/>
+                <a:cs typeface="Courier New" panose="02070309020205020404" pitchFamily="49" charset="0"/>
+              </a:rPr>
+              <a:t>beeen</a:t>
+            </a:r>
+            <a:r>
+              <a:rPr lang="en-US" dirty="0">
+                <a:latin typeface="Courier New" panose="02070309020205020404" pitchFamily="49" charset="0"/>
+                <a:cs typeface="Courier New" panose="02070309020205020404" pitchFamily="49" charset="0"/>
+              </a:rPr>
               <a:t> </a:t>
             </a:r>
             <a:r>
-              <a:rPr lang="ru-RU" dirty="0"/>
-              <a:t>в приложении</a:t>
-            </a:r>
-            <a:r>
-              <a:rPr lang="en-US" dirty="0"/>
-              <a:t>:</a:t>
-            </a:r>
-          </a:p>
-          <a:p>
-            <a:pPr lvl="1"/>
-            <a:r>
-              <a:rPr lang="ru-RU" dirty="0"/>
-              <a:t>Какие проверялись версии дистрибутивов</a:t>
-            </a:r>
-          </a:p>
-          <a:p>
-            <a:pPr lvl="1"/>
-            <a:r>
-              <a:rPr lang="ru-RU" dirty="0"/>
-              <a:t>Как считались </a:t>
-            </a:r>
-            <a:r>
-              <a:rPr lang="en-US" dirty="0"/>
-              <a:t>CVE, KEV</a:t>
-            </a:r>
-            <a:r>
-              <a:rPr lang="ru-RU" dirty="0"/>
-              <a:t> (скрипты</a:t>
-            </a:r>
-            <a:r>
-              <a:rPr lang="en-US" dirty="0"/>
-              <a:t>)</a:t>
-            </a:r>
-            <a:endParaRPr lang="ru-RU" dirty="0"/>
-          </a:p>
-          <a:p>
-            <a:pPr lvl="1"/>
-            <a:r>
-              <a:rPr lang="ru-RU" dirty="0"/>
-              <a:t>Ссылки на примеры</a:t>
-            </a:r>
-            <a:r>
-              <a:rPr lang="en-US" dirty="0"/>
-              <a:t> (Stack Clashing)</a:t>
-            </a:r>
-          </a:p>
-          <a:p>
-            <a:pPr lvl="1"/>
-            <a:r>
-              <a:rPr lang="ru-RU" dirty="0"/>
-              <a:t>Как искать проблемные программы (</a:t>
-            </a:r>
-            <a:r>
-              <a:rPr lang="en-US" dirty="0"/>
-              <a:t>no-pie, etc.)</a:t>
-            </a:r>
-          </a:p>
-          <a:p>
-            <a:pPr lvl="1"/>
-            <a:r>
-              <a:rPr lang="ru-RU" dirty="0"/>
-              <a:t>Как запустить бенчмарки </a:t>
-            </a:r>
-            <a:r>
-              <a:rPr lang="en-US" dirty="0"/>
-              <a:t>Clang</a:t>
-            </a:r>
-          </a:p>
-          <a:p>
-            <a:r>
-              <a:rPr lang="ru-RU" dirty="0"/>
-              <a:t>Отдельный слайд про </a:t>
-            </a:r>
-            <a:r>
-              <a:rPr lang="en-US" dirty="0"/>
-              <a:t>Rust</a:t>
-            </a:r>
-            <a:r>
-              <a:rPr lang="ru-RU" dirty="0"/>
-              <a:t> (таблица со сравнением)</a:t>
-            </a:r>
-            <a:endParaRPr lang="en-US" dirty="0"/>
-          </a:p>
-          <a:p>
-            <a:r>
-              <a:rPr lang="ru-RU" dirty="0"/>
-              <a:t>Отдельный слайд с рекомендуемыми ссылками</a:t>
-            </a:r>
-            <a:endParaRPr lang="en-US" dirty="0"/>
-          </a:p>
-          <a:p>
-            <a:r>
-              <a:rPr lang="ru-RU" dirty="0"/>
-              <a:t>Слайд с рекомендациями</a:t>
-            </a:r>
-            <a:r>
-              <a:rPr lang="en-US" dirty="0"/>
-              <a:t>:</a:t>
-            </a:r>
-          </a:p>
-          <a:p>
-            <a:pPr lvl="1"/>
-            <a:r>
-              <a:rPr lang="ru-RU" dirty="0"/>
-              <a:t>Проверить дефолтные опции в дистро, решить с </a:t>
-            </a:r>
-            <a:r>
-              <a:rPr lang="en-US" dirty="0"/>
-              <a:t>Security Team </a:t>
-            </a:r>
-            <a:r>
-              <a:rPr lang="ru-RU" dirty="0"/>
-              <a:t>какие </a:t>
-            </a:r>
-            <a:r>
-              <a:rPr lang="en-US" dirty="0"/>
-              <a:t>hardening</a:t>
-            </a:r>
-            <a:r>
-              <a:rPr lang="ru-RU" dirty="0"/>
-              <a:t>-методы включить в проде</a:t>
-            </a:r>
-            <a:endParaRPr lang="en-US" dirty="0"/>
+              <a:rPr lang="en-US" dirty="0" err="1">
+                <a:latin typeface="Courier New" panose="02070309020205020404" pitchFamily="49" charset="0"/>
+                <a:cs typeface="Courier New" panose="02070309020205020404" pitchFamily="49" charset="0"/>
+              </a:rPr>
+              <a:t>pwned%s</a:t>
+            </a:r>
+            <a:r>
+              <a:rPr lang="en-US" dirty="0">
+                <a:latin typeface="Courier New" panose="02070309020205020404" pitchFamily="49" charset="0"/>
+                <a:cs typeface="Courier New" panose="02070309020205020404" pitchFamily="49" charset="0"/>
+              </a:rPr>
+              <a:t>\n", "");</a:t>
+            </a:r>
+          </a:p>
+          <a:p>
+            <a:pPr marL="0" indent="0">
+              <a:buNone/>
+            </a:pPr>
+            <a:r>
+              <a:rPr lang="en-US" dirty="0">
+                <a:latin typeface="Courier New" panose="02070309020205020404" pitchFamily="49" charset="0"/>
+                <a:cs typeface="Courier New" panose="02070309020205020404" pitchFamily="49" charset="0"/>
+              </a:rPr>
+              <a:t>}</a:t>
+            </a:r>
+          </a:p>
+          <a:p>
+            <a:pPr marL="0" indent="0">
+              <a:buNone/>
+            </a:pPr>
+            <a:endParaRPr lang="en-US" dirty="0">
+              <a:latin typeface="Courier New" panose="02070309020205020404" pitchFamily="49" charset="0"/>
+              <a:cs typeface="Courier New" panose="02070309020205020404" pitchFamily="49" charset="0"/>
+            </a:endParaRPr>
+          </a:p>
+          <a:p>
+            <a:pPr marL="0" indent="0">
+              <a:buNone/>
+            </a:pPr>
+            <a:r>
+              <a:rPr lang="en-US" dirty="0">
+                <a:latin typeface="Courier New" panose="02070309020205020404" pitchFamily="49" charset="0"/>
+                <a:cs typeface="Courier New" panose="02070309020205020404" pitchFamily="49" charset="0"/>
+              </a:rPr>
+              <a:t>extern void *_GLOBAL_OFFSET_TABLE_[];</a:t>
+            </a:r>
+          </a:p>
+          <a:p>
+            <a:pPr marL="0" indent="0">
+              <a:buNone/>
+            </a:pPr>
+            <a:endParaRPr lang="en-US" dirty="0">
+              <a:latin typeface="Courier New" panose="02070309020205020404" pitchFamily="49" charset="0"/>
+              <a:cs typeface="Courier New" panose="02070309020205020404" pitchFamily="49" charset="0"/>
+            </a:endParaRPr>
+          </a:p>
+          <a:p>
+            <a:pPr marL="0" indent="0">
+              <a:buNone/>
+            </a:pPr>
+            <a:r>
+              <a:rPr lang="en-US" dirty="0">
+                <a:latin typeface="Courier New" panose="02070309020205020404" pitchFamily="49" charset="0"/>
+                <a:cs typeface="Courier New" panose="02070309020205020404" pitchFamily="49" charset="0"/>
+              </a:rPr>
+              <a:t>int main() {</a:t>
+            </a:r>
+          </a:p>
+          <a:p>
+            <a:pPr marL="0" indent="0">
+              <a:buNone/>
+            </a:pPr>
+            <a:r>
+              <a:rPr lang="en-US" dirty="0">
+                <a:latin typeface="Courier New" panose="02070309020205020404" pitchFamily="49" charset="0"/>
+                <a:cs typeface="Courier New" panose="02070309020205020404" pitchFamily="49" charset="0"/>
+              </a:rPr>
+              <a:t>  // </a:t>
+            </a:r>
+            <a:r>
+              <a:rPr lang="ru-RU" dirty="0">
+                <a:latin typeface="Courier New" panose="02070309020205020404" pitchFamily="49" charset="0"/>
+                <a:cs typeface="Courier New" panose="02070309020205020404" pitchFamily="49" charset="0"/>
+              </a:rPr>
+              <a:t>Имитируем действия хакера</a:t>
+            </a:r>
+            <a:endParaRPr lang="en-US" dirty="0">
+              <a:latin typeface="Courier New" panose="02070309020205020404" pitchFamily="49" charset="0"/>
+              <a:cs typeface="Courier New" panose="02070309020205020404" pitchFamily="49" charset="0"/>
+            </a:endParaRPr>
+          </a:p>
+          <a:p>
+            <a:pPr marL="0" indent="0">
+              <a:buNone/>
+            </a:pPr>
+            <a:r>
+              <a:rPr lang="en-US" dirty="0">
+                <a:latin typeface="Courier New" panose="02070309020205020404" pitchFamily="49" charset="0"/>
+                <a:cs typeface="Courier New" panose="02070309020205020404" pitchFamily="49" charset="0"/>
+              </a:rPr>
+              <a:t>  _GLOBAL_OFFSET_TABLE_[POS] = shellcode;</a:t>
+            </a:r>
+          </a:p>
+          <a:p>
+            <a:pPr marL="0" indent="0">
+              <a:buNone/>
+            </a:pPr>
+            <a:endParaRPr lang="en-US" dirty="0">
+              <a:latin typeface="Courier New" panose="02070309020205020404" pitchFamily="49" charset="0"/>
+              <a:cs typeface="Courier New" panose="02070309020205020404" pitchFamily="49" charset="0"/>
+            </a:endParaRPr>
+          </a:p>
+          <a:p>
+            <a:pPr marL="0" indent="0">
+              <a:buNone/>
+            </a:pPr>
+            <a:r>
+              <a:rPr lang="en-US" dirty="0">
+                <a:latin typeface="Courier New" panose="02070309020205020404" pitchFamily="49" charset="0"/>
+                <a:cs typeface="Courier New" panose="02070309020205020404" pitchFamily="49" charset="0"/>
+              </a:rPr>
+              <a:t>  puts("Hello world!\n");</a:t>
+            </a:r>
+          </a:p>
+          <a:p>
+            <a:pPr marL="0" indent="0">
+              <a:buNone/>
+            </a:pPr>
+            <a:r>
+              <a:rPr lang="en-US" dirty="0">
+                <a:latin typeface="Courier New" panose="02070309020205020404" pitchFamily="49" charset="0"/>
+                <a:cs typeface="Courier New" panose="02070309020205020404" pitchFamily="49" charset="0"/>
+              </a:rPr>
+              <a:t>  return 0;</a:t>
+            </a:r>
+          </a:p>
+          <a:p>
+            <a:pPr marL="0" indent="0">
+              <a:buNone/>
+            </a:pPr>
+            <a:r>
+              <a:rPr lang="en-US" dirty="0">
+                <a:latin typeface="Courier New" panose="02070309020205020404" pitchFamily="49" charset="0"/>
+                <a:cs typeface="Courier New" panose="02070309020205020404" pitchFamily="49" charset="0"/>
+              </a:rPr>
+              <a:t>}</a:t>
+            </a:r>
+          </a:p>
+        </p:txBody>
+      </p:sp>
+      <p:sp>
+        <p:nvSpPr>
+          <p:cNvPr id="4" name="Content Placeholder 2">
+            <a:extLst>
+              <a:ext uri="{FF2B5EF4-FFF2-40B4-BE49-F238E27FC236}">
+                <a16:creationId xmlns:a16="http://schemas.microsoft.com/office/drawing/2014/main" id="{7310122A-D2E5-4462-9C9F-5B2A4EF8D9A6}"/>
+              </a:ext>
+            </a:extLst>
+          </p:cNvPr>
+          <p:cNvSpPr txBox="1">
+            <a:spLocks/>
+          </p:cNvSpPr>
+          <p:nvPr/>
+        </p:nvSpPr>
+        <p:spPr>
+          <a:xfrm>
+            <a:off x="6414247" y="1568824"/>
+            <a:ext cx="5257800" cy="4608139"/>
+          </a:xfrm>
+          <a:prstGeom prst="rect">
+            <a:avLst/>
+          </a:prstGeom>
+        </p:spPr>
+        <p:txBody>
+          <a:bodyPr vert="horz" lIns="91440" tIns="45720" rIns="91440" bIns="45720" rtlCol="0">
+            <a:normAutofit fontScale="62500" lnSpcReduction="20000"/>
+          </a:bodyPr>
+          <a:lstStyle>
+            <a:lvl1pPr marL="228600" indent="-228600" algn="l" defTabSz="914400" rtl="0" eaLnBrk="1" latinLnBrk="0" hangingPunct="1">
+              <a:lnSpc>
+                <a:spcPct val="90000"/>
+              </a:lnSpc>
+              <a:spcBef>
+                <a:spcPts val="1000"/>
+              </a:spcBef>
+              <a:buFont typeface="Arial" panose="020B0604020202020204" pitchFamily="34" charset="0"/>
+              <a:buChar char="•"/>
+              <a:defRPr sz="2800" kern="1200">
+                <a:solidFill>
+                  <a:schemeClr val="tx1"/>
+                </a:solidFill>
+                <a:latin typeface="+mn-lt"/>
+                <a:ea typeface="+mn-ea"/>
+                <a:cs typeface="+mn-cs"/>
+              </a:defRPr>
+            </a:lvl1pPr>
+            <a:lvl2pPr marL="685800" indent="-228600" algn="l" defTabSz="914400" rtl="0" eaLnBrk="1" latinLnBrk="0" hangingPunct="1">
+              <a:lnSpc>
+                <a:spcPct val="90000"/>
+              </a:lnSpc>
+              <a:spcBef>
+                <a:spcPts val="500"/>
+              </a:spcBef>
+              <a:buFont typeface="Arial" panose="020B0604020202020204" pitchFamily="34" charset="0"/>
+              <a:buChar char="•"/>
+              <a:defRPr sz="2400" kern="1200">
+                <a:solidFill>
+                  <a:schemeClr val="tx1"/>
+                </a:solidFill>
+                <a:latin typeface="+mn-lt"/>
+                <a:ea typeface="+mn-ea"/>
+                <a:cs typeface="+mn-cs"/>
+              </a:defRPr>
+            </a:lvl2pPr>
+            <a:lvl3pPr marL="1143000" indent="-228600" algn="l" defTabSz="914400" rtl="0" eaLnBrk="1" latinLnBrk="0" hangingPunct="1">
+              <a:lnSpc>
+                <a:spcPct val="90000"/>
+              </a:lnSpc>
+              <a:spcBef>
+                <a:spcPts val="500"/>
+              </a:spcBef>
+              <a:buFont typeface="Arial" panose="020B0604020202020204" pitchFamily="34" charset="0"/>
+              <a:buChar char="•"/>
+              <a:defRPr sz="2000" kern="1200">
+                <a:solidFill>
+                  <a:schemeClr val="tx1"/>
+                </a:solidFill>
+                <a:latin typeface="+mn-lt"/>
+                <a:ea typeface="+mn-ea"/>
+                <a:cs typeface="+mn-cs"/>
+              </a:defRPr>
+            </a:lvl3pPr>
+            <a:lvl4pPr marL="1600200" indent="-228600" algn="l" defTabSz="914400" rtl="0" eaLnBrk="1" latinLnBrk="0" hangingPunct="1">
+              <a:lnSpc>
+                <a:spcPct val="90000"/>
+              </a:lnSpc>
+              <a:spcBef>
+                <a:spcPts val="500"/>
+              </a:spcBef>
+              <a:buFont typeface="Arial" panose="020B0604020202020204" pitchFamily="34" charset="0"/>
+              <a:buChar char="•"/>
+              <a:defRPr sz="1800" kern="1200">
+                <a:solidFill>
+                  <a:schemeClr val="tx1"/>
+                </a:solidFill>
+                <a:latin typeface="+mn-lt"/>
+                <a:ea typeface="+mn-ea"/>
+                <a:cs typeface="+mn-cs"/>
+              </a:defRPr>
+            </a:lvl4pPr>
+            <a:lvl5pPr marL="2057400" indent="-228600" algn="l" defTabSz="914400" rtl="0" eaLnBrk="1" latinLnBrk="0" hangingPunct="1">
+              <a:lnSpc>
+                <a:spcPct val="90000"/>
+              </a:lnSpc>
+              <a:spcBef>
+                <a:spcPts val="500"/>
+              </a:spcBef>
+              <a:buFont typeface="Arial" panose="020B0604020202020204" pitchFamily="34" charset="0"/>
+              <a:buChar char="•"/>
+              <a:defRPr sz="1800" kern="1200">
+                <a:solidFill>
+                  <a:schemeClr val="tx1"/>
+                </a:solidFill>
+                <a:latin typeface="+mn-lt"/>
+                <a:ea typeface="+mn-ea"/>
+                <a:cs typeface="+mn-cs"/>
+              </a:defRPr>
+            </a:lvl5pPr>
+            <a:lvl6pPr marL="2514600" indent="-228600" algn="l" defTabSz="914400" rtl="0" eaLnBrk="1" latinLnBrk="0" hangingPunct="1">
+              <a:lnSpc>
+                <a:spcPct val="90000"/>
+              </a:lnSpc>
+              <a:spcBef>
+                <a:spcPts val="500"/>
+              </a:spcBef>
+              <a:buFont typeface="Arial" panose="020B0604020202020204" pitchFamily="34" charset="0"/>
+              <a:buChar char="•"/>
+              <a:defRPr sz="1800" kern="1200">
+                <a:solidFill>
+                  <a:schemeClr val="tx1"/>
+                </a:solidFill>
+                <a:latin typeface="+mn-lt"/>
+                <a:ea typeface="+mn-ea"/>
+                <a:cs typeface="+mn-cs"/>
+              </a:defRPr>
+            </a:lvl6pPr>
+            <a:lvl7pPr marL="2971800" indent="-228600" algn="l" defTabSz="914400" rtl="0" eaLnBrk="1" latinLnBrk="0" hangingPunct="1">
+              <a:lnSpc>
+                <a:spcPct val="90000"/>
+              </a:lnSpc>
+              <a:spcBef>
+                <a:spcPts val="500"/>
+              </a:spcBef>
+              <a:buFont typeface="Arial" panose="020B0604020202020204" pitchFamily="34" charset="0"/>
+              <a:buChar char="•"/>
+              <a:defRPr sz="1800" kern="1200">
+                <a:solidFill>
+                  <a:schemeClr val="tx1"/>
+                </a:solidFill>
+                <a:latin typeface="+mn-lt"/>
+                <a:ea typeface="+mn-ea"/>
+                <a:cs typeface="+mn-cs"/>
+              </a:defRPr>
+            </a:lvl7pPr>
+            <a:lvl8pPr marL="3429000" indent="-228600" algn="l" defTabSz="914400" rtl="0" eaLnBrk="1" latinLnBrk="0" hangingPunct="1">
+              <a:lnSpc>
+                <a:spcPct val="90000"/>
+              </a:lnSpc>
+              <a:spcBef>
+                <a:spcPts val="500"/>
+              </a:spcBef>
+              <a:buFont typeface="Arial" panose="020B0604020202020204" pitchFamily="34" charset="0"/>
+              <a:buChar char="•"/>
+              <a:defRPr sz="1800" kern="1200">
+                <a:solidFill>
+                  <a:schemeClr val="tx1"/>
+                </a:solidFill>
+                <a:latin typeface="+mn-lt"/>
+                <a:ea typeface="+mn-ea"/>
+                <a:cs typeface="+mn-cs"/>
+              </a:defRPr>
+            </a:lvl8pPr>
+            <a:lvl9pPr marL="3886200" indent="-228600" algn="l" defTabSz="914400" rtl="0" eaLnBrk="1" latinLnBrk="0" hangingPunct="1">
+              <a:lnSpc>
+                <a:spcPct val="90000"/>
+              </a:lnSpc>
+              <a:spcBef>
+                <a:spcPts val="500"/>
+              </a:spcBef>
+              <a:buFont typeface="Arial" panose="020B0604020202020204" pitchFamily="34" charset="0"/>
+              <a:buChar char="•"/>
+              <a:defRPr sz="1800" kern="1200">
+                <a:solidFill>
+                  <a:schemeClr val="tx1"/>
+                </a:solidFill>
+                <a:latin typeface="+mn-lt"/>
+                <a:ea typeface="+mn-ea"/>
+                <a:cs typeface="+mn-cs"/>
+              </a:defRPr>
+            </a:lvl9pPr>
+          </a:lstStyle>
+          <a:p>
+            <a:pPr marL="0" indent="0">
+              <a:buFont typeface="Arial" panose="020B0604020202020204" pitchFamily="34" charset="0"/>
+              <a:buNone/>
+            </a:pPr>
+            <a:r>
+              <a:rPr lang="en-US" dirty="0">
+                <a:latin typeface="Courier New" panose="02070309020205020404" pitchFamily="49" charset="0"/>
+                <a:cs typeface="Courier New" panose="02070309020205020404" pitchFamily="49" charset="0"/>
+              </a:rPr>
+              <a:t>$ for </a:t>
+            </a:r>
+            <a:r>
+              <a:rPr lang="en-US" dirty="0" err="1">
+                <a:latin typeface="Courier New" panose="02070309020205020404" pitchFamily="49" charset="0"/>
+                <a:cs typeface="Courier New" panose="02070309020205020404" pitchFamily="49" charset="0"/>
+              </a:rPr>
+              <a:t>i</a:t>
+            </a:r>
+            <a:r>
+              <a:rPr lang="en-US" dirty="0">
+                <a:latin typeface="Courier New" panose="02070309020205020404" pitchFamily="49" charset="0"/>
+                <a:cs typeface="Courier New" panose="02070309020205020404" pitchFamily="49" charset="0"/>
+              </a:rPr>
+              <a:t> in `seq 0 16`; do</a:t>
+            </a:r>
+          </a:p>
+          <a:p>
+            <a:pPr marL="0" indent="0">
+              <a:buFont typeface="Arial" panose="020B0604020202020204" pitchFamily="34" charset="0"/>
+              <a:buNone/>
+            </a:pPr>
+            <a:r>
+              <a:rPr lang="en-US" dirty="0">
+                <a:latin typeface="Courier New" panose="02070309020205020404" pitchFamily="49" charset="0"/>
+                <a:cs typeface="Courier New" panose="02070309020205020404" pitchFamily="49" charset="0"/>
+              </a:rPr>
+              <a:t>    </a:t>
+            </a:r>
+            <a:r>
+              <a:rPr lang="en-US" dirty="0" err="1">
+                <a:latin typeface="Courier New" panose="02070309020205020404" pitchFamily="49" charset="0"/>
+                <a:cs typeface="Courier New" panose="02070309020205020404" pitchFamily="49" charset="0"/>
+              </a:rPr>
+              <a:t>gcc</a:t>
+            </a:r>
+            <a:r>
+              <a:rPr lang="en-US" dirty="0">
+                <a:latin typeface="Courier New" panose="02070309020205020404" pitchFamily="49" charset="0"/>
+                <a:cs typeface="Courier New" panose="02070309020205020404" pitchFamily="49" charset="0"/>
+              </a:rPr>
+              <a:t> -</a:t>
+            </a:r>
+            <a:r>
+              <a:rPr lang="en-US" dirty="0" err="1">
+                <a:latin typeface="Courier New" panose="02070309020205020404" pitchFamily="49" charset="0"/>
+                <a:cs typeface="Courier New" panose="02070309020205020404" pitchFamily="49" charset="0"/>
+              </a:rPr>
+              <a:t>Wl</a:t>
+            </a:r>
+            <a:r>
+              <a:rPr lang="en-US" dirty="0">
+                <a:latin typeface="Courier New" panose="02070309020205020404" pitchFamily="49" charset="0"/>
+                <a:cs typeface="Courier New" panose="02070309020205020404" pitchFamily="49" charset="0"/>
+              </a:rPr>
+              <a:t>,-</a:t>
+            </a:r>
+            <a:r>
+              <a:rPr lang="en-US" dirty="0" err="1">
+                <a:latin typeface="Courier New" panose="02070309020205020404" pitchFamily="49" charset="0"/>
+                <a:cs typeface="Courier New" panose="02070309020205020404" pitchFamily="49" charset="0"/>
+              </a:rPr>
+              <a:t>z,norelro</a:t>
+            </a:r>
+            <a:r>
+              <a:rPr lang="en-US" dirty="0">
+                <a:latin typeface="Courier New" panose="02070309020205020404" pitchFamily="49" charset="0"/>
+                <a:cs typeface="Courier New" panose="02070309020205020404" pitchFamily="49" charset="0"/>
+              </a:rPr>
+              <a:t> </a:t>
+            </a:r>
+            <a:r>
+              <a:rPr lang="en-US" dirty="0" err="1">
+                <a:latin typeface="Courier New" panose="02070309020205020404" pitchFamily="49" charset="0"/>
+                <a:cs typeface="Courier New" panose="02070309020205020404" pitchFamily="49" charset="0"/>
+              </a:rPr>
+              <a:t>repro.c</a:t>
+            </a:r>
+            <a:r>
+              <a:rPr lang="en-US" dirty="0">
+                <a:latin typeface="Courier New" panose="02070309020205020404" pitchFamily="49" charset="0"/>
+                <a:cs typeface="Courier New" panose="02070309020205020404" pitchFamily="49" charset="0"/>
+              </a:rPr>
+              <a:t> -DPOS=$</a:t>
+            </a:r>
+            <a:r>
+              <a:rPr lang="en-US" dirty="0" err="1">
+                <a:latin typeface="Courier New" panose="02070309020205020404" pitchFamily="49" charset="0"/>
+                <a:cs typeface="Courier New" panose="02070309020205020404" pitchFamily="49" charset="0"/>
+              </a:rPr>
+              <a:t>i</a:t>
+            </a:r>
+            <a:endParaRPr lang="en-US" dirty="0">
+              <a:latin typeface="Courier New" panose="02070309020205020404" pitchFamily="49" charset="0"/>
+              <a:cs typeface="Courier New" panose="02070309020205020404" pitchFamily="49" charset="0"/>
+            </a:endParaRPr>
+          </a:p>
+          <a:p>
+            <a:pPr marL="0" indent="0">
+              <a:buFont typeface="Arial" panose="020B0604020202020204" pitchFamily="34" charset="0"/>
+              <a:buNone/>
+            </a:pPr>
+            <a:r>
+              <a:rPr lang="en-US" dirty="0">
+                <a:latin typeface="Courier New" panose="02070309020205020404" pitchFamily="49" charset="0"/>
+                <a:cs typeface="Courier New" panose="02070309020205020404" pitchFamily="49" charset="0"/>
+              </a:rPr>
+              <a:t>    ./</a:t>
+            </a:r>
+            <a:r>
+              <a:rPr lang="en-US" dirty="0" err="1">
+                <a:latin typeface="Courier New" panose="02070309020205020404" pitchFamily="49" charset="0"/>
+                <a:cs typeface="Courier New" panose="02070309020205020404" pitchFamily="49" charset="0"/>
+              </a:rPr>
+              <a:t>a.out</a:t>
+            </a:r>
+            <a:endParaRPr lang="en-US" dirty="0">
+              <a:latin typeface="Courier New" panose="02070309020205020404" pitchFamily="49" charset="0"/>
+              <a:cs typeface="Courier New" panose="02070309020205020404" pitchFamily="49" charset="0"/>
+            </a:endParaRPr>
+          </a:p>
+          <a:p>
+            <a:pPr marL="0" indent="0">
+              <a:buFont typeface="Arial" panose="020B0604020202020204" pitchFamily="34" charset="0"/>
+              <a:buNone/>
+            </a:pPr>
+            <a:r>
+              <a:rPr lang="en-US" dirty="0">
+                <a:latin typeface="Courier New" panose="02070309020205020404" pitchFamily="49" charset="0"/>
+                <a:cs typeface="Courier New" panose="02070309020205020404" pitchFamily="49" charset="0"/>
+              </a:rPr>
+              <a:t>    </a:t>
+            </a:r>
+            <a:r>
+              <a:rPr lang="en-US" dirty="0" err="1">
+                <a:latin typeface="Courier New" panose="02070309020205020404" pitchFamily="49" charset="0"/>
+                <a:cs typeface="Courier New" panose="02070309020205020404" pitchFamily="49" charset="0"/>
+              </a:rPr>
+              <a:t>i</a:t>
+            </a:r>
+            <a:r>
+              <a:rPr lang="en-US" dirty="0">
+                <a:latin typeface="Courier New" panose="02070309020205020404" pitchFamily="49" charset="0"/>
+                <a:cs typeface="Courier New" panose="02070309020205020404" pitchFamily="49" charset="0"/>
+              </a:rPr>
+              <a:t>=$((</a:t>
+            </a:r>
+            <a:r>
+              <a:rPr lang="en-US" dirty="0" err="1">
+                <a:latin typeface="Courier New" panose="02070309020205020404" pitchFamily="49" charset="0"/>
+                <a:cs typeface="Courier New" panose="02070309020205020404" pitchFamily="49" charset="0"/>
+              </a:rPr>
+              <a:t>i</a:t>
+            </a:r>
+            <a:r>
+              <a:rPr lang="en-US" dirty="0">
+                <a:latin typeface="Courier New" panose="02070309020205020404" pitchFamily="49" charset="0"/>
+                <a:cs typeface="Courier New" panose="02070309020205020404" pitchFamily="49" charset="0"/>
+              </a:rPr>
+              <a:t> + 1))</a:t>
+            </a:r>
+          </a:p>
+          <a:p>
+            <a:pPr marL="0" indent="0">
+              <a:buFont typeface="Arial" panose="020B0604020202020204" pitchFamily="34" charset="0"/>
+              <a:buNone/>
+            </a:pPr>
+            <a:r>
+              <a:rPr lang="en-US" dirty="0">
+                <a:latin typeface="Courier New" panose="02070309020205020404" pitchFamily="49" charset="0"/>
+                <a:cs typeface="Courier New" panose="02070309020205020404" pitchFamily="49" charset="0"/>
+              </a:rPr>
+              <a:t>  done</a:t>
+            </a:r>
+          </a:p>
+          <a:p>
+            <a:pPr marL="0" indent="0">
+              <a:buFont typeface="Arial" panose="020B0604020202020204" pitchFamily="34" charset="0"/>
+              <a:buNone/>
+            </a:pPr>
+            <a:r>
+              <a:rPr lang="en-US" dirty="0">
+                <a:latin typeface="Courier New" panose="02070309020205020404" pitchFamily="49" charset="0"/>
+                <a:cs typeface="Courier New" panose="02070309020205020404" pitchFamily="49" charset="0"/>
+              </a:rPr>
+              <a:t>  Segmentation fault</a:t>
+            </a:r>
+          </a:p>
+          <a:p>
+            <a:pPr marL="0" indent="0">
+              <a:buFont typeface="Arial" panose="020B0604020202020204" pitchFamily="34" charset="0"/>
+              <a:buNone/>
+            </a:pPr>
+            <a:r>
+              <a:rPr lang="en-US" dirty="0">
+                <a:latin typeface="Courier New" panose="02070309020205020404" pitchFamily="49" charset="0"/>
+                <a:cs typeface="Courier New" panose="02070309020205020404" pitchFamily="49" charset="0"/>
+              </a:rPr>
+              <a:t>  Segmentation fault</a:t>
+            </a:r>
+          </a:p>
+          <a:p>
+            <a:pPr marL="0" indent="0">
+              <a:buFont typeface="Arial" panose="020B0604020202020204" pitchFamily="34" charset="0"/>
+              <a:buNone/>
+            </a:pPr>
+            <a:r>
+              <a:rPr lang="en-US" dirty="0">
+                <a:latin typeface="Courier New" panose="02070309020205020404" pitchFamily="49" charset="0"/>
+                <a:cs typeface="Courier New" panose="02070309020205020404" pitchFamily="49" charset="0"/>
+              </a:rPr>
+              <a:t>  Segmentation fault</a:t>
+            </a:r>
+          </a:p>
+          <a:p>
+            <a:pPr marL="0" indent="0">
+              <a:buFont typeface="Arial" panose="020B0604020202020204" pitchFamily="34" charset="0"/>
+              <a:buNone/>
+            </a:pPr>
+            <a:r>
+              <a:rPr lang="en-US" b="1" dirty="0">
+                <a:latin typeface="Courier New" panose="02070309020205020404" pitchFamily="49" charset="0"/>
+                <a:cs typeface="Courier New" panose="02070309020205020404" pitchFamily="49" charset="0"/>
+              </a:rPr>
+              <a:t>  You have </a:t>
+            </a:r>
+            <a:r>
+              <a:rPr lang="en-US" b="1" dirty="0" err="1">
+                <a:latin typeface="Courier New" panose="02070309020205020404" pitchFamily="49" charset="0"/>
+                <a:cs typeface="Courier New" panose="02070309020205020404" pitchFamily="49" charset="0"/>
+              </a:rPr>
+              <a:t>beeen</a:t>
+            </a:r>
+            <a:r>
+              <a:rPr lang="en-US" b="1" dirty="0">
+                <a:latin typeface="Courier New" panose="02070309020205020404" pitchFamily="49" charset="0"/>
+                <a:cs typeface="Courier New" panose="02070309020205020404" pitchFamily="49" charset="0"/>
+              </a:rPr>
+              <a:t> </a:t>
+            </a:r>
+            <a:r>
+              <a:rPr lang="en-US" b="1" dirty="0" err="1">
+                <a:latin typeface="Courier New" panose="02070309020205020404" pitchFamily="49" charset="0"/>
+                <a:cs typeface="Courier New" panose="02070309020205020404" pitchFamily="49" charset="0"/>
+              </a:rPr>
+              <a:t>pwned</a:t>
+            </a:r>
+            <a:endParaRPr lang="en-US" b="1" dirty="0">
+              <a:latin typeface="Courier New" panose="02070309020205020404" pitchFamily="49" charset="0"/>
+              <a:cs typeface="Courier New" panose="02070309020205020404" pitchFamily="49" charset="0"/>
+            </a:endParaRPr>
+          </a:p>
+          <a:p>
+            <a:pPr marL="0" indent="0">
+              <a:buFont typeface="Arial" panose="020B0604020202020204" pitchFamily="34" charset="0"/>
+              <a:buNone/>
+            </a:pPr>
+            <a:r>
+              <a:rPr lang="en-US" dirty="0">
+                <a:latin typeface="Courier New" panose="02070309020205020404" pitchFamily="49" charset="0"/>
+                <a:cs typeface="Courier New" panose="02070309020205020404" pitchFamily="49" charset="0"/>
+              </a:rPr>
+              <a:t>  Hello world!</a:t>
+            </a:r>
+          </a:p>
+          <a:p>
+            <a:pPr marL="0" indent="0">
+              <a:buFont typeface="Arial" panose="020B0604020202020204" pitchFamily="34" charset="0"/>
+              <a:buNone/>
+            </a:pPr>
+            <a:r>
+              <a:rPr lang="en-US" dirty="0">
+                <a:latin typeface="Courier New" panose="02070309020205020404" pitchFamily="49" charset="0"/>
+                <a:cs typeface="Courier New" panose="02070309020205020404" pitchFamily="49" charset="0"/>
+              </a:rPr>
+              <a:t>  Hello world!</a:t>
+            </a:r>
+          </a:p>
+          <a:p>
+            <a:pPr marL="0" indent="0">
+              <a:buFont typeface="Arial" panose="020B0604020202020204" pitchFamily="34" charset="0"/>
+              <a:buNone/>
+            </a:pPr>
+            <a:r>
+              <a:rPr lang="en-US" dirty="0">
+                <a:latin typeface="Courier New" panose="02070309020205020404" pitchFamily="49" charset="0"/>
+                <a:cs typeface="Courier New" panose="02070309020205020404" pitchFamily="49" charset="0"/>
+              </a:rPr>
+              <a:t>  Hello world!</a:t>
+            </a:r>
+          </a:p>
+          <a:p>
+            <a:pPr marL="0" indent="0">
+              <a:buFont typeface="Arial" panose="020B0604020202020204" pitchFamily="34" charset="0"/>
+              <a:buNone/>
+            </a:pPr>
+            <a:r>
+              <a:rPr lang="en-US" dirty="0">
+                <a:latin typeface="Courier New" panose="02070309020205020404" pitchFamily="49" charset="0"/>
+                <a:cs typeface="Courier New" panose="02070309020205020404" pitchFamily="49" charset="0"/>
+              </a:rPr>
+              <a:t>  ...</a:t>
+            </a:r>
           </a:p>
         </p:txBody>
       </p:sp>
     </p:spTree>
     <p:extLst>
       <p:ext uri="{BB962C8B-B14F-4D97-AF65-F5344CB8AC3E}">
-        <p14:creationId xmlns:p14="http://schemas.microsoft.com/office/powerpoint/2010/main" val="4165890631"/>
+        <p14:creationId xmlns:p14="http://schemas.microsoft.com/office/powerpoint/2010/main" val="2956310077"/>
       </p:ext>
     </p:extLst>
   </p:cSld>
@@ -15372,6 +16059,793 @@
     <p:extLst>
       <p:ext uri="{BB962C8B-B14F-4D97-AF65-F5344CB8AC3E}">
         <p14:creationId xmlns:p14="http://schemas.microsoft.com/office/powerpoint/2010/main" val="1953492814"/>
+      </p:ext>
+    </p:extLst>
+  </p:cSld>
+  <p:clrMapOvr>
+    <a:masterClrMapping/>
+  </p:clrMapOvr>
+</p:sld>
+</file>
+
+<file path=ppt/slides/slide50.xml><?xml version="1.0" encoding="utf-8"?>
+<p:sld xmlns:a="http://schemas.openxmlformats.org/drawingml/2006/main" xmlns:r="http://schemas.openxmlformats.org/officeDocument/2006/relationships" xmlns:p="http://schemas.openxmlformats.org/presentationml/2006/main">
+  <p:cSld>
+    <p:spTree>
+      <p:nvGrpSpPr>
+        <p:cNvPr id="1" name=""/>
+        <p:cNvGrpSpPr/>
+        <p:nvPr/>
+      </p:nvGrpSpPr>
+      <p:grpSpPr>
+        <a:xfrm>
+          <a:off x="0" y="0"/>
+          <a:ext cx="0" cy="0"/>
+          <a:chOff x="0" y="0"/>
+          <a:chExt cx="0" cy="0"/>
+        </a:xfrm>
+      </p:grpSpPr>
+      <p:sp>
+        <p:nvSpPr>
+          <p:cNvPr id="2" name="Title 1">
+            <a:extLst>
+              <a:ext uri="{FF2B5EF4-FFF2-40B4-BE49-F238E27FC236}">
+                <a16:creationId xmlns:a16="http://schemas.microsoft.com/office/drawing/2014/main" id="{7B8E7810-D0A8-4634-93F0-ED0AC0D81DED}"/>
+              </a:ext>
+            </a:extLst>
+          </p:cNvPr>
+          <p:cNvSpPr>
+            <a:spLocks noGrp="1"/>
+          </p:cNvSpPr>
+          <p:nvPr>
+            <p:ph type="title"/>
+          </p:nvPr>
+        </p:nvSpPr>
+        <p:spPr/>
+        <p:txBody>
+          <a:bodyPr/>
+          <a:lstStyle/>
+          <a:p>
+            <a:r>
+              <a:rPr lang="ru-RU" dirty="0"/>
+              <a:t>История</a:t>
+            </a:r>
+            <a:endParaRPr lang="en-US" dirty="0"/>
+          </a:p>
+        </p:txBody>
+      </p:sp>
+      <p:sp>
+        <p:nvSpPr>
+          <p:cNvPr id="3" name="Content Placeholder 2">
+            <a:extLst>
+              <a:ext uri="{FF2B5EF4-FFF2-40B4-BE49-F238E27FC236}">
+                <a16:creationId xmlns:a16="http://schemas.microsoft.com/office/drawing/2014/main" id="{801672DB-F6AD-4CB3-A053-3E47CCBF67BF}"/>
+              </a:ext>
+            </a:extLst>
+          </p:cNvPr>
+          <p:cNvSpPr>
+            <a:spLocks noGrp="1"/>
+          </p:cNvSpPr>
+          <p:nvPr>
+            <p:ph idx="1"/>
+          </p:nvPr>
+        </p:nvSpPr>
+        <p:spPr/>
+        <p:txBody>
+          <a:bodyPr>
+            <a:normAutofit/>
+          </a:bodyPr>
+          <a:lstStyle/>
+          <a:p>
+            <a:r>
+              <a:rPr lang="ru-RU" dirty="0"/>
+              <a:t>Подход RELRO уже использовался ранее для инициализации vtables </a:t>
+            </a:r>
+            <a:r>
+              <a:rPr lang="en-US" dirty="0"/>
+              <a:t>(partial RELRO)</a:t>
+            </a:r>
+            <a:endParaRPr lang="ru-RU" dirty="0"/>
+          </a:p>
+          <a:p>
+            <a:pPr lvl="1"/>
+            <a:r>
+              <a:rPr lang="ru-RU" dirty="0">
+                <a:hlinkClick r:id="rId2"/>
+              </a:rPr>
+              <a:t>Ian Lance Taylor</a:t>
+            </a:r>
+            <a:r>
+              <a:rPr lang="en-US" dirty="0">
+                <a:hlinkClick r:id="rId2"/>
+              </a:rPr>
+              <a:t>: Linker </a:t>
+            </a:r>
+            <a:r>
+              <a:rPr lang="en-US" dirty="0" err="1">
+                <a:hlinkClick r:id="rId2"/>
+              </a:rPr>
+              <a:t>relro</a:t>
+            </a:r>
+            <a:endParaRPr lang="ru-RU" dirty="0"/>
+          </a:p>
+          <a:p>
+            <a:r>
+              <a:rPr lang="ru-RU" dirty="0"/>
+              <a:t>Потребовалась лишь небольшая адаптация для GOT</a:t>
+            </a:r>
+            <a:r>
+              <a:rPr lang="en-US" dirty="0"/>
+              <a:t> (full RELRO)</a:t>
+            </a:r>
+            <a:endParaRPr lang="ru-RU" dirty="0"/>
+          </a:p>
+          <a:p>
+            <a:endParaRPr lang="en-US" dirty="0"/>
+          </a:p>
+        </p:txBody>
+      </p:sp>
+    </p:spTree>
+    <p:extLst>
+      <p:ext uri="{BB962C8B-B14F-4D97-AF65-F5344CB8AC3E}">
+        <p14:creationId xmlns:p14="http://schemas.microsoft.com/office/powerpoint/2010/main" val="160064826"/>
+      </p:ext>
+    </p:extLst>
+  </p:cSld>
+  <p:clrMapOvr>
+    <a:masterClrMapping/>
+  </p:clrMapOvr>
+</p:sld>
+</file>
+
+<file path=ppt/slides/slide51.xml><?xml version="1.0" encoding="utf-8"?>
+<p:sld xmlns:a="http://schemas.openxmlformats.org/drawingml/2006/main" xmlns:r="http://schemas.openxmlformats.org/officeDocument/2006/relationships" xmlns:p="http://schemas.openxmlformats.org/presentationml/2006/main">
+  <p:cSld>
+    <p:spTree>
+      <p:nvGrpSpPr>
+        <p:cNvPr id="1" name=""/>
+        <p:cNvGrpSpPr/>
+        <p:nvPr/>
+      </p:nvGrpSpPr>
+      <p:grpSpPr>
+        <a:xfrm>
+          <a:off x="0" y="0"/>
+          <a:ext cx="0" cy="0"/>
+          <a:chOff x="0" y="0"/>
+          <a:chExt cx="0" cy="0"/>
+        </a:xfrm>
+      </p:grpSpPr>
+      <p:sp>
+        <p:nvSpPr>
+          <p:cNvPr id="2" name="Title 1">
+            <a:extLst>
+              <a:ext uri="{FF2B5EF4-FFF2-40B4-BE49-F238E27FC236}">
+                <a16:creationId xmlns:a16="http://schemas.microsoft.com/office/drawing/2014/main" id="{C959E6E0-49FC-47E3-B907-3E8C02CEE8E1}"/>
+              </a:ext>
+            </a:extLst>
+          </p:cNvPr>
+          <p:cNvSpPr>
+            <a:spLocks noGrp="1"/>
+          </p:cNvSpPr>
+          <p:nvPr>
+            <p:ph type="title"/>
+          </p:nvPr>
+        </p:nvSpPr>
+        <p:spPr/>
+        <p:txBody>
+          <a:bodyPr/>
+          <a:lstStyle/>
+          <a:p>
+            <a:r>
+              <a:rPr lang="ru-RU" dirty="0"/>
+              <a:t>Недостатки</a:t>
+            </a:r>
+            <a:endParaRPr lang="en-US" dirty="0"/>
+          </a:p>
+        </p:txBody>
+      </p:sp>
+      <p:sp>
+        <p:nvSpPr>
+          <p:cNvPr id="3" name="Content Placeholder 2">
+            <a:extLst>
+              <a:ext uri="{FF2B5EF4-FFF2-40B4-BE49-F238E27FC236}">
+                <a16:creationId xmlns:a16="http://schemas.microsoft.com/office/drawing/2014/main" id="{65C5F9C5-D035-44BF-A73F-D04C9E2F3C20}"/>
+              </a:ext>
+            </a:extLst>
+          </p:cNvPr>
+          <p:cNvSpPr>
+            <a:spLocks noGrp="1"/>
+          </p:cNvSpPr>
+          <p:nvPr>
+            <p:ph idx="1"/>
+          </p:nvPr>
+        </p:nvSpPr>
+        <p:spPr/>
+        <p:txBody>
+          <a:bodyPr/>
+          <a:lstStyle/>
+          <a:p>
+            <a:r>
+              <a:rPr lang="ru-RU" dirty="0"/>
+              <a:t>Практически не влияет на производительность</a:t>
+            </a:r>
+          </a:p>
+          <a:p>
+            <a:pPr lvl="1"/>
+            <a:r>
+              <a:rPr lang="ru-RU" dirty="0"/>
+              <a:t>Может только немного замедлить старт приложения из-за необходимости разрешения всех символов</a:t>
+            </a:r>
+            <a:endParaRPr lang="en-US" dirty="0"/>
+          </a:p>
+          <a:p>
+            <a:pPr lvl="1"/>
+            <a:r>
+              <a:rPr lang="ru-RU" dirty="0"/>
+              <a:t>Не обнаружили никакого замедления в работе компилятора </a:t>
+            </a:r>
+            <a:r>
+              <a:rPr lang="en-US" dirty="0"/>
+              <a:t>Clang</a:t>
+            </a:r>
+          </a:p>
+          <a:p>
+            <a:r>
+              <a:rPr lang="en-US" dirty="0"/>
+              <a:t>False positives:</a:t>
+            </a:r>
+            <a:endParaRPr lang="ru-RU" dirty="0"/>
+          </a:p>
+          <a:p>
+            <a:pPr lvl="1"/>
+            <a:r>
+              <a:rPr lang="ru-RU" dirty="0"/>
+              <a:t>Могут сломаться некоторые программы, если в них были отсутствующие символы (которые не вызывались)</a:t>
+            </a:r>
+          </a:p>
+          <a:p>
+            <a:r>
+              <a:rPr lang="en-US" dirty="0"/>
+              <a:t>False negatives:</a:t>
+            </a:r>
+          </a:p>
+          <a:p>
+            <a:pPr lvl="1"/>
+            <a:r>
+              <a:rPr lang="ru-RU" dirty="0"/>
+              <a:t>Не защищает пользовательские таблицы функций</a:t>
+            </a:r>
+            <a:endParaRPr lang="en-US" dirty="0"/>
+          </a:p>
+          <a:p>
+            <a:endParaRPr lang="en-US" dirty="0"/>
+          </a:p>
+          <a:p>
+            <a:endParaRPr lang="en-US" dirty="0"/>
+          </a:p>
+        </p:txBody>
+      </p:sp>
+    </p:spTree>
+    <p:extLst>
+      <p:ext uri="{BB962C8B-B14F-4D97-AF65-F5344CB8AC3E}">
+        <p14:creationId xmlns:p14="http://schemas.microsoft.com/office/powerpoint/2010/main" val="826898882"/>
+      </p:ext>
+    </p:extLst>
+  </p:cSld>
+  <p:clrMapOvr>
+    <a:masterClrMapping/>
+  </p:clrMapOvr>
+</p:sld>
+</file>
+
+<file path=ppt/slides/slide52.xml><?xml version="1.0" encoding="utf-8"?>
+<p:sld xmlns:a="http://schemas.openxmlformats.org/drawingml/2006/main" xmlns:r="http://schemas.openxmlformats.org/officeDocument/2006/relationships" xmlns:p="http://schemas.openxmlformats.org/presentationml/2006/main">
+  <p:cSld>
+    <p:spTree>
+      <p:nvGrpSpPr>
+        <p:cNvPr id="1" name=""/>
+        <p:cNvGrpSpPr/>
+        <p:nvPr/>
+      </p:nvGrpSpPr>
+      <p:grpSpPr>
+        <a:xfrm>
+          <a:off x="0" y="0"/>
+          <a:ext cx="0" cy="0"/>
+          <a:chOff x="0" y="0"/>
+          <a:chExt cx="0" cy="0"/>
+        </a:xfrm>
+      </p:grpSpPr>
+      <p:sp>
+        <p:nvSpPr>
+          <p:cNvPr id="2" name="Title 1">
+            <a:extLst>
+              <a:ext uri="{FF2B5EF4-FFF2-40B4-BE49-F238E27FC236}">
+                <a16:creationId xmlns:a16="http://schemas.microsoft.com/office/drawing/2014/main" id="{24F65176-1DCF-40BE-BC3B-1D07413D3E26}"/>
+              </a:ext>
+            </a:extLst>
+          </p:cNvPr>
+          <p:cNvSpPr>
+            <a:spLocks noGrp="1"/>
+          </p:cNvSpPr>
+          <p:nvPr>
+            <p:ph type="title"/>
+          </p:nvPr>
+        </p:nvSpPr>
+        <p:spPr/>
+        <p:txBody>
+          <a:bodyPr/>
+          <a:lstStyle/>
+          <a:p>
+            <a:r>
+              <a:rPr lang="ru-RU" dirty="0"/>
+              <a:t>Как включить</a:t>
+            </a:r>
+            <a:r>
+              <a:rPr lang="en-US" dirty="0"/>
+              <a:t> ?</a:t>
+            </a:r>
+          </a:p>
+        </p:txBody>
+      </p:sp>
+      <p:sp>
+        <p:nvSpPr>
+          <p:cNvPr id="3" name="Content Placeholder 2">
+            <a:extLst>
+              <a:ext uri="{FF2B5EF4-FFF2-40B4-BE49-F238E27FC236}">
+                <a16:creationId xmlns:a16="http://schemas.microsoft.com/office/drawing/2014/main" id="{0B75EE06-796F-4150-9967-C80D9D14B36F}"/>
+              </a:ext>
+            </a:extLst>
+          </p:cNvPr>
+          <p:cNvSpPr>
+            <a:spLocks noGrp="1"/>
+          </p:cNvSpPr>
+          <p:nvPr>
+            <p:ph idx="1"/>
+          </p:nvPr>
+        </p:nvSpPr>
+        <p:spPr/>
+        <p:txBody>
+          <a:bodyPr>
+            <a:normAutofit/>
+          </a:bodyPr>
+          <a:lstStyle/>
+          <a:p>
+            <a:r>
+              <a:rPr lang="ru-RU" dirty="0"/>
+              <a:t>Опции линкера для включения </a:t>
+            </a:r>
+            <a:r>
+              <a:rPr lang="en-US" dirty="0"/>
+              <a:t>Full RELRO:</a:t>
+            </a:r>
+            <a:r>
+              <a:rPr lang="ru-RU" dirty="0"/>
+              <a:t> </a:t>
+            </a:r>
+            <a:r>
+              <a:rPr lang="ru-RU" dirty="0">
+                <a:latin typeface="Courier New" panose="02070309020205020404" pitchFamily="49" charset="0"/>
+                <a:cs typeface="Courier New" panose="02070309020205020404" pitchFamily="49" charset="0"/>
+              </a:rPr>
+              <a:t>-Wl,-z,now -Wl,-z,relro</a:t>
+            </a:r>
+          </a:p>
+          <a:p>
+            <a:pPr lvl="1"/>
+            <a:r>
+              <a:rPr lang="ru-RU" dirty="0"/>
+              <a:t>В Ubuntu включены по умолчанию в GCC, но не в </a:t>
+            </a:r>
+            <a:r>
+              <a:rPr lang="en-US" dirty="0"/>
+              <a:t>Clang (</a:t>
+            </a:r>
+            <a:r>
+              <a:rPr lang="ru-RU" dirty="0"/>
+              <a:t>в </a:t>
+            </a:r>
+            <a:r>
+              <a:rPr lang="en-US" dirty="0"/>
+              <a:t>Clang </a:t>
+            </a:r>
+            <a:r>
+              <a:rPr lang="ru-RU" dirty="0"/>
+              <a:t>только </a:t>
+            </a:r>
+            <a:r>
+              <a:rPr lang="en-US" dirty="0"/>
+              <a:t>partial RELRO</a:t>
+            </a:r>
+            <a:endParaRPr lang="ru-RU" dirty="0"/>
+          </a:p>
+          <a:p>
+            <a:pPr lvl="1"/>
+            <a:r>
+              <a:rPr lang="ru-RU" dirty="0"/>
+              <a:t>В Debian и </a:t>
+            </a:r>
+            <a:r>
+              <a:rPr lang="en-US" dirty="0"/>
+              <a:t>Fedora </a:t>
+            </a:r>
+            <a:r>
+              <a:rPr lang="ru-RU" dirty="0"/>
+              <a:t>не включены по умолчанию ни в GCC, ни в Clang</a:t>
+            </a:r>
+          </a:p>
+          <a:p>
+            <a:r>
+              <a:rPr lang="ru-RU" dirty="0"/>
+              <a:t>Использование в реальных проектах</a:t>
+            </a:r>
+            <a:endParaRPr lang="en-US" dirty="0"/>
+          </a:p>
+          <a:p>
+            <a:pPr lvl="1"/>
+            <a:r>
+              <a:rPr lang="ru-RU" dirty="0"/>
+              <a:t>В </a:t>
+            </a:r>
+            <a:r>
+              <a:rPr lang="en-US" dirty="0"/>
+              <a:t>Ubuntu </a:t>
+            </a:r>
+            <a:r>
+              <a:rPr lang="ru-RU" dirty="0"/>
+              <a:t>и Fefora пакеты дефолтно собираются с </a:t>
+            </a:r>
+            <a:r>
+              <a:rPr lang="en-US" dirty="0"/>
+              <a:t>F</a:t>
+            </a:r>
+            <a:r>
+              <a:rPr lang="ru-RU" dirty="0"/>
+              <a:t>ull RELRO</a:t>
+            </a:r>
+          </a:p>
+          <a:p>
+            <a:pPr lvl="1"/>
+            <a:r>
+              <a:rPr lang="ru-RU" dirty="0"/>
+              <a:t>В пакетах Debian </a:t>
+            </a:r>
+            <a:r>
+              <a:rPr lang="en-US" dirty="0"/>
+              <a:t>Full RELRO</a:t>
+            </a:r>
+            <a:r>
+              <a:rPr lang="ru-RU" dirty="0"/>
+              <a:t> дефолтно не включён</a:t>
+            </a:r>
+            <a:endParaRPr lang="en-US" dirty="0"/>
+          </a:p>
+          <a:p>
+            <a:pPr lvl="1"/>
+            <a:r>
+              <a:rPr lang="en-US" dirty="0"/>
+              <a:t>TODO: </a:t>
+            </a:r>
+            <a:r>
+              <a:rPr lang="ru-RU" dirty="0"/>
+              <a:t>браузеры</a:t>
+            </a:r>
+          </a:p>
+          <a:p>
+            <a:endParaRPr lang="en-US" dirty="0"/>
+          </a:p>
+        </p:txBody>
+      </p:sp>
+    </p:spTree>
+    <p:extLst>
+      <p:ext uri="{BB962C8B-B14F-4D97-AF65-F5344CB8AC3E}">
+        <p14:creationId xmlns:p14="http://schemas.microsoft.com/office/powerpoint/2010/main" val="935747203"/>
+      </p:ext>
+    </p:extLst>
+  </p:cSld>
+  <p:clrMapOvr>
+    <a:masterClrMapping/>
+  </p:clrMapOvr>
+</p:sld>
+</file>
+
+<file path=ppt/slides/slide53.xml><?xml version="1.0" encoding="utf-8"?>
+<p:sld xmlns:a="http://schemas.openxmlformats.org/drawingml/2006/main" xmlns:r="http://schemas.openxmlformats.org/officeDocument/2006/relationships" xmlns:p="http://schemas.openxmlformats.org/presentationml/2006/main">
+  <p:cSld>
+    <p:spTree>
+      <p:nvGrpSpPr>
+        <p:cNvPr id="1" name=""/>
+        <p:cNvGrpSpPr/>
+        <p:nvPr/>
+      </p:nvGrpSpPr>
+      <p:grpSpPr>
+        <a:xfrm>
+          <a:off x="0" y="0"/>
+          <a:ext cx="0" cy="0"/>
+          <a:chOff x="0" y="0"/>
+          <a:chExt cx="0" cy="0"/>
+        </a:xfrm>
+      </p:grpSpPr>
+      <p:sp>
+        <p:nvSpPr>
+          <p:cNvPr id="2" name="Title 1">
+            <a:extLst>
+              <a:ext uri="{FF2B5EF4-FFF2-40B4-BE49-F238E27FC236}">
+                <a16:creationId xmlns:a16="http://schemas.microsoft.com/office/drawing/2014/main" id="{CA3C8DD7-2659-4877-AB44-B521617A7883}"/>
+              </a:ext>
+            </a:extLst>
+          </p:cNvPr>
+          <p:cNvSpPr>
+            <a:spLocks noGrp="1"/>
+          </p:cNvSpPr>
+          <p:nvPr>
+            <p:ph type="title"/>
+          </p:nvPr>
+        </p:nvSpPr>
+        <p:spPr/>
+        <p:txBody>
+          <a:bodyPr/>
+          <a:lstStyle/>
+          <a:p>
+            <a:r>
+              <a:rPr lang="ru-RU" dirty="0"/>
+              <a:t>Спасибо за внимание</a:t>
+            </a:r>
+            <a:endParaRPr lang="en-US" dirty="0"/>
+          </a:p>
+        </p:txBody>
+      </p:sp>
+      <p:sp>
+        <p:nvSpPr>
+          <p:cNvPr id="3" name="Content Placeholder 2">
+            <a:extLst>
+              <a:ext uri="{FF2B5EF4-FFF2-40B4-BE49-F238E27FC236}">
+                <a16:creationId xmlns:a16="http://schemas.microsoft.com/office/drawing/2014/main" id="{1A014712-4ABE-498A-9B77-26D4F051DB7C}"/>
+              </a:ext>
+            </a:extLst>
+          </p:cNvPr>
+          <p:cNvSpPr>
+            <a:spLocks noGrp="1"/>
+          </p:cNvSpPr>
+          <p:nvPr>
+            <p:ph idx="1"/>
+          </p:nvPr>
+        </p:nvSpPr>
+        <p:spPr/>
+        <p:txBody>
+          <a:bodyPr/>
+          <a:lstStyle/>
+          <a:p>
+            <a:r>
+              <a:rPr lang="ru-RU" dirty="0"/>
+              <a:t>Вопросы</a:t>
+            </a:r>
+            <a:r>
+              <a:rPr lang="en-US" dirty="0"/>
+              <a:t> ?</a:t>
+            </a:r>
+          </a:p>
+        </p:txBody>
+      </p:sp>
+    </p:spTree>
+    <p:extLst>
+      <p:ext uri="{BB962C8B-B14F-4D97-AF65-F5344CB8AC3E}">
+        <p14:creationId xmlns:p14="http://schemas.microsoft.com/office/powerpoint/2010/main" val="836139563"/>
+      </p:ext>
+    </p:extLst>
+  </p:cSld>
+  <p:clrMapOvr>
+    <a:masterClrMapping/>
+  </p:clrMapOvr>
+</p:sld>
+</file>
+
+<file path=ppt/slides/slide54.xml><?xml version="1.0" encoding="utf-8"?>
+<p:sld xmlns:a="http://schemas.openxmlformats.org/drawingml/2006/main" xmlns:r="http://schemas.openxmlformats.org/officeDocument/2006/relationships" xmlns:p="http://schemas.openxmlformats.org/presentationml/2006/main">
+  <p:cSld>
+    <p:spTree>
+      <p:nvGrpSpPr>
+        <p:cNvPr id="1" name=""/>
+        <p:cNvGrpSpPr/>
+        <p:nvPr/>
+      </p:nvGrpSpPr>
+      <p:grpSpPr>
+        <a:xfrm>
+          <a:off x="0" y="0"/>
+          <a:ext cx="0" cy="0"/>
+          <a:chOff x="0" y="0"/>
+          <a:chExt cx="0" cy="0"/>
+        </a:xfrm>
+      </p:grpSpPr>
+      <p:sp>
+        <p:nvSpPr>
+          <p:cNvPr id="2" name="Title 1">
+            <a:extLst>
+              <a:ext uri="{FF2B5EF4-FFF2-40B4-BE49-F238E27FC236}">
+                <a16:creationId xmlns:a16="http://schemas.microsoft.com/office/drawing/2014/main" id="{CAC7532A-964A-431E-A4F5-80DD903BB997}"/>
+              </a:ext>
+            </a:extLst>
+          </p:cNvPr>
+          <p:cNvSpPr>
+            <a:spLocks noGrp="1"/>
+          </p:cNvSpPr>
+          <p:nvPr>
+            <p:ph type="title"/>
+          </p:nvPr>
+        </p:nvSpPr>
+        <p:spPr/>
+        <p:txBody>
+          <a:bodyPr/>
+          <a:lstStyle/>
+          <a:p>
+            <a:r>
+              <a:rPr lang="en-US" dirty="0"/>
+              <a:t>TODO</a:t>
+            </a:r>
+          </a:p>
+        </p:txBody>
+      </p:sp>
+      <p:sp>
+        <p:nvSpPr>
+          <p:cNvPr id="3" name="Content Placeholder 2">
+            <a:extLst>
+              <a:ext uri="{FF2B5EF4-FFF2-40B4-BE49-F238E27FC236}">
+                <a16:creationId xmlns:a16="http://schemas.microsoft.com/office/drawing/2014/main" id="{4C484971-452F-45F6-AD84-582487E77763}"/>
+              </a:ext>
+            </a:extLst>
+          </p:cNvPr>
+          <p:cNvSpPr>
+            <a:spLocks noGrp="1"/>
+          </p:cNvSpPr>
+          <p:nvPr>
+            <p:ph idx="1"/>
+          </p:nvPr>
+        </p:nvSpPr>
+        <p:spPr/>
+        <p:txBody>
+          <a:bodyPr>
+            <a:normAutofit lnSpcReduction="10000"/>
+          </a:bodyPr>
+          <a:lstStyle/>
+          <a:p>
+            <a:r>
+              <a:rPr lang="ru-RU" dirty="0"/>
+              <a:t>Информация о замерах</a:t>
+            </a:r>
+            <a:r>
+              <a:rPr lang="en-US" dirty="0"/>
+              <a:t> </a:t>
+            </a:r>
+            <a:r>
+              <a:rPr lang="ru-RU" dirty="0"/>
+              <a:t>в приложении</a:t>
+            </a:r>
+            <a:r>
+              <a:rPr lang="en-US" dirty="0"/>
+              <a:t>:</a:t>
+            </a:r>
+          </a:p>
+          <a:p>
+            <a:pPr lvl="1"/>
+            <a:r>
+              <a:rPr lang="ru-RU" dirty="0"/>
+              <a:t>Какие проверялись версии дистрибутивов</a:t>
+            </a:r>
+          </a:p>
+          <a:p>
+            <a:pPr lvl="1"/>
+            <a:r>
+              <a:rPr lang="ru-RU" dirty="0"/>
+              <a:t>Как считались </a:t>
+            </a:r>
+            <a:r>
+              <a:rPr lang="en-US" dirty="0"/>
+              <a:t>CVE, KEV</a:t>
+            </a:r>
+            <a:r>
+              <a:rPr lang="ru-RU" dirty="0"/>
+              <a:t> (скрипты</a:t>
+            </a:r>
+            <a:r>
+              <a:rPr lang="en-US" dirty="0"/>
+              <a:t>)</a:t>
+            </a:r>
+            <a:endParaRPr lang="ru-RU" dirty="0"/>
+          </a:p>
+          <a:p>
+            <a:pPr lvl="1"/>
+            <a:r>
+              <a:rPr lang="ru-RU" dirty="0"/>
+              <a:t>Ссылки на примеры</a:t>
+            </a:r>
+            <a:r>
+              <a:rPr lang="en-US" dirty="0"/>
+              <a:t> (Stack Clashing)</a:t>
+            </a:r>
+          </a:p>
+          <a:p>
+            <a:pPr lvl="1"/>
+            <a:r>
+              <a:rPr lang="ru-RU" dirty="0"/>
+              <a:t>Как искать проблемные программы (</a:t>
+            </a:r>
+            <a:r>
+              <a:rPr lang="en-US" dirty="0"/>
+              <a:t>no-pie, etc.)</a:t>
+            </a:r>
+          </a:p>
+          <a:p>
+            <a:pPr lvl="1"/>
+            <a:r>
+              <a:rPr lang="ru-RU" dirty="0"/>
+              <a:t>Как запустить бенчмарки </a:t>
+            </a:r>
+            <a:r>
+              <a:rPr lang="en-US" dirty="0"/>
+              <a:t>Clang</a:t>
+            </a:r>
+          </a:p>
+          <a:p>
+            <a:r>
+              <a:rPr lang="ru-RU" dirty="0"/>
+              <a:t>Отдельный слайд про </a:t>
+            </a:r>
+            <a:r>
+              <a:rPr lang="en-US" dirty="0"/>
+              <a:t>Rust</a:t>
+            </a:r>
+            <a:r>
+              <a:rPr lang="ru-RU" dirty="0"/>
+              <a:t> (таблица со сравнением)</a:t>
+            </a:r>
+            <a:endParaRPr lang="en-US" dirty="0"/>
+          </a:p>
+          <a:p>
+            <a:r>
+              <a:rPr lang="ru-RU" dirty="0"/>
+              <a:t>Отдельный слайд с рекомендуемыми ссылками</a:t>
+            </a:r>
+            <a:endParaRPr lang="en-US" dirty="0"/>
+          </a:p>
+          <a:p>
+            <a:r>
+              <a:rPr lang="ru-RU" dirty="0"/>
+              <a:t>Слайд с рекомендациями</a:t>
+            </a:r>
+            <a:r>
+              <a:rPr lang="en-US" dirty="0"/>
+              <a:t>:</a:t>
+            </a:r>
+          </a:p>
+          <a:p>
+            <a:pPr lvl="1"/>
+            <a:r>
+              <a:rPr lang="ru-RU" dirty="0"/>
+              <a:t>Проверить дефолтные опции в дистро, решить с </a:t>
+            </a:r>
+            <a:r>
+              <a:rPr lang="en-US" dirty="0"/>
+              <a:t>Security Team </a:t>
+            </a:r>
+            <a:r>
+              <a:rPr lang="ru-RU" dirty="0"/>
+              <a:t>какие </a:t>
+            </a:r>
+            <a:r>
+              <a:rPr lang="en-US" dirty="0"/>
+              <a:t>hardening</a:t>
+            </a:r>
+            <a:r>
+              <a:rPr lang="ru-RU" dirty="0"/>
+              <a:t>-методы включить в проде</a:t>
+            </a:r>
+            <a:endParaRPr lang="en-US" dirty="0"/>
+          </a:p>
+        </p:txBody>
+      </p:sp>
+    </p:spTree>
+    <p:extLst>
+      <p:ext uri="{BB962C8B-B14F-4D97-AF65-F5344CB8AC3E}">
+        <p14:creationId xmlns:p14="http://schemas.microsoft.com/office/powerpoint/2010/main" val="4165890631"/>
       </p:ext>
     </p:extLst>
   </p:cSld>

</xml_diff>

<commit_message>
Daily updates and todos.
</commit_message>
<xml_diff>
--- a/CppZeroCost/2025/RU.pptx
+++ b/CppZeroCost/2025/RU.pptx
@@ -77,8 +77,8 @@
     <p:sldId id="329" r:id="rId71"/>
     <p:sldId id="330" r:id="rId72"/>
     <p:sldId id="331" r:id="rId73"/>
-    <p:sldId id="270" r:id="rId74"/>
-    <p:sldId id="271" r:id="rId75"/>
+    <p:sldId id="271" r:id="rId74"/>
+    <p:sldId id="270" r:id="rId75"/>
   </p:sldIdLst>
   <p:sldSz cx="12192000" cy="6858000"/>
   <p:notesSz cx="6858000" cy="9144000"/>
@@ -4372,9 +4372,12 @@
             <a:pPr lvl="2"/>
             <a:r>
               <a:rPr lang="ru-RU" dirty="0"/>
-              <a:t>В 32-битных Windows рандомизировалось только 8 (!) бит адреса загрузки</a:t>
-            </a:r>
-            <a:endParaRPr lang="en-US" dirty="0"/>
+              <a:t>Небольшое число рандомизируемых битов (16 или даже 8 в 32-битных Windows</a:t>
+            </a:r>
+            <a:r>
+              <a:rPr lang="en-US" dirty="0"/>
+              <a:t>)</a:t>
+            </a:r>
           </a:p>
           <a:p>
             <a:pPr lvl="3"/>
@@ -12507,7 +12510,7 @@
         <p:spPr/>
         <p:txBody>
           <a:bodyPr>
-            <a:normAutofit/>
+            <a:normAutofit fontScale="92500" lnSpcReduction="10000"/>
           </a:bodyPr>
           <a:lstStyle/>
           <a:p>
@@ -12529,6 +12532,33 @@
             </a:r>
           </a:p>
           <a:p>
+            <a:pPr lvl="1"/>
+            <a:r>
+              <a:rPr lang="ru-RU" dirty="0"/>
+              <a:t>(дефолтная </a:t>
+            </a:r>
+            <a:r>
+              <a:rPr lang="en-US" dirty="0"/>
+              <a:t>STL </a:t>
+            </a:r>
+            <a:r>
+              <a:rPr lang="ru-RU" dirty="0"/>
+              <a:t>в </a:t>
+            </a:r>
+            <a:r>
+              <a:rPr lang="en-US" dirty="0"/>
+              <a:t>GCC </a:t>
+            </a:r>
+            <a:r>
+              <a:rPr lang="ru-RU" dirty="0"/>
+              <a:t>и </a:t>
+            </a:r>
+            <a:r>
+              <a:rPr lang="en-US" dirty="0"/>
+              <a:t>Clang)</a:t>
+            </a:r>
+          </a:p>
+          <a:p>
             <a:r>
               <a:rPr lang="en-US" dirty="0" err="1"/>
               <a:t>Libc</a:t>
@@ -12536,6 +12566,45 @@
             <a:r>
               <a:rPr lang="en-US" dirty="0"/>
               <a:t>++: -D_LIBCPP_HARDENING_MODE=...</a:t>
+            </a:r>
+          </a:p>
+          <a:p>
+            <a:pPr lvl="1"/>
+            <a:r>
+              <a:rPr lang="en-US" dirty="0"/>
+              <a:t>(</a:t>
+            </a:r>
+            <a:r>
+              <a:rPr lang="ru-RU" dirty="0"/>
+              <a:t>включается в </a:t>
+            </a:r>
+            <a:r>
+              <a:rPr lang="en-US" dirty="0"/>
+              <a:t>Clang </a:t>
+            </a:r>
+            <a:r>
+              <a:rPr lang="ru-RU" dirty="0"/>
+              <a:t>по флагу </a:t>
+            </a:r>
+            <a:r>
+              <a:rPr lang="en-US" dirty="0"/>
+              <a:t>-</a:t>
+            </a:r>
+            <a:r>
+              <a:rPr lang="en-US" dirty="0" err="1"/>
+              <a:t>stdlib</a:t>
+            </a:r>
+            <a:r>
+              <a:rPr lang="en-US" dirty="0"/>
+              <a:t>=</a:t>
+            </a:r>
+            <a:r>
+              <a:rPr lang="en-US" dirty="0" err="1"/>
+              <a:t>libc</a:t>
+            </a:r>
+            <a:r>
+              <a:rPr lang="en-US" dirty="0"/>
+              <a:t>++)</a:t>
             </a:r>
           </a:p>
           <a:p>
@@ -18559,7 +18628,7 @@
         <p:spPr/>
         <p:txBody>
           <a:bodyPr>
-            <a:normAutofit lnSpcReduction="10000"/>
+            <a:normAutofit fontScale="92500" lnSpcReduction="10000"/>
           </a:bodyPr>
           <a:lstStyle/>
           <a:p>
@@ -18715,6 +18784,38 @@
             <a:r>
               <a:rPr lang="en-US" dirty="0"/>
               <a:t> Firefox</a:t>
+            </a:r>
+          </a:p>
+          <a:p>
+            <a:r>
+              <a:rPr lang="ru-RU" dirty="0"/>
+              <a:t>Включён в </a:t>
+            </a:r>
+            <a:r>
+              <a:rPr lang="en-US" dirty="0"/>
+              <a:t>Android user</a:t>
+            </a:r>
+            <a:r>
+              <a:rPr lang="ru-RU" dirty="0"/>
+              <a:t>- и </a:t>
+            </a:r>
+            <a:r>
+              <a:rPr lang="en-US" dirty="0" err="1"/>
+              <a:t>kernelspace</a:t>
+            </a:r>
+            <a:r>
+              <a:rPr lang="en-US" dirty="0"/>
+              <a:t> (</a:t>
+            </a:r>
+            <a:r>
+              <a:rPr lang="sv-SE" dirty="0">
+                <a:hlinkClick r:id="rId5"/>
+              </a:rPr>
+              <a:t>System hardening in Android 11</a:t>
+            </a:r>
+            <a:r>
+              <a:rPr lang="en-US" dirty="0"/>
+              <a:t>)</a:t>
             </a:r>
           </a:p>
         </p:txBody>
@@ -22235,7 +22336,7 @@
           <p:cNvPr id="2" name="Title 1">
             <a:extLst>
               <a:ext uri="{FF2B5EF4-FFF2-40B4-BE49-F238E27FC236}">
-                <a16:creationId xmlns:a16="http://schemas.microsoft.com/office/drawing/2014/main" id="{CA3C8DD7-2659-4877-AB44-B521617A7883}"/>
+                <a16:creationId xmlns:a16="http://schemas.microsoft.com/office/drawing/2014/main" id="{CAC7532A-964A-431E-A4F5-80DD903BB997}"/>
               </a:ext>
             </a:extLst>
           </p:cNvPr>
@@ -22252,10 +22353,9 @@
           <a:lstStyle/>
           <a:p>
             <a:r>
-              <a:rPr lang="ru-RU" dirty="0"/>
-              <a:t>Спасибо за внимание</a:t>
-            </a:r>
-            <a:endParaRPr lang="en-US" dirty="0"/>
+              <a:rPr lang="en-US" dirty="0"/>
+              <a:t>TODO</a:t>
+            </a:r>
           </a:p>
         </p:txBody>
       </p:sp>
@@ -22264,7 +22364,7 @@
           <p:cNvPr id="3" name="Content Placeholder 2">
             <a:extLst>
               <a:ext uri="{FF2B5EF4-FFF2-40B4-BE49-F238E27FC236}">
-                <a16:creationId xmlns:a16="http://schemas.microsoft.com/office/drawing/2014/main" id="{1A014712-4ABE-498A-9B77-26D4F051DB7C}"/>
+                <a16:creationId xmlns:a16="http://schemas.microsoft.com/office/drawing/2014/main" id="{4C484971-452F-45F6-AD84-582487E77763}"/>
               </a:ext>
             </a:extLst>
           </p:cNvPr>
@@ -22277,24 +22377,150 @@
         </p:nvSpPr>
         <p:spPr/>
         <p:txBody>
-          <a:bodyPr/>
+          <a:bodyPr>
+            <a:normAutofit lnSpcReduction="10000"/>
+          </a:bodyPr>
           <a:lstStyle/>
           <a:p>
             <a:r>
               <a:rPr lang="ru-RU" dirty="0"/>
-              <a:t>Вопросы</a:t>
-            </a:r>
-            <a:r>
-              <a:rPr lang="en-US" dirty="0"/>
-              <a:t> ?</a:t>
-            </a:r>
+              <a:t>Информация о замерах</a:t>
+            </a:r>
+            <a:r>
+              <a:rPr lang="en-US" dirty="0"/>
+              <a:t> </a:t>
+            </a:r>
+            <a:r>
+              <a:rPr lang="ru-RU" dirty="0"/>
+              <a:t>в приложении</a:t>
+            </a:r>
+            <a:r>
+              <a:rPr lang="en-US" dirty="0"/>
+              <a:t>:</a:t>
+            </a:r>
+          </a:p>
+          <a:p>
+            <a:pPr lvl="1"/>
+            <a:r>
+              <a:rPr lang="ru-RU" dirty="0"/>
+              <a:t>Какие проверялись версии дистрибутивов</a:t>
+            </a:r>
+          </a:p>
+          <a:p>
+            <a:pPr lvl="1"/>
+            <a:r>
+              <a:rPr lang="ru-RU" dirty="0"/>
+              <a:t>Как считались </a:t>
+            </a:r>
+            <a:r>
+              <a:rPr lang="en-US" dirty="0"/>
+              <a:t>CVE, KEV</a:t>
+            </a:r>
+            <a:r>
+              <a:rPr lang="ru-RU" dirty="0"/>
+              <a:t> (скрипты</a:t>
+            </a:r>
+            <a:r>
+              <a:rPr lang="en-US" dirty="0"/>
+              <a:t>)</a:t>
+            </a:r>
+            <a:endParaRPr lang="ru-RU" dirty="0"/>
+          </a:p>
+          <a:p>
+            <a:pPr lvl="1"/>
+            <a:r>
+              <a:rPr lang="ru-RU" dirty="0"/>
+              <a:t>Ссылки на примеры</a:t>
+            </a:r>
+            <a:r>
+              <a:rPr lang="en-US" dirty="0"/>
+              <a:t> (Stack Clashing)</a:t>
+            </a:r>
+          </a:p>
+          <a:p>
+            <a:pPr lvl="1"/>
+            <a:r>
+              <a:rPr lang="ru-RU" dirty="0"/>
+              <a:t>Как искать проблемные программы (</a:t>
+            </a:r>
+            <a:r>
+              <a:rPr lang="en-US" dirty="0"/>
+              <a:t>no-pie, etc.)</a:t>
+            </a:r>
+          </a:p>
+          <a:p>
+            <a:pPr lvl="1"/>
+            <a:r>
+              <a:rPr lang="ru-RU" dirty="0"/>
+              <a:t>Как запустить бенчмарки </a:t>
+            </a:r>
+            <a:r>
+              <a:rPr lang="en-US" dirty="0"/>
+              <a:t>Clang</a:t>
+            </a:r>
+          </a:p>
+          <a:p>
+            <a:r>
+              <a:rPr lang="ru-RU" dirty="0"/>
+              <a:t>Отдельный слайд про </a:t>
+            </a:r>
+            <a:r>
+              <a:rPr lang="en-US" dirty="0"/>
+              <a:t>Rust</a:t>
+            </a:r>
+            <a:r>
+              <a:rPr lang="ru-RU" dirty="0"/>
+              <a:t> (таблица со сравнением)</a:t>
+            </a:r>
+            <a:endParaRPr lang="en-US" dirty="0"/>
+          </a:p>
+          <a:p>
+            <a:r>
+              <a:rPr lang="ru-RU" dirty="0"/>
+              <a:t>Отдельный слайд с рекомендуемыми ссылками</a:t>
+            </a:r>
+            <a:endParaRPr lang="en-US" dirty="0"/>
+          </a:p>
+          <a:p>
+            <a:r>
+              <a:rPr lang="ru-RU" dirty="0"/>
+              <a:t>Слайд с рекомендациями</a:t>
+            </a:r>
+            <a:r>
+              <a:rPr lang="en-US" dirty="0"/>
+              <a:t>:</a:t>
+            </a:r>
+          </a:p>
+          <a:p>
+            <a:pPr lvl="1"/>
+            <a:r>
+              <a:rPr lang="ru-RU" dirty="0"/>
+              <a:t>Проверить дефолтные опции в дистро, решить с </a:t>
+            </a:r>
+            <a:r>
+              <a:rPr lang="en-US" dirty="0"/>
+              <a:t>Security Team </a:t>
+            </a:r>
+            <a:r>
+              <a:rPr lang="ru-RU" dirty="0"/>
+              <a:t>какие </a:t>
+            </a:r>
+            <a:r>
+              <a:rPr lang="en-US" dirty="0"/>
+              <a:t>hardening</a:t>
+            </a:r>
+            <a:r>
+              <a:rPr lang="ru-RU" dirty="0"/>
+              <a:t>-методы включить в проде</a:t>
+            </a:r>
+            <a:endParaRPr lang="en-US" dirty="0"/>
           </a:p>
         </p:txBody>
       </p:sp>
     </p:spTree>
     <p:extLst>
       <p:ext uri="{BB962C8B-B14F-4D97-AF65-F5344CB8AC3E}">
-        <p14:creationId xmlns:p14="http://schemas.microsoft.com/office/powerpoint/2010/main" val="836139563"/>
+        <p14:creationId xmlns:p14="http://schemas.microsoft.com/office/powerpoint/2010/main" val="4165890631"/>
       </p:ext>
     </p:extLst>
   </p:cSld>
@@ -22326,7 +22552,7 @@
           <p:cNvPr id="2" name="Title 1">
             <a:extLst>
               <a:ext uri="{FF2B5EF4-FFF2-40B4-BE49-F238E27FC236}">
-                <a16:creationId xmlns:a16="http://schemas.microsoft.com/office/drawing/2014/main" id="{CAC7532A-964A-431E-A4F5-80DD903BB997}"/>
+                <a16:creationId xmlns:a16="http://schemas.microsoft.com/office/drawing/2014/main" id="{CA3C8DD7-2659-4877-AB44-B521617A7883}"/>
               </a:ext>
             </a:extLst>
           </p:cNvPr>
@@ -22343,9 +22569,10 @@
           <a:lstStyle/>
           <a:p>
             <a:r>
-              <a:rPr lang="en-US" dirty="0"/>
-              <a:t>TODO</a:t>
-            </a:r>
+              <a:rPr lang="ru-RU" dirty="0"/>
+              <a:t>Спасибо за внимание</a:t>
+            </a:r>
+            <a:endParaRPr lang="en-US" dirty="0"/>
           </a:p>
         </p:txBody>
       </p:sp>
@@ -22354,7 +22581,7 @@
           <p:cNvPr id="3" name="Content Placeholder 2">
             <a:extLst>
               <a:ext uri="{FF2B5EF4-FFF2-40B4-BE49-F238E27FC236}">
-                <a16:creationId xmlns:a16="http://schemas.microsoft.com/office/drawing/2014/main" id="{4C484971-452F-45F6-AD84-582487E77763}"/>
+                <a16:creationId xmlns:a16="http://schemas.microsoft.com/office/drawing/2014/main" id="{1A014712-4ABE-498A-9B77-26D4F051DB7C}"/>
               </a:ext>
             </a:extLst>
           </p:cNvPr>
@@ -22367,150 +22594,24 @@
         </p:nvSpPr>
         <p:spPr/>
         <p:txBody>
-          <a:bodyPr>
-            <a:normAutofit lnSpcReduction="10000"/>
-          </a:bodyPr>
+          <a:bodyPr/>
           <a:lstStyle/>
           <a:p>
             <a:r>
               <a:rPr lang="ru-RU" dirty="0"/>
-              <a:t>Информация о замерах</a:t>
-            </a:r>
-            <a:r>
-              <a:rPr lang="en-US" dirty="0"/>
-              <a:t> </a:t>
-            </a:r>
-            <a:r>
-              <a:rPr lang="ru-RU" dirty="0"/>
-              <a:t>в приложении</a:t>
-            </a:r>
-            <a:r>
-              <a:rPr lang="en-US" dirty="0"/>
-              <a:t>:</a:t>
-            </a:r>
-          </a:p>
-          <a:p>
-            <a:pPr lvl="1"/>
-            <a:r>
-              <a:rPr lang="ru-RU" dirty="0"/>
-              <a:t>Какие проверялись версии дистрибутивов</a:t>
-            </a:r>
-          </a:p>
-          <a:p>
-            <a:pPr lvl="1"/>
-            <a:r>
-              <a:rPr lang="ru-RU" dirty="0"/>
-              <a:t>Как считались </a:t>
-            </a:r>
-            <a:r>
-              <a:rPr lang="en-US" dirty="0"/>
-              <a:t>CVE, KEV</a:t>
-            </a:r>
-            <a:r>
-              <a:rPr lang="ru-RU" dirty="0"/>
-              <a:t> (скрипты</a:t>
-            </a:r>
-            <a:r>
-              <a:rPr lang="en-US" dirty="0"/>
-              <a:t>)</a:t>
-            </a:r>
-            <a:endParaRPr lang="ru-RU" dirty="0"/>
-          </a:p>
-          <a:p>
-            <a:pPr lvl="1"/>
-            <a:r>
-              <a:rPr lang="ru-RU" dirty="0"/>
-              <a:t>Ссылки на примеры</a:t>
-            </a:r>
-            <a:r>
-              <a:rPr lang="en-US" dirty="0"/>
-              <a:t> (Stack Clashing)</a:t>
-            </a:r>
-          </a:p>
-          <a:p>
-            <a:pPr lvl="1"/>
-            <a:r>
-              <a:rPr lang="ru-RU" dirty="0"/>
-              <a:t>Как искать проблемные программы (</a:t>
-            </a:r>
-            <a:r>
-              <a:rPr lang="en-US" dirty="0"/>
-              <a:t>no-pie, etc.)</a:t>
-            </a:r>
-          </a:p>
-          <a:p>
-            <a:pPr lvl="1"/>
-            <a:r>
-              <a:rPr lang="ru-RU" dirty="0"/>
-              <a:t>Как запустить бенчмарки </a:t>
-            </a:r>
-            <a:r>
-              <a:rPr lang="en-US" dirty="0"/>
-              <a:t>Clang</a:t>
-            </a:r>
-          </a:p>
-          <a:p>
-            <a:r>
-              <a:rPr lang="ru-RU" dirty="0"/>
-              <a:t>Отдельный слайд про </a:t>
-            </a:r>
-            <a:r>
-              <a:rPr lang="en-US" dirty="0"/>
-              <a:t>Rust</a:t>
-            </a:r>
-            <a:r>
-              <a:rPr lang="ru-RU" dirty="0"/>
-              <a:t> (таблица со сравнением)</a:t>
-            </a:r>
-            <a:endParaRPr lang="en-US" dirty="0"/>
-          </a:p>
-          <a:p>
-            <a:r>
-              <a:rPr lang="ru-RU" dirty="0"/>
-              <a:t>Отдельный слайд с рекомендуемыми ссылками</a:t>
-            </a:r>
-            <a:endParaRPr lang="en-US" dirty="0"/>
-          </a:p>
-          <a:p>
-            <a:r>
-              <a:rPr lang="ru-RU" dirty="0"/>
-              <a:t>Слайд с рекомендациями</a:t>
-            </a:r>
-            <a:r>
-              <a:rPr lang="en-US" dirty="0"/>
-              <a:t>:</a:t>
-            </a:r>
-          </a:p>
-          <a:p>
-            <a:pPr lvl="1"/>
-            <a:r>
-              <a:rPr lang="ru-RU" dirty="0"/>
-              <a:t>Проверить дефолтные опции в дистро, решить с </a:t>
-            </a:r>
-            <a:r>
-              <a:rPr lang="en-US" dirty="0"/>
-              <a:t>Security Team </a:t>
-            </a:r>
-            <a:r>
-              <a:rPr lang="ru-RU" dirty="0"/>
-              <a:t>какие </a:t>
-            </a:r>
-            <a:r>
-              <a:rPr lang="en-US" dirty="0"/>
-              <a:t>hardening</a:t>
-            </a:r>
-            <a:r>
-              <a:rPr lang="ru-RU" dirty="0"/>
-              <a:t>-методы включить в проде</a:t>
-            </a:r>
-            <a:endParaRPr lang="en-US" dirty="0"/>
+              <a:t>Вопросы</a:t>
+            </a:r>
+            <a:r>
+              <a:rPr lang="en-US" dirty="0"/>
+              <a:t> ?</a:t>
+            </a:r>
           </a:p>
         </p:txBody>
       </p:sp>
     </p:spTree>
     <p:extLst>
       <p:ext uri="{BB962C8B-B14F-4D97-AF65-F5344CB8AC3E}">
-        <p14:creationId xmlns:p14="http://schemas.microsoft.com/office/powerpoint/2010/main" val="4165890631"/>
+        <p14:creationId xmlns:p14="http://schemas.microsoft.com/office/powerpoint/2010/main" val="836139563"/>
       </p:ext>
     </p:extLst>
   </p:cSld>

</xml_diff>

<commit_message>
Update results for IOF.
</commit_message>
<xml_diff>
--- a/CppZeroCost/2025/RU.pptx
+++ b/CppZeroCost/2025/RU.pptx
@@ -38,47 +38,48 @@
     <p:sldId id="289" r:id="rId32"/>
     <p:sldId id="290" r:id="rId33"/>
     <p:sldId id="292" r:id="rId34"/>
-    <p:sldId id="293" r:id="rId35"/>
-    <p:sldId id="294" r:id="rId36"/>
-    <p:sldId id="295" r:id="rId37"/>
-    <p:sldId id="296" r:id="rId38"/>
-    <p:sldId id="297" r:id="rId39"/>
-    <p:sldId id="298" r:id="rId40"/>
-    <p:sldId id="300" r:id="rId41"/>
-    <p:sldId id="301" r:id="rId42"/>
-    <p:sldId id="302" r:id="rId43"/>
-    <p:sldId id="299" r:id="rId44"/>
-    <p:sldId id="303" r:id="rId45"/>
-    <p:sldId id="304" r:id="rId46"/>
-    <p:sldId id="305" r:id="rId47"/>
-    <p:sldId id="306" r:id="rId48"/>
-    <p:sldId id="307" r:id="rId49"/>
-    <p:sldId id="308" r:id="rId50"/>
-    <p:sldId id="309" r:id="rId51"/>
-    <p:sldId id="310" r:id="rId52"/>
-    <p:sldId id="311" r:id="rId53"/>
-    <p:sldId id="312" r:id="rId54"/>
-    <p:sldId id="313" r:id="rId55"/>
-    <p:sldId id="314" r:id="rId56"/>
-    <p:sldId id="315" r:id="rId57"/>
-    <p:sldId id="316" r:id="rId58"/>
-    <p:sldId id="317" r:id="rId59"/>
-    <p:sldId id="318" r:id="rId60"/>
-    <p:sldId id="319" r:id="rId61"/>
-    <p:sldId id="320" r:id="rId62"/>
-    <p:sldId id="321" r:id="rId63"/>
-    <p:sldId id="322" r:id="rId64"/>
-    <p:sldId id="323" r:id="rId65"/>
-    <p:sldId id="324" r:id="rId66"/>
-    <p:sldId id="325" r:id="rId67"/>
-    <p:sldId id="326" r:id="rId68"/>
-    <p:sldId id="327" r:id="rId69"/>
-    <p:sldId id="328" r:id="rId70"/>
-    <p:sldId id="329" r:id="rId71"/>
-    <p:sldId id="330" r:id="rId72"/>
-    <p:sldId id="331" r:id="rId73"/>
-    <p:sldId id="271" r:id="rId74"/>
-    <p:sldId id="270" r:id="rId75"/>
+    <p:sldId id="332" r:id="rId35"/>
+    <p:sldId id="293" r:id="rId36"/>
+    <p:sldId id="294" r:id="rId37"/>
+    <p:sldId id="295" r:id="rId38"/>
+    <p:sldId id="296" r:id="rId39"/>
+    <p:sldId id="297" r:id="rId40"/>
+    <p:sldId id="298" r:id="rId41"/>
+    <p:sldId id="300" r:id="rId42"/>
+    <p:sldId id="301" r:id="rId43"/>
+    <p:sldId id="302" r:id="rId44"/>
+    <p:sldId id="299" r:id="rId45"/>
+    <p:sldId id="303" r:id="rId46"/>
+    <p:sldId id="304" r:id="rId47"/>
+    <p:sldId id="305" r:id="rId48"/>
+    <p:sldId id="306" r:id="rId49"/>
+    <p:sldId id="307" r:id="rId50"/>
+    <p:sldId id="308" r:id="rId51"/>
+    <p:sldId id="309" r:id="rId52"/>
+    <p:sldId id="310" r:id="rId53"/>
+    <p:sldId id="311" r:id="rId54"/>
+    <p:sldId id="312" r:id="rId55"/>
+    <p:sldId id="313" r:id="rId56"/>
+    <p:sldId id="314" r:id="rId57"/>
+    <p:sldId id="315" r:id="rId58"/>
+    <p:sldId id="316" r:id="rId59"/>
+    <p:sldId id="317" r:id="rId60"/>
+    <p:sldId id="318" r:id="rId61"/>
+    <p:sldId id="319" r:id="rId62"/>
+    <p:sldId id="320" r:id="rId63"/>
+    <p:sldId id="321" r:id="rId64"/>
+    <p:sldId id="322" r:id="rId65"/>
+    <p:sldId id="323" r:id="rId66"/>
+    <p:sldId id="324" r:id="rId67"/>
+    <p:sldId id="325" r:id="rId68"/>
+    <p:sldId id="326" r:id="rId69"/>
+    <p:sldId id="327" r:id="rId70"/>
+    <p:sldId id="328" r:id="rId71"/>
+    <p:sldId id="329" r:id="rId72"/>
+    <p:sldId id="330" r:id="rId73"/>
+    <p:sldId id="331" r:id="rId74"/>
+    <p:sldId id="271" r:id="rId75"/>
+    <p:sldId id="270" r:id="rId76"/>
   </p:sldIdLst>
   <p:sldSz cx="12192000" cy="6858000"/>
   <p:notesSz cx="6858000" cy="9144000"/>
@@ -11181,6 +11182,173 @@
           <p:cNvPr id="2" name="Title 1">
             <a:extLst>
               <a:ext uri="{FF2B5EF4-FFF2-40B4-BE49-F238E27FC236}">
+                <a16:creationId xmlns:a16="http://schemas.microsoft.com/office/drawing/2014/main" id="{7FA1430F-BE9D-4DC4-8569-0A4451014AE9}"/>
+              </a:ext>
+            </a:extLst>
+          </p:cNvPr>
+          <p:cNvSpPr>
+            <a:spLocks noGrp="1"/>
+          </p:cNvSpPr>
+          <p:nvPr>
+            <p:ph type="title"/>
+          </p:nvPr>
+        </p:nvSpPr>
+        <p:spPr/>
+        <p:txBody>
+          <a:bodyPr/>
+          <a:lstStyle/>
+          <a:p>
+            <a:r>
+              <a:rPr lang="en-US" dirty="0"/>
+              <a:t>-</a:t>
+            </a:r>
+            <a:r>
+              <a:rPr lang="en-US" dirty="0" err="1"/>
+              <a:t>fsanitize</a:t>
+            </a:r>
+            <a:r>
+              <a:rPr lang="en-US" dirty="0"/>
+              <a:t>=bounds</a:t>
+            </a:r>
+          </a:p>
+        </p:txBody>
+      </p:sp>
+      <p:sp>
+        <p:nvSpPr>
+          <p:cNvPr id="3" name="Content Placeholder 2">
+            <a:extLst>
+              <a:ext uri="{FF2B5EF4-FFF2-40B4-BE49-F238E27FC236}">
+                <a16:creationId xmlns:a16="http://schemas.microsoft.com/office/drawing/2014/main" id="{E0697734-E16B-494D-8832-44823EB86231}"/>
+              </a:ext>
+            </a:extLst>
+          </p:cNvPr>
+          <p:cNvSpPr>
+            <a:spLocks noGrp="1"/>
+          </p:cNvSpPr>
+          <p:nvPr>
+            <p:ph idx="1"/>
+          </p:nvPr>
+        </p:nvSpPr>
+        <p:spPr/>
+        <p:txBody>
+          <a:bodyPr/>
+          <a:lstStyle/>
+          <a:p>
+            <a:r>
+              <a:rPr lang="ru-RU" dirty="0"/>
+              <a:t>Подход фортификации можно расширить на скалярные обращения к массивам известной длины</a:t>
+            </a:r>
+          </a:p>
+          <a:p>
+            <a:r>
+              <a:rPr lang="ru-RU" dirty="0"/>
+              <a:t>Опция компилятора </a:t>
+            </a:r>
+            <a:r>
+              <a:rPr lang="en-US" dirty="0"/>
+              <a:t>-</a:t>
+            </a:r>
+            <a:r>
+              <a:rPr lang="en-US" dirty="0" err="1"/>
+              <a:t>fsanitize</a:t>
+            </a:r>
+            <a:r>
+              <a:rPr lang="en-US" dirty="0"/>
+              <a:t>=bounds</a:t>
+            </a:r>
+          </a:p>
+          <a:p>
+            <a:r>
+              <a:rPr lang="ru-RU" dirty="0"/>
+              <a:t>Включена в </a:t>
+            </a:r>
+            <a:r>
+              <a:rPr lang="en-US" dirty="0"/>
+              <a:t>Android </a:t>
+            </a:r>
+            <a:r>
+              <a:rPr lang="ru-RU" dirty="0"/>
+              <a:t>для некоторых критичных модулей</a:t>
+            </a:r>
+            <a:endParaRPr lang="en-US" dirty="0"/>
+          </a:p>
+          <a:p>
+            <a:pPr lvl="1"/>
+            <a:r>
+              <a:rPr lang="en-US" dirty="0">
+                <a:hlinkClick r:id="rId2"/>
+              </a:rPr>
+              <a:t>Android Developers Blog: System hardening in Android 11</a:t>
+            </a:r>
+            <a:endParaRPr lang="en-US" dirty="0"/>
+          </a:p>
+          <a:p>
+            <a:r>
+              <a:rPr lang="ru-RU" dirty="0"/>
+              <a:t>Нет накладных расходов при компиляции </a:t>
+            </a:r>
+            <a:r>
+              <a:rPr lang="en-US" dirty="0"/>
+              <a:t>CGBuiltin.cpp </a:t>
+            </a:r>
+            <a:r>
+              <a:rPr lang="ru-RU" dirty="0"/>
+              <a:t>компилятором </a:t>
+            </a:r>
+            <a:r>
+              <a:rPr lang="en-US" dirty="0"/>
+              <a:t>Clang</a:t>
+            </a:r>
+          </a:p>
+          <a:p>
+            <a:pPr lvl="1"/>
+            <a:r>
+              <a:rPr lang="en-US" dirty="0"/>
+              <a:t>TODO: </a:t>
+            </a:r>
+            <a:r>
+              <a:rPr lang="ru-RU" dirty="0"/>
+              <a:t>как такое может быть</a:t>
+            </a:r>
+            <a:endParaRPr lang="en-US" dirty="0"/>
+          </a:p>
+        </p:txBody>
+      </p:sp>
+    </p:spTree>
+    <p:extLst>
+      <p:ext uri="{BB962C8B-B14F-4D97-AF65-F5344CB8AC3E}">
+        <p14:creationId xmlns:p14="http://schemas.microsoft.com/office/powerpoint/2010/main" val="1515280932"/>
+      </p:ext>
+    </p:extLst>
+  </p:cSld>
+  <p:clrMapOvr>
+    <a:masterClrMapping/>
+  </p:clrMapOvr>
+</p:sld>
+</file>
+
+<file path=ppt/slides/slide35.xml><?xml version="1.0" encoding="utf-8"?>
+<p:sld xmlns:a="http://schemas.openxmlformats.org/drawingml/2006/main" xmlns:r="http://schemas.openxmlformats.org/officeDocument/2006/relationships" xmlns:p="http://schemas.openxmlformats.org/presentationml/2006/main">
+  <p:cSld>
+    <p:spTree>
+      <p:nvGrpSpPr>
+        <p:cNvPr id="1" name=""/>
+        <p:cNvGrpSpPr/>
+        <p:nvPr/>
+      </p:nvGrpSpPr>
+      <p:grpSpPr>
+        <a:xfrm>
+          <a:off x="0" y="0"/>
+          <a:ext cx="0" cy="0"/>
+          <a:chOff x="0" y="0"/>
+          <a:chExt cx="0" cy="0"/>
+        </a:xfrm>
+      </p:grpSpPr>
+      <p:sp>
+        <p:nvSpPr>
+          <p:cNvPr id="2" name="Title 1">
+            <a:extLst>
+              <a:ext uri="{FF2B5EF4-FFF2-40B4-BE49-F238E27FC236}">
                 <a16:creationId xmlns:a16="http://schemas.microsoft.com/office/drawing/2014/main" id="{98B0CBE4-9961-4D8C-87A4-F78CBA37BC72}"/>
               </a:ext>
             </a:extLst>
@@ -11246,7 +11414,7 @@
 </p:sld>
 </file>
 
-<file path=ppt/slides/slide35.xml><?xml version="1.0" encoding="utf-8"?>
+<file path=ppt/slides/slide36.xml><?xml version="1.0" encoding="utf-8"?>
 <p:sld xmlns:a="http://schemas.openxmlformats.org/drawingml/2006/main" xmlns:r="http://schemas.openxmlformats.org/officeDocument/2006/relationships" xmlns:p="http://schemas.openxmlformats.org/presentationml/2006/main">
   <p:cSld>
     <p:spTree>
@@ -11789,7 +11957,7 @@
 </p:sld>
 </file>
 
-<file path=ppt/slides/slide36.xml><?xml version="1.0" encoding="utf-8"?>
+<file path=ppt/slides/slide37.xml><?xml version="1.0" encoding="utf-8"?>
 <p:sld xmlns:a="http://schemas.openxmlformats.org/drawingml/2006/main" xmlns:r="http://schemas.openxmlformats.org/officeDocument/2006/relationships" xmlns:p="http://schemas.openxmlformats.org/presentationml/2006/main">
   <p:cSld>
     <p:spTree>
@@ -12018,7 +12186,7 @@
 </p:sld>
 </file>
 
-<file path=ppt/slides/slide37.xml><?xml version="1.0" encoding="utf-8"?>
+<file path=ppt/slides/slide38.xml><?xml version="1.0" encoding="utf-8"?>
 <p:sld xmlns:a="http://schemas.openxmlformats.org/drawingml/2006/main" xmlns:r="http://schemas.openxmlformats.org/officeDocument/2006/relationships" xmlns:p="http://schemas.openxmlformats.org/presentationml/2006/main">
   <p:cSld>
     <p:spTree>
@@ -12268,7 +12436,7 @@
 </p:sld>
 </file>
 
-<file path=ppt/slides/slide38.xml><?xml version="1.0" encoding="utf-8"?>
+<file path=ppt/slides/slide39.xml><?xml version="1.0" encoding="utf-8"?>
 <p:sld xmlns:a="http://schemas.openxmlformats.org/drawingml/2006/main" xmlns:r="http://schemas.openxmlformats.org/officeDocument/2006/relationships" xmlns:p="http://schemas.openxmlformats.org/presentationml/2006/main">
   <p:cSld>
     <p:spTree>
@@ -12433,261 +12601,6 @@
     <p:extLst>
       <p:ext uri="{BB962C8B-B14F-4D97-AF65-F5344CB8AC3E}">
         <p14:creationId xmlns:p14="http://schemas.microsoft.com/office/powerpoint/2010/main" val="4092177488"/>
-      </p:ext>
-    </p:extLst>
-  </p:cSld>
-  <p:clrMapOvr>
-    <a:masterClrMapping/>
-  </p:clrMapOvr>
-</p:sld>
-</file>
-
-<file path=ppt/slides/slide39.xml><?xml version="1.0" encoding="utf-8"?>
-<p:sld xmlns:a="http://schemas.openxmlformats.org/drawingml/2006/main" xmlns:r="http://schemas.openxmlformats.org/officeDocument/2006/relationships" xmlns:p="http://schemas.openxmlformats.org/presentationml/2006/main">
-  <p:cSld>
-    <p:spTree>
-      <p:nvGrpSpPr>
-        <p:cNvPr id="1" name=""/>
-        <p:cNvGrpSpPr/>
-        <p:nvPr/>
-      </p:nvGrpSpPr>
-      <p:grpSpPr>
-        <a:xfrm>
-          <a:off x="0" y="0"/>
-          <a:ext cx="0" cy="0"/>
-          <a:chOff x="0" y="0"/>
-          <a:chExt cx="0" cy="0"/>
-        </a:xfrm>
-      </p:grpSpPr>
-      <p:sp>
-        <p:nvSpPr>
-          <p:cNvPr id="2" name="Title 1">
-            <a:extLst>
-              <a:ext uri="{FF2B5EF4-FFF2-40B4-BE49-F238E27FC236}">
-                <a16:creationId xmlns:a16="http://schemas.microsoft.com/office/drawing/2014/main" id="{88930F68-01D6-4DFC-8C4B-096056195DAD}"/>
-              </a:ext>
-            </a:extLst>
-          </p:cNvPr>
-          <p:cNvSpPr>
-            <a:spLocks noGrp="1"/>
-          </p:cNvSpPr>
-          <p:nvPr>
-            <p:ph type="title"/>
-          </p:nvPr>
-        </p:nvSpPr>
-        <p:spPr/>
-        <p:txBody>
-          <a:bodyPr/>
-          <a:lstStyle/>
-          <a:p>
-            <a:r>
-              <a:rPr lang="ru-RU" dirty="0"/>
-              <a:t>Как включить</a:t>
-            </a:r>
-            <a:r>
-              <a:rPr lang="en-US" dirty="0"/>
-              <a:t> ?</a:t>
-            </a:r>
-          </a:p>
-        </p:txBody>
-      </p:sp>
-      <p:sp>
-        <p:nvSpPr>
-          <p:cNvPr id="3" name="Content Placeholder 2">
-            <a:extLst>
-              <a:ext uri="{FF2B5EF4-FFF2-40B4-BE49-F238E27FC236}">
-                <a16:creationId xmlns:a16="http://schemas.microsoft.com/office/drawing/2014/main" id="{CDEFA53E-F74E-4729-8A65-412D2CAD0540}"/>
-              </a:ext>
-            </a:extLst>
-          </p:cNvPr>
-          <p:cNvSpPr>
-            <a:spLocks noGrp="1"/>
-          </p:cNvSpPr>
-          <p:nvPr>
-            <p:ph idx="1"/>
-          </p:nvPr>
-        </p:nvSpPr>
-        <p:spPr/>
-        <p:txBody>
-          <a:bodyPr>
-            <a:normAutofit fontScale="92500" lnSpcReduction="10000"/>
-          </a:bodyPr>
-          <a:lstStyle/>
-          <a:p>
-            <a:r>
-              <a:rPr lang="en-US" dirty="0" err="1"/>
-              <a:t>Libstdc</a:t>
-            </a:r>
-            <a:r>
-              <a:rPr lang="en-US" dirty="0"/>
-              <a:t>++:</a:t>
-            </a:r>
-            <a:r>
-              <a:rPr lang="ru-RU" dirty="0"/>
-              <a:t> -</a:t>
-            </a:r>
-            <a:r>
-              <a:rPr lang="en-US" dirty="0"/>
-              <a:t>D_GLIBCXX_ASSERTIONS</a:t>
-            </a:r>
-          </a:p>
-          <a:p>
-            <a:pPr lvl="1"/>
-            <a:r>
-              <a:rPr lang="ru-RU" dirty="0"/>
-              <a:t>(дефолтная </a:t>
-            </a:r>
-            <a:r>
-              <a:rPr lang="en-US" dirty="0"/>
-              <a:t>STL </a:t>
-            </a:r>
-            <a:r>
-              <a:rPr lang="ru-RU" dirty="0"/>
-              <a:t>в </a:t>
-            </a:r>
-            <a:r>
-              <a:rPr lang="en-US" dirty="0"/>
-              <a:t>GCC </a:t>
-            </a:r>
-            <a:r>
-              <a:rPr lang="ru-RU" dirty="0"/>
-              <a:t>и </a:t>
-            </a:r>
-            <a:r>
-              <a:rPr lang="en-US" dirty="0"/>
-              <a:t>Clang)</a:t>
-            </a:r>
-          </a:p>
-          <a:p>
-            <a:r>
-              <a:rPr lang="en-US" dirty="0" err="1"/>
-              <a:t>Libc</a:t>
-            </a:r>
-            <a:r>
-              <a:rPr lang="en-US" dirty="0"/>
-              <a:t>++: -D_LIBCPP_HARDENING_MODE=...</a:t>
-            </a:r>
-          </a:p>
-          <a:p>
-            <a:pPr lvl="1"/>
-            <a:r>
-              <a:rPr lang="en-US" dirty="0"/>
-              <a:t>(</a:t>
-            </a:r>
-            <a:r>
-              <a:rPr lang="ru-RU" dirty="0"/>
-              <a:t>включается в </a:t>
-            </a:r>
-            <a:r>
-              <a:rPr lang="en-US" dirty="0"/>
-              <a:t>Clang </a:t>
-            </a:r>
-            <a:r>
-              <a:rPr lang="ru-RU" dirty="0"/>
-              <a:t>по флагу </a:t>
-            </a:r>
-            <a:r>
-              <a:rPr lang="en-US" dirty="0"/>
-              <a:t>-</a:t>
-            </a:r>
-            <a:r>
-              <a:rPr lang="en-US" dirty="0" err="1"/>
-              <a:t>stdlib</a:t>
-            </a:r>
-            <a:r>
-              <a:rPr lang="en-US" dirty="0"/>
-              <a:t>=</a:t>
-            </a:r>
-            <a:r>
-              <a:rPr lang="en-US" dirty="0" err="1"/>
-              <a:t>libc</a:t>
-            </a:r>
-            <a:r>
-              <a:rPr lang="en-US" dirty="0"/>
-              <a:t>++)</a:t>
-            </a:r>
-          </a:p>
-          <a:p>
-            <a:r>
-              <a:rPr lang="en-US" dirty="0"/>
-              <a:t>Visual Studio: -D_ITERATOR_DEBUG_LEVEL=1</a:t>
-            </a:r>
-          </a:p>
-          <a:p>
-            <a:r>
-              <a:rPr lang="ru-RU" dirty="0"/>
-              <a:t>По умолчанию не включена в компиляторах в дистрибутивах </a:t>
-            </a:r>
-            <a:r>
-              <a:rPr lang="en-US" dirty="0"/>
-              <a:t>Debian, Ubuntu </a:t>
-            </a:r>
-            <a:r>
-              <a:rPr lang="ru-RU" dirty="0"/>
-              <a:t>и </a:t>
-            </a:r>
-            <a:r>
-              <a:rPr lang="en-US" dirty="0"/>
-              <a:t>Fedora</a:t>
-            </a:r>
-            <a:endParaRPr lang="ru-RU" dirty="0"/>
-          </a:p>
-          <a:p>
-            <a:r>
-              <a:rPr lang="ru-RU" dirty="0"/>
-              <a:t>Использование в реальных проектах:</a:t>
-            </a:r>
-          </a:p>
-          <a:p>
-            <a:pPr lvl="1"/>
-            <a:r>
-              <a:rPr lang="ru-RU" dirty="0"/>
-              <a:t>Включена по умолчанию для пакетов </a:t>
-            </a:r>
-            <a:r>
-              <a:rPr lang="en-US" dirty="0"/>
-              <a:t>Fedora, </a:t>
-            </a:r>
-            <a:r>
-              <a:rPr lang="ru-RU" dirty="0"/>
-              <a:t>но не для </a:t>
-            </a:r>
-            <a:r>
-              <a:rPr lang="en-US" dirty="0"/>
-              <a:t>Debian </a:t>
-            </a:r>
-            <a:r>
-              <a:rPr lang="ru-RU" dirty="0"/>
-              <a:t>и </a:t>
-            </a:r>
-            <a:r>
-              <a:rPr lang="en-US" dirty="0"/>
-              <a:t>Ubuntu</a:t>
-            </a:r>
-          </a:p>
-          <a:p>
-            <a:pPr lvl="1"/>
-            <a:r>
-              <a:rPr lang="en-US" dirty="0"/>
-              <a:t>Google: Chrome and server systems</a:t>
-            </a:r>
-          </a:p>
-          <a:p>
-            <a:pPr lvl="2"/>
-            <a:r>
-              <a:rPr lang="en-US" dirty="0">
-                <a:hlinkClick r:id="rId2"/>
-              </a:rPr>
-              <a:t>Retrofitting spatial safety to hundreds of millions of lines of C++</a:t>
-            </a:r>
-            <a:endParaRPr lang="en-US" dirty="0"/>
-          </a:p>
-        </p:txBody>
-      </p:sp>
-    </p:spTree>
-    <p:extLst>
-      <p:ext uri="{BB962C8B-B14F-4D97-AF65-F5344CB8AC3E}">
-        <p14:creationId xmlns:p14="http://schemas.microsoft.com/office/powerpoint/2010/main" val="3642710049"/>
       </p:ext>
     </p:extLst>
   </p:cSld>
@@ -12911,6 +12824,261 @@
           <p:cNvPr id="2" name="Title 1">
             <a:extLst>
               <a:ext uri="{FF2B5EF4-FFF2-40B4-BE49-F238E27FC236}">
+                <a16:creationId xmlns:a16="http://schemas.microsoft.com/office/drawing/2014/main" id="{88930F68-01D6-4DFC-8C4B-096056195DAD}"/>
+              </a:ext>
+            </a:extLst>
+          </p:cNvPr>
+          <p:cNvSpPr>
+            <a:spLocks noGrp="1"/>
+          </p:cNvSpPr>
+          <p:nvPr>
+            <p:ph type="title"/>
+          </p:nvPr>
+        </p:nvSpPr>
+        <p:spPr/>
+        <p:txBody>
+          <a:bodyPr/>
+          <a:lstStyle/>
+          <a:p>
+            <a:r>
+              <a:rPr lang="ru-RU" dirty="0"/>
+              <a:t>Как включить</a:t>
+            </a:r>
+            <a:r>
+              <a:rPr lang="en-US" dirty="0"/>
+              <a:t> ?</a:t>
+            </a:r>
+          </a:p>
+        </p:txBody>
+      </p:sp>
+      <p:sp>
+        <p:nvSpPr>
+          <p:cNvPr id="3" name="Content Placeholder 2">
+            <a:extLst>
+              <a:ext uri="{FF2B5EF4-FFF2-40B4-BE49-F238E27FC236}">
+                <a16:creationId xmlns:a16="http://schemas.microsoft.com/office/drawing/2014/main" id="{CDEFA53E-F74E-4729-8A65-412D2CAD0540}"/>
+              </a:ext>
+            </a:extLst>
+          </p:cNvPr>
+          <p:cNvSpPr>
+            <a:spLocks noGrp="1"/>
+          </p:cNvSpPr>
+          <p:nvPr>
+            <p:ph idx="1"/>
+          </p:nvPr>
+        </p:nvSpPr>
+        <p:spPr/>
+        <p:txBody>
+          <a:bodyPr>
+            <a:normAutofit fontScale="92500" lnSpcReduction="10000"/>
+          </a:bodyPr>
+          <a:lstStyle/>
+          <a:p>
+            <a:r>
+              <a:rPr lang="en-US" dirty="0" err="1"/>
+              <a:t>Libstdc</a:t>
+            </a:r>
+            <a:r>
+              <a:rPr lang="en-US" dirty="0"/>
+              <a:t>++:</a:t>
+            </a:r>
+            <a:r>
+              <a:rPr lang="ru-RU" dirty="0"/>
+              <a:t> -</a:t>
+            </a:r>
+            <a:r>
+              <a:rPr lang="en-US" dirty="0"/>
+              <a:t>D_GLIBCXX_ASSERTIONS</a:t>
+            </a:r>
+          </a:p>
+          <a:p>
+            <a:pPr lvl="1"/>
+            <a:r>
+              <a:rPr lang="ru-RU" dirty="0"/>
+              <a:t>(дефолтная </a:t>
+            </a:r>
+            <a:r>
+              <a:rPr lang="en-US" dirty="0"/>
+              <a:t>STL </a:t>
+            </a:r>
+            <a:r>
+              <a:rPr lang="ru-RU" dirty="0"/>
+              <a:t>в </a:t>
+            </a:r>
+            <a:r>
+              <a:rPr lang="en-US" dirty="0"/>
+              <a:t>GCC </a:t>
+            </a:r>
+            <a:r>
+              <a:rPr lang="ru-RU" dirty="0"/>
+              <a:t>и </a:t>
+            </a:r>
+            <a:r>
+              <a:rPr lang="en-US" dirty="0"/>
+              <a:t>Clang)</a:t>
+            </a:r>
+          </a:p>
+          <a:p>
+            <a:r>
+              <a:rPr lang="en-US" dirty="0" err="1"/>
+              <a:t>Libc</a:t>
+            </a:r>
+            <a:r>
+              <a:rPr lang="en-US" dirty="0"/>
+              <a:t>++: -D_LIBCPP_HARDENING_MODE=...</a:t>
+            </a:r>
+          </a:p>
+          <a:p>
+            <a:pPr lvl="1"/>
+            <a:r>
+              <a:rPr lang="en-US" dirty="0"/>
+              <a:t>(</a:t>
+            </a:r>
+            <a:r>
+              <a:rPr lang="ru-RU" dirty="0"/>
+              <a:t>включается в </a:t>
+            </a:r>
+            <a:r>
+              <a:rPr lang="en-US" dirty="0"/>
+              <a:t>Clang </a:t>
+            </a:r>
+            <a:r>
+              <a:rPr lang="ru-RU" dirty="0"/>
+              <a:t>по флагу </a:t>
+            </a:r>
+            <a:r>
+              <a:rPr lang="en-US" dirty="0"/>
+              <a:t>-</a:t>
+            </a:r>
+            <a:r>
+              <a:rPr lang="en-US" dirty="0" err="1"/>
+              <a:t>stdlib</a:t>
+            </a:r>
+            <a:r>
+              <a:rPr lang="en-US" dirty="0"/>
+              <a:t>=</a:t>
+            </a:r>
+            <a:r>
+              <a:rPr lang="en-US" dirty="0" err="1"/>
+              <a:t>libc</a:t>
+            </a:r>
+            <a:r>
+              <a:rPr lang="en-US" dirty="0"/>
+              <a:t>++)</a:t>
+            </a:r>
+          </a:p>
+          <a:p>
+            <a:r>
+              <a:rPr lang="en-US" dirty="0"/>
+              <a:t>Visual Studio: -D_ITERATOR_DEBUG_LEVEL=1</a:t>
+            </a:r>
+          </a:p>
+          <a:p>
+            <a:r>
+              <a:rPr lang="ru-RU" dirty="0"/>
+              <a:t>По умолчанию не включена в компиляторах в дистрибутивах </a:t>
+            </a:r>
+            <a:r>
+              <a:rPr lang="en-US" dirty="0"/>
+              <a:t>Debian, Ubuntu </a:t>
+            </a:r>
+            <a:r>
+              <a:rPr lang="ru-RU" dirty="0"/>
+              <a:t>и </a:t>
+            </a:r>
+            <a:r>
+              <a:rPr lang="en-US" dirty="0"/>
+              <a:t>Fedora</a:t>
+            </a:r>
+            <a:endParaRPr lang="ru-RU" dirty="0"/>
+          </a:p>
+          <a:p>
+            <a:r>
+              <a:rPr lang="ru-RU" dirty="0"/>
+              <a:t>Использование в реальных проектах:</a:t>
+            </a:r>
+          </a:p>
+          <a:p>
+            <a:pPr lvl="1"/>
+            <a:r>
+              <a:rPr lang="ru-RU" dirty="0"/>
+              <a:t>Включена по умолчанию для пакетов </a:t>
+            </a:r>
+            <a:r>
+              <a:rPr lang="en-US" dirty="0"/>
+              <a:t>Fedora, </a:t>
+            </a:r>
+            <a:r>
+              <a:rPr lang="ru-RU" dirty="0"/>
+              <a:t>но не для </a:t>
+            </a:r>
+            <a:r>
+              <a:rPr lang="en-US" dirty="0"/>
+              <a:t>Debian </a:t>
+            </a:r>
+            <a:r>
+              <a:rPr lang="ru-RU" dirty="0"/>
+              <a:t>и </a:t>
+            </a:r>
+            <a:r>
+              <a:rPr lang="en-US" dirty="0"/>
+              <a:t>Ubuntu</a:t>
+            </a:r>
+          </a:p>
+          <a:p>
+            <a:pPr lvl="1"/>
+            <a:r>
+              <a:rPr lang="en-US" dirty="0"/>
+              <a:t>Google: Chrome and server systems</a:t>
+            </a:r>
+          </a:p>
+          <a:p>
+            <a:pPr lvl="2"/>
+            <a:r>
+              <a:rPr lang="en-US" dirty="0">
+                <a:hlinkClick r:id="rId2"/>
+              </a:rPr>
+              <a:t>Retrofitting spatial safety to hundreds of millions of lines of C++</a:t>
+            </a:r>
+            <a:endParaRPr lang="en-US" dirty="0"/>
+          </a:p>
+        </p:txBody>
+      </p:sp>
+    </p:spTree>
+    <p:extLst>
+      <p:ext uri="{BB962C8B-B14F-4D97-AF65-F5344CB8AC3E}">
+        <p14:creationId xmlns:p14="http://schemas.microsoft.com/office/powerpoint/2010/main" val="3642710049"/>
+      </p:ext>
+    </p:extLst>
+  </p:cSld>
+  <p:clrMapOvr>
+    <a:masterClrMapping/>
+  </p:clrMapOvr>
+</p:sld>
+</file>
+
+<file path=ppt/slides/slide41.xml><?xml version="1.0" encoding="utf-8"?>
+<p:sld xmlns:a="http://schemas.openxmlformats.org/drawingml/2006/main" xmlns:r="http://schemas.openxmlformats.org/officeDocument/2006/relationships" xmlns:p="http://schemas.openxmlformats.org/presentationml/2006/main">
+  <p:cSld>
+    <p:spTree>
+      <p:nvGrpSpPr>
+        <p:cNvPr id="1" name=""/>
+        <p:cNvGrpSpPr/>
+        <p:nvPr/>
+      </p:nvGrpSpPr>
+      <p:grpSpPr>
+        <a:xfrm>
+          <a:off x="0" y="0"/>
+          <a:ext cx="0" cy="0"/>
+          <a:chOff x="0" y="0"/>
+          <a:chExt cx="0" cy="0"/>
+        </a:xfrm>
+      </p:grpSpPr>
+      <p:sp>
+        <p:nvSpPr>
+          <p:cNvPr id="2" name="Title 1">
+            <a:extLst>
+              <a:ext uri="{FF2B5EF4-FFF2-40B4-BE49-F238E27FC236}">
                 <a16:creationId xmlns:a16="http://schemas.microsoft.com/office/drawing/2014/main" id="{B1842F7A-9200-46E5-9FC2-73C39E243D0B}"/>
               </a:ext>
             </a:extLst>
@@ -12973,7 +13141,7 @@
 </p:sld>
 </file>
 
-<file path=ppt/slides/slide41.xml><?xml version="1.0" encoding="utf-8"?>
+<file path=ppt/slides/slide42.xml><?xml version="1.0" encoding="utf-8"?>
 <p:sld xmlns:a="http://schemas.openxmlformats.org/drawingml/2006/main" xmlns:r="http://schemas.openxmlformats.org/officeDocument/2006/relationships" xmlns:p="http://schemas.openxmlformats.org/presentationml/2006/main">
   <p:cSld>
     <p:spTree>
@@ -13521,7 +13689,7 @@
 </p:sld>
 </file>
 
-<file path=ppt/slides/slide42.xml><?xml version="1.0" encoding="utf-8"?>
+<file path=ppt/slides/slide43.xml><?xml version="1.0" encoding="utf-8"?>
 <p:sld xmlns:a="http://schemas.openxmlformats.org/drawingml/2006/main" xmlns:r="http://schemas.openxmlformats.org/officeDocument/2006/relationships" xmlns:p="http://schemas.openxmlformats.org/presentationml/2006/main">
   <p:cSld>
     <p:spTree>
@@ -14159,7 +14327,7 @@
 </p:sld>
 </file>
 
-<file path=ppt/slides/slide43.xml><?xml version="1.0" encoding="utf-8"?>
+<file path=ppt/slides/slide44.xml><?xml version="1.0" encoding="utf-8"?>
 <p:sld xmlns:a="http://schemas.openxmlformats.org/drawingml/2006/main" xmlns:r="http://schemas.openxmlformats.org/officeDocument/2006/relationships" xmlns:p="http://schemas.openxmlformats.org/presentationml/2006/main">
   <p:cSld>
     <p:spTree>
@@ -14412,7 +14580,7 @@
 </p:sld>
 </file>
 
-<file path=ppt/slides/slide44.xml><?xml version="1.0" encoding="utf-8"?>
+<file path=ppt/slides/slide45.xml><?xml version="1.0" encoding="utf-8"?>
 <p:sld xmlns:a="http://schemas.openxmlformats.org/drawingml/2006/main" xmlns:r="http://schemas.openxmlformats.org/officeDocument/2006/relationships" xmlns:p="http://schemas.openxmlformats.org/presentationml/2006/main">
   <p:cSld>
     <p:spTree>
@@ -14538,7 +14706,7 @@
 </p:sld>
 </file>
 
-<file path=ppt/slides/slide45.xml><?xml version="1.0" encoding="utf-8"?>
+<file path=ppt/slides/slide46.xml><?xml version="1.0" encoding="utf-8"?>
 <p:sld xmlns:a="http://schemas.openxmlformats.org/drawingml/2006/main" xmlns:r="http://schemas.openxmlformats.org/officeDocument/2006/relationships" xmlns:p="http://schemas.openxmlformats.org/presentationml/2006/main">
   <p:cSld>
     <p:spTree>
@@ -14769,7 +14937,7 @@
 </p:sld>
 </file>
 
-<file path=ppt/slides/slide46.xml><?xml version="1.0" encoding="utf-8"?>
+<file path=ppt/slides/slide47.xml><?xml version="1.0" encoding="utf-8"?>
 <p:sld xmlns:a="http://schemas.openxmlformats.org/drawingml/2006/main" xmlns:r="http://schemas.openxmlformats.org/officeDocument/2006/relationships" xmlns:p="http://schemas.openxmlformats.org/presentationml/2006/main">
   <p:cSld>
     <p:spTree>
@@ -14856,7 +15024,7 @@
 </p:sld>
 </file>
 
-<file path=ppt/slides/slide47.xml><?xml version="1.0" encoding="utf-8"?>
+<file path=ppt/slides/slide48.xml><?xml version="1.0" encoding="utf-8"?>
 <p:sld xmlns:a="http://schemas.openxmlformats.org/drawingml/2006/main" xmlns:r="http://schemas.openxmlformats.org/officeDocument/2006/relationships" xmlns:p="http://schemas.openxmlformats.org/presentationml/2006/main">
   <p:cSld>
     <p:spTree>
@@ -15035,7 +15203,7 @@
 </p:sld>
 </file>
 
-<file path=ppt/slides/slide48.xml><?xml version="1.0" encoding="utf-8"?>
+<file path=ppt/slides/slide49.xml><?xml version="1.0" encoding="utf-8"?>
 <p:sld xmlns:a="http://schemas.openxmlformats.org/drawingml/2006/main" xmlns:r="http://schemas.openxmlformats.org/officeDocument/2006/relationships" xmlns:p="http://schemas.openxmlformats.org/presentationml/2006/main">
   <p:cSld>
     <p:spTree>
@@ -15865,136 +16033,6 @@
 </p:sld>
 </file>
 
-<file path=ppt/slides/slide49.xml><?xml version="1.0" encoding="utf-8"?>
-<p:sld xmlns:a="http://schemas.openxmlformats.org/drawingml/2006/main" xmlns:r="http://schemas.openxmlformats.org/officeDocument/2006/relationships" xmlns:p="http://schemas.openxmlformats.org/presentationml/2006/main">
-  <p:cSld>
-    <p:spTree>
-      <p:nvGrpSpPr>
-        <p:cNvPr id="1" name=""/>
-        <p:cNvGrpSpPr/>
-        <p:nvPr/>
-      </p:nvGrpSpPr>
-      <p:grpSpPr>
-        <a:xfrm>
-          <a:off x="0" y="0"/>
-          <a:ext cx="0" cy="0"/>
-          <a:chOff x="0" y="0"/>
-          <a:chExt cx="0" cy="0"/>
-        </a:xfrm>
-      </p:grpSpPr>
-      <p:sp>
-        <p:nvSpPr>
-          <p:cNvPr id="2" name="Title 1">
-            <a:extLst>
-              <a:ext uri="{FF2B5EF4-FFF2-40B4-BE49-F238E27FC236}">
-                <a16:creationId xmlns:a16="http://schemas.microsoft.com/office/drawing/2014/main" id="{7B8E7810-D0A8-4634-93F0-ED0AC0D81DED}"/>
-              </a:ext>
-            </a:extLst>
-          </p:cNvPr>
-          <p:cNvSpPr>
-            <a:spLocks noGrp="1"/>
-          </p:cNvSpPr>
-          <p:nvPr>
-            <p:ph type="title"/>
-          </p:nvPr>
-        </p:nvSpPr>
-        <p:spPr/>
-        <p:txBody>
-          <a:bodyPr/>
-          <a:lstStyle/>
-          <a:p>
-            <a:r>
-              <a:rPr lang="ru-RU" dirty="0"/>
-              <a:t>История</a:t>
-            </a:r>
-            <a:endParaRPr lang="en-US" dirty="0"/>
-          </a:p>
-        </p:txBody>
-      </p:sp>
-      <p:sp>
-        <p:nvSpPr>
-          <p:cNvPr id="3" name="Content Placeholder 2">
-            <a:extLst>
-              <a:ext uri="{FF2B5EF4-FFF2-40B4-BE49-F238E27FC236}">
-                <a16:creationId xmlns:a16="http://schemas.microsoft.com/office/drawing/2014/main" id="{801672DB-F6AD-4CB3-A053-3E47CCBF67BF}"/>
-              </a:ext>
-            </a:extLst>
-          </p:cNvPr>
-          <p:cNvSpPr>
-            <a:spLocks noGrp="1"/>
-          </p:cNvSpPr>
-          <p:nvPr>
-            <p:ph idx="1"/>
-          </p:nvPr>
-        </p:nvSpPr>
-        <p:spPr/>
-        <p:txBody>
-          <a:bodyPr>
-            <a:normAutofit/>
-          </a:bodyPr>
-          <a:lstStyle/>
-          <a:p>
-            <a:r>
-              <a:rPr lang="ru-RU" dirty="0"/>
-              <a:t>Подход RELRO уже использовался ранее для инициализации vtables </a:t>
-            </a:r>
-            <a:r>
-              <a:rPr lang="en-US" dirty="0"/>
-              <a:t>(partial RELRO)</a:t>
-            </a:r>
-            <a:endParaRPr lang="ru-RU" dirty="0"/>
-          </a:p>
-          <a:p>
-            <a:pPr lvl="1"/>
-            <a:r>
-              <a:rPr lang="ru-RU" dirty="0">
-                <a:hlinkClick r:id="rId2"/>
-              </a:rPr>
-              <a:t>Ian Lance Taylor</a:t>
-            </a:r>
-            <a:r>
-              <a:rPr lang="en-US" dirty="0">
-                <a:hlinkClick r:id="rId2"/>
-              </a:rPr>
-              <a:t>: Linker </a:t>
-            </a:r>
-            <a:r>
-              <a:rPr lang="en-US" dirty="0" err="1">
-                <a:hlinkClick r:id="rId2"/>
-              </a:rPr>
-              <a:t>relro</a:t>
-            </a:r>
-            <a:endParaRPr lang="ru-RU" dirty="0"/>
-          </a:p>
-          <a:p>
-            <a:r>
-              <a:rPr lang="ru-RU" dirty="0"/>
-              <a:t>Потребовалась лишь небольшая адаптация для GOT</a:t>
-            </a:r>
-            <a:r>
-              <a:rPr lang="en-US" dirty="0"/>
-              <a:t> (full RELRO)</a:t>
-            </a:r>
-            <a:endParaRPr lang="ru-RU" dirty="0"/>
-          </a:p>
-          <a:p>
-            <a:endParaRPr lang="en-US" dirty="0"/>
-          </a:p>
-        </p:txBody>
-      </p:sp>
-    </p:spTree>
-    <p:extLst>
-      <p:ext uri="{BB962C8B-B14F-4D97-AF65-F5344CB8AC3E}">
-        <p14:creationId xmlns:p14="http://schemas.microsoft.com/office/powerpoint/2010/main" val="160064826"/>
-      </p:ext>
-    </p:extLst>
-  </p:cSld>
-  <p:clrMapOvr>
-    <a:masterClrMapping/>
-  </p:clrMapOvr>
-</p:sld>
-</file>
-
 <file path=ppt/slides/slide5.xml><?xml version="1.0" encoding="utf-8"?>
 <p:sld xmlns:a="http://schemas.openxmlformats.org/drawingml/2006/main" xmlns:r="http://schemas.openxmlformats.org/officeDocument/2006/relationships" xmlns:p="http://schemas.openxmlformats.org/presentationml/2006/main">
   <p:cSld>
@@ -16266,6 +16304,136 @@
           <p:cNvPr id="2" name="Title 1">
             <a:extLst>
               <a:ext uri="{FF2B5EF4-FFF2-40B4-BE49-F238E27FC236}">
+                <a16:creationId xmlns:a16="http://schemas.microsoft.com/office/drawing/2014/main" id="{7B8E7810-D0A8-4634-93F0-ED0AC0D81DED}"/>
+              </a:ext>
+            </a:extLst>
+          </p:cNvPr>
+          <p:cNvSpPr>
+            <a:spLocks noGrp="1"/>
+          </p:cNvSpPr>
+          <p:nvPr>
+            <p:ph type="title"/>
+          </p:nvPr>
+        </p:nvSpPr>
+        <p:spPr/>
+        <p:txBody>
+          <a:bodyPr/>
+          <a:lstStyle/>
+          <a:p>
+            <a:r>
+              <a:rPr lang="ru-RU" dirty="0"/>
+              <a:t>История</a:t>
+            </a:r>
+            <a:endParaRPr lang="en-US" dirty="0"/>
+          </a:p>
+        </p:txBody>
+      </p:sp>
+      <p:sp>
+        <p:nvSpPr>
+          <p:cNvPr id="3" name="Content Placeholder 2">
+            <a:extLst>
+              <a:ext uri="{FF2B5EF4-FFF2-40B4-BE49-F238E27FC236}">
+                <a16:creationId xmlns:a16="http://schemas.microsoft.com/office/drawing/2014/main" id="{801672DB-F6AD-4CB3-A053-3E47CCBF67BF}"/>
+              </a:ext>
+            </a:extLst>
+          </p:cNvPr>
+          <p:cNvSpPr>
+            <a:spLocks noGrp="1"/>
+          </p:cNvSpPr>
+          <p:nvPr>
+            <p:ph idx="1"/>
+          </p:nvPr>
+        </p:nvSpPr>
+        <p:spPr/>
+        <p:txBody>
+          <a:bodyPr>
+            <a:normAutofit/>
+          </a:bodyPr>
+          <a:lstStyle/>
+          <a:p>
+            <a:r>
+              <a:rPr lang="ru-RU" dirty="0"/>
+              <a:t>Подход RELRO уже использовался ранее для инициализации vtables </a:t>
+            </a:r>
+            <a:r>
+              <a:rPr lang="en-US" dirty="0"/>
+              <a:t>(partial RELRO)</a:t>
+            </a:r>
+            <a:endParaRPr lang="ru-RU" dirty="0"/>
+          </a:p>
+          <a:p>
+            <a:pPr lvl="1"/>
+            <a:r>
+              <a:rPr lang="ru-RU" dirty="0">
+                <a:hlinkClick r:id="rId2"/>
+              </a:rPr>
+              <a:t>Ian Lance Taylor</a:t>
+            </a:r>
+            <a:r>
+              <a:rPr lang="en-US" dirty="0">
+                <a:hlinkClick r:id="rId2"/>
+              </a:rPr>
+              <a:t>: Linker </a:t>
+            </a:r>
+            <a:r>
+              <a:rPr lang="en-US" dirty="0" err="1">
+                <a:hlinkClick r:id="rId2"/>
+              </a:rPr>
+              <a:t>relro</a:t>
+            </a:r>
+            <a:endParaRPr lang="ru-RU" dirty="0"/>
+          </a:p>
+          <a:p>
+            <a:r>
+              <a:rPr lang="ru-RU" dirty="0"/>
+              <a:t>Потребовалась лишь небольшая адаптация для GOT</a:t>
+            </a:r>
+            <a:r>
+              <a:rPr lang="en-US" dirty="0"/>
+              <a:t> (full RELRO)</a:t>
+            </a:r>
+            <a:endParaRPr lang="ru-RU" dirty="0"/>
+          </a:p>
+          <a:p>
+            <a:endParaRPr lang="en-US" dirty="0"/>
+          </a:p>
+        </p:txBody>
+      </p:sp>
+    </p:spTree>
+    <p:extLst>
+      <p:ext uri="{BB962C8B-B14F-4D97-AF65-F5344CB8AC3E}">
+        <p14:creationId xmlns:p14="http://schemas.microsoft.com/office/powerpoint/2010/main" val="160064826"/>
+      </p:ext>
+    </p:extLst>
+  </p:cSld>
+  <p:clrMapOvr>
+    <a:masterClrMapping/>
+  </p:clrMapOvr>
+</p:sld>
+</file>
+
+<file path=ppt/slides/slide51.xml><?xml version="1.0" encoding="utf-8"?>
+<p:sld xmlns:a="http://schemas.openxmlformats.org/drawingml/2006/main" xmlns:r="http://schemas.openxmlformats.org/officeDocument/2006/relationships" xmlns:p="http://schemas.openxmlformats.org/presentationml/2006/main">
+  <p:cSld>
+    <p:spTree>
+      <p:nvGrpSpPr>
+        <p:cNvPr id="1" name=""/>
+        <p:cNvGrpSpPr/>
+        <p:nvPr/>
+      </p:nvGrpSpPr>
+      <p:grpSpPr>
+        <a:xfrm>
+          <a:off x="0" y="0"/>
+          <a:ext cx="0" cy="0"/>
+          <a:chOff x="0" y="0"/>
+          <a:chExt cx="0" cy="0"/>
+        </a:xfrm>
+      </p:grpSpPr>
+      <p:sp>
+        <p:nvSpPr>
+          <p:cNvPr id="2" name="Title 1">
+            <a:extLst>
+              <a:ext uri="{FF2B5EF4-FFF2-40B4-BE49-F238E27FC236}">
                 <a16:creationId xmlns:a16="http://schemas.microsoft.com/office/drawing/2014/main" id="{C959E6E0-49FC-47E3-B907-3E8C02CEE8E1}"/>
               </a:ext>
             </a:extLst>
@@ -16408,7 +16576,7 @@
 </p:sld>
 </file>
 
-<file path=ppt/slides/slide51.xml><?xml version="1.0" encoding="utf-8"?>
+<file path=ppt/slides/slide52.xml><?xml version="1.0" encoding="utf-8"?>
 <p:sld xmlns:a="http://schemas.openxmlformats.org/drawingml/2006/main" xmlns:r="http://schemas.openxmlformats.org/officeDocument/2006/relationships" xmlns:p="http://schemas.openxmlformats.org/presentationml/2006/main">
   <p:cSld>
     <p:spTree>
@@ -16618,7 +16786,7 @@
 </p:sld>
 </file>
 
-<file path=ppt/slides/slide52.xml><?xml version="1.0" encoding="utf-8"?>
+<file path=ppt/slides/slide53.xml><?xml version="1.0" encoding="utf-8"?>
 <p:sld xmlns:a="http://schemas.openxmlformats.org/drawingml/2006/main" xmlns:r="http://schemas.openxmlformats.org/officeDocument/2006/relationships" xmlns:p="http://schemas.openxmlformats.org/presentationml/2006/main">
   <p:cSld>
     <p:spTree>
@@ -16702,7 +16870,7 @@
 </p:sld>
 </file>
 
-<file path=ppt/slides/slide53.xml><?xml version="1.0" encoding="utf-8"?>
+<file path=ppt/slides/slide54.xml><?xml version="1.0" encoding="utf-8"?>
 <p:sld xmlns:a="http://schemas.openxmlformats.org/drawingml/2006/main" xmlns:r="http://schemas.openxmlformats.org/officeDocument/2006/relationships" xmlns:p="http://schemas.openxmlformats.org/presentationml/2006/main">
   <p:cSld>
     <p:spTree>
@@ -16852,7 +17020,7 @@
 </p:sld>
 </file>
 
-<file path=ppt/slides/slide54.xml><?xml version="1.0" encoding="utf-8"?>
+<file path=ppt/slides/slide55.xml><?xml version="1.0" encoding="utf-8"?>
 <p:sld xmlns:a="http://schemas.openxmlformats.org/drawingml/2006/main" xmlns:r="http://schemas.openxmlformats.org/officeDocument/2006/relationships" xmlns:p="http://schemas.openxmlformats.org/presentationml/2006/main">
   <p:cSld>
     <p:spTree>
@@ -17329,7 +17497,7 @@
 </p:sld>
 </file>
 
-<file path=ppt/slides/slide55.xml><?xml version="1.0" encoding="utf-8"?>
+<file path=ppt/slides/slide56.xml><?xml version="1.0" encoding="utf-8"?>
 <p:sld xmlns:a="http://schemas.openxmlformats.org/drawingml/2006/main" xmlns:r="http://schemas.openxmlformats.org/officeDocument/2006/relationships" xmlns:p="http://schemas.openxmlformats.org/presentationml/2006/main">
   <p:cSld>
     <p:spTree>
@@ -17628,7 +17796,7 @@
 </p:sld>
 </file>
 
-<file path=ppt/slides/slide56.xml><?xml version="1.0" encoding="utf-8"?>
+<file path=ppt/slides/slide57.xml><?xml version="1.0" encoding="utf-8"?>
 <p:sld xmlns:a="http://schemas.openxmlformats.org/drawingml/2006/main" xmlns:r="http://schemas.openxmlformats.org/officeDocument/2006/relationships" xmlns:p="http://schemas.openxmlformats.org/presentationml/2006/main">
   <p:cSld>
     <p:spTree>
@@ -18330,7 +18498,7 @@
 </p:sld>
 </file>
 
-<file path=ppt/slides/slide57.xml><?xml version="1.0" encoding="utf-8"?>
+<file path=ppt/slides/slide58.xml><?xml version="1.0" encoding="utf-8"?>
 <p:sld xmlns:a="http://schemas.openxmlformats.org/drawingml/2006/main" xmlns:r="http://schemas.openxmlformats.org/officeDocument/2006/relationships" xmlns:p="http://schemas.openxmlformats.org/presentationml/2006/main">
   <p:cSld>
     <p:spTree>
@@ -18560,7 +18728,7 @@
 </p:sld>
 </file>
 
-<file path=ppt/slides/slide58.xml><?xml version="1.0" encoding="utf-8"?>
+<file path=ppt/slides/slide59.xml><?xml version="1.0" encoding="utf-8"?>
 <p:sld xmlns:a="http://schemas.openxmlformats.org/drawingml/2006/main" xmlns:r="http://schemas.openxmlformats.org/officeDocument/2006/relationships" xmlns:p="http://schemas.openxmlformats.org/presentationml/2006/main">
   <p:cSld>
     <p:spTree>
@@ -18824,90 +18992,6 @@
     <p:extLst>
       <p:ext uri="{BB962C8B-B14F-4D97-AF65-F5344CB8AC3E}">
         <p14:creationId xmlns:p14="http://schemas.microsoft.com/office/powerpoint/2010/main" val="716798563"/>
-      </p:ext>
-    </p:extLst>
-  </p:cSld>
-  <p:clrMapOvr>
-    <a:masterClrMapping/>
-  </p:clrMapOvr>
-</p:sld>
-</file>
-
-<file path=ppt/slides/slide59.xml><?xml version="1.0" encoding="utf-8"?>
-<p:sld xmlns:a="http://schemas.openxmlformats.org/drawingml/2006/main" xmlns:r="http://schemas.openxmlformats.org/officeDocument/2006/relationships" xmlns:p="http://schemas.openxmlformats.org/presentationml/2006/main">
-  <p:cSld>
-    <p:spTree>
-      <p:nvGrpSpPr>
-        <p:cNvPr id="1" name=""/>
-        <p:cNvGrpSpPr/>
-        <p:nvPr/>
-      </p:nvGrpSpPr>
-      <p:grpSpPr>
-        <a:xfrm>
-          <a:off x="0" y="0"/>
-          <a:ext cx="0" cy="0"/>
-          <a:chOff x="0" y="0"/>
-          <a:chExt cx="0" cy="0"/>
-        </a:xfrm>
-      </p:grpSpPr>
-      <p:sp>
-        <p:nvSpPr>
-          <p:cNvPr id="2" name="Title 1">
-            <a:extLst>
-              <a:ext uri="{FF2B5EF4-FFF2-40B4-BE49-F238E27FC236}">
-                <a16:creationId xmlns:a16="http://schemas.microsoft.com/office/drawing/2014/main" id="{F1FC243D-B202-4F31-A4DF-4AF817233640}"/>
-              </a:ext>
-            </a:extLst>
-          </p:cNvPr>
-          <p:cNvSpPr>
-            <a:spLocks noGrp="1"/>
-          </p:cNvSpPr>
-          <p:nvPr>
-            <p:ph type="title"/>
-          </p:nvPr>
-        </p:nvSpPr>
-        <p:spPr/>
-        <p:txBody>
-          <a:bodyPr/>
-          <a:lstStyle/>
-          <a:p>
-            <a:r>
-              <a:rPr lang="ru-RU" dirty="0"/>
-              <a:t>Проверка целочисленных переполнений</a:t>
-            </a:r>
-            <a:endParaRPr lang="en-US" dirty="0"/>
-          </a:p>
-        </p:txBody>
-      </p:sp>
-      <p:sp>
-        <p:nvSpPr>
-          <p:cNvPr id="3" name="Text Placeholder 2">
-            <a:extLst>
-              <a:ext uri="{FF2B5EF4-FFF2-40B4-BE49-F238E27FC236}">
-                <a16:creationId xmlns:a16="http://schemas.microsoft.com/office/drawing/2014/main" id="{85C2332E-D266-4879-883F-74C1BEE5C67F}"/>
-              </a:ext>
-            </a:extLst>
-          </p:cNvPr>
-          <p:cNvSpPr>
-            <a:spLocks noGrp="1"/>
-          </p:cNvSpPr>
-          <p:nvPr>
-            <p:ph type="body" idx="1"/>
-          </p:nvPr>
-        </p:nvSpPr>
-        <p:spPr/>
-        <p:txBody>
-          <a:bodyPr/>
-          <a:lstStyle/>
-          <a:p>
-            <a:endParaRPr lang="en-US"/>
-          </a:p>
-        </p:txBody>
-      </p:sp>
-    </p:spTree>
-    <p:extLst>
-      <p:ext uri="{BB962C8B-B14F-4D97-AF65-F5344CB8AC3E}">
-        <p14:creationId xmlns:p14="http://schemas.microsoft.com/office/powerpoint/2010/main" val="1442791335"/>
       </p:ext>
     </p:extLst>
   </p:cSld>
@@ -19168,6 +19252,90 @@
           <p:cNvPr id="2" name="Title 1">
             <a:extLst>
               <a:ext uri="{FF2B5EF4-FFF2-40B4-BE49-F238E27FC236}">
+                <a16:creationId xmlns:a16="http://schemas.microsoft.com/office/drawing/2014/main" id="{F1FC243D-B202-4F31-A4DF-4AF817233640}"/>
+              </a:ext>
+            </a:extLst>
+          </p:cNvPr>
+          <p:cNvSpPr>
+            <a:spLocks noGrp="1"/>
+          </p:cNvSpPr>
+          <p:nvPr>
+            <p:ph type="title"/>
+          </p:nvPr>
+        </p:nvSpPr>
+        <p:spPr/>
+        <p:txBody>
+          <a:bodyPr/>
+          <a:lstStyle/>
+          <a:p>
+            <a:r>
+              <a:rPr lang="ru-RU" dirty="0"/>
+              <a:t>Проверка целочисленных переполнений</a:t>
+            </a:r>
+            <a:endParaRPr lang="en-US" dirty="0"/>
+          </a:p>
+        </p:txBody>
+      </p:sp>
+      <p:sp>
+        <p:nvSpPr>
+          <p:cNvPr id="3" name="Text Placeholder 2">
+            <a:extLst>
+              <a:ext uri="{FF2B5EF4-FFF2-40B4-BE49-F238E27FC236}">
+                <a16:creationId xmlns:a16="http://schemas.microsoft.com/office/drawing/2014/main" id="{85C2332E-D266-4879-883F-74C1BEE5C67F}"/>
+              </a:ext>
+            </a:extLst>
+          </p:cNvPr>
+          <p:cNvSpPr>
+            <a:spLocks noGrp="1"/>
+          </p:cNvSpPr>
+          <p:nvPr>
+            <p:ph type="body" idx="1"/>
+          </p:nvPr>
+        </p:nvSpPr>
+        <p:spPr/>
+        <p:txBody>
+          <a:bodyPr/>
+          <a:lstStyle/>
+          <a:p>
+            <a:endParaRPr lang="en-US"/>
+          </a:p>
+        </p:txBody>
+      </p:sp>
+    </p:spTree>
+    <p:extLst>
+      <p:ext uri="{BB962C8B-B14F-4D97-AF65-F5344CB8AC3E}">
+        <p14:creationId xmlns:p14="http://schemas.microsoft.com/office/powerpoint/2010/main" val="1442791335"/>
+      </p:ext>
+    </p:extLst>
+  </p:cSld>
+  <p:clrMapOvr>
+    <a:masterClrMapping/>
+  </p:clrMapOvr>
+</p:sld>
+</file>
+
+<file path=ppt/slides/slide61.xml><?xml version="1.0" encoding="utf-8"?>
+<p:sld xmlns:a="http://schemas.openxmlformats.org/drawingml/2006/main" xmlns:r="http://schemas.openxmlformats.org/officeDocument/2006/relationships" xmlns:p="http://schemas.openxmlformats.org/presentationml/2006/main">
+  <p:cSld>
+    <p:spTree>
+      <p:nvGrpSpPr>
+        <p:cNvPr id="1" name=""/>
+        <p:cNvGrpSpPr/>
+        <p:nvPr/>
+      </p:nvGrpSpPr>
+      <p:grpSpPr>
+        <a:xfrm>
+          <a:off x="0" y="0"/>
+          <a:ext cx="0" cy="0"/>
+          <a:chOff x="0" y="0"/>
+          <a:chExt cx="0" cy="0"/>
+        </a:xfrm>
+      </p:grpSpPr>
+      <p:sp>
+        <p:nvSpPr>
+          <p:cNvPr id="2" name="Title 1">
+            <a:extLst>
+              <a:ext uri="{FF2B5EF4-FFF2-40B4-BE49-F238E27FC236}">
                 <a16:creationId xmlns:a16="http://schemas.microsoft.com/office/drawing/2014/main" id="{D2AF8B44-9846-43A7-A173-784CB989F268}"/>
               </a:ext>
             </a:extLst>
@@ -19547,7 +19715,7 @@
 </p:sld>
 </file>
 
-<file path=ppt/slides/slide61.xml><?xml version="1.0" encoding="utf-8"?>
+<file path=ppt/slides/slide62.xml><?xml version="1.0" encoding="utf-8"?>
 <p:sld xmlns:a="http://schemas.openxmlformats.org/drawingml/2006/main" xmlns:r="http://schemas.openxmlformats.org/officeDocument/2006/relationships" xmlns:p="http://schemas.openxmlformats.org/presentationml/2006/main">
   <p:cSld>
     <p:spTree>
@@ -19861,7 +20029,7 @@
 </p:sld>
 </file>
 
-<file path=ppt/slides/slide62.xml><?xml version="1.0" encoding="utf-8"?>
+<file path=ppt/slides/slide63.xml><?xml version="1.0" encoding="utf-8"?>
 <p:sld xmlns:a="http://schemas.openxmlformats.org/drawingml/2006/main" xmlns:r="http://schemas.openxmlformats.org/officeDocument/2006/relationships" xmlns:p="http://schemas.openxmlformats.org/presentationml/2006/main">
   <p:cSld>
     <p:spTree>
@@ -19982,7 +20150,7 @@
             <a:pPr lvl="1"/>
             <a:r>
               <a:rPr lang="en-US" dirty="0"/>
-              <a:t>3x </a:t>
+              <a:t>30% </a:t>
             </a:r>
             <a:r>
               <a:rPr lang="ru-RU" dirty="0"/>
@@ -20288,7 +20456,7 @@
 </p:sld>
 </file>
 
-<file path=ppt/slides/slide63.xml><?xml version="1.0" encoding="utf-8"?>
+<file path=ppt/slides/slide64.xml><?xml version="1.0" encoding="utf-8"?>
 <p:sld xmlns:a="http://schemas.openxmlformats.org/drawingml/2006/main" xmlns:r="http://schemas.openxmlformats.org/officeDocument/2006/relationships" xmlns:p="http://schemas.openxmlformats.org/presentationml/2006/main">
   <p:cSld>
     <p:spTree>
@@ -20356,7 +20524,7 @@
         <p:spPr/>
         <p:txBody>
           <a:bodyPr>
-            <a:normAutofit lnSpcReduction="10000"/>
+            <a:normAutofit fontScale="92500" lnSpcReduction="20000"/>
           </a:bodyPr>
           <a:lstStyle/>
           <a:p>
@@ -20383,7 +20551,21 @@
                 <a:latin typeface="Courier New" panose="02070309020205020404" pitchFamily="49" charset="0"/>
                 <a:cs typeface="Courier New" panose="02070309020205020404" pitchFamily="49" charset="0"/>
               </a:rPr>
-              <a:t>-trap=undefined</a:t>
+              <a:t>-trap=signed-integer-</a:t>
+            </a:r>
+            <a:r>
+              <a:rPr lang="en-US" dirty="0" err="1">
+                <a:latin typeface="Courier New" panose="02070309020205020404" pitchFamily="49" charset="0"/>
+                <a:cs typeface="Courier New" panose="02070309020205020404" pitchFamily="49" charset="0"/>
+              </a:rPr>
+              <a:t>overflow,pointer</a:t>
+            </a:r>
+            <a:r>
+              <a:rPr lang="en-US" dirty="0">
+                <a:latin typeface="Courier New" panose="02070309020205020404" pitchFamily="49" charset="0"/>
+                <a:cs typeface="Courier New" panose="02070309020205020404" pitchFamily="49" charset="0"/>
+              </a:rPr>
+              <a:t>-overflow</a:t>
             </a:r>
           </a:p>
           <a:p>
@@ -20457,13 +20639,27 @@
                 <a:latin typeface="Courier New" panose="02070309020205020404" pitchFamily="49" charset="0"/>
                 <a:cs typeface="Courier New" panose="02070309020205020404" pitchFamily="49" charset="0"/>
               </a:rPr>
-              <a:t>=undefined -</a:t>
+              <a:t>=signed-integer-</a:t>
             </a:r>
             <a:r>
               <a:rPr lang="en-US" dirty="0" err="1">
                 <a:latin typeface="Courier New" panose="02070309020205020404" pitchFamily="49" charset="0"/>
                 <a:cs typeface="Courier New" panose="02070309020205020404" pitchFamily="49" charset="0"/>
               </a:rPr>
+              <a:t>overflow,pointer</a:t>
+            </a:r>
+            <a:r>
+              <a:rPr lang="en-US" dirty="0">
+                <a:latin typeface="Courier New" panose="02070309020205020404" pitchFamily="49" charset="0"/>
+                <a:cs typeface="Courier New" panose="02070309020205020404" pitchFamily="49" charset="0"/>
+              </a:rPr>
+              <a:t>-overflow -</a:t>
+            </a:r>
+            <a:r>
+              <a:rPr lang="en-US" dirty="0" err="1">
+                <a:latin typeface="Courier New" panose="02070309020205020404" pitchFamily="49" charset="0"/>
+                <a:cs typeface="Courier New" panose="02070309020205020404" pitchFamily="49" charset="0"/>
+              </a:rPr>
               <a:t>fsanitize</a:t>
             </a:r>
             <a:r>
@@ -20499,14 +20695,31 @@
                 <a:latin typeface="Courier New" panose="02070309020205020404" pitchFamily="49" charset="0"/>
                 <a:cs typeface="Courier New" panose="02070309020205020404" pitchFamily="49" charset="0"/>
               </a:rPr>
-              <a:t>=</a:t>
-            </a:r>
-            <a:r>
-              <a:rPr lang="en-US" dirty="0" err="1">
-                <a:latin typeface="Courier New" panose="02070309020205020404" pitchFamily="49" charset="0"/>
-                <a:cs typeface="Courier New" panose="02070309020205020404" pitchFamily="49" charset="0"/>
-              </a:rPr>
-              <a:t>undefined,integer</a:t>
+              <a:t>=integer</a:t>
+            </a:r>
+            <a:r>
+              <a:rPr lang="en-US" dirty="0"/>
+              <a:t> </a:t>
+            </a:r>
+            <a:r>
+              <a:rPr lang="ru-RU" dirty="0"/>
+              <a:t>(может потребоваться добавить некоторые </a:t>
+            </a:r>
+            <a:r>
+              <a:rPr lang="en-US" dirty="0"/>
+              <a:t>STL </a:t>
+            </a:r>
+            <a:r>
+              <a:rPr lang="ru-RU" dirty="0"/>
+              <a:t>хедеры в </a:t>
+            </a:r>
+            <a:r>
+              <a:rPr lang="en-US" dirty="0"/>
+              <a:t>blacklist</a:t>
+            </a:r>
+            <a:r>
+              <a:rPr lang="ru-RU" dirty="0"/>
+              <a:t>)</a:t>
             </a:r>
             <a:endParaRPr lang="en-US" dirty="0">
               <a:latin typeface="Courier New" panose="02070309020205020404" pitchFamily="49" charset="0"/>
@@ -20582,7 +20795,7 @@
 </p:sld>
 </file>
 
-<file path=ppt/slides/slide64.xml><?xml version="1.0" encoding="utf-8"?>
+<file path=ppt/slides/slide65.xml><?xml version="1.0" encoding="utf-8"?>
 <p:sld xmlns:a="http://schemas.openxmlformats.org/drawingml/2006/main" xmlns:r="http://schemas.openxmlformats.org/officeDocument/2006/relationships" xmlns:p="http://schemas.openxmlformats.org/presentationml/2006/main">
   <p:cSld>
     <p:spTree>
@@ -20666,7 +20879,7 @@
 </p:sld>
 </file>
 
-<file path=ppt/slides/slide65.xml><?xml version="1.0" encoding="utf-8"?>
+<file path=ppt/slides/slide66.xml><?xml version="1.0" encoding="utf-8"?>
 <p:sld xmlns:a="http://schemas.openxmlformats.org/drawingml/2006/main" xmlns:r="http://schemas.openxmlformats.org/officeDocument/2006/relationships" xmlns:p="http://schemas.openxmlformats.org/presentationml/2006/main">
   <p:cSld>
     <p:spTree>
@@ -21012,7 +21225,7 @@
 </p:sld>
 </file>
 
-<file path=ppt/slides/slide66.xml><?xml version="1.0" encoding="utf-8"?>
+<file path=ppt/slides/slide67.xml><?xml version="1.0" encoding="utf-8"?>
 <p:sld xmlns:a="http://schemas.openxmlformats.org/drawingml/2006/main" xmlns:r="http://schemas.openxmlformats.org/officeDocument/2006/relationships" xmlns:p="http://schemas.openxmlformats.org/presentationml/2006/main">
   <p:cSld>
     <p:spTree>
@@ -21220,7 +21433,7 @@
 </p:sld>
 </file>
 
-<file path=ppt/slides/slide67.xml><?xml version="1.0" encoding="utf-8"?>
+<file path=ppt/slides/slide68.xml><?xml version="1.0" encoding="utf-8"?>
 <p:sld xmlns:a="http://schemas.openxmlformats.org/drawingml/2006/main" xmlns:r="http://schemas.openxmlformats.org/officeDocument/2006/relationships" xmlns:p="http://schemas.openxmlformats.org/presentationml/2006/main">
   <p:cSld>
     <p:spTree>
@@ -21340,7 +21553,7 @@
 </p:sld>
 </file>
 
-<file path=ppt/slides/slide68.xml><?xml version="1.0" encoding="utf-8"?>
+<file path=ppt/slides/slide69.xml><?xml version="1.0" encoding="utf-8"?>
 <p:sld xmlns:a="http://schemas.openxmlformats.org/drawingml/2006/main" xmlns:r="http://schemas.openxmlformats.org/officeDocument/2006/relationships" xmlns:p="http://schemas.openxmlformats.org/presentationml/2006/main">
   <p:cSld>
     <p:spTree>
@@ -21615,89 +21828,6 @@
     <p:extLst>
       <p:ext uri="{BB962C8B-B14F-4D97-AF65-F5344CB8AC3E}">
         <p14:creationId xmlns:p14="http://schemas.microsoft.com/office/powerpoint/2010/main" val="3014055000"/>
-      </p:ext>
-    </p:extLst>
-  </p:cSld>
-  <p:clrMapOvr>
-    <a:masterClrMapping/>
-  </p:clrMapOvr>
-</p:sld>
-</file>
-
-<file path=ppt/slides/slide69.xml><?xml version="1.0" encoding="utf-8"?>
-<p:sld xmlns:a="http://schemas.openxmlformats.org/drawingml/2006/main" xmlns:r="http://schemas.openxmlformats.org/officeDocument/2006/relationships" xmlns:p="http://schemas.openxmlformats.org/presentationml/2006/main">
-  <p:cSld>
-    <p:spTree>
-      <p:nvGrpSpPr>
-        <p:cNvPr id="1" name=""/>
-        <p:cNvGrpSpPr/>
-        <p:nvPr/>
-      </p:nvGrpSpPr>
-      <p:grpSpPr>
-        <a:xfrm>
-          <a:off x="0" y="0"/>
-          <a:ext cx="0" cy="0"/>
-          <a:chOff x="0" y="0"/>
-          <a:chExt cx="0" cy="0"/>
-        </a:xfrm>
-      </p:grpSpPr>
-      <p:sp>
-        <p:nvSpPr>
-          <p:cNvPr id="2" name="Title 1">
-            <a:extLst>
-              <a:ext uri="{FF2B5EF4-FFF2-40B4-BE49-F238E27FC236}">
-                <a16:creationId xmlns:a16="http://schemas.microsoft.com/office/drawing/2014/main" id="{4C6C92A7-677E-4576-AB17-AD95F9FAA24A}"/>
-              </a:ext>
-            </a:extLst>
-          </p:cNvPr>
-          <p:cNvSpPr>
-            <a:spLocks noGrp="1"/>
-          </p:cNvSpPr>
-          <p:nvPr>
-            <p:ph type="title"/>
-          </p:nvPr>
-        </p:nvSpPr>
-        <p:spPr/>
-        <p:txBody>
-          <a:bodyPr/>
-          <a:lstStyle/>
-          <a:p>
-            <a:r>
-              <a:rPr lang="en-US" dirty="0"/>
-              <a:t>Control-Flow Integrity</a:t>
-            </a:r>
-          </a:p>
-        </p:txBody>
-      </p:sp>
-      <p:sp>
-        <p:nvSpPr>
-          <p:cNvPr id="3" name="Text Placeholder 2">
-            <a:extLst>
-              <a:ext uri="{FF2B5EF4-FFF2-40B4-BE49-F238E27FC236}">
-                <a16:creationId xmlns:a16="http://schemas.microsoft.com/office/drawing/2014/main" id="{2791C595-BB19-499F-BED4-456F80ABC843}"/>
-              </a:ext>
-            </a:extLst>
-          </p:cNvPr>
-          <p:cNvSpPr>
-            <a:spLocks noGrp="1"/>
-          </p:cNvSpPr>
-          <p:nvPr>
-            <p:ph type="body" idx="1"/>
-          </p:nvPr>
-        </p:nvSpPr>
-        <p:spPr/>
-        <p:txBody>
-          <a:bodyPr/>
-          <a:lstStyle/>
-          <a:p>
-            <a:endParaRPr lang="en-US"/>
-          </a:p>
-        </p:txBody>
-      </p:sp>
-    </p:spTree>
-    <p:extLst>
-      <p:ext uri="{BB962C8B-B14F-4D97-AF65-F5344CB8AC3E}">
-        <p14:creationId xmlns:p14="http://schemas.microsoft.com/office/powerpoint/2010/main" val="3818483602"/>
       </p:ext>
     </p:extLst>
   </p:cSld>
@@ -21813,6 +21943,89 @@
           <p:cNvPr id="2" name="Title 1">
             <a:extLst>
               <a:ext uri="{FF2B5EF4-FFF2-40B4-BE49-F238E27FC236}">
+                <a16:creationId xmlns:a16="http://schemas.microsoft.com/office/drawing/2014/main" id="{4C6C92A7-677E-4576-AB17-AD95F9FAA24A}"/>
+              </a:ext>
+            </a:extLst>
+          </p:cNvPr>
+          <p:cNvSpPr>
+            <a:spLocks noGrp="1"/>
+          </p:cNvSpPr>
+          <p:nvPr>
+            <p:ph type="title"/>
+          </p:nvPr>
+        </p:nvSpPr>
+        <p:spPr/>
+        <p:txBody>
+          <a:bodyPr/>
+          <a:lstStyle/>
+          <a:p>
+            <a:r>
+              <a:rPr lang="en-US" dirty="0"/>
+              <a:t>Control-Flow Integrity</a:t>
+            </a:r>
+          </a:p>
+        </p:txBody>
+      </p:sp>
+      <p:sp>
+        <p:nvSpPr>
+          <p:cNvPr id="3" name="Text Placeholder 2">
+            <a:extLst>
+              <a:ext uri="{FF2B5EF4-FFF2-40B4-BE49-F238E27FC236}">
+                <a16:creationId xmlns:a16="http://schemas.microsoft.com/office/drawing/2014/main" id="{2791C595-BB19-499F-BED4-456F80ABC843}"/>
+              </a:ext>
+            </a:extLst>
+          </p:cNvPr>
+          <p:cNvSpPr>
+            <a:spLocks noGrp="1"/>
+          </p:cNvSpPr>
+          <p:nvPr>
+            <p:ph type="body" idx="1"/>
+          </p:nvPr>
+        </p:nvSpPr>
+        <p:spPr/>
+        <p:txBody>
+          <a:bodyPr/>
+          <a:lstStyle/>
+          <a:p>
+            <a:endParaRPr lang="en-US"/>
+          </a:p>
+        </p:txBody>
+      </p:sp>
+    </p:spTree>
+    <p:extLst>
+      <p:ext uri="{BB962C8B-B14F-4D97-AF65-F5344CB8AC3E}">
+        <p14:creationId xmlns:p14="http://schemas.microsoft.com/office/powerpoint/2010/main" val="3818483602"/>
+      </p:ext>
+    </p:extLst>
+  </p:cSld>
+  <p:clrMapOvr>
+    <a:masterClrMapping/>
+  </p:clrMapOvr>
+</p:sld>
+</file>
+
+<file path=ppt/slides/slide71.xml><?xml version="1.0" encoding="utf-8"?>
+<p:sld xmlns:a="http://schemas.openxmlformats.org/drawingml/2006/main" xmlns:r="http://schemas.openxmlformats.org/officeDocument/2006/relationships" xmlns:p="http://schemas.openxmlformats.org/presentationml/2006/main">
+  <p:cSld>
+    <p:spTree>
+      <p:nvGrpSpPr>
+        <p:cNvPr id="1" name=""/>
+        <p:cNvGrpSpPr/>
+        <p:nvPr/>
+      </p:nvGrpSpPr>
+      <p:grpSpPr>
+        <a:xfrm>
+          <a:off x="0" y="0"/>
+          <a:ext cx="0" cy="0"/>
+          <a:chOff x="0" y="0"/>
+          <a:chExt cx="0" cy="0"/>
+        </a:xfrm>
+      </p:grpSpPr>
+      <p:sp>
+        <p:nvSpPr>
+          <p:cNvPr id="2" name="Title 1">
+            <a:extLst>
+              <a:ext uri="{FF2B5EF4-FFF2-40B4-BE49-F238E27FC236}">
                 <a16:creationId xmlns:a16="http://schemas.microsoft.com/office/drawing/2014/main" id="{9BB5F15B-5D95-4693-97B3-F5B5E3D2B3C4}"/>
               </a:ext>
             </a:extLst>
@@ -21878,7 +22091,7 @@
 </p:sld>
 </file>
 
-<file path=ppt/slides/slide71.xml><?xml version="1.0" encoding="utf-8"?>
+<file path=ppt/slides/slide72.xml><?xml version="1.0" encoding="utf-8"?>
 <p:sld xmlns:a="http://schemas.openxmlformats.org/drawingml/2006/main" xmlns:r="http://schemas.openxmlformats.org/officeDocument/2006/relationships" xmlns:p="http://schemas.openxmlformats.org/presentationml/2006/main">
   <p:cSld>
     <p:spTree>
@@ -21962,7 +22175,7 @@
 </p:sld>
 </file>
 
-<file path=ppt/slides/slide72.xml><?xml version="1.0" encoding="utf-8"?>
+<file path=ppt/slides/slide73.xml><?xml version="1.0" encoding="utf-8"?>
 <p:sld xmlns:a="http://schemas.openxmlformats.org/drawingml/2006/main" xmlns:r="http://schemas.openxmlformats.org/officeDocument/2006/relationships" xmlns:p="http://schemas.openxmlformats.org/presentationml/2006/main">
   <p:cSld>
     <p:spTree>
@@ -22314,7 +22527,7 @@
 </p:sld>
 </file>
 
-<file path=ppt/slides/slide73.xml><?xml version="1.0" encoding="utf-8"?>
+<file path=ppt/slides/slide74.xml><?xml version="1.0" encoding="utf-8"?>
 <p:sld xmlns:a="http://schemas.openxmlformats.org/drawingml/2006/main" xmlns:r="http://schemas.openxmlformats.org/officeDocument/2006/relationships" xmlns:p="http://schemas.openxmlformats.org/presentationml/2006/main">
   <p:cSld>
     <p:spTree>
@@ -22530,7 +22743,7 @@
 </p:sld>
 </file>
 
-<file path=ppt/slides/slide74.xml><?xml version="1.0" encoding="utf-8"?>
+<file path=ppt/slides/slide75.xml><?xml version="1.0" encoding="utf-8"?>
 <p:sld xmlns:a="http://schemas.openxmlformats.org/drawingml/2006/main" xmlns:r="http://schemas.openxmlformats.org/officeDocument/2006/relationships" xmlns:p="http://schemas.openxmlformats.org/presentationml/2006/main">
   <p:cSld>
     <p:spTree>

</xml_diff>

<commit_message>
WIP adding info on CFI.
</commit_message>
<xml_diff>
--- a/CppZeroCost/2025/RU.pptx
+++ b/CppZeroCost/2025/RU.pptx
@@ -333,7 +333,7 @@
           <a:p>
             <a:fld id="{8B51C82C-088A-4FB4-80D3-9F271402ACE7}" type="datetimeFigureOut">
               <a:rPr lang="en-US" smtClean="0"/>
-              <a:t>7/11/2025</a:t>
+              <a:t>7/12/2025</a:t>
             </a:fld>
             <a:endParaRPr lang="en-US"/>
           </a:p>
@@ -531,7 +531,7 @@
           <a:p>
             <a:fld id="{8B51C82C-088A-4FB4-80D3-9F271402ACE7}" type="datetimeFigureOut">
               <a:rPr lang="en-US" smtClean="0"/>
-              <a:t>7/11/2025</a:t>
+              <a:t>7/12/2025</a:t>
             </a:fld>
             <a:endParaRPr lang="en-US"/>
           </a:p>
@@ -739,7 +739,7 @@
           <a:p>
             <a:fld id="{8B51C82C-088A-4FB4-80D3-9F271402ACE7}" type="datetimeFigureOut">
               <a:rPr lang="en-US" smtClean="0"/>
-              <a:t>7/11/2025</a:t>
+              <a:t>7/12/2025</a:t>
             </a:fld>
             <a:endParaRPr lang="en-US"/>
           </a:p>
@@ -937,7 +937,7 @@
           <a:p>
             <a:fld id="{8B51C82C-088A-4FB4-80D3-9F271402ACE7}" type="datetimeFigureOut">
               <a:rPr lang="en-US" smtClean="0"/>
-              <a:t>7/11/2025</a:t>
+              <a:t>7/12/2025</a:t>
             </a:fld>
             <a:endParaRPr lang="en-US"/>
           </a:p>
@@ -1212,7 +1212,7 @@
           <a:p>
             <a:fld id="{8B51C82C-088A-4FB4-80D3-9F271402ACE7}" type="datetimeFigureOut">
               <a:rPr lang="en-US" smtClean="0"/>
-              <a:t>7/11/2025</a:t>
+              <a:t>7/12/2025</a:t>
             </a:fld>
             <a:endParaRPr lang="en-US"/>
           </a:p>
@@ -1477,7 +1477,7 @@
           <a:p>
             <a:fld id="{8B51C82C-088A-4FB4-80D3-9F271402ACE7}" type="datetimeFigureOut">
               <a:rPr lang="en-US" smtClean="0"/>
-              <a:t>7/11/2025</a:t>
+              <a:t>7/12/2025</a:t>
             </a:fld>
             <a:endParaRPr lang="en-US"/>
           </a:p>
@@ -1889,7 +1889,7 @@
           <a:p>
             <a:fld id="{8B51C82C-088A-4FB4-80D3-9F271402ACE7}" type="datetimeFigureOut">
               <a:rPr lang="en-US" smtClean="0"/>
-              <a:t>7/11/2025</a:t>
+              <a:t>7/12/2025</a:t>
             </a:fld>
             <a:endParaRPr lang="en-US"/>
           </a:p>
@@ -2030,7 +2030,7 @@
           <a:p>
             <a:fld id="{8B51C82C-088A-4FB4-80D3-9F271402ACE7}" type="datetimeFigureOut">
               <a:rPr lang="en-US" smtClean="0"/>
-              <a:t>7/11/2025</a:t>
+              <a:t>7/12/2025</a:t>
             </a:fld>
             <a:endParaRPr lang="en-US"/>
           </a:p>
@@ -2143,7 +2143,7 @@
           <a:p>
             <a:fld id="{8B51C82C-088A-4FB4-80D3-9F271402ACE7}" type="datetimeFigureOut">
               <a:rPr lang="en-US" smtClean="0"/>
-              <a:t>7/11/2025</a:t>
+              <a:t>7/12/2025</a:t>
             </a:fld>
             <a:endParaRPr lang="en-US"/>
           </a:p>
@@ -2454,7 +2454,7 @@
           <a:p>
             <a:fld id="{8B51C82C-088A-4FB4-80D3-9F271402ACE7}" type="datetimeFigureOut">
               <a:rPr lang="en-US" smtClean="0"/>
-              <a:t>7/11/2025</a:t>
+              <a:t>7/12/2025</a:t>
             </a:fld>
             <a:endParaRPr lang="en-US"/>
           </a:p>
@@ -2742,7 +2742,7 @@
           <a:p>
             <a:fld id="{8B51C82C-088A-4FB4-80D3-9F271402ACE7}" type="datetimeFigureOut">
               <a:rPr lang="en-US" smtClean="0"/>
-              <a:t>7/11/2025</a:t>
+              <a:t>7/12/2025</a:t>
             </a:fld>
             <a:endParaRPr lang="en-US"/>
           </a:p>
@@ -2983,7 +2983,7 @@
           <a:p>
             <a:fld id="{8B51C82C-088A-4FB4-80D3-9F271402ACE7}" type="datetimeFigureOut">
               <a:rPr lang="en-US" smtClean="0"/>
-              <a:t>7/11/2025</a:t>
+              <a:t>7/12/2025</a:t>
             </a:fld>
             <a:endParaRPr lang="en-US"/>
           </a:p>
@@ -7563,7 +7563,7 @@
             <a:pPr lvl="1"/>
             <a:r>
               <a:rPr lang="ru-RU" dirty="0"/>
-              <a:t>пакеты </a:t>
+              <a:t>Пакеты </a:t>
             </a:r>
             <a:r>
               <a:rPr lang="en-US" dirty="0"/>
@@ -7590,7 +7590,7 @@
             <a:pPr lvl="1"/>
             <a:r>
               <a:rPr lang="ru-RU" dirty="0"/>
-              <a:t>пакеты </a:t>
+              <a:t>Статус на </a:t>
             </a:r>
             <a:r>
               <a:rPr lang="en-US" dirty="0"/>
@@ -7598,7 +7598,7 @@
             </a:r>
             <a:r>
               <a:rPr lang="ru-RU" dirty="0"/>
-              <a:t>видимо собираются пока без этого флага (</a:t>
+              <a:t>неясен (</a:t>
             </a:r>
             <a:r>
               <a:rPr lang="en-US" dirty="0">
@@ -7616,7 +7616,15 @@
             <a:pPr lvl="2"/>
             <a:r>
               <a:rPr lang="ru-RU" dirty="0"/>
-              <a:t>Не защищены даже уязвимые программы: </a:t>
+              <a:t>На </a:t>
+            </a:r>
+            <a:r>
+              <a:rPr lang="en-US" dirty="0"/>
+              <a:t>Debian 12 (stable) </a:t>
+            </a:r>
+            <a:r>
+              <a:rPr lang="ru-RU" dirty="0"/>
+              <a:t>не защищены даже уязвимые программы: </a:t>
             </a:r>
             <a:r>
               <a:rPr lang="en-US" dirty="0"/>

</xml_diff>

<commit_message>
Verify default distro build flags in OS buildscripts.
</commit_message>
<xml_diff>
--- a/CppZeroCost/2025/RU.pptx
+++ b/CppZeroCost/2025/RU.pptx
@@ -289,7 +289,7 @@
           <a:p>
             <a:fld id="{A8F27B54-EFD4-4F1F-9CE4-9A3C368187A4}" type="datetimeFigureOut">
               <a:rPr lang="en-US" smtClean="0"/>
-              <a:t>7/19/2025</a:t>
+              <a:t>7/20/2025</a:t>
             </a:fld>
             <a:endParaRPr lang="en-US"/>
           </a:p>
@@ -703,7 +703,7 @@
           <a:p>
             <a:fld id="{4E570717-CC08-42AC-84F3-7EB74EE2C2EE}" type="datetime1">
               <a:rPr lang="en-US" smtClean="0"/>
-              <a:t>7/19/2025</a:t>
+              <a:t>7/20/2025</a:t>
             </a:fld>
             <a:endParaRPr lang="en-US"/>
           </a:p>
@@ -901,7 +901,7 @@
           <a:p>
             <a:fld id="{E850434B-ABC0-4013-A159-517880C2CE4B}" type="datetime1">
               <a:rPr lang="en-US" smtClean="0"/>
-              <a:t>7/19/2025</a:t>
+              <a:t>7/20/2025</a:t>
             </a:fld>
             <a:endParaRPr lang="en-US"/>
           </a:p>
@@ -1109,7 +1109,7 @@
           <a:p>
             <a:fld id="{307E2251-42B8-4CD0-9F76-CE8A218C5A9B}" type="datetime1">
               <a:rPr lang="en-US" smtClean="0"/>
-              <a:t>7/19/2025</a:t>
+              <a:t>7/20/2025</a:t>
             </a:fld>
             <a:endParaRPr lang="en-US"/>
           </a:p>
@@ -1307,7 +1307,7 @@
           <a:p>
             <a:fld id="{650366BD-2959-43A5-9C43-B178997CA9C1}" type="datetime1">
               <a:rPr lang="en-US" smtClean="0"/>
-              <a:t>7/19/2025</a:t>
+              <a:t>7/20/2025</a:t>
             </a:fld>
             <a:endParaRPr lang="en-US"/>
           </a:p>
@@ -1582,7 +1582,7 @@
           <a:p>
             <a:fld id="{44A443A2-278A-4AA2-A6FA-B813D9AB289B}" type="datetime1">
               <a:rPr lang="en-US" smtClean="0"/>
-              <a:t>7/19/2025</a:t>
+              <a:t>7/20/2025</a:t>
             </a:fld>
             <a:endParaRPr lang="en-US"/>
           </a:p>
@@ -1847,7 +1847,7 @@
           <a:p>
             <a:fld id="{8DB96CD0-8DC9-4D9E-8F97-A64EB549E498}" type="datetime1">
               <a:rPr lang="en-US" smtClean="0"/>
-              <a:t>7/19/2025</a:t>
+              <a:t>7/20/2025</a:t>
             </a:fld>
             <a:endParaRPr lang="en-US"/>
           </a:p>
@@ -2259,7 +2259,7 @@
           <a:p>
             <a:fld id="{8728ABDD-F7C0-49E5-BDEF-78EEAB9D4FF0}" type="datetime1">
               <a:rPr lang="en-US" smtClean="0"/>
-              <a:t>7/19/2025</a:t>
+              <a:t>7/20/2025</a:t>
             </a:fld>
             <a:endParaRPr lang="en-US"/>
           </a:p>
@@ -2400,7 +2400,7 @@
           <a:p>
             <a:fld id="{1815E602-B233-4072-AF5E-EEC16D6A3250}" type="datetime1">
               <a:rPr lang="en-US" smtClean="0"/>
-              <a:t>7/19/2025</a:t>
+              <a:t>7/20/2025</a:t>
             </a:fld>
             <a:endParaRPr lang="en-US"/>
           </a:p>
@@ -2513,7 +2513,7 @@
           <a:p>
             <a:fld id="{B46368E2-0F8E-43F1-B205-4CE4ED81C818}" type="datetime1">
               <a:rPr lang="en-US" smtClean="0"/>
-              <a:t>7/19/2025</a:t>
+              <a:t>7/20/2025</a:t>
             </a:fld>
             <a:endParaRPr lang="en-US"/>
           </a:p>
@@ -2824,7 +2824,7 @@
           <a:p>
             <a:fld id="{A90826D4-3247-4C35-B745-95D9A6527E86}" type="datetime1">
               <a:rPr lang="en-US" smtClean="0"/>
-              <a:t>7/19/2025</a:t>
+              <a:t>7/20/2025</a:t>
             </a:fld>
             <a:endParaRPr lang="en-US"/>
           </a:p>
@@ -3112,7 +3112,7 @@
           <a:p>
             <a:fld id="{F697CA6C-CB8E-4E4E-A40B-CF748107F47F}" type="datetime1">
               <a:rPr lang="en-US" smtClean="0"/>
-              <a:t>7/19/2025</a:t>
+              <a:t>7/20/2025</a:t>
             </a:fld>
             <a:endParaRPr lang="en-US"/>
           </a:p>
@@ -3353,7 +3353,7 @@
           <a:p>
             <a:fld id="{486D2D92-9836-4BF5-99A8-6BBA488E0F07}" type="datetime1">
               <a:rPr lang="en-US" smtClean="0"/>
-              <a:t>7/19/2025</a:t>
+              <a:t>7/20/2025</a:t>
             </a:fld>
             <a:endParaRPr lang="en-US"/>
           </a:p>
@@ -4265,21 +4265,6 @@
           <a:p>
             <a:r>
               <a:rPr lang="ru-RU" dirty="0"/>
-              <a:t>Накладые расходы</a:t>
-            </a:r>
-            <a:r>
-              <a:rPr lang="en-US" dirty="0"/>
-              <a:t> </a:t>
-            </a:r>
-            <a:r>
-              <a:rPr lang="ru-RU" dirty="0"/>
-              <a:t>отсутствуют</a:t>
-            </a:r>
-            <a:endParaRPr lang="en-US" dirty="0"/>
-          </a:p>
-          <a:p>
-            <a:r>
-              <a:rPr lang="ru-RU" dirty="0"/>
               <a:t>Требуется чтобы весь код программы был собран в режиме неисполняемого стека</a:t>
             </a:r>
           </a:p>
@@ -4378,6 +4363,21 @@
               <a:rPr lang="en-US" dirty="0"/>
               <a:t>GNU nested functions</a:t>
             </a:r>
+          </a:p>
+          <a:p>
+            <a:r>
+              <a:rPr lang="ru-RU" dirty="0"/>
+              <a:t>Накладые расходы</a:t>
+            </a:r>
+            <a:r>
+              <a:rPr lang="en-US" dirty="0"/>
+              <a:t> </a:t>
+            </a:r>
+            <a:r>
+              <a:rPr lang="ru-RU" dirty="0"/>
+              <a:t>отсутствуют</a:t>
+            </a:r>
+            <a:endParaRPr lang="en-US" dirty="0"/>
           </a:p>
           <a:p>
             <a:endParaRPr lang="en-US" dirty="0"/>
@@ -5508,6 +5508,46 @@
               <a:rPr lang="ru-RU" dirty="0"/>
               <a:t>скомпрометирована</a:t>
             </a:r>
+            <a:endParaRPr lang="en-US" dirty="0"/>
+          </a:p>
+          <a:p>
+            <a:pPr lvl="1"/>
+            <a:r>
+              <a:rPr lang="ru-RU" dirty="0"/>
+              <a:t>В частности использование </a:t>
+            </a:r>
+            <a:r>
+              <a:rPr lang="en-US" dirty="0"/>
+              <a:t>fork </a:t>
+            </a:r>
+            <a:r>
+              <a:rPr lang="ru-RU" dirty="0"/>
+              <a:t>компрометирует </a:t>
+            </a:r>
+            <a:r>
+              <a:rPr lang="en-US" dirty="0"/>
+              <a:t>ASLR </a:t>
+            </a:r>
+            <a:r>
+              <a:rPr lang="ru-RU" dirty="0"/>
+              <a:t>(</a:t>
+            </a:r>
+            <a:r>
+              <a:rPr lang="en-US" dirty="0"/>
+              <a:t>Zygote-</a:t>
+            </a:r>
+            <a:r>
+              <a:rPr lang="ru-RU" dirty="0"/>
+              <a:t>процесс в </a:t>
+            </a:r>
+            <a:r>
+              <a:rPr lang="en-US" dirty="0"/>
+              <a:t>Android)</a:t>
+            </a:r>
+          </a:p>
+          <a:p>
+            <a:pPr lvl="1"/>
+            <a:endParaRPr lang="ru-RU" dirty="0"/>
           </a:p>
         </p:txBody>
       </p:sp>
@@ -5668,11 +5708,14 @@
             </a:r>
             <a:r>
               <a:rPr lang="en-US" dirty="0"/>
-              <a:t>) =&gt; </a:t>
-            </a:r>
-            <a:r>
-              <a:rPr lang="ru-RU" dirty="0"/>
-              <a:t>относительный библиотек и </a:t>
+              <a:t>) </a:t>
+            </a:r>
+          </a:p>
+          <a:p>
+            <a:pPr lvl="2"/>
+            <a:r>
+              <a:rPr lang="ru-RU" dirty="0"/>
+              <a:t>Относительный библиотек и </a:t>
             </a:r>
             <a:r>
               <a:rPr lang="en-US" dirty="0" err="1"/>
@@ -5711,11 +5754,19 @@
             <a:pPr lvl="1"/>
             <a:r>
               <a:rPr lang="ru-RU" dirty="0"/>
-              <a:t>Небольшое число рандомизируемых битов (16 или даже 8 в 32-битных Windows и ранних </a:t>
-            </a:r>
-            <a:r>
-              <a:rPr lang="en-US" dirty="0"/>
-              <a:t>Android)</a:t>
+              <a:t>Небольшое число рандомизируемых битов</a:t>
+            </a:r>
+            <a:endParaRPr lang="en-US" dirty="0"/>
+          </a:p>
+          <a:p>
+            <a:pPr lvl="2"/>
+            <a:r>
+              <a:rPr lang="ru-RU" dirty="0"/>
+              <a:t>16 или даже 8 в 32-битных Windows и ранних </a:t>
+            </a:r>
+            <a:r>
+              <a:rPr lang="en-US" dirty="0"/>
+              <a:t>Android</a:t>
             </a:r>
           </a:p>
           <a:p>
@@ -5730,71 +5781,44 @@
             <a:pPr lvl="1"/>
             <a:r>
               <a:rPr lang="ru-RU" dirty="0"/>
-              <a:t>Использование </a:t>
-            </a:r>
-            <a:r>
-              <a:rPr lang="en-US" dirty="0"/>
-              <a:t>fork </a:t>
-            </a:r>
-            <a:r>
-              <a:rPr lang="ru-RU" dirty="0"/>
-              <a:t>компрометирует </a:t>
-            </a:r>
-            <a:r>
-              <a:rPr lang="en-US" dirty="0"/>
-              <a:t>ASLR </a:t>
-            </a:r>
-            <a:r>
-              <a:rPr lang="ru-RU" dirty="0"/>
-              <a:t>(</a:t>
-            </a:r>
-            <a:r>
-              <a:rPr lang="en-US" dirty="0"/>
-              <a:t>Zygote-</a:t>
-            </a:r>
-            <a:r>
-              <a:rPr lang="ru-RU" dirty="0"/>
-              <a:t>процесс в </a:t>
-            </a:r>
-            <a:r>
-              <a:rPr lang="en-US" dirty="0"/>
-              <a:t>Android)</a:t>
-            </a:r>
+              <a:t>Windows</a:t>
+            </a:r>
+          </a:p>
+          <a:p>
+            <a:pPr lvl="2"/>
+            <a:r>
+              <a:rPr lang="ru-RU" dirty="0"/>
+              <a:t>Рандомизация каждого приложения делается однократно при его первой загрузке (для ускорения)</a:t>
+            </a:r>
+          </a:p>
+          <a:p>
+            <a:pPr lvl="2"/>
+            <a:r>
+              <a:rPr lang="ru-RU" dirty="0"/>
+              <a:t>Одна и та же библиотека может грузиться по одному адресу в разных приложениях (для ускорения)</a:t>
+            </a:r>
+            <a:endParaRPr lang="en-US" dirty="0"/>
           </a:p>
           <a:p>
             <a:pPr lvl="1"/>
             <a:r>
               <a:rPr lang="ru-RU" dirty="0"/>
-              <a:t>В Windows</a:t>
-            </a:r>
+              <a:t>Linux</a:t>
+            </a:r>
+            <a:endParaRPr lang="en-US" dirty="0"/>
           </a:p>
           <a:p>
             <a:pPr lvl="2"/>
             <a:r>
               <a:rPr lang="ru-RU" dirty="0"/>
-              <a:t>Рандомизация каждого приложения делается однократно при его первой загрузке (для ускорения)</a:t>
-            </a:r>
+              <a:t>Рандомизация делается однократно при старте сервиса</a:t>
+            </a:r>
+            <a:endParaRPr lang="en-US" dirty="0"/>
           </a:p>
           <a:p>
             <a:pPr lvl="2"/>
             <a:r>
               <a:rPr lang="ru-RU" dirty="0"/>
-              <a:t>Одна и та же библиотека может грузиться по одному адресу в разных приложениях (для ускорения)</a:t>
-            </a:r>
-            <a:endParaRPr lang="en-US" dirty="0"/>
-          </a:p>
-          <a:p>
-            <a:pPr lvl="1"/>
-            <a:r>
-              <a:rPr lang="ru-RU" dirty="0"/>
-              <a:t>В Linux рандомизация делается однократно при старте сервиса</a:t>
-            </a:r>
-            <a:endParaRPr lang="en-US" dirty="0"/>
-          </a:p>
-          <a:p>
-            <a:pPr lvl="2"/>
-            <a:r>
-              <a:rPr lang="ru-RU" dirty="0"/>
               <a:t>Уязвима к brute force (особенно на 32-битных платформах)</a:t>
             </a:r>
           </a:p>
@@ -5803,6 +5827,11 @@
               <a:rPr lang="ru-RU" dirty="0"/>
               <a:t>Рекомендуется делать регулярный рестарт сервисов</a:t>
             </a:r>
+            <a:r>
+              <a:rPr lang="en-US" dirty="0"/>
+              <a:t> !</a:t>
+            </a:r>
+            <a:endParaRPr lang="ru-RU" dirty="0"/>
           </a:p>
         </p:txBody>
       </p:sp>
@@ -8358,7 +8387,15 @@
             <a:pPr lvl="1"/>
             <a:r>
               <a:rPr lang="en-US" dirty="0"/>
-              <a:t>Intel CET Shadow Stack: </a:t>
+              <a:t>Intel CET Shadow Stack:</a:t>
+            </a:r>
+            <a:r>
+              <a:rPr lang="ru-RU" dirty="0"/>
+              <a:t> не реализован (нельзя включить ни по</a:t>
+            </a:r>
+            <a:r>
+              <a:rPr lang="en-US" dirty="0"/>
+              <a:t> </a:t>
             </a:r>
             <a:r>
               <a:rPr lang="en-US" dirty="0">
@@ -8383,18 +8420,18 @@
             </a:r>
             <a:r>
               <a:rPr lang="en-US" dirty="0"/>
-              <a:t> </a:t>
-            </a:r>
-            <a:r>
-              <a:rPr lang="ru-RU" dirty="0"/>
-              <a:t>или </a:t>
-            </a:r>
-            <a:r>
-              <a:rPr lang="en-US" dirty="0">
-                <a:latin typeface="Courier New" panose="02070309020205020404" pitchFamily="49" charset="0"/>
-                <a:cs typeface="Courier New" panose="02070309020205020404" pitchFamily="49" charset="0"/>
-              </a:rPr>
-              <a:t>-</a:t>
+              <a:t>, </a:t>
+            </a:r>
+            <a:r>
+              <a:rPr lang="ru-RU" dirty="0"/>
+              <a:t>ни по </a:t>
+            </a:r>
+            <a:r>
+              <a:rPr lang="en-US" dirty="0">
+                <a:latin typeface="Courier New" panose="02070309020205020404" pitchFamily="49" charset="0"/>
+                <a:cs typeface="Courier New" panose="02070309020205020404" pitchFamily="49" charset="0"/>
+              </a:rPr>
+              <a:t>–</a:t>
             </a:r>
             <a:r>
               <a:rPr lang="en-US" dirty="0" err="1">
@@ -8405,15 +8442,7 @@
             </a:r>
             <a:r>
               <a:rPr lang="en-US" dirty="0"/>
-              <a:t> (</a:t>
-            </a:r>
-            <a:r>
-              <a:rPr lang="ru-RU" dirty="0"/>
-              <a:t>требует аппаратной поддержки </a:t>
-            </a:r>
-            <a:r>
-              <a:rPr lang="en-US" dirty="0"/>
-              <a:t>Intel CET)</a:t>
+              <a:t>)</a:t>
             </a:r>
           </a:p>
           <a:p>
@@ -27973,14 +28002,14 @@
           <p:nvPr>
             <p:extLst>
               <p:ext uri="{D42A27DB-BD31-4B8C-83A1-F6EECF244321}">
-                <p14:modId xmlns:p14="http://schemas.microsoft.com/office/powerpoint/2010/main" val="1770854364"/>
+                <p14:modId xmlns:p14="http://schemas.microsoft.com/office/powerpoint/2010/main" val="3911734843"/>
               </p:ext>
             </p:extLst>
           </p:nvPr>
         </p:nvGraphicFramePr>
         <p:xfrm>
           <a:off x="838200" y="981311"/>
-          <a:ext cx="8453718" cy="5558160"/>
+          <a:ext cx="8453718" cy="5783040"/>
         </p:xfrm>
         <a:graphic>
           <a:graphicData uri="http://schemas.openxmlformats.org/drawingml/2006/table">
@@ -29186,11 +29215,15 @@
                       </a:pPr>
                       <a:r>
                         <a:rPr lang="en-US" sz="1400" dirty="0"/>
-                        <a:t>?</a:t>
+                        <a:t>N</a:t>
                       </a:r>
                     </a:p>
                   </a:txBody>
-                  <a:tcPr anchor="ctr"/>
+                  <a:tcPr anchor="ctr">
+                    <a:solidFill>
+                      <a:schemeClr val="accent2"/>
+                    </a:solidFill>
+                  </a:tcPr>
                 </a:tc>
                 <a:tc>
                   <a:txBody>
@@ -29236,11 +29269,15 @@
                       <a:pPr algn="ctr"/>
                       <a:r>
                         <a:rPr lang="en-US" sz="1400" dirty="0"/>
-                        <a:t>?</a:t>
+                        <a:t>N</a:t>
                       </a:r>
                     </a:p>
                   </a:txBody>
-                  <a:tcPr anchor="ctr"/>
+                  <a:tcPr anchor="ctr">
+                    <a:solidFill>
+                      <a:schemeClr val="accent2"/>
+                    </a:solidFill>
+                  </a:tcPr>
                 </a:tc>
                 <a:tc>
                   <a:txBody>
@@ -29286,11 +29323,15 @@
                       <a:pPr algn="ctr"/>
                       <a:r>
                         <a:rPr lang="en-US" sz="1400" dirty="0"/>
-                        <a:t>?</a:t>
+                        <a:t>N</a:t>
                       </a:r>
                     </a:p>
                   </a:txBody>
-                  <a:tcPr anchor="ctr"/>
+                  <a:tcPr anchor="ctr">
+                    <a:solidFill>
+                      <a:schemeClr val="accent2"/>
+                    </a:solidFill>
+                  </a:tcPr>
                 </a:tc>
                 <a:extLst>
                   <a:ext uri="{0D108BD9-81ED-4DB2-BD59-A6C34878D82A}">
@@ -29411,13 +29452,13 @@
                       <a:pPr algn="ctr"/>
                       <a:r>
                         <a:rPr lang="en-US" sz="1400" dirty="0"/>
-                        <a:t>Y</a:t>
+                        <a:t>N*</a:t>
                       </a:r>
                     </a:p>
                   </a:txBody>
                   <a:tcPr anchor="ctr">
                     <a:solidFill>
-                      <a:schemeClr val="accent6"/>
+                      <a:srgbClr val="FFFF00"/>
                     </a:solidFill>
                   </a:tcPr>
                 </a:tc>
@@ -29465,11 +29506,15 @@
                       <a:pPr algn="ctr"/>
                       <a:r>
                         <a:rPr lang="en-US" sz="1400" dirty="0"/>
-                        <a:t>?</a:t>
+                        <a:t>Y</a:t>
                       </a:r>
                     </a:p>
                   </a:txBody>
-                  <a:tcPr anchor="ctr"/>
+                  <a:tcPr anchor="ctr">
+                    <a:solidFill>
+                      <a:schemeClr val="accent6"/>
+                    </a:solidFill>
+                  </a:tcPr>
                 </a:tc>
                 <a:extLst>
                   <a:ext uri="{0D108BD9-81ED-4DB2-BD59-A6C34878D82A}">
@@ -29954,14 +29999,22 @@
                     <a:p>
                       <a:pPr algn="ctr"/>
                       <a:r>
-                        <a:rPr lang="en-US" sz="1400" dirty="0"/>
-                        <a:t>N</a:t>
+                        <a:rPr lang="en-US" sz="1100" dirty="0"/>
+                        <a:t>Y (</a:t>
+                      </a:r>
+                      <a:r>
+                        <a:rPr lang="en-US" sz="1100" dirty="0" err="1"/>
+                        <a:t>libstdc</a:t>
+                      </a:r>
+                      <a:r>
+                        <a:rPr lang="en-US" sz="1100" dirty="0"/>
+                        <a:t>++)</a:t>
                       </a:r>
                     </a:p>
                   </a:txBody>
                   <a:tcPr anchor="ctr">
                     <a:solidFill>
-                      <a:schemeClr val="accent2"/>
+                      <a:schemeClr val="accent6"/>
                     </a:solidFill>
                   </a:tcPr>
                 </a:tc>
@@ -30993,7 +31046,14 @@
                       <a:pPr algn="ctr"/>
                       <a:r>
                         <a:rPr lang="en-US" sz="1400" dirty="0"/>
-                        <a:t>CFI (Intel CET)</a:t>
+                        <a:t>Hardware CFI</a:t>
+                      </a:r>
+                    </a:p>
+                    <a:p>
+                      <a:pPr algn="ctr"/>
+                      <a:r>
+                        <a:rPr lang="en-US" sz="1400" dirty="0"/>
+                        <a:t>(Intel CET, AArch64 BP)</a:t>
                       </a:r>
                     </a:p>
                   </a:txBody>
@@ -31145,13 +31205,13 @@
                       <a:pPr algn="ctr"/>
                       <a:r>
                         <a:rPr lang="en-US" sz="1400" dirty="0"/>
-                        <a:t>Y</a:t>
+                        <a:t>N*</a:t>
                       </a:r>
                     </a:p>
                   </a:txBody>
                   <a:tcPr anchor="ctr">
                     <a:solidFill>
-                      <a:schemeClr val="accent6"/>
+                      <a:srgbClr val="FFFF00"/>
                     </a:solidFill>
                   </a:tcPr>
                 </a:tc>
@@ -31262,8 +31322,8 @@
         </p:nvSpPr>
         <p:spPr>
           <a:xfrm>
-            <a:off x="9583270" y="1981200"/>
-            <a:ext cx="2357718" cy="2585323"/>
+            <a:off x="9659470" y="421341"/>
+            <a:ext cx="2357718" cy="6186309"/>
           </a:xfrm>
           <a:prstGeom prst="rect">
             <a:avLst/>
@@ -31310,11 +31370,53 @@
             </a:r>
             <a:r>
               <a:rPr lang="ru-RU" dirty="0"/>
-              <a:t>включено меньше защит чем в </a:t>
+              <a:t>включено намного меньше защит чем в </a:t>
             </a:r>
             <a:r>
               <a:rPr lang="en-US" dirty="0"/>
               <a:t>GCC</a:t>
+            </a:r>
+          </a:p>
+          <a:p>
+            <a:pPr marL="285750" indent="-285750">
+              <a:buFont typeface="Arial" panose="020B0604020202020204" pitchFamily="34" charset="0"/>
+              <a:buChar char="•"/>
+            </a:pPr>
+            <a:r>
+              <a:rPr lang="ru-RU" dirty="0"/>
+              <a:t>Многие новые защиты по умолчанию не включены</a:t>
+            </a:r>
+          </a:p>
+          <a:p>
+            <a:pPr marL="285750" indent="-285750">
+              <a:buFont typeface="Arial" panose="020B0604020202020204" pitchFamily="34" charset="0"/>
+              <a:buChar char="•"/>
+            </a:pPr>
+            <a:r>
+              <a:rPr lang="ru-RU" dirty="0"/>
+              <a:t>Пакеты системы защищены лучше чем пользовательские программы</a:t>
+            </a:r>
+            <a:endParaRPr lang="en-US" dirty="0"/>
+          </a:p>
+          <a:p>
+            <a:pPr marL="285750" indent="-285750">
+              <a:buFont typeface="Arial" panose="020B0604020202020204" pitchFamily="34" charset="0"/>
+              <a:buChar char="•"/>
+            </a:pPr>
+            <a:endParaRPr lang="en-US" dirty="0"/>
+          </a:p>
+          <a:p>
+            <a:r>
+              <a:rPr lang="en-US" dirty="0"/>
+              <a:t>* - </a:t>
+            </a:r>
+            <a:r>
+              <a:rPr lang="ru-RU" dirty="0"/>
+              <a:t>будет включён в следующей версии </a:t>
+            </a:r>
+            <a:r>
+              <a:rPr lang="en-US" dirty="0"/>
+              <a:t>Debian</a:t>
             </a:r>
           </a:p>
         </p:txBody>
@@ -31398,7 +31500,7 @@
           <p:nvPr>
             <p:extLst>
               <p:ext uri="{D42A27DB-BD31-4B8C-83A1-F6EECF244321}">
-                <p14:modId xmlns:p14="http://schemas.microsoft.com/office/powerpoint/2010/main" val="1931322201"/>
+                <p14:modId xmlns:p14="http://schemas.microsoft.com/office/powerpoint/2010/main" val="3146313282"/>
               </p:ext>
             </p:extLst>
           </p:nvPr>
@@ -31460,7 +31562,7 @@
                       <a:pPr algn="ctr"/>
                       <a:r>
                         <a:rPr lang="en-US" sz="1400" dirty="0"/>
-                        <a:t>Chrome</a:t>
+                        <a:t>Chrome (d0273f3d)</a:t>
                       </a:r>
                     </a:p>
                   </a:txBody>
@@ -31474,7 +31576,7 @@
                       <a:pPr algn="ctr"/>
                       <a:r>
                         <a:rPr lang="en-US" sz="1400" dirty="0"/>
-                        <a:t>Firefox</a:t>
+                        <a:t>Firefox (b0ca903b)</a:t>
                       </a:r>
                     </a:p>
                   </a:txBody>
@@ -31678,7 +31780,7 @@
                   </a:txBody>
                   <a:tcPr anchor="ctr">
                     <a:solidFill>
-                      <a:schemeClr val="accent6"/>
+                      <a:srgbClr val="FFFF00"/>
                     </a:solidFill>
                   </a:tcPr>
                 </a:tc>
@@ -32380,7 +32482,15 @@
                       </a:pPr>
                       <a:r>
                         <a:rPr lang="en-US" sz="1400" dirty="0"/>
-                        <a:t>Y</a:t>
+                        <a:t>Y (LLVM </a:t>
+                      </a:r>
+                      <a:r>
+                        <a:rPr lang="ru-RU" sz="1400" dirty="0"/>
+                        <a:t>на </a:t>
+                      </a:r>
+                      <a:r>
+                        <a:rPr lang="en-US" sz="1400" dirty="0"/>
+                        <a:t>X86, AArch64 CFI)</a:t>
                       </a:r>
                     </a:p>
                   </a:txBody>
@@ -32665,8 +32775,12 @@
           <a:lstStyle/>
           <a:p>
             <a:r>
-              <a:rPr lang="ru-RU" dirty="0"/>
-              <a:t>Сравнение с </a:t>
+              <a:rPr lang="en-US" dirty="0"/>
+              <a:t>Hardening </a:t>
+            </a:r>
+            <a:r>
+              <a:rPr lang="ru-RU" dirty="0"/>
+              <a:t>в </a:t>
             </a:r>
             <a:r>
               <a:rPr lang="en-US" dirty="0"/>

</xml_diff>

<commit_message>
Add link for python problem.
</commit_message>
<xml_diff>
--- a/CppZeroCost/2025/RU.pptx
+++ b/CppZeroCost/2025/RU.pptx
@@ -4282,15 +4282,15 @@
             <a:pPr lvl="2"/>
             <a:r>
               <a:rPr lang="ru-RU" dirty="0"/>
-              <a:t>Не загруженные динамически с помощью </a:t>
-            </a:r>
-            <a:r>
-              <a:rPr lang="en-US" dirty="0"/>
+              <a:t>Но не загруженные динамически с помощью </a:t>
+            </a:r>
+            <a:r>
+              <a:rPr lang="en-US" dirty="0" err="1"/>
               <a:t>dlopen</a:t>
             </a:r>
             <a:r>
               <a:rPr lang="ru-RU" dirty="0"/>
-              <a:t> (см. </a:t>
+              <a:t> (</a:t>
             </a:r>
             <a:r>
               <a:rPr lang="en-US" dirty="0">
@@ -7881,7 +7881,7 @@
             </a:r>
             <a:r>
               <a:rPr lang="ru-RU" dirty="0"/>
-              <a:t>в среднем (</a:t>
+              <a:t>по замерам авторов (</a:t>
             </a:r>
             <a:r>
               <a:rPr lang="en-US" dirty="0">
@@ -8315,10 +8315,10 @@
               </a:rPr>
               <a:t>The Stack Clash</a:t>
             </a:r>
-            <a:endParaRPr lang="en-US" dirty="0"/>
-          </a:p>
-          <a:p>
-            <a:pPr lvl="2"/>
+            <a:r>
+              <a:rPr lang="en-US" dirty="0"/>
+              <a:t> (</a:t>
+            </a:r>
             <a:r>
               <a:rPr lang="ru-RU" dirty="0"/>
               <a:t>10 proof</a:t>
@@ -8339,7 +8339,10 @@
               <a:rPr lang="ru-RU" dirty="0"/>
               <a:t>concept атак</a:t>
             </a:r>
-            <a:endParaRPr lang="en-US" dirty="0"/>
+            <a:r>
+              <a:rPr lang="en-US" dirty="0"/>
+              <a:t>)</a:t>
+            </a:r>
           </a:p>
           <a:p>
             <a:r>
@@ -8355,7 +8358,7 @@
             <a:pPr lvl="1"/>
             <a:r>
               <a:rPr lang="ru-RU" dirty="0"/>
-              <a:t>Перед выполнением функции пройти по фрейму</a:t>
+              <a:t>Перед выполнением функции пройти по новому фрейму</a:t>
             </a:r>
             <a:r>
               <a:rPr lang="en-US" dirty="0"/>
@@ -28965,19 +28968,33 @@
             </a:r>
             <a:r>
               <a:rPr lang="ru-RU" sz="1600" dirty="0"/>
-              <a:t>дефолтные защиты могут быть отключены в конкретных пакетах (</a:t>
+              <a:t>дефолтные защиты могут быть отключены в конкретных пакетах (например</a:t>
             </a:r>
             <a:r>
               <a:rPr lang="en-US" sz="1600" dirty="0"/>
-              <a:t>e.g. python3 </a:t>
-            </a:r>
-            <a:r>
-              <a:rPr lang="ru-RU" sz="1600" dirty="0"/>
+              <a:t> </a:t>
+            </a:r>
+            <a:r>
+              <a:rPr lang="en-US" sz="1600" dirty="0">
+                <a:hlinkClick r:id="rId2"/>
+              </a:rPr>
+              <a:t>python3 </a:t>
+            </a:r>
+            <a:r>
+              <a:rPr lang="ru-RU" sz="1600" dirty="0">
+                <a:hlinkClick r:id="rId2"/>
+              </a:rPr>
               <a:t>в</a:t>
             </a:r>
             <a:r>
+              <a:rPr lang="en-US" sz="1600" dirty="0">
+                <a:hlinkClick r:id="rId2"/>
+              </a:rPr>
+              <a:t> Debian 12</a:t>
+            </a:r>
+            <a:r>
               <a:rPr lang="en-US" sz="1600" dirty="0"/>
-              <a:t> Debian 12)</a:t>
+              <a:t>)</a:t>
             </a:r>
             <a:endParaRPr lang="en-US" sz="1400" dirty="0"/>
           </a:p>
@@ -31678,15 +31695,32 @@
             </a:r>
             <a:r>
               <a:rPr lang="ru-RU" dirty="0"/>
-              <a:t>опция для наиболее важных </a:t>
-            </a:r>
-            <a:r>
-              <a:rPr lang="en-US" dirty="0"/>
-              <a:t>hardened-</a:t>
-            </a:r>
-            <a:r>
-              <a:rPr lang="ru-RU" dirty="0"/>
-              <a:t>оптимизаций</a:t>
+              <a:t>опция для наиболее важных защит</a:t>
+            </a:r>
+          </a:p>
+          <a:p>
+            <a:pPr lvl="1"/>
+            <a:r>
+              <a:rPr lang="ru-RU" dirty="0"/>
+              <a:t>Хороший дефолтный флаг, но пока реализован только в </a:t>
+            </a:r>
+            <a:r>
+              <a:rPr lang="en-US" dirty="0"/>
+              <a:t>GCC</a:t>
+            </a:r>
+            <a:r>
+              <a:rPr lang="ru-RU" dirty="0"/>
+              <a:t> (</a:t>
+            </a:r>
+            <a:r>
+              <a:rPr lang="en-US" dirty="0">
+                <a:hlinkClick r:id="rId2"/>
+              </a:rPr>
+              <a:t>LLVM #122687</a:t>
+            </a:r>
+            <a:r>
+              <a:rPr lang="en-US" dirty="0"/>
+              <a:t>)</a:t>
             </a:r>
           </a:p>
           <a:p>
@@ -31699,15 +31733,36 @@
               <a:rPr lang="en-US" dirty="0" err="1"/>
               <a:t>OpenSSF</a:t>
             </a:r>
-            <a:r>
-              <a:rPr lang="en-US" dirty="0"/>
-              <a:t> (</a:t>
-            </a:r>
-            <a:r>
-              <a:rPr lang="en-US" dirty="0">
-                <a:hlinkClick r:id="rId2"/>
-              </a:rPr>
-              <a:t>Compiler Options Hardening Guide for C and C++</a:t>
+            <a:endParaRPr lang="en-US" dirty="0"/>
+          </a:p>
+          <a:p>
+            <a:pPr lvl="2"/>
+            <a:r>
+              <a:rPr lang="ru-RU" dirty="0"/>
+              <a:t>Конкретный набор зависит от версии компилятора </a:t>
+            </a:r>
+            <a:r>
+              <a:rPr lang="en-US" dirty="0"/>
+              <a:t>(</a:t>
+            </a:r>
+            <a:r>
+              <a:rPr lang="ru-RU" dirty="0"/>
+              <a:t>для </a:t>
+            </a:r>
+            <a:r>
+              <a:rPr lang="en-US" dirty="0"/>
+              <a:t>GCC </a:t>
+            </a:r>
+            <a:r>
+              <a:rPr lang="ru-RU" dirty="0"/>
+              <a:t>есть </a:t>
+            </a:r>
+            <a:r>
+              <a:rPr lang="en-US" dirty="0">
+                <a:latin typeface="Courier New" panose="02070309020205020404" pitchFamily="49" charset="0"/>
+                <a:cs typeface="Courier New" panose="02070309020205020404" pitchFamily="49" charset="0"/>
+              </a:rPr>
+              <a:t>--help=hardened</a:t>
             </a:r>
             <a:r>
               <a:rPr lang="en-US" dirty="0"/>
@@ -31715,193 +31770,198 @@
             </a:r>
           </a:p>
           <a:p>
+            <a:pPr lvl="2"/>
+            <a:r>
+              <a:rPr lang="ru-RU" dirty="0"/>
+              <a:t>Сейчас</a:t>
+            </a:r>
+            <a:r>
+              <a:rPr lang="en-US" dirty="0"/>
+              <a:t>: </a:t>
+            </a:r>
+            <a:r>
+              <a:rPr lang="ru-RU" dirty="0">
+                <a:latin typeface="Courier New" panose="02070309020205020404" pitchFamily="49" charset="0"/>
+                <a:cs typeface="Courier New" panose="02070309020205020404" pitchFamily="49" charset="0"/>
+              </a:rPr>
+              <a:t>-</a:t>
+            </a:r>
+            <a:r>
+              <a:rPr lang="en-US" dirty="0">
+                <a:latin typeface="Courier New" panose="02070309020205020404" pitchFamily="49" charset="0"/>
+                <a:cs typeface="Courier New" panose="02070309020205020404" pitchFamily="49" charset="0"/>
+              </a:rPr>
+              <a:t>D_FORTIFY_SOURCE=3 -D_GLIBCXX_ASSERTIONS -</a:t>
+            </a:r>
+            <a:r>
+              <a:rPr lang="en-US" dirty="0" err="1">
+                <a:latin typeface="Courier New" panose="02070309020205020404" pitchFamily="49" charset="0"/>
+                <a:cs typeface="Courier New" panose="02070309020205020404" pitchFamily="49" charset="0"/>
+              </a:rPr>
+              <a:t>ftrivial</a:t>
+            </a:r>
+            <a:r>
+              <a:rPr lang="en-US" dirty="0">
+                <a:latin typeface="Courier New" panose="02070309020205020404" pitchFamily="49" charset="0"/>
+                <a:cs typeface="Courier New" panose="02070309020205020404" pitchFamily="49" charset="0"/>
+              </a:rPr>
+              <a:t>-auto-var-</a:t>
+            </a:r>
+            <a:r>
+              <a:rPr lang="en-US" dirty="0" err="1">
+                <a:latin typeface="Courier New" panose="02070309020205020404" pitchFamily="49" charset="0"/>
+                <a:cs typeface="Courier New" panose="02070309020205020404" pitchFamily="49" charset="0"/>
+              </a:rPr>
+              <a:t>init</a:t>
+            </a:r>
+            <a:r>
+              <a:rPr lang="en-US" dirty="0">
+                <a:latin typeface="Courier New" panose="02070309020205020404" pitchFamily="49" charset="0"/>
+                <a:cs typeface="Courier New" panose="02070309020205020404" pitchFamily="49" charset="0"/>
+              </a:rPr>
+              <a:t>=zero -</a:t>
+            </a:r>
+            <a:r>
+              <a:rPr lang="en-US" dirty="0" err="1">
+                <a:latin typeface="Courier New" panose="02070309020205020404" pitchFamily="49" charset="0"/>
+                <a:cs typeface="Courier New" panose="02070309020205020404" pitchFamily="49" charset="0"/>
+              </a:rPr>
+              <a:t>fPIE</a:t>
+            </a:r>
+            <a:r>
+              <a:rPr lang="en-US" dirty="0">
+                <a:latin typeface="Courier New" panose="02070309020205020404" pitchFamily="49" charset="0"/>
+                <a:cs typeface="Courier New" panose="02070309020205020404" pitchFamily="49" charset="0"/>
+              </a:rPr>
+              <a:t> -</a:t>
+            </a:r>
+            <a:r>
+              <a:rPr lang="en-US" dirty="0" err="1">
+                <a:latin typeface="Courier New" panose="02070309020205020404" pitchFamily="49" charset="0"/>
+                <a:cs typeface="Courier New" panose="02070309020205020404" pitchFamily="49" charset="0"/>
+              </a:rPr>
+              <a:t>Wl</a:t>
+            </a:r>
+            <a:r>
+              <a:rPr lang="en-US" dirty="0">
+                <a:latin typeface="Courier New" panose="02070309020205020404" pitchFamily="49" charset="0"/>
+                <a:cs typeface="Courier New" panose="02070309020205020404" pitchFamily="49" charset="0"/>
+              </a:rPr>
+              <a:t>,-</a:t>
+            </a:r>
+            <a:r>
+              <a:rPr lang="en-US" dirty="0" err="1">
+                <a:latin typeface="Courier New" panose="02070309020205020404" pitchFamily="49" charset="0"/>
+                <a:cs typeface="Courier New" panose="02070309020205020404" pitchFamily="49" charset="0"/>
+              </a:rPr>
+              <a:t>z,now</a:t>
+            </a:r>
+            <a:r>
+              <a:rPr lang="en-US" dirty="0">
+                <a:latin typeface="Courier New" panose="02070309020205020404" pitchFamily="49" charset="0"/>
+                <a:cs typeface="Courier New" panose="02070309020205020404" pitchFamily="49" charset="0"/>
+              </a:rPr>
+              <a:t> -</a:t>
+            </a:r>
+            <a:r>
+              <a:rPr lang="en-US" dirty="0" err="1">
+                <a:latin typeface="Courier New" panose="02070309020205020404" pitchFamily="49" charset="0"/>
+                <a:cs typeface="Courier New" panose="02070309020205020404" pitchFamily="49" charset="0"/>
+              </a:rPr>
+              <a:t>Wl</a:t>
+            </a:r>
+            <a:r>
+              <a:rPr lang="en-US" dirty="0">
+                <a:latin typeface="Courier New" panose="02070309020205020404" pitchFamily="49" charset="0"/>
+                <a:cs typeface="Courier New" panose="02070309020205020404" pitchFamily="49" charset="0"/>
+              </a:rPr>
+              <a:t>,-</a:t>
+            </a:r>
+            <a:r>
+              <a:rPr lang="en-US" dirty="0" err="1">
+                <a:latin typeface="Courier New" panose="02070309020205020404" pitchFamily="49" charset="0"/>
+                <a:cs typeface="Courier New" panose="02070309020205020404" pitchFamily="49" charset="0"/>
+              </a:rPr>
+              <a:t>z,relro</a:t>
+            </a:r>
+            <a:r>
+              <a:rPr lang="en-US" dirty="0">
+                <a:latin typeface="Courier New" panose="02070309020205020404" pitchFamily="49" charset="0"/>
+                <a:cs typeface="Courier New" panose="02070309020205020404" pitchFamily="49" charset="0"/>
+              </a:rPr>
+              <a:t> -</a:t>
+            </a:r>
+            <a:r>
+              <a:rPr lang="en-US" dirty="0" err="1">
+                <a:latin typeface="Courier New" panose="02070309020205020404" pitchFamily="49" charset="0"/>
+                <a:cs typeface="Courier New" panose="02070309020205020404" pitchFamily="49" charset="0"/>
+              </a:rPr>
+              <a:t>fstack</a:t>
+            </a:r>
+            <a:r>
+              <a:rPr lang="en-US" dirty="0">
+                <a:latin typeface="Courier New" panose="02070309020205020404" pitchFamily="49" charset="0"/>
+                <a:cs typeface="Courier New" panose="02070309020205020404" pitchFamily="49" charset="0"/>
+              </a:rPr>
+              <a:t>-protector-strong -</a:t>
+            </a:r>
+            <a:r>
+              <a:rPr lang="en-US" dirty="0" err="1">
+                <a:latin typeface="Courier New" panose="02070309020205020404" pitchFamily="49" charset="0"/>
+                <a:cs typeface="Courier New" panose="02070309020205020404" pitchFamily="49" charset="0"/>
+              </a:rPr>
+              <a:t>fstack</a:t>
+            </a:r>
+            <a:r>
+              <a:rPr lang="en-US" dirty="0">
+                <a:latin typeface="Courier New" panose="02070309020205020404" pitchFamily="49" charset="0"/>
+                <a:cs typeface="Courier New" panose="02070309020205020404" pitchFamily="49" charset="0"/>
+              </a:rPr>
+              <a:t>-clash-protection -</a:t>
+            </a:r>
+            <a:r>
+              <a:rPr lang="en-US" dirty="0" err="1">
+                <a:latin typeface="Courier New" panose="02070309020205020404" pitchFamily="49" charset="0"/>
+                <a:cs typeface="Courier New" panose="02070309020205020404" pitchFamily="49" charset="0"/>
+              </a:rPr>
+              <a:t>fcf</a:t>
+            </a:r>
+            <a:r>
+              <a:rPr lang="en-US" dirty="0">
+                <a:latin typeface="Courier New" panose="02070309020205020404" pitchFamily="49" charset="0"/>
+                <a:cs typeface="Courier New" panose="02070309020205020404" pitchFamily="49" charset="0"/>
+              </a:rPr>
+              <a:t>-protection=full</a:t>
+            </a:r>
+          </a:p>
+          <a:p>
+            <a:r>
+              <a:rPr lang="en-US" dirty="0"/>
+              <a:t>Hardening-</a:t>
+            </a:r>
+            <a:r>
+              <a:rPr lang="ru-RU" dirty="0"/>
+              <a:t>защиты в критическом ПО</a:t>
+            </a:r>
+          </a:p>
+          <a:p>
             <a:pPr lvl="1"/>
             <a:r>
               <a:rPr lang="ru-RU" dirty="0"/>
-              <a:t>Хороший дефолтный флаг, но пока реализован только в </a:t>
-            </a:r>
-            <a:r>
-              <a:rPr lang="en-US" dirty="0"/>
-              <a:t>GCC</a:t>
-            </a:r>
-            <a:r>
-              <a:rPr lang="ru-RU" dirty="0"/>
-              <a:t> (</a:t>
-            </a:r>
-            <a:r>
-              <a:rPr lang="en-US" dirty="0">
-                <a:hlinkClick r:id="rId3"/>
-              </a:rPr>
-              <a:t>LLVM #122687</a:t>
-            </a:r>
-            <a:r>
-              <a:rPr lang="en-US" dirty="0"/>
-              <a:t>)</a:t>
-            </a:r>
-          </a:p>
-          <a:p>
-            <a:pPr lvl="1"/>
-            <a:r>
-              <a:rPr lang="ru-RU" dirty="0"/>
-              <a:t>Конкретный набор зависит от версии компилятора</a:t>
-            </a:r>
-          </a:p>
-          <a:p>
-            <a:pPr lvl="2"/>
-            <a:r>
-              <a:rPr lang="ru-RU" dirty="0"/>
-              <a:t>Для </a:t>
-            </a:r>
-            <a:r>
-              <a:rPr lang="en-US" dirty="0"/>
-              <a:t>GCC </a:t>
-            </a:r>
-            <a:r>
-              <a:rPr lang="ru-RU" dirty="0"/>
-              <a:t>можно посмотреть функцию </a:t>
-            </a:r>
-            <a:r>
-              <a:rPr lang="en-US" dirty="0" err="1"/>
-              <a:t>print_help_hardened</a:t>
-            </a:r>
-            <a:endParaRPr lang="en-US" dirty="0"/>
-          </a:p>
-          <a:p>
-            <a:pPr lvl="2"/>
-            <a:r>
-              <a:rPr lang="ru-RU" dirty="0"/>
-              <a:t>Сейчас</a:t>
-            </a:r>
-            <a:r>
-              <a:rPr lang="en-US" dirty="0"/>
-              <a:t>: </a:t>
-            </a:r>
-            <a:r>
-              <a:rPr lang="ru-RU" dirty="0">
-                <a:latin typeface="Courier New" panose="02070309020205020404" pitchFamily="49" charset="0"/>
-                <a:cs typeface="Courier New" panose="02070309020205020404" pitchFamily="49" charset="0"/>
-              </a:rPr>
-              <a:t>-</a:t>
-            </a:r>
-            <a:r>
-              <a:rPr lang="en-US" dirty="0">
-                <a:latin typeface="Courier New" panose="02070309020205020404" pitchFamily="49" charset="0"/>
-                <a:cs typeface="Courier New" panose="02070309020205020404" pitchFamily="49" charset="0"/>
-              </a:rPr>
-              <a:t>D_FORTIFY_SOURCE=3 -D_GLIBCXX_ASSERTIONS -</a:t>
-            </a:r>
-            <a:r>
-              <a:rPr lang="en-US" dirty="0" err="1">
-                <a:latin typeface="Courier New" panose="02070309020205020404" pitchFamily="49" charset="0"/>
-                <a:cs typeface="Courier New" panose="02070309020205020404" pitchFamily="49" charset="0"/>
-              </a:rPr>
-              <a:t>ftrivial</a:t>
-            </a:r>
-            <a:r>
-              <a:rPr lang="en-US" dirty="0">
-                <a:latin typeface="Courier New" panose="02070309020205020404" pitchFamily="49" charset="0"/>
-                <a:cs typeface="Courier New" panose="02070309020205020404" pitchFamily="49" charset="0"/>
-              </a:rPr>
-              <a:t>-auto-var-</a:t>
-            </a:r>
-            <a:r>
-              <a:rPr lang="en-US" dirty="0" err="1">
-                <a:latin typeface="Courier New" panose="02070309020205020404" pitchFamily="49" charset="0"/>
-                <a:cs typeface="Courier New" panose="02070309020205020404" pitchFamily="49" charset="0"/>
-              </a:rPr>
-              <a:t>init</a:t>
-            </a:r>
-            <a:r>
-              <a:rPr lang="en-US" dirty="0">
-                <a:latin typeface="Courier New" panose="02070309020205020404" pitchFamily="49" charset="0"/>
-                <a:cs typeface="Courier New" panose="02070309020205020404" pitchFamily="49" charset="0"/>
-              </a:rPr>
-              <a:t>=zero -</a:t>
-            </a:r>
-            <a:r>
-              <a:rPr lang="en-US" dirty="0" err="1">
-                <a:latin typeface="Courier New" panose="02070309020205020404" pitchFamily="49" charset="0"/>
-                <a:cs typeface="Courier New" panose="02070309020205020404" pitchFamily="49" charset="0"/>
-              </a:rPr>
-              <a:t>fPIE</a:t>
-            </a:r>
-            <a:r>
-              <a:rPr lang="en-US" dirty="0">
-                <a:latin typeface="Courier New" panose="02070309020205020404" pitchFamily="49" charset="0"/>
-                <a:cs typeface="Courier New" panose="02070309020205020404" pitchFamily="49" charset="0"/>
-              </a:rPr>
-              <a:t> -Wl,-</a:t>
-            </a:r>
-            <a:r>
-              <a:rPr lang="en-US" dirty="0" err="1">
-                <a:latin typeface="Courier New" panose="02070309020205020404" pitchFamily="49" charset="0"/>
-                <a:cs typeface="Courier New" panose="02070309020205020404" pitchFamily="49" charset="0"/>
-              </a:rPr>
-              <a:t>z,now</a:t>
-            </a:r>
-            <a:r>
-              <a:rPr lang="en-US" dirty="0">
-                <a:latin typeface="Courier New" panose="02070309020205020404" pitchFamily="49" charset="0"/>
-                <a:cs typeface="Courier New" panose="02070309020205020404" pitchFamily="49" charset="0"/>
-              </a:rPr>
-              <a:t> -Wl,-</a:t>
-            </a:r>
-            <a:r>
-              <a:rPr lang="en-US" dirty="0" err="1">
-                <a:latin typeface="Courier New" panose="02070309020205020404" pitchFamily="49" charset="0"/>
-                <a:cs typeface="Courier New" panose="02070309020205020404" pitchFamily="49" charset="0"/>
-              </a:rPr>
-              <a:t>z,relro</a:t>
-            </a:r>
-            <a:r>
-              <a:rPr lang="en-US" dirty="0">
-                <a:latin typeface="Courier New" panose="02070309020205020404" pitchFamily="49" charset="0"/>
-                <a:cs typeface="Courier New" panose="02070309020205020404" pitchFamily="49" charset="0"/>
-              </a:rPr>
-              <a:t> -</a:t>
-            </a:r>
-            <a:r>
-              <a:rPr lang="en-US" dirty="0" err="1">
-                <a:latin typeface="Courier New" panose="02070309020205020404" pitchFamily="49" charset="0"/>
-                <a:cs typeface="Courier New" panose="02070309020205020404" pitchFamily="49" charset="0"/>
-              </a:rPr>
-              <a:t>fstack</a:t>
-            </a:r>
-            <a:r>
-              <a:rPr lang="en-US" dirty="0">
-                <a:latin typeface="Courier New" panose="02070309020205020404" pitchFamily="49" charset="0"/>
-                <a:cs typeface="Courier New" panose="02070309020205020404" pitchFamily="49" charset="0"/>
-              </a:rPr>
-              <a:t>-protector-strong -</a:t>
-            </a:r>
-            <a:r>
-              <a:rPr lang="en-US" dirty="0" err="1">
-                <a:latin typeface="Courier New" panose="02070309020205020404" pitchFamily="49" charset="0"/>
-                <a:cs typeface="Courier New" panose="02070309020205020404" pitchFamily="49" charset="0"/>
-              </a:rPr>
-              <a:t>fstack</a:t>
-            </a:r>
-            <a:r>
-              <a:rPr lang="en-US" dirty="0">
-                <a:latin typeface="Courier New" panose="02070309020205020404" pitchFamily="49" charset="0"/>
-                <a:cs typeface="Courier New" panose="02070309020205020404" pitchFamily="49" charset="0"/>
-              </a:rPr>
-              <a:t>-clash-protection -</a:t>
-            </a:r>
-            <a:r>
-              <a:rPr lang="en-US" dirty="0" err="1">
-                <a:latin typeface="Courier New" panose="02070309020205020404" pitchFamily="49" charset="0"/>
-                <a:cs typeface="Courier New" panose="02070309020205020404" pitchFamily="49" charset="0"/>
-              </a:rPr>
-              <a:t>fcf</a:t>
-            </a:r>
-            <a:r>
-              <a:rPr lang="en-US" dirty="0">
-                <a:latin typeface="Courier New" panose="02070309020205020404" pitchFamily="49" charset="0"/>
-                <a:cs typeface="Courier New" panose="02070309020205020404" pitchFamily="49" charset="0"/>
-              </a:rPr>
-              <a:t>-protection=full</a:t>
-            </a:r>
+              <a:t>Чаты, почтовые клиенты, мультимедиа, интерпретаторы, БД, офисное ПО</a:t>
+            </a:r>
+            <a:r>
+              <a:rPr lang="en-US" dirty="0"/>
+              <a:t>, </a:t>
+            </a:r>
+            <a:r>
+              <a:rPr lang="ru-RU" dirty="0"/>
+              <a:t>ридеры</a:t>
+            </a:r>
+            <a:endParaRPr lang="en-US" dirty="0">
+              <a:latin typeface="Courier New" panose="02070309020205020404" pitchFamily="49" charset="0"/>
+              <a:cs typeface="Courier New" panose="02070309020205020404" pitchFamily="49" charset="0"/>
+            </a:endParaRPr>
           </a:p>
         </p:txBody>
       </p:sp>

</xml_diff>

<commit_message>
Added todo to add Android info.
</commit_message>
<xml_diff>
--- a/CppZeroCost/2025/RU.pptx
+++ b/CppZeroCost/2025/RU.pptx
@@ -29021,6 +29021,45 @@
           </a:p>
         </p:txBody>
       </p:sp>
+      <p:sp>
+        <p:nvSpPr>
+          <p:cNvPr id="5" name="TextBox 4">
+            <a:extLst>
+              <a:ext uri="{FF2B5EF4-FFF2-40B4-BE49-F238E27FC236}">
+                <a16:creationId xmlns:a16="http://schemas.microsoft.com/office/drawing/2014/main" id="{5E2794B4-69E7-4919-8A1F-B6D7F7392F01}"/>
+              </a:ext>
+            </a:extLst>
+          </p:cNvPr>
+          <p:cNvSpPr txBox="1"/>
+          <p:nvPr/>
+        </p:nvSpPr>
+        <p:spPr>
+          <a:xfrm>
+            <a:off x="6660777" y="347354"/>
+            <a:ext cx="2187388" cy="369332"/>
+          </a:xfrm>
+          <a:prstGeom prst="rect">
+            <a:avLst/>
+          </a:prstGeom>
+          <a:noFill/>
+        </p:spPr>
+        <p:txBody>
+          <a:bodyPr wrap="square" rtlCol="0">
+            <a:spAutoFit/>
+          </a:bodyPr>
+          <a:lstStyle/>
+          <a:p>
+            <a:r>
+              <a:rPr lang="en-US" b="1" dirty="0">
+                <a:solidFill>
+                  <a:srgbClr val="FF0000"/>
+                </a:solidFill>
+              </a:rPr>
+              <a:t>TODO: Android</a:t>
+            </a:r>
+          </a:p>
+        </p:txBody>
+      </p:sp>
     </p:spTree>
     <p:extLst>
       <p:ext uri="{BB962C8B-B14F-4D97-AF65-F5344CB8AC3E}">

</xml_diff>

<commit_message>
Mention _FORTIFY_SOURCE in Bionic.
</commit_message>
<xml_diff>
--- a/CppZeroCost/2025/RU.pptx
+++ b/CppZeroCost/2025/RU.pptx
@@ -10932,7 +10932,15 @@
             </a:r>
             <a:r>
               <a:rPr lang="en-US" dirty="0"/>
-              <a:t>Glibc (</a:t>
+              <a:t>Glibc</a:t>
+            </a:r>
+            <a:r>
+              <a:rPr lang="ru-RU" dirty="0"/>
+              <a:t> и </a:t>
+            </a:r>
+            <a:r>
+              <a:rPr lang="en-US" dirty="0"/>
+              <a:t>Bionic (</a:t>
             </a:r>
             <a:r>
               <a:rPr lang="ru-RU" dirty="0"/>

</xml_diff>

<commit_message>
Link to Python no-PIE bug.
</commit_message>
<xml_diff>
--- a/CppZeroCost/2025/RU.pptx
+++ b/CppZeroCost/2025/RU.pptx
@@ -4998,7 +4998,17 @@
             <a:pPr lvl="2"/>
             <a:r>
               <a:rPr lang="en-US" dirty="0"/>
-              <a:t>/usr/bin/python3</a:t>
+              <a:t>/usr/bin/python3 (</a:t>
+            </a:r>
+            <a:r>
+              <a:rPr lang="en-US" dirty="0">
+                <a:hlinkClick r:id="rId2"/>
+              </a:rPr>
+              <a:t>Launchpad #1452115</a:t>
+            </a:r>
+            <a:r>
+              <a:rPr lang="en-US" dirty="0"/>
+              <a:t>)</a:t>
             </a:r>
             <a:endParaRPr lang="ru-RU" dirty="0"/>
           </a:p>

</xml_diff>

<commit_message>
Mention that Python3 on Debian does not have Full RELRO either.
</commit_message>
<xml_diff>
--- a/CppZeroCost/2025/RU.pptx
+++ b/CppZeroCost/2025/RU.pptx
@@ -28881,8 +28881,8 @@
         </p:nvSpPr>
         <p:spPr>
           <a:xfrm>
-            <a:off x="9511553" y="662484"/>
-            <a:ext cx="2357718" cy="5693866"/>
+            <a:off x="9511553" y="416262"/>
+            <a:ext cx="2357718" cy="5940088"/>
           </a:xfrm>
           <a:prstGeom prst="rect">
             <a:avLst/>
@@ -28963,7 +28963,7 @@
             </a:r>
             <a:r>
               <a:rPr lang="en-US" sz="1600" dirty="0"/>
-              <a:t>PIE</a:t>
+              <a:t>PIE/Full RELRO</a:t>
             </a:r>
             <a:r>
               <a:rPr lang="ru-RU" sz="1600" dirty="0"/>

</xml_diff>

<commit_message>
Read materials suggested by Serge Bronnikov.
</commit_message>
<xml_diff>
--- a/CppZeroCost/2025/RU.pptx
+++ b/CppZeroCost/2025/RU.pptx
@@ -295,7 +295,7 @@
           <a:p>
             <a:fld id="{A8F27B54-EFD4-4F1F-9CE4-9A3C368187A4}" type="datetimeFigureOut">
               <a:rPr lang="en-US" smtClean="0"/>
-              <a:t>7/25/2025</a:t>
+              <a:t>7/26/2025</a:t>
             </a:fld>
             <a:endParaRPr lang="en-US"/>
           </a:p>
@@ -709,7 +709,7 @@
           <a:p>
             <a:fld id="{4E570717-CC08-42AC-84F3-7EB74EE2C2EE}" type="datetime1">
               <a:rPr lang="en-US" smtClean="0"/>
-              <a:t>7/25/2025</a:t>
+              <a:t>7/26/2025</a:t>
             </a:fld>
             <a:endParaRPr lang="en-US"/>
           </a:p>
@@ -907,7 +907,7 @@
           <a:p>
             <a:fld id="{E850434B-ABC0-4013-A159-517880C2CE4B}" type="datetime1">
               <a:rPr lang="en-US" smtClean="0"/>
-              <a:t>7/25/2025</a:t>
+              <a:t>7/26/2025</a:t>
             </a:fld>
             <a:endParaRPr lang="en-US"/>
           </a:p>
@@ -1115,7 +1115,7 @@
           <a:p>
             <a:fld id="{307E2251-42B8-4CD0-9F76-CE8A218C5A9B}" type="datetime1">
               <a:rPr lang="en-US" smtClean="0"/>
-              <a:t>7/25/2025</a:t>
+              <a:t>7/26/2025</a:t>
             </a:fld>
             <a:endParaRPr lang="en-US"/>
           </a:p>
@@ -1313,7 +1313,7 @@
           <a:p>
             <a:fld id="{650366BD-2959-43A5-9C43-B178997CA9C1}" type="datetime1">
               <a:rPr lang="en-US" smtClean="0"/>
-              <a:t>7/25/2025</a:t>
+              <a:t>7/26/2025</a:t>
             </a:fld>
             <a:endParaRPr lang="en-US"/>
           </a:p>
@@ -1588,7 +1588,7 @@
           <a:p>
             <a:fld id="{44A443A2-278A-4AA2-A6FA-B813D9AB289B}" type="datetime1">
               <a:rPr lang="en-US" smtClean="0"/>
-              <a:t>7/25/2025</a:t>
+              <a:t>7/26/2025</a:t>
             </a:fld>
             <a:endParaRPr lang="en-US"/>
           </a:p>
@@ -1853,7 +1853,7 @@
           <a:p>
             <a:fld id="{8DB96CD0-8DC9-4D9E-8F97-A64EB549E498}" type="datetime1">
               <a:rPr lang="en-US" smtClean="0"/>
-              <a:t>7/25/2025</a:t>
+              <a:t>7/26/2025</a:t>
             </a:fld>
             <a:endParaRPr lang="en-US"/>
           </a:p>
@@ -2265,7 +2265,7 @@
           <a:p>
             <a:fld id="{8728ABDD-F7C0-49E5-BDEF-78EEAB9D4FF0}" type="datetime1">
               <a:rPr lang="en-US" smtClean="0"/>
-              <a:t>7/25/2025</a:t>
+              <a:t>7/26/2025</a:t>
             </a:fld>
             <a:endParaRPr lang="en-US"/>
           </a:p>
@@ -2406,7 +2406,7 @@
           <a:p>
             <a:fld id="{1815E602-B233-4072-AF5E-EEC16D6A3250}" type="datetime1">
               <a:rPr lang="en-US" smtClean="0"/>
-              <a:t>7/25/2025</a:t>
+              <a:t>7/26/2025</a:t>
             </a:fld>
             <a:endParaRPr lang="en-US"/>
           </a:p>
@@ -2519,7 +2519,7 @@
           <a:p>
             <a:fld id="{B46368E2-0F8E-43F1-B205-4CE4ED81C818}" type="datetime1">
               <a:rPr lang="en-US" smtClean="0"/>
-              <a:t>7/25/2025</a:t>
+              <a:t>7/26/2025</a:t>
             </a:fld>
             <a:endParaRPr lang="en-US"/>
           </a:p>
@@ -2830,7 +2830,7 @@
           <a:p>
             <a:fld id="{A90826D4-3247-4C35-B745-95D9A6527E86}" type="datetime1">
               <a:rPr lang="en-US" smtClean="0"/>
-              <a:t>7/25/2025</a:t>
+              <a:t>7/26/2025</a:t>
             </a:fld>
             <a:endParaRPr lang="en-US"/>
           </a:p>
@@ -3118,7 +3118,7 @@
           <a:p>
             <a:fld id="{F697CA6C-CB8E-4E4E-A40B-CF748107F47F}" type="datetime1">
               <a:rPr lang="en-US" smtClean="0"/>
-              <a:t>7/25/2025</a:t>
+              <a:t>7/26/2025</a:t>
             </a:fld>
             <a:endParaRPr lang="en-US"/>
           </a:p>
@@ -3359,7 +3359,7 @@
           <a:p>
             <a:fld id="{486D2D92-9836-4BF5-99A8-6BBA488E0F07}" type="datetime1">
               <a:rPr lang="en-US" smtClean="0"/>
-              <a:t>7/25/2025</a:t>
+              <a:t>7/26/2025</a:t>
             </a:fld>
             <a:endParaRPr lang="en-US"/>
           </a:p>
@@ -3916,7 +3916,7 @@
           <a:p>
             <a:r>
               <a:rPr lang="ru-RU" dirty="0"/>
-              <a:t>Неисполняемый стек</a:t>
+              <a:t>Неисполняемые сегменты данных</a:t>
             </a:r>
             <a:endParaRPr lang="en-US" dirty="0"/>
           </a:p>
@@ -4140,7 +4140,23 @@
             </a:r>
             <a:r>
               <a:rPr lang="en-US" dirty="0"/>
-              <a:t>(GCC, Clang) </a:t>
+              <a:t>(</a:t>
+            </a:r>
+            <a:r>
+              <a:rPr lang="ru-RU" dirty="0"/>
+              <a:t>и в </a:t>
+            </a:r>
+            <a:r>
+              <a:rPr lang="en-US" dirty="0"/>
+              <a:t>GCC, </a:t>
+            </a:r>
+            <a:r>
+              <a:rPr lang="ru-RU" dirty="0"/>
+              <a:t>и в </a:t>
+            </a:r>
+            <a:r>
+              <a:rPr lang="en-US" dirty="0"/>
+              <a:t>Clang) </a:t>
             </a:r>
             <a:r>
               <a:rPr lang="ru-RU" dirty="0"/>
@@ -4367,8 +4383,13 @@
             </a:r>
             <a:r>
               <a:rPr lang="en-US" dirty="0"/>
-              <a:t>GNU nested functions</a:t>
-            </a:r>
+              <a:t>GNU nested functions </a:t>
+            </a:r>
+            <a:r>
+              <a:rPr lang="ru-RU" dirty="0"/>
+              <a:t>(редко)</a:t>
+            </a:r>
+            <a:endParaRPr lang="en-US" dirty="0"/>
           </a:p>
           <a:p>
             <a:r>
@@ -5036,8 +5057,27 @@
             </a:r>
             <a:r>
               <a:rPr lang="en-US" dirty="0"/>
-              <a:t> DLL</a:t>
-            </a:r>
+              <a:t> DLL)</a:t>
+            </a:r>
+          </a:p>
+          <a:p>
+            <a:pPr lvl="2"/>
+            <a:r>
+              <a:rPr lang="en-US" dirty="0"/>
+              <a:t>Takes decades to add security ... (Theo de </a:t>
+            </a:r>
+            <a:r>
+              <a:rPr lang="en-US" dirty="0" err="1"/>
+              <a:t>Raadt</a:t>
+            </a:r>
+            <a:r>
+              <a:rPr lang="en-US" dirty="0"/>
+              <a:t>)</a:t>
+            </a:r>
+          </a:p>
+          <a:p>
+            <a:pPr lvl="2"/>
+            <a:endParaRPr lang="en-US" dirty="0"/>
           </a:p>
           <a:p>
             <a:endParaRPr lang="en-US" dirty="0"/>
@@ -14827,7 +14867,7 @@
         <p:spPr/>
         <p:txBody>
           <a:bodyPr>
-            <a:normAutofit/>
+            <a:normAutofit fontScale="92500"/>
           </a:bodyPr>
           <a:lstStyle/>
           <a:p>
@@ -14839,6 +14879,21 @@
           </a:p>
           <a:p>
             <a:r>
+              <a:rPr lang="en-US" dirty="0"/>
+              <a:t>Scudo (Android), </a:t>
+            </a:r>
+            <a:r>
+              <a:rPr lang="en-US" dirty="0" err="1"/>
+              <a:t>hardened_malloc</a:t>
+            </a:r>
+            <a:r>
+              <a:rPr lang="en-US" dirty="0"/>
+              <a:t>, OpenBSD allocator, Glibc MALLOC_CHECK_, etc.</a:t>
+            </a:r>
+            <a:endParaRPr lang="ru-RU" dirty="0"/>
+          </a:p>
+          <a:p>
+            <a:r>
               <a:rPr lang="ru-RU" dirty="0"/>
               <a:t>Защита от ошибок кучи </a:t>
             </a:r>
@@ -14897,6 +14952,7 @@
               <a:rPr lang="ru-RU" dirty="0"/>
               <a:t>Зануление данных на free и проверка на malloc</a:t>
             </a:r>
+            <a:endParaRPr lang="en-US" dirty="0"/>
           </a:p>
         </p:txBody>
       </p:sp>
@@ -29146,8 +29202,8 @@
         </p:nvSpPr>
         <p:spPr>
           <a:xfrm>
-            <a:off x="9511553" y="416262"/>
-            <a:ext cx="2357718" cy="5940088"/>
+            <a:off x="9448800" y="179249"/>
+            <a:ext cx="2357718" cy="6678751"/>
           </a:xfrm>
           <a:prstGeom prst="rect">
             <a:avLst/>
@@ -29216,15 +29272,7 @@
             </a:pPr>
             <a:r>
               <a:rPr lang="ru-RU" sz="1600" dirty="0"/>
-              <a:t>Важно</a:t>
-            </a:r>
-            <a:r>
-              <a:rPr lang="en-US" sz="1600" dirty="0"/>
-              <a:t>: </a:t>
-            </a:r>
-            <a:r>
-              <a:rPr lang="ru-RU" sz="1600" dirty="0"/>
-              <a:t>дефолтные защиты могут быть отключены в конкретных пакетах (например нет </a:t>
+              <a:t>Дефолтные защиты могут быть отключены в конкретных пакетах (например нет </a:t>
             </a:r>
             <a:r>
               <a:rPr lang="en-US" sz="1600" dirty="0"/>
@@ -29255,6 +29303,30 @@
                 <a:hlinkClick r:id="rId2"/>
               </a:rPr>
               <a:t> Debian 12</a:t>
+            </a:r>
+            <a:r>
+              <a:rPr lang="en-US" sz="1600" dirty="0"/>
+              <a:t>, 85% </a:t>
+            </a:r>
+            <a:r>
+              <a:rPr lang="ru-RU" sz="1600" dirty="0"/>
+              <a:t>пакетов </a:t>
+            </a:r>
+            <a:r>
+              <a:rPr lang="en-US" sz="1600" dirty="0"/>
+              <a:t>Debian 10 </a:t>
+            </a:r>
+            <a:r>
+              <a:rPr lang="ru-RU" sz="1600" dirty="0">
+                <a:hlinkClick r:id="rId3"/>
+              </a:rPr>
+              <a:t>не имели </a:t>
+            </a:r>
+            <a:r>
+              <a:rPr lang="en-US" sz="1600" dirty="0" err="1">
+                <a:hlinkClick r:id="rId3"/>
+              </a:rPr>
+              <a:t>StackProtector</a:t>
             </a:r>
             <a:r>
               <a:rPr lang="en-US" sz="1600" dirty="0"/>
@@ -31784,7 +31856,7 @@
         <p:spPr>
           <a:xfrm>
             <a:off x="9646024" y="1416424"/>
-            <a:ext cx="2312894" cy="2554545"/>
+            <a:ext cx="2312894" cy="3293209"/>
           </a:xfrm>
           <a:prstGeom prst="rect">
             <a:avLst/>
@@ -31858,7 +31930,24 @@
               <a:rPr lang="en-US" sz="1600" dirty="0"/>
               <a:t>)</a:t>
             </a:r>
-            <a:endParaRPr lang="ru-RU" sz="1600" dirty="0"/>
+          </a:p>
+          <a:p>
+            <a:pPr marL="285750" indent="-285750">
+              <a:buFont typeface="Arial" panose="020B0604020202020204" pitchFamily="34" charset="0"/>
+              <a:buChar char="•"/>
+            </a:pPr>
+            <a:r>
+              <a:rPr lang="ru-RU" sz="1600" dirty="0"/>
+              <a:t>В стабильном </a:t>
+            </a:r>
+            <a:r>
+              <a:rPr lang="en-US" sz="1600" dirty="0"/>
+              <a:t>Rust </a:t>
+            </a:r>
+            <a:r>
+              <a:rPr lang="ru-RU" sz="1600" dirty="0"/>
+              <a:t>нет опций для ключевых защит</a:t>
+            </a:r>
           </a:p>
         </p:txBody>
       </p:sp>
@@ -32237,7 +32326,7 @@
         <p:spPr/>
         <p:txBody>
           <a:bodyPr>
-            <a:normAutofit fontScale="92500" lnSpcReduction="20000"/>
+            <a:normAutofit/>
           </a:bodyPr>
           <a:lstStyle/>
           <a:p>
@@ -32261,7 +32350,7 @@
             </a:r>
             <a:r>
               <a:rPr lang="ru-RU" dirty="0"/>
-              <a:t>места 2, 6, 8, 20</a:t>
+              <a:t>места 2, 6, 20</a:t>
             </a:r>
             <a:r>
               <a:rPr lang="en-US" dirty="0"/>
@@ -32280,80 +32369,49 @@
             </a:r>
             <a:r>
               <a:rPr lang="ru-RU" dirty="0"/>
-              <a:t>вызваны ошибками работы с памятью</a:t>
+              <a:t>и </a:t>
+            </a:r>
+            <a:r>
+              <a:rPr lang="en-US" dirty="0"/>
+              <a:t>Chromium </a:t>
+            </a:r>
+            <a:r>
+              <a:rPr lang="ru-RU" dirty="0"/>
+              <a:t>вызваны ошибками</a:t>
+            </a:r>
+            <a:r>
+              <a:rPr lang="en-US" dirty="0"/>
+              <a:t> </a:t>
+            </a:r>
+            <a:r>
+              <a:rPr lang="ru-RU" dirty="0"/>
+              <a:t>памяти</a:t>
             </a:r>
             <a:endParaRPr lang="en-US" dirty="0"/>
           </a:p>
           <a:p>
+            <a:r>
+              <a:rPr lang="ru-RU" dirty="0"/>
+              <a:t>40% атак, вызванных ошибками работы с памятью</a:t>
+            </a:r>
+            <a:r>
+              <a:rPr lang="en-US" dirty="0"/>
+              <a:t>, </a:t>
+            </a:r>
+            <a:r>
+              <a:rPr lang="ru-RU" dirty="0"/>
+              <a:t>вызваны </a:t>
+            </a:r>
+            <a:r>
+              <a:rPr lang="en-US" dirty="0"/>
+              <a:t>buffer overflow</a:t>
+            </a:r>
+          </a:p>
+          <a:p>
             <a:pPr lvl="1"/>
             <a:r>
               <a:rPr lang="en-US" dirty="0">
                 <a:hlinkClick r:id="rId3"/>
-              </a:rPr>
-              <a:t>MSRC Blog: A proactive approach to more secure code</a:t>
-            </a:r>
-            <a:endParaRPr lang="en-US" dirty="0"/>
-          </a:p>
-          <a:p>
-            <a:r>
-              <a:rPr lang="en-US" dirty="0"/>
-              <a:t>70% high/critical </a:t>
-            </a:r>
-            <a:r>
-              <a:rPr lang="ru-RU" dirty="0"/>
-              <a:t>багов в проекте </a:t>
-            </a:r>
-            <a:r>
-              <a:rPr lang="en-US" dirty="0"/>
-              <a:t>Chromium – </a:t>
-            </a:r>
-            <a:r>
-              <a:rPr lang="ru-RU" dirty="0"/>
-              <a:t>ошибки</a:t>
-            </a:r>
-            <a:r>
-              <a:rPr lang="en-US" dirty="0"/>
-              <a:t> </a:t>
-            </a:r>
-            <a:r>
-              <a:rPr lang="ru-RU" dirty="0"/>
-              <a:t>памяти</a:t>
-            </a:r>
-            <a:endParaRPr lang="en-US" dirty="0"/>
-          </a:p>
-          <a:p>
-            <a:pPr lvl="1"/>
-            <a:r>
-              <a:rPr lang="en-US" dirty="0">
-                <a:hlinkClick r:id="rId4"/>
-              </a:rPr>
-              <a:t>Chromium Security: Memory Safety</a:t>
-            </a:r>
-            <a:endParaRPr lang="en-US" dirty="0"/>
-          </a:p>
-          <a:p>
-            <a:r>
-              <a:rPr lang="ru-RU" dirty="0"/>
-              <a:t>40% атак, вызванных ошибками работы с памятью</a:t>
-            </a:r>
-            <a:r>
-              <a:rPr lang="en-US" dirty="0"/>
-              <a:t>, </a:t>
-            </a:r>
-            <a:r>
-              <a:rPr lang="ru-RU" dirty="0"/>
-              <a:t>вызваны </a:t>
-            </a:r>
-            <a:r>
-              <a:rPr lang="en-US" dirty="0"/>
-              <a:t>buffer overflow</a:t>
-            </a:r>
-          </a:p>
-          <a:p>
-            <a:pPr lvl="1"/>
-            <a:r>
-              <a:rPr lang="en-US" dirty="0">
-                <a:hlinkClick r:id="rId5"/>
               </a:rPr>
               <a:t>Google Project Zero</a:t>
             </a:r>
@@ -32425,7 +32483,7 @@
           <p:nvPr/>
         </p:nvPicPr>
         <p:blipFill>
-          <a:blip r:embed="rId6">
+          <a:blip r:embed="rId4">
             <a:extLst>
               <a:ext uri="{28A0092B-C50C-407E-A947-70E740481C1C}">
                 <a14:useLocalDpi xmlns:a14="http://schemas.microsoft.com/office/drawing/2010/main" val="0"/>
@@ -32553,7 +32611,7 @@
         <p:spPr/>
         <p:txBody>
           <a:bodyPr>
-            <a:normAutofit lnSpcReduction="10000"/>
+            <a:normAutofit fontScale="92500" lnSpcReduction="10000"/>
           </a:bodyPr>
           <a:lstStyle/>
           <a:p>
@@ -32567,8 +32625,23 @@
             </a:r>
             <a:r>
               <a:rPr lang="en-US" dirty="0"/>
-              <a:t>Linux (RedHat, OpenSUSE, Gentoo, etc.)</a:t>
-            </a:r>
+              <a:t>Linux (RedHat, OpenSUSE, Gentoo, etc.) </a:t>
+            </a:r>
+            <a:r>
+              <a:rPr lang="ru-RU" dirty="0"/>
+              <a:t>и встроенных системах</a:t>
+            </a:r>
+            <a:endParaRPr lang="en-US" dirty="0"/>
+          </a:p>
+          <a:p>
+            <a:pPr lvl="1"/>
+            <a:r>
+              <a:rPr lang="en-US" dirty="0">
+                <a:hlinkClick r:id="rId2"/>
+              </a:rPr>
+              <a:t>Building Embedded Systems Like It’s 1996</a:t>
+            </a:r>
+            <a:endParaRPr lang="en-US" dirty="0"/>
           </a:p>
           <a:p>
             <a:r>
@@ -32592,6 +32665,28 @@
             <a:r>
               <a:rPr lang="ru-RU" dirty="0"/>
               <a:t>в ядре операционной системы</a:t>
+            </a:r>
+            <a:endParaRPr lang="en-US" dirty="0"/>
+          </a:p>
+          <a:p>
+            <a:pPr lvl="1"/>
+            <a:r>
+              <a:rPr lang="en-US" dirty="0">
+                <a:hlinkClick r:id="rId3"/>
+              </a:rPr>
+              <a:t>Linux Kernel </a:t>
+            </a:r>
+            <a:r>
+              <a:rPr lang="en-US" dirty="0" err="1">
+                <a:hlinkClick r:id="rId3"/>
+              </a:rPr>
+              <a:t>Defence</a:t>
+            </a:r>
+            <a:r>
+              <a:rPr lang="en-US" dirty="0">
+                <a:hlinkClick r:id="rId3"/>
+              </a:rPr>
+              <a:t> Map</a:t>
             </a:r>
             <a:endParaRPr lang="en-US" dirty="0"/>
           </a:p>
@@ -32922,7 +33017,7 @@
         </p:spPr>
         <p:txBody>
           <a:bodyPr vert="horz" lIns="91440" tIns="45720" rIns="91440" bIns="45720" rtlCol="0">
-            <a:normAutofit lnSpcReduction="10000"/>
+            <a:normAutofit/>
           </a:bodyPr>
           <a:lstStyle>
             <a:lvl1pPr marL="228600" indent="-228600" algn="l" defTabSz="914400" rtl="0" eaLnBrk="1" latinLnBrk="0" hangingPunct="1">
@@ -33091,13 +33186,13 @@
           <a:p>
             <a:r>
               <a:rPr lang="ru-RU" dirty="0"/>
-              <a:t>Проверить дефолтные опции при сборке продуктового кода и дистрибутива</a:t>
-            </a:r>
-          </a:p>
-          <a:p>
-            <a:r>
-              <a:rPr lang="ru-RU" dirty="0"/>
-              <a:t>Решить с Security Team какие hardening-методы включить</a:t>
+              <a:t>Проверить опции сборки продуктового кода и дистрибутива</a:t>
+            </a:r>
+          </a:p>
+          <a:p>
+            <a:r>
+              <a:rPr lang="ru-RU" dirty="0"/>
+              <a:t>Решить с Security Team какие hardening-методы включить и где</a:t>
             </a:r>
             <a:endParaRPr lang="en-US" dirty="0"/>
           </a:p>
@@ -33426,6 +33521,22 @@
               <a:rPr lang="ru-RU" sz="2400" dirty="0"/>
               <a:t>Может проверить наличие noexecstack, PIE, _FORTIFY_SOURCE, RELRO, etc.</a:t>
             </a:r>
+          </a:p>
+          <a:p>
+            <a:pPr lvl="1"/>
+            <a:r>
+              <a:rPr lang="ru-RU" sz="2000" dirty="0"/>
+              <a:t>Только динамически слинкованные приложения</a:t>
+            </a:r>
+            <a:r>
+              <a:rPr lang="en-US" sz="2000" dirty="0"/>
+              <a:t>/</a:t>
+            </a:r>
+            <a:r>
+              <a:rPr lang="ru-RU" sz="2000" dirty="0"/>
+              <a:t>библиотеки</a:t>
+            </a:r>
+            <a:endParaRPr lang="en-US" sz="2000" dirty="0"/>
           </a:p>
           <a:p>
             <a:pPr lvl="1"/>
@@ -34658,6 +34769,35 @@
               <a:t>Ubuntu собираются с этим флагом</a:t>
             </a:r>
             <a:endParaRPr lang="en-US" dirty="0"/>
+          </a:p>
+          <a:p>
+            <a:pPr lvl="2"/>
+            <a:r>
+              <a:rPr lang="ru-RU" dirty="0"/>
+              <a:t>В </a:t>
+            </a:r>
+            <a:r>
+              <a:rPr lang="en-US" dirty="0"/>
+              <a:t>Debian 10 </a:t>
+            </a:r>
+            <a:r>
+              <a:rPr lang="ru-RU" dirty="0"/>
+              <a:t>только 85% пакетов использовали </a:t>
+            </a:r>
+            <a:r>
+              <a:rPr lang="en-US" dirty="0"/>
+              <a:t>SP (</a:t>
+            </a:r>
+            <a:r>
+              <a:rPr lang="en-US" dirty="0">
+                <a:hlinkClick r:id="rId2"/>
+              </a:rPr>
+              <a:t>Building Embedded Systems Like It’s 1996</a:t>
+            </a:r>
+            <a:r>
+              <a:rPr lang="en-US" dirty="0"/>
+              <a:t>)</a:t>
+            </a:r>
           </a:p>
           <a:p>
             <a:r>

</xml_diff>

<commit_message>
Mention ISP RAS paper.
</commit_message>
<xml_diff>
--- a/CppZeroCost/2025/RU.pptx
+++ b/CppZeroCost/2025/RU.pptx
@@ -5440,25 +5440,33 @@
         </p:nvSpPr>
         <p:spPr/>
         <p:txBody>
-          <a:bodyPr/>
+          <a:bodyPr>
+            <a:normAutofit fontScale="92500" lnSpcReduction="10000"/>
+          </a:bodyPr>
           <a:lstStyle/>
           <a:p>
             <a:r>
               <a:rPr lang="ru-RU" dirty="0"/>
-              <a:t>Примеры атак</a:t>
-            </a:r>
-            <a:r>
-              <a:rPr lang="en-US" dirty="0"/>
-              <a:t>:</a:t>
+              <a:t>Руководства по </a:t>
+            </a:r>
+            <a:r>
+              <a:rPr lang="en-US" dirty="0"/>
+              <a:t>hardening</a:t>
             </a:r>
           </a:p>
           <a:p>
             <a:pPr lvl="1"/>
+            <a:r>
+              <a:rPr lang="en-US" dirty="0" err="1">
+                <a:hlinkClick r:id="rId2"/>
+              </a:rPr>
+              <a:t>OpenSSF</a:t>
+            </a:r>
             <a:r>
               <a:rPr lang="en-US" dirty="0">
                 <a:hlinkClick r:id="rId2"/>
               </a:rPr>
-              <a:t>Nightmare</a:t>
+              <a:t> Compiler Options Hardening Guide for C and C++</a:t>
             </a:r>
             <a:endParaRPr lang="en-US" dirty="0"/>
           </a:p>
@@ -5468,35 +5476,52 @@
               <a:rPr lang="en-US" dirty="0">
                 <a:hlinkClick r:id="rId3"/>
               </a:rPr>
-              <a:t>Overview of GLIBC heap exploitation techniques</a:t>
+              <a:t>Linux Hardening Guide</a:t>
             </a:r>
             <a:endParaRPr lang="en-US" dirty="0"/>
           </a:p>
           <a:p>
             <a:r>
               <a:rPr lang="ru-RU" dirty="0"/>
-              <a:t>Руководства по </a:t>
-            </a:r>
-            <a:r>
-              <a:rPr lang="en-US" dirty="0"/>
-              <a:t>hardening</a:t>
-            </a:r>
+              <a:t>Обзоры</a:t>
+            </a:r>
+            <a:r>
+              <a:rPr lang="en-US" dirty="0"/>
+              <a:t>:</a:t>
+            </a:r>
+            <a:endParaRPr lang="ru-RU" dirty="0"/>
           </a:p>
           <a:p>
             <a:pPr lvl="1"/>
             <a:r>
-              <a:rPr lang="en-US" dirty="0" err="1">
+              <a:rPr lang="ru-RU" dirty="0">
                 <a:hlinkClick r:id="rId4"/>
               </a:rPr>
-              <a:t>OpenSSF</a:t>
-            </a:r>
-            <a:r>
-              <a:rPr lang="en-US" dirty="0">
-                <a:hlinkClick r:id="rId4"/>
-              </a:rPr>
-              <a:t> Compiler Options Hardening Guide for C and C++</a:t>
-            </a:r>
-            <a:endParaRPr lang="en-US" dirty="0"/>
+              <a:t>Обзор механизмов усиления защищенности операционных систем и пользовательских приложений</a:t>
+            </a:r>
+            <a:r>
+              <a:rPr lang="en-US" dirty="0"/>
+              <a:t> (</a:t>
+            </a:r>
+            <a:r>
+              <a:rPr lang="ru-RU" dirty="0"/>
+              <a:t>ИСП РАН</a:t>
+            </a:r>
+            <a:r>
+              <a:rPr lang="en-US" dirty="0"/>
+              <a:t>)</a:t>
+            </a:r>
+            <a:endParaRPr lang="ru-RU" dirty="0"/>
+          </a:p>
+          <a:p>
+            <a:r>
+              <a:rPr lang="ru-RU" dirty="0"/>
+              <a:t>Примеры атак</a:t>
+            </a:r>
+            <a:r>
+              <a:rPr lang="en-US" dirty="0"/>
+              <a:t>:</a:t>
+            </a:r>
           </a:p>
           <a:p>
             <a:pPr lvl="1"/>
@@ -5504,7 +5529,17 @@
               <a:rPr lang="en-US" dirty="0">
                 <a:hlinkClick r:id="rId5"/>
               </a:rPr>
-              <a:t>Linux Hardening Guide</a:t>
+              <a:t>Nightmare</a:t>
+            </a:r>
+            <a:endParaRPr lang="en-US" dirty="0"/>
+          </a:p>
+          <a:p>
+            <a:pPr lvl="1"/>
+            <a:r>
+              <a:rPr lang="en-US" dirty="0">
+                <a:hlinkClick r:id="rId6"/>
+              </a:rPr>
+              <a:t>Overview of GLIBC heap exploitation techniques</a:t>
             </a:r>
             <a:endParaRPr lang="en-US" dirty="0"/>
           </a:p>
@@ -5538,7 +5573,7 @@
             <a:pPr lvl="1"/>
             <a:r>
               <a:rPr lang="en-US" dirty="0">
-                <a:hlinkClick r:id="rId6"/>
+                <a:hlinkClick r:id="rId7"/>
               </a:rPr>
               <a:t>A Guide to Undefined Behavior in C and C++</a:t>
             </a:r>
@@ -5548,7 +5583,7 @@
             <a:pPr lvl="1"/>
             <a:r>
               <a:rPr lang="en-US" dirty="0">
-                <a:hlinkClick r:id="rId7"/>
+                <a:hlinkClick r:id="rId8"/>
               </a:rPr>
               <a:t>UB in 2017</a:t>
             </a:r>
@@ -12696,7 +12731,7 @@
           <a:p>
             <a:r>
               <a:rPr lang="ru-RU" dirty="0"/>
-              <a:t>Средства отлова и</a:t>
+              <a:t>Средства обнаружения и</a:t>
             </a:r>
             <a:r>
               <a:rPr lang="en-US" dirty="0"/>
@@ -12711,7 +12746,15 @@
             <a:pPr lvl="1"/>
             <a:r>
               <a:rPr lang="ru-RU" dirty="0"/>
-              <a:t>Выход за границу буфера, обращение по невалидному адресу, использование неинициализированных переменных и т.п</a:t>
+              <a:t>Выход за границу буфера, обращение по невалидному адресу</a:t>
+            </a:r>
+            <a:r>
+              <a:rPr lang="ru-RU"/>
+              <a:t>, переполнение целочисленной переменной </a:t>
+            </a:r>
+            <a:r>
+              <a:rPr lang="ru-RU" dirty="0"/>
+              <a:t>и т.п</a:t>
             </a:r>
           </a:p>
           <a:p>

</xml_diff>

<commit_message>
Added conclusions + minor fixes.
</commit_message>
<xml_diff>
--- a/CppZeroCost/2025/RU.pptx
+++ b/CppZeroCost/2025/RU.pptx
@@ -5,7 +5,7 @@
     <p:sldMasterId id="2147483648" r:id="rId1"/>
   </p:sldMasterIdLst>
   <p:notesMasterIdLst>
-    <p:notesMasterId r:id="rId123"/>
+    <p:notesMasterId r:id="rId124"/>
   </p:notesMasterIdLst>
   <p:sldIdLst>
     <p:sldId id="256" r:id="rId2"/>
@@ -110,25 +110,26 @@
     <p:sldId id="377" r:id="rId101"/>
     <p:sldId id="378" r:id="rId102"/>
     <p:sldId id="330" r:id="rId103"/>
-    <p:sldId id="345" r:id="rId104"/>
-    <p:sldId id="360" r:id="rId105"/>
-    <p:sldId id="356" r:id="rId106"/>
-    <p:sldId id="346" r:id="rId107"/>
-    <p:sldId id="359" r:id="rId108"/>
-    <p:sldId id="270" r:id="rId109"/>
-    <p:sldId id="347" r:id="rId110"/>
-    <p:sldId id="271" r:id="rId111"/>
-    <p:sldId id="274" r:id="rId112"/>
-    <p:sldId id="286" r:id="rId113"/>
-    <p:sldId id="278" r:id="rId114"/>
-    <p:sldId id="292" r:id="rId115"/>
-    <p:sldId id="298" r:id="rId116"/>
-    <p:sldId id="304" r:id="rId117"/>
-    <p:sldId id="310" r:id="rId118"/>
-    <p:sldId id="317" r:id="rId119"/>
-    <p:sldId id="322" r:id="rId120"/>
-    <p:sldId id="339" r:id="rId121"/>
-    <p:sldId id="338" r:id="rId122"/>
+    <p:sldId id="380" r:id="rId104"/>
+    <p:sldId id="345" r:id="rId105"/>
+    <p:sldId id="360" r:id="rId106"/>
+    <p:sldId id="356" r:id="rId107"/>
+    <p:sldId id="346" r:id="rId108"/>
+    <p:sldId id="359" r:id="rId109"/>
+    <p:sldId id="270" r:id="rId110"/>
+    <p:sldId id="347" r:id="rId111"/>
+    <p:sldId id="271" r:id="rId112"/>
+    <p:sldId id="274" r:id="rId113"/>
+    <p:sldId id="286" r:id="rId114"/>
+    <p:sldId id="278" r:id="rId115"/>
+    <p:sldId id="292" r:id="rId116"/>
+    <p:sldId id="298" r:id="rId117"/>
+    <p:sldId id="304" r:id="rId118"/>
+    <p:sldId id="310" r:id="rId119"/>
+    <p:sldId id="317" r:id="rId120"/>
+    <p:sldId id="322" r:id="rId121"/>
+    <p:sldId id="339" r:id="rId122"/>
+    <p:sldId id="338" r:id="rId123"/>
   </p:sldIdLst>
   <p:sldSz cx="12192000" cy="6858000"/>
   <p:notesSz cx="6858000" cy="9144000"/>
@@ -317,7 +318,7 @@
           <a:p>
             <a:fld id="{A8F27B54-EFD4-4F1F-9CE4-9A3C368187A4}" type="datetimeFigureOut">
               <a:rPr lang="en-US" smtClean="0"/>
-              <a:t>7/26/2025</a:t>
+              <a:t>7/27/2025</a:t>
             </a:fld>
             <a:endParaRPr lang="en-US"/>
           </a:p>
@@ -731,7 +732,7 @@
           <a:p>
             <a:fld id="{4E570717-CC08-42AC-84F3-7EB74EE2C2EE}" type="datetime1">
               <a:rPr lang="en-US" smtClean="0"/>
-              <a:t>7/26/2025</a:t>
+              <a:t>7/27/2025</a:t>
             </a:fld>
             <a:endParaRPr lang="en-US"/>
           </a:p>
@@ -929,7 +930,7 @@
           <a:p>
             <a:fld id="{E850434B-ABC0-4013-A159-517880C2CE4B}" type="datetime1">
               <a:rPr lang="en-US" smtClean="0"/>
-              <a:t>7/26/2025</a:t>
+              <a:t>7/27/2025</a:t>
             </a:fld>
             <a:endParaRPr lang="en-US"/>
           </a:p>
@@ -1137,7 +1138,7 @@
           <a:p>
             <a:fld id="{307E2251-42B8-4CD0-9F76-CE8A218C5A9B}" type="datetime1">
               <a:rPr lang="en-US" smtClean="0"/>
-              <a:t>7/26/2025</a:t>
+              <a:t>7/27/2025</a:t>
             </a:fld>
             <a:endParaRPr lang="en-US"/>
           </a:p>
@@ -1335,7 +1336,7 @@
           <a:p>
             <a:fld id="{650366BD-2959-43A5-9C43-B178997CA9C1}" type="datetime1">
               <a:rPr lang="en-US" smtClean="0"/>
-              <a:t>7/26/2025</a:t>
+              <a:t>7/27/2025</a:t>
             </a:fld>
             <a:endParaRPr lang="en-US"/>
           </a:p>
@@ -1610,7 +1611,7 @@
           <a:p>
             <a:fld id="{44A443A2-278A-4AA2-A6FA-B813D9AB289B}" type="datetime1">
               <a:rPr lang="en-US" smtClean="0"/>
-              <a:t>7/26/2025</a:t>
+              <a:t>7/27/2025</a:t>
             </a:fld>
             <a:endParaRPr lang="en-US"/>
           </a:p>
@@ -1875,7 +1876,7 @@
           <a:p>
             <a:fld id="{8DB96CD0-8DC9-4D9E-8F97-A64EB549E498}" type="datetime1">
               <a:rPr lang="en-US" smtClean="0"/>
-              <a:t>7/26/2025</a:t>
+              <a:t>7/27/2025</a:t>
             </a:fld>
             <a:endParaRPr lang="en-US"/>
           </a:p>
@@ -2287,7 +2288,7 @@
           <a:p>
             <a:fld id="{8728ABDD-F7C0-49E5-BDEF-78EEAB9D4FF0}" type="datetime1">
               <a:rPr lang="en-US" smtClean="0"/>
-              <a:t>7/26/2025</a:t>
+              <a:t>7/27/2025</a:t>
             </a:fld>
             <a:endParaRPr lang="en-US"/>
           </a:p>
@@ -2428,7 +2429,7 @@
           <a:p>
             <a:fld id="{1815E602-B233-4072-AF5E-EEC16D6A3250}" type="datetime1">
               <a:rPr lang="en-US" smtClean="0"/>
-              <a:t>7/26/2025</a:t>
+              <a:t>7/27/2025</a:t>
             </a:fld>
             <a:endParaRPr lang="en-US"/>
           </a:p>
@@ -2541,7 +2542,7 @@
           <a:p>
             <a:fld id="{B46368E2-0F8E-43F1-B205-4CE4ED81C818}" type="datetime1">
               <a:rPr lang="en-US" smtClean="0"/>
-              <a:t>7/26/2025</a:t>
+              <a:t>7/27/2025</a:t>
             </a:fld>
             <a:endParaRPr lang="en-US"/>
           </a:p>
@@ -2852,7 +2853,7 @@
           <a:p>
             <a:fld id="{A90826D4-3247-4C35-B745-95D9A6527E86}" type="datetime1">
               <a:rPr lang="en-US" smtClean="0"/>
-              <a:t>7/26/2025</a:t>
+              <a:t>7/27/2025</a:t>
             </a:fld>
             <a:endParaRPr lang="en-US"/>
           </a:p>
@@ -3140,7 +3141,7 @@
           <a:p>
             <a:fld id="{F697CA6C-CB8E-4E4E-A40B-CF748107F47F}" type="datetime1">
               <a:rPr lang="en-US" smtClean="0"/>
-              <a:t>7/26/2025</a:t>
+              <a:t>7/27/2025</a:t>
             </a:fld>
             <a:endParaRPr lang="en-US"/>
           </a:p>
@@ -3381,7 +3382,7 @@
           <a:p>
             <a:fld id="{486D2D92-9836-4BF5-99A8-6BBA488E0F07}" type="datetime1">
               <a:rPr lang="en-US" smtClean="0"/>
-              <a:t>7/26/2025</a:t>
+              <a:t>7/27/2025</a:t>
             </a:fld>
             <a:endParaRPr lang="en-US"/>
           </a:p>
@@ -4450,7 +4451,7 @@
           <a:p>
             <a:r>
               <a:rPr lang="ru-RU" dirty="0"/>
-              <a:t>Будет ли единым механизмом для унификации </a:t>
+              <a:t>Станут ли профили единым механизмом для унификации </a:t>
             </a:r>
             <a:r>
               <a:rPr lang="en-US" dirty="0"/>
@@ -4514,7 +4515,7 @@
         </p:blipFill>
         <p:spPr>
           <a:xfrm>
-            <a:off x="6797655" y="2864464"/>
+            <a:off x="6797655" y="2828604"/>
             <a:ext cx="5256128" cy="2959803"/>
           </a:xfrm>
           <a:prstGeom prst="rect">
@@ -4670,7 +4671,7 @@
           <p:cNvPr id="2" name="Title 1">
             <a:extLst>
               <a:ext uri="{FF2B5EF4-FFF2-40B4-BE49-F238E27FC236}">
-                <a16:creationId xmlns:a16="http://schemas.microsoft.com/office/drawing/2014/main" id="{527B94E6-AC75-496A-80B4-C52365ABC84D}"/>
+                <a16:creationId xmlns:a16="http://schemas.microsoft.com/office/drawing/2014/main" id="{D9FB29DB-6EB1-4484-8B38-F0A4A0326D8B}"/>
               </a:ext>
             </a:extLst>
           </p:cNvPr>
@@ -4681,24 +4682,79 @@
             <p:ph type="title"/>
           </p:nvPr>
         </p:nvSpPr>
-        <p:spPr>
-          <a:xfrm>
-            <a:off x="838200" y="18255"/>
-            <a:ext cx="10515600" cy="1325563"/>
-          </a:xfrm>
-        </p:spPr>
+        <p:spPr/>
         <p:txBody>
           <a:bodyPr/>
           <a:lstStyle/>
           <a:p>
             <a:r>
               <a:rPr lang="ru-RU" dirty="0"/>
-              <a:t>Что стоит сделать </a:t>
-            </a:r>
-            <a:r>
-              <a:rPr lang="en-US" dirty="0"/>
-              <a:t>?</a:t>
-            </a:r>
+              <a:t>Выводы</a:t>
+            </a:r>
+            <a:endParaRPr lang="en-US" dirty="0"/>
+          </a:p>
+        </p:txBody>
+      </p:sp>
+      <p:sp>
+        <p:nvSpPr>
+          <p:cNvPr id="3" name="Content Placeholder 2">
+            <a:extLst>
+              <a:ext uri="{FF2B5EF4-FFF2-40B4-BE49-F238E27FC236}">
+                <a16:creationId xmlns:a16="http://schemas.microsoft.com/office/drawing/2014/main" id="{C6FE0A17-5713-4285-992A-27DF0DA5ADB3}"/>
+              </a:ext>
+            </a:extLst>
+          </p:cNvPr>
+          <p:cNvSpPr>
+            <a:spLocks noGrp="1"/>
+          </p:cNvSpPr>
+          <p:nvPr>
+            <p:ph idx="1"/>
+          </p:nvPr>
+        </p:nvSpPr>
+        <p:spPr/>
+        <p:txBody>
+          <a:bodyPr/>
+          <a:lstStyle/>
+          <a:p>
+            <a:r>
+              <a:rPr lang="en-US" dirty="0"/>
+              <a:t>Hardening </a:t>
+            </a:r>
+            <a:r>
+              <a:rPr lang="ru-RU" dirty="0"/>
+              <a:t>это</a:t>
+            </a:r>
+            <a:r>
+              <a:rPr lang="en-US" dirty="0"/>
+              <a:t> state-of-the-art </a:t>
+            </a:r>
+            <a:r>
+              <a:rPr lang="ru-RU" dirty="0"/>
+              <a:t>часть разработки современного ПО</a:t>
+            </a:r>
+            <a:endParaRPr lang="en-US" dirty="0"/>
+          </a:p>
+          <a:p>
+            <a:r>
+              <a:rPr lang="ru-RU" dirty="0"/>
+              <a:t>Существует большое количество методов с разной степенью защиты и оверхеда</a:t>
+            </a:r>
+          </a:p>
+          <a:p>
+            <a:r>
+              <a:rPr lang="ru-RU" dirty="0"/>
+              <a:t>Они будут всё больше использоваться на практике из-за требований заказчиков и регуляторов</a:t>
+            </a:r>
+          </a:p>
+          <a:p>
+            <a:pPr lvl="1"/>
+            <a:r>
+              <a:rPr lang="ru-RU" dirty="0"/>
+              <a:t>В том числе стандартизовываться в языке</a:t>
+            </a:r>
+          </a:p>
+          <a:p>
+            <a:endParaRPr lang="en-US" dirty="0"/>
           </a:p>
         </p:txBody>
       </p:sp>
@@ -4707,7 +4763,7 @@
           <p:cNvPr id="4" name="Slide Number Placeholder 3">
             <a:extLst>
               <a:ext uri="{FF2B5EF4-FFF2-40B4-BE49-F238E27FC236}">
-                <a16:creationId xmlns:a16="http://schemas.microsoft.com/office/drawing/2014/main" id="{2AD9F63E-EF6A-418A-B986-AFC03C54C97A}"/>
+                <a16:creationId xmlns:a16="http://schemas.microsoft.com/office/drawing/2014/main" id="{C3402B22-D0AB-40C0-8DB6-254B6E0190B1}"/>
               </a:ext>
             </a:extLst>
           </p:cNvPr>
@@ -4731,374 +4787,10 @@
           </a:p>
         </p:txBody>
       </p:sp>
-      <p:sp>
-        <p:nvSpPr>
-          <p:cNvPr id="11" name="Content Placeholder 2">
-            <a:extLst>
-              <a:ext uri="{FF2B5EF4-FFF2-40B4-BE49-F238E27FC236}">
-                <a16:creationId xmlns:a16="http://schemas.microsoft.com/office/drawing/2014/main" id="{8EA9C31B-4E86-4B0E-A53A-AA39A4B9C3E6}"/>
-              </a:ext>
-            </a:extLst>
-          </p:cNvPr>
-          <p:cNvSpPr txBox="1">
-            <a:spLocks/>
-          </p:cNvSpPr>
-          <p:nvPr/>
-        </p:nvSpPr>
-        <p:spPr>
-          <a:xfrm>
-            <a:off x="838200" y="1825625"/>
-            <a:ext cx="10515600" cy="4351338"/>
-          </a:xfrm>
-          <a:prstGeom prst="rect">
-            <a:avLst/>
-          </a:prstGeom>
-        </p:spPr>
-        <p:txBody>
-          <a:bodyPr vert="horz" lIns="91440" tIns="45720" rIns="91440" bIns="45720" rtlCol="0">
-            <a:normAutofit/>
-          </a:bodyPr>
-          <a:lstStyle>
-            <a:lvl1pPr marL="228600" indent="-228600" algn="l" defTabSz="914400" rtl="0" eaLnBrk="1" latinLnBrk="0" hangingPunct="1">
-              <a:lnSpc>
-                <a:spcPct val="90000"/>
-              </a:lnSpc>
-              <a:spcBef>
-                <a:spcPts val="1000"/>
-              </a:spcBef>
-              <a:buFont typeface="Arial" panose="020B0604020202020204" pitchFamily="34" charset="0"/>
-              <a:buChar char="•"/>
-              <a:defRPr sz="2800" kern="1200">
-                <a:solidFill>
-                  <a:schemeClr val="tx1"/>
-                </a:solidFill>
-                <a:latin typeface="+mn-lt"/>
-                <a:ea typeface="+mn-ea"/>
-                <a:cs typeface="+mn-cs"/>
-              </a:defRPr>
-            </a:lvl1pPr>
-            <a:lvl2pPr marL="685800" indent="-228600" algn="l" defTabSz="914400" rtl="0" eaLnBrk="1" latinLnBrk="0" hangingPunct="1">
-              <a:lnSpc>
-                <a:spcPct val="90000"/>
-              </a:lnSpc>
-              <a:spcBef>
-                <a:spcPts val="500"/>
-              </a:spcBef>
-              <a:buFont typeface="Arial" panose="020B0604020202020204" pitchFamily="34" charset="0"/>
-              <a:buChar char="•"/>
-              <a:defRPr sz="2400" kern="1200">
-                <a:solidFill>
-                  <a:schemeClr val="tx1"/>
-                </a:solidFill>
-                <a:latin typeface="+mn-lt"/>
-                <a:ea typeface="+mn-ea"/>
-                <a:cs typeface="+mn-cs"/>
-              </a:defRPr>
-            </a:lvl2pPr>
-            <a:lvl3pPr marL="1143000" indent="-228600" algn="l" defTabSz="914400" rtl="0" eaLnBrk="1" latinLnBrk="0" hangingPunct="1">
-              <a:lnSpc>
-                <a:spcPct val="90000"/>
-              </a:lnSpc>
-              <a:spcBef>
-                <a:spcPts val="500"/>
-              </a:spcBef>
-              <a:buFont typeface="Arial" panose="020B0604020202020204" pitchFamily="34" charset="0"/>
-              <a:buChar char="•"/>
-              <a:defRPr sz="2000" kern="1200">
-                <a:solidFill>
-                  <a:schemeClr val="tx1"/>
-                </a:solidFill>
-                <a:latin typeface="+mn-lt"/>
-                <a:ea typeface="+mn-ea"/>
-                <a:cs typeface="+mn-cs"/>
-              </a:defRPr>
-            </a:lvl3pPr>
-            <a:lvl4pPr marL="1600200" indent="-228600" algn="l" defTabSz="914400" rtl="0" eaLnBrk="1" latinLnBrk="0" hangingPunct="1">
-              <a:lnSpc>
-                <a:spcPct val="90000"/>
-              </a:lnSpc>
-              <a:spcBef>
-                <a:spcPts val="500"/>
-              </a:spcBef>
-              <a:buFont typeface="Arial" panose="020B0604020202020204" pitchFamily="34" charset="0"/>
-              <a:buChar char="•"/>
-              <a:defRPr sz="1800" kern="1200">
-                <a:solidFill>
-                  <a:schemeClr val="tx1"/>
-                </a:solidFill>
-                <a:latin typeface="+mn-lt"/>
-                <a:ea typeface="+mn-ea"/>
-                <a:cs typeface="+mn-cs"/>
-              </a:defRPr>
-            </a:lvl4pPr>
-            <a:lvl5pPr marL="2057400" indent="-228600" algn="l" defTabSz="914400" rtl="0" eaLnBrk="1" latinLnBrk="0" hangingPunct="1">
-              <a:lnSpc>
-                <a:spcPct val="90000"/>
-              </a:lnSpc>
-              <a:spcBef>
-                <a:spcPts val="500"/>
-              </a:spcBef>
-              <a:buFont typeface="Arial" panose="020B0604020202020204" pitchFamily="34" charset="0"/>
-              <a:buChar char="•"/>
-              <a:defRPr sz="1800" kern="1200">
-                <a:solidFill>
-                  <a:schemeClr val="tx1"/>
-                </a:solidFill>
-                <a:latin typeface="+mn-lt"/>
-                <a:ea typeface="+mn-ea"/>
-                <a:cs typeface="+mn-cs"/>
-              </a:defRPr>
-            </a:lvl5pPr>
-            <a:lvl6pPr marL="2514600" indent="-228600" algn="l" defTabSz="914400" rtl="0" eaLnBrk="1" latinLnBrk="0" hangingPunct="1">
-              <a:lnSpc>
-                <a:spcPct val="90000"/>
-              </a:lnSpc>
-              <a:spcBef>
-                <a:spcPts val="500"/>
-              </a:spcBef>
-              <a:buFont typeface="Arial" panose="020B0604020202020204" pitchFamily="34" charset="0"/>
-              <a:buChar char="•"/>
-              <a:defRPr sz="1800" kern="1200">
-                <a:solidFill>
-                  <a:schemeClr val="tx1"/>
-                </a:solidFill>
-                <a:latin typeface="+mn-lt"/>
-                <a:ea typeface="+mn-ea"/>
-                <a:cs typeface="+mn-cs"/>
-              </a:defRPr>
-            </a:lvl6pPr>
-            <a:lvl7pPr marL="2971800" indent="-228600" algn="l" defTabSz="914400" rtl="0" eaLnBrk="1" latinLnBrk="0" hangingPunct="1">
-              <a:lnSpc>
-                <a:spcPct val="90000"/>
-              </a:lnSpc>
-              <a:spcBef>
-                <a:spcPts val="500"/>
-              </a:spcBef>
-              <a:buFont typeface="Arial" panose="020B0604020202020204" pitchFamily="34" charset="0"/>
-              <a:buChar char="•"/>
-              <a:defRPr sz="1800" kern="1200">
-                <a:solidFill>
-                  <a:schemeClr val="tx1"/>
-                </a:solidFill>
-                <a:latin typeface="+mn-lt"/>
-                <a:ea typeface="+mn-ea"/>
-                <a:cs typeface="+mn-cs"/>
-              </a:defRPr>
-            </a:lvl7pPr>
-            <a:lvl8pPr marL="3429000" indent="-228600" algn="l" defTabSz="914400" rtl="0" eaLnBrk="1" latinLnBrk="0" hangingPunct="1">
-              <a:lnSpc>
-                <a:spcPct val="90000"/>
-              </a:lnSpc>
-              <a:spcBef>
-                <a:spcPts val="500"/>
-              </a:spcBef>
-              <a:buFont typeface="Arial" panose="020B0604020202020204" pitchFamily="34" charset="0"/>
-              <a:buChar char="•"/>
-              <a:defRPr sz="1800" kern="1200">
-                <a:solidFill>
-                  <a:schemeClr val="tx1"/>
-                </a:solidFill>
-                <a:latin typeface="+mn-lt"/>
-                <a:ea typeface="+mn-ea"/>
-                <a:cs typeface="+mn-cs"/>
-              </a:defRPr>
-            </a:lvl8pPr>
-            <a:lvl9pPr marL="3886200" indent="-228600" algn="l" defTabSz="914400" rtl="0" eaLnBrk="1" latinLnBrk="0" hangingPunct="1">
-              <a:lnSpc>
-                <a:spcPct val="90000"/>
-              </a:lnSpc>
-              <a:spcBef>
-                <a:spcPts val="500"/>
-              </a:spcBef>
-              <a:buFont typeface="Arial" panose="020B0604020202020204" pitchFamily="34" charset="0"/>
-              <a:buChar char="•"/>
-              <a:defRPr sz="1800" kern="1200">
-                <a:solidFill>
-                  <a:schemeClr val="tx1"/>
-                </a:solidFill>
-                <a:latin typeface="+mn-lt"/>
-                <a:ea typeface="+mn-ea"/>
-                <a:cs typeface="+mn-cs"/>
-              </a:defRPr>
-            </a:lvl9pPr>
-          </a:lstStyle>
-          <a:p>
-            <a:r>
-              <a:rPr lang="ru-RU" dirty="0"/>
-              <a:t>Проверить опции сборки продуктового кода и дистрибутива</a:t>
-            </a:r>
-          </a:p>
-          <a:p>
-            <a:r>
-              <a:rPr lang="ru-RU" dirty="0"/>
-              <a:t>Решить с Security Team какие hardening-методы включить и где</a:t>
-            </a:r>
-            <a:endParaRPr lang="en-US" dirty="0"/>
-          </a:p>
-          <a:p>
-            <a:r>
-              <a:rPr lang="ru-RU" dirty="0"/>
-              <a:t>Минимальный рекомендуемый набор</a:t>
-            </a:r>
-            <a:r>
-              <a:rPr lang="en-US" dirty="0"/>
-              <a:t>:</a:t>
-            </a:r>
-          </a:p>
-          <a:p>
-            <a:pPr lvl="1"/>
-            <a:r>
-              <a:rPr lang="en-US" dirty="0"/>
-              <a:t>ASLR (-</a:t>
-            </a:r>
-            <a:r>
-              <a:rPr lang="en-US" dirty="0" err="1"/>
-              <a:t>fPIE</a:t>
-            </a:r>
-            <a:r>
-              <a:rPr lang="en-US" dirty="0"/>
-              <a:t> -pie)</a:t>
-            </a:r>
-            <a:endParaRPr lang="ru-RU" dirty="0"/>
-          </a:p>
-          <a:p>
-            <a:pPr lvl="1"/>
-            <a:r>
-              <a:rPr lang="en-US" dirty="0"/>
-              <a:t>Stack Protector (-</a:t>
-            </a:r>
-            <a:r>
-              <a:rPr lang="en-US" dirty="0" err="1"/>
-              <a:t>fstack</a:t>
-            </a:r>
-            <a:r>
-              <a:rPr lang="en-US" dirty="0"/>
-              <a:t>-protector-strong)</a:t>
-            </a:r>
-          </a:p>
-          <a:p>
-            <a:pPr lvl="1"/>
-            <a:r>
-              <a:rPr lang="ru-RU" dirty="0"/>
-              <a:t>Фортификация (-</a:t>
-            </a:r>
-            <a:r>
-              <a:rPr lang="en-US" dirty="0"/>
-              <a:t>D_FORTIFY_SOURCE=2)</a:t>
-            </a:r>
-          </a:p>
-          <a:p>
-            <a:pPr lvl="1"/>
-            <a:r>
-              <a:rPr lang="en-US" dirty="0"/>
-              <a:t>Full RELRO (-</a:t>
-            </a:r>
-            <a:r>
-              <a:rPr lang="en-US" dirty="0" err="1"/>
-              <a:t>Wl</a:t>
-            </a:r>
-            <a:r>
-              <a:rPr lang="en-US" dirty="0"/>
-              <a:t>,-</a:t>
-            </a:r>
-            <a:r>
-              <a:rPr lang="en-US" dirty="0" err="1"/>
-              <a:t>z,relro</a:t>
-            </a:r>
-            <a:r>
-              <a:rPr lang="en-US" dirty="0"/>
-              <a:t> -</a:t>
-            </a:r>
-            <a:r>
-              <a:rPr lang="en-US" dirty="0" err="1"/>
-              <a:t>Wl</a:t>
-            </a:r>
-            <a:r>
-              <a:rPr lang="en-US" dirty="0"/>
-              <a:t>,-</a:t>
-            </a:r>
-            <a:r>
-              <a:rPr lang="en-US" dirty="0" err="1"/>
-              <a:t>z,now</a:t>
-            </a:r>
-            <a:r>
-              <a:rPr lang="en-US" dirty="0"/>
-              <a:t>)</a:t>
-            </a:r>
-          </a:p>
-          <a:p>
-            <a:pPr lvl="1"/>
-            <a:r>
-              <a:rPr lang="ru-RU" dirty="0"/>
-              <a:t>Защита от </a:t>
-            </a:r>
-            <a:r>
-              <a:rPr lang="en-US" dirty="0"/>
-              <a:t>Stack Clash</a:t>
-            </a:r>
-            <a:r>
-              <a:rPr lang="ru-RU" dirty="0"/>
-              <a:t> </a:t>
-            </a:r>
-            <a:r>
-              <a:rPr lang="en-US" dirty="0"/>
-              <a:t>(-</a:t>
-            </a:r>
-            <a:r>
-              <a:rPr lang="en-US" dirty="0" err="1"/>
-              <a:t>fstack</a:t>
-            </a:r>
-            <a:r>
-              <a:rPr lang="en-US" dirty="0"/>
-              <a:t>-clash-protection)</a:t>
-            </a:r>
-            <a:endParaRPr lang="ru-RU" dirty="0"/>
-          </a:p>
-          <a:p>
-            <a:pPr lvl="1"/>
-            <a:r>
-              <a:rPr lang="en-US" dirty="0"/>
-              <a:t>Control-flow Integrity (-</a:t>
-            </a:r>
-            <a:r>
-              <a:rPr lang="en-US" dirty="0" err="1"/>
-              <a:t>fcf</a:t>
-            </a:r>
-            <a:r>
-              <a:rPr lang="en-US" dirty="0"/>
-              <a:t>-protection </a:t>
-            </a:r>
-            <a:r>
-              <a:rPr lang="ru-RU" dirty="0"/>
-              <a:t>на </a:t>
-            </a:r>
-            <a:r>
-              <a:rPr lang="en-US" dirty="0"/>
-              <a:t>X86, -</a:t>
-            </a:r>
-            <a:r>
-              <a:rPr lang="en-US" dirty="0" err="1"/>
-              <a:t>mbranch</a:t>
-            </a:r>
-            <a:r>
-              <a:rPr lang="en-US" dirty="0"/>
-              <a:t>-protection </a:t>
-            </a:r>
-            <a:r>
-              <a:rPr lang="ru-RU" dirty="0"/>
-              <a:t>на </a:t>
-            </a:r>
-            <a:r>
-              <a:rPr lang="en-US" dirty="0"/>
-              <a:t>AArch64)</a:t>
-            </a:r>
-          </a:p>
-        </p:txBody>
-      </p:sp>
     </p:spTree>
     <p:extLst>
       <p:ext uri="{BB962C8B-B14F-4D97-AF65-F5344CB8AC3E}">
-        <p14:creationId xmlns:p14="http://schemas.microsoft.com/office/powerpoint/2010/main" val="1359780015"/>
+        <p14:creationId xmlns:p14="http://schemas.microsoft.com/office/powerpoint/2010/main" val="412102781"/>
       </p:ext>
     </p:extLst>
   </p:cSld>
@@ -5164,6 +4856,474 @@
       </p:sp>
       <p:sp>
         <p:nvSpPr>
+          <p:cNvPr id="4" name="Slide Number Placeholder 3">
+            <a:extLst>
+              <a:ext uri="{FF2B5EF4-FFF2-40B4-BE49-F238E27FC236}">
+                <a16:creationId xmlns:a16="http://schemas.microsoft.com/office/drawing/2014/main" id="{2AD9F63E-EF6A-418A-B986-AFC03C54C97A}"/>
+              </a:ext>
+            </a:extLst>
+          </p:cNvPr>
+          <p:cNvSpPr>
+            <a:spLocks noGrp="1"/>
+          </p:cNvSpPr>
+          <p:nvPr>
+            <p:ph type="sldNum" sz="quarter" idx="12"/>
+          </p:nvPr>
+        </p:nvSpPr>
+        <p:spPr/>
+        <p:txBody>
+          <a:bodyPr/>
+          <a:lstStyle/>
+          <a:p>
+            <a:fld id="{9077AC13-74B0-42BB-979A-B4FD3BCA574B}" type="slidenum">
+              <a:rPr lang="en-US" smtClean="0"/>
+              <a:t>104</a:t>
+            </a:fld>
+            <a:endParaRPr lang="en-US"/>
+          </a:p>
+        </p:txBody>
+      </p:sp>
+      <p:sp>
+        <p:nvSpPr>
+          <p:cNvPr id="11" name="Content Placeholder 2">
+            <a:extLst>
+              <a:ext uri="{FF2B5EF4-FFF2-40B4-BE49-F238E27FC236}">
+                <a16:creationId xmlns:a16="http://schemas.microsoft.com/office/drawing/2014/main" id="{8EA9C31B-4E86-4B0E-A53A-AA39A4B9C3E6}"/>
+              </a:ext>
+            </a:extLst>
+          </p:cNvPr>
+          <p:cNvSpPr txBox="1">
+            <a:spLocks/>
+          </p:cNvSpPr>
+          <p:nvPr/>
+        </p:nvSpPr>
+        <p:spPr>
+          <a:xfrm>
+            <a:off x="838200" y="1825625"/>
+            <a:ext cx="10515600" cy="4351338"/>
+          </a:xfrm>
+          <a:prstGeom prst="rect">
+            <a:avLst/>
+          </a:prstGeom>
+        </p:spPr>
+        <p:txBody>
+          <a:bodyPr vert="horz" lIns="91440" tIns="45720" rIns="91440" bIns="45720" rtlCol="0">
+            <a:normAutofit fontScale="92500"/>
+          </a:bodyPr>
+          <a:lstStyle>
+            <a:lvl1pPr marL="228600" indent="-228600" algn="l" defTabSz="914400" rtl="0" eaLnBrk="1" latinLnBrk="0" hangingPunct="1">
+              <a:lnSpc>
+                <a:spcPct val="90000"/>
+              </a:lnSpc>
+              <a:spcBef>
+                <a:spcPts val="1000"/>
+              </a:spcBef>
+              <a:buFont typeface="Arial" panose="020B0604020202020204" pitchFamily="34" charset="0"/>
+              <a:buChar char="•"/>
+              <a:defRPr sz="2800" kern="1200">
+                <a:solidFill>
+                  <a:schemeClr val="tx1"/>
+                </a:solidFill>
+                <a:latin typeface="+mn-lt"/>
+                <a:ea typeface="+mn-ea"/>
+                <a:cs typeface="+mn-cs"/>
+              </a:defRPr>
+            </a:lvl1pPr>
+            <a:lvl2pPr marL="685800" indent="-228600" algn="l" defTabSz="914400" rtl="0" eaLnBrk="1" latinLnBrk="0" hangingPunct="1">
+              <a:lnSpc>
+                <a:spcPct val="90000"/>
+              </a:lnSpc>
+              <a:spcBef>
+                <a:spcPts val="500"/>
+              </a:spcBef>
+              <a:buFont typeface="Arial" panose="020B0604020202020204" pitchFamily="34" charset="0"/>
+              <a:buChar char="•"/>
+              <a:defRPr sz="2400" kern="1200">
+                <a:solidFill>
+                  <a:schemeClr val="tx1"/>
+                </a:solidFill>
+                <a:latin typeface="+mn-lt"/>
+                <a:ea typeface="+mn-ea"/>
+                <a:cs typeface="+mn-cs"/>
+              </a:defRPr>
+            </a:lvl2pPr>
+            <a:lvl3pPr marL="1143000" indent="-228600" algn="l" defTabSz="914400" rtl="0" eaLnBrk="1" latinLnBrk="0" hangingPunct="1">
+              <a:lnSpc>
+                <a:spcPct val="90000"/>
+              </a:lnSpc>
+              <a:spcBef>
+                <a:spcPts val="500"/>
+              </a:spcBef>
+              <a:buFont typeface="Arial" panose="020B0604020202020204" pitchFamily="34" charset="0"/>
+              <a:buChar char="•"/>
+              <a:defRPr sz="2000" kern="1200">
+                <a:solidFill>
+                  <a:schemeClr val="tx1"/>
+                </a:solidFill>
+                <a:latin typeface="+mn-lt"/>
+                <a:ea typeface="+mn-ea"/>
+                <a:cs typeface="+mn-cs"/>
+              </a:defRPr>
+            </a:lvl3pPr>
+            <a:lvl4pPr marL="1600200" indent="-228600" algn="l" defTabSz="914400" rtl="0" eaLnBrk="1" latinLnBrk="0" hangingPunct="1">
+              <a:lnSpc>
+                <a:spcPct val="90000"/>
+              </a:lnSpc>
+              <a:spcBef>
+                <a:spcPts val="500"/>
+              </a:spcBef>
+              <a:buFont typeface="Arial" panose="020B0604020202020204" pitchFamily="34" charset="0"/>
+              <a:buChar char="•"/>
+              <a:defRPr sz="1800" kern="1200">
+                <a:solidFill>
+                  <a:schemeClr val="tx1"/>
+                </a:solidFill>
+                <a:latin typeface="+mn-lt"/>
+                <a:ea typeface="+mn-ea"/>
+                <a:cs typeface="+mn-cs"/>
+              </a:defRPr>
+            </a:lvl4pPr>
+            <a:lvl5pPr marL="2057400" indent="-228600" algn="l" defTabSz="914400" rtl="0" eaLnBrk="1" latinLnBrk="0" hangingPunct="1">
+              <a:lnSpc>
+                <a:spcPct val="90000"/>
+              </a:lnSpc>
+              <a:spcBef>
+                <a:spcPts val="500"/>
+              </a:spcBef>
+              <a:buFont typeface="Arial" panose="020B0604020202020204" pitchFamily="34" charset="0"/>
+              <a:buChar char="•"/>
+              <a:defRPr sz="1800" kern="1200">
+                <a:solidFill>
+                  <a:schemeClr val="tx1"/>
+                </a:solidFill>
+                <a:latin typeface="+mn-lt"/>
+                <a:ea typeface="+mn-ea"/>
+                <a:cs typeface="+mn-cs"/>
+              </a:defRPr>
+            </a:lvl5pPr>
+            <a:lvl6pPr marL="2514600" indent="-228600" algn="l" defTabSz="914400" rtl="0" eaLnBrk="1" latinLnBrk="0" hangingPunct="1">
+              <a:lnSpc>
+                <a:spcPct val="90000"/>
+              </a:lnSpc>
+              <a:spcBef>
+                <a:spcPts val="500"/>
+              </a:spcBef>
+              <a:buFont typeface="Arial" panose="020B0604020202020204" pitchFamily="34" charset="0"/>
+              <a:buChar char="•"/>
+              <a:defRPr sz="1800" kern="1200">
+                <a:solidFill>
+                  <a:schemeClr val="tx1"/>
+                </a:solidFill>
+                <a:latin typeface="+mn-lt"/>
+                <a:ea typeface="+mn-ea"/>
+                <a:cs typeface="+mn-cs"/>
+              </a:defRPr>
+            </a:lvl6pPr>
+            <a:lvl7pPr marL="2971800" indent="-228600" algn="l" defTabSz="914400" rtl="0" eaLnBrk="1" latinLnBrk="0" hangingPunct="1">
+              <a:lnSpc>
+                <a:spcPct val="90000"/>
+              </a:lnSpc>
+              <a:spcBef>
+                <a:spcPts val="500"/>
+              </a:spcBef>
+              <a:buFont typeface="Arial" panose="020B0604020202020204" pitchFamily="34" charset="0"/>
+              <a:buChar char="•"/>
+              <a:defRPr sz="1800" kern="1200">
+                <a:solidFill>
+                  <a:schemeClr val="tx1"/>
+                </a:solidFill>
+                <a:latin typeface="+mn-lt"/>
+                <a:ea typeface="+mn-ea"/>
+                <a:cs typeface="+mn-cs"/>
+              </a:defRPr>
+            </a:lvl7pPr>
+            <a:lvl8pPr marL="3429000" indent="-228600" algn="l" defTabSz="914400" rtl="0" eaLnBrk="1" latinLnBrk="0" hangingPunct="1">
+              <a:lnSpc>
+                <a:spcPct val="90000"/>
+              </a:lnSpc>
+              <a:spcBef>
+                <a:spcPts val="500"/>
+              </a:spcBef>
+              <a:buFont typeface="Arial" panose="020B0604020202020204" pitchFamily="34" charset="0"/>
+              <a:buChar char="•"/>
+              <a:defRPr sz="1800" kern="1200">
+                <a:solidFill>
+                  <a:schemeClr val="tx1"/>
+                </a:solidFill>
+                <a:latin typeface="+mn-lt"/>
+                <a:ea typeface="+mn-ea"/>
+                <a:cs typeface="+mn-cs"/>
+              </a:defRPr>
+            </a:lvl8pPr>
+            <a:lvl9pPr marL="3886200" indent="-228600" algn="l" defTabSz="914400" rtl="0" eaLnBrk="1" latinLnBrk="0" hangingPunct="1">
+              <a:lnSpc>
+                <a:spcPct val="90000"/>
+              </a:lnSpc>
+              <a:spcBef>
+                <a:spcPts val="500"/>
+              </a:spcBef>
+              <a:buFont typeface="Arial" panose="020B0604020202020204" pitchFamily="34" charset="0"/>
+              <a:buChar char="•"/>
+              <a:defRPr sz="1800" kern="1200">
+                <a:solidFill>
+                  <a:schemeClr val="tx1"/>
+                </a:solidFill>
+                <a:latin typeface="+mn-lt"/>
+                <a:ea typeface="+mn-ea"/>
+                <a:cs typeface="+mn-cs"/>
+              </a:defRPr>
+            </a:lvl9pPr>
+          </a:lstStyle>
+          <a:p>
+            <a:r>
+              <a:rPr lang="ru-RU" dirty="0"/>
+              <a:t>Проверить опции сборки продуктового кода и дистрибутива</a:t>
+            </a:r>
+            <a:endParaRPr lang="en-US" dirty="0"/>
+          </a:p>
+          <a:p>
+            <a:pPr lvl="1"/>
+            <a:r>
+              <a:rPr lang="ru-RU" dirty="0"/>
+              <a:t>В том числе опции компилятора, включенные по умолчанию</a:t>
+            </a:r>
+          </a:p>
+          <a:p>
+            <a:r>
+              <a:rPr lang="ru-RU" dirty="0"/>
+              <a:t>Решить с Security Team какие hardening-методы включить и в каких компонентах</a:t>
+            </a:r>
+            <a:endParaRPr lang="en-US" dirty="0"/>
+          </a:p>
+          <a:p>
+            <a:r>
+              <a:rPr lang="ru-RU" dirty="0"/>
+              <a:t>Минимальный рекомендуемый набор</a:t>
+            </a:r>
+            <a:r>
+              <a:rPr lang="en-US" dirty="0"/>
+              <a:t>:</a:t>
+            </a:r>
+          </a:p>
+          <a:p>
+            <a:pPr lvl="1"/>
+            <a:r>
+              <a:rPr lang="en-US" dirty="0"/>
+              <a:t>ASLR (-</a:t>
+            </a:r>
+            <a:r>
+              <a:rPr lang="en-US" dirty="0" err="1"/>
+              <a:t>fPIE</a:t>
+            </a:r>
+            <a:r>
+              <a:rPr lang="en-US" dirty="0"/>
+              <a:t> -pie)</a:t>
+            </a:r>
+            <a:endParaRPr lang="ru-RU" dirty="0"/>
+          </a:p>
+          <a:p>
+            <a:pPr lvl="1"/>
+            <a:r>
+              <a:rPr lang="en-US" dirty="0"/>
+              <a:t>Stack Protector (-</a:t>
+            </a:r>
+            <a:r>
+              <a:rPr lang="en-US" dirty="0" err="1"/>
+              <a:t>fstack</a:t>
+            </a:r>
+            <a:r>
+              <a:rPr lang="en-US" dirty="0"/>
+              <a:t>-protector-strong)</a:t>
+            </a:r>
+          </a:p>
+          <a:p>
+            <a:pPr lvl="1"/>
+            <a:r>
+              <a:rPr lang="ru-RU" dirty="0"/>
+              <a:t>Фортификация (-</a:t>
+            </a:r>
+            <a:r>
+              <a:rPr lang="en-US" dirty="0"/>
+              <a:t>D_FORTIFY_SOURCE=2)</a:t>
+            </a:r>
+          </a:p>
+          <a:p>
+            <a:pPr lvl="1"/>
+            <a:r>
+              <a:rPr lang="en-US" dirty="0"/>
+              <a:t>Full RELRO (-</a:t>
+            </a:r>
+            <a:r>
+              <a:rPr lang="en-US" dirty="0" err="1"/>
+              <a:t>Wl</a:t>
+            </a:r>
+            <a:r>
+              <a:rPr lang="en-US" dirty="0"/>
+              <a:t>,-</a:t>
+            </a:r>
+            <a:r>
+              <a:rPr lang="en-US" dirty="0" err="1"/>
+              <a:t>z,relro</a:t>
+            </a:r>
+            <a:r>
+              <a:rPr lang="en-US" dirty="0"/>
+              <a:t> -</a:t>
+            </a:r>
+            <a:r>
+              <a:rPr lang="en-US" dirty="0" err="1"/>
+              <a:t>Wl</a:t>
+            </a:r>
+            <a:r>
+              <a:rPr lang="en-US" dirty="0"/>
+              <a:t>,-</a:t>
+            </a:r>
+            <a:r>
+              <a:rPr lang="en-US" dirty="0" err="1"/>
+              <a:t>z,now</a:t>
+            </a:r>
+            <a:r>
+              <a:rPr lang="en-US" dirty="0"/>
+              <a:t>)</a:t>
+            </a:r>
+          </a:p>
+          <a:p>
+            <a:pPr lvl="1"/>
+            <a:r>
+              <a:rPr lang="ru-RU" dirty="0"/>
+              <a:t>Защита от </a:t>
+            </a:r>
+            <a:r>
+              <a:rPr lang="en-US" dirty="0"/>
+              <a:t>Stack Clash</a:t>
+            </a:r>
+            <a:r>
+              <a:rPr lang="ru-RU" dirty="0"/>
+              <a:t> </a:t>
+            </a:r>
+            <a:r>
+              <a:rPr lang="en-US" dirty="0"/>
+              <a:t>(-</a:t>
+            </a:r>
+            <a:r>
+              <a:rPr lang="en-US" dirty="0" err="1"/>
+              <a:t>fstack</a:t>
+            </a:r>
+            <a:r>
+              <a:rPr lang="en-US" dirty="0"/>
+              <a:t>-clash-protection)</a:t>
+            </a:r>
+            <a:endParaRPr lang="ru-RU" dirty="0"/>
+          </a:p>
+          <a:p>
+            <a:pPr lvl="1"/>
+            <a:r>
+              <a:rPr lang="en-US" dirty="0"/>
+              <a:t>Control-flow Integrity (-</a:t>
+            </a:r>
+            <a:r>
+              <a:rPr lang="en-US" dirty="0" err="1"/>
+              <a:t>fcf</a:t>
+            </a:r>
+            <a:r>
+              <a:rPr lang="en-US" dirty="0"/>
+              <a:t>-protection </a:t>
+            </a:r>
+            <a:r>
+              <a:rPr lang="ru-RU" dirty="0"/>
+              <a:t>на </a:t>
+            </a:r>
+            <a:r>
+              <a:rPr lang="en-US" dirty="0"/>
+              <a:t>X86, -</a:t>
+            </a:r>
+            <a:r>
+              <a:rPr lang="en-US" dirty="0" err="1"/>
+              <a:t>mbranch</a:t>
+            </a:r>
+            <a:r>
+              <a:rPr lang="en-US" dirty="0"/>
+              <a:t>-protection </a:t>
+            </a:r>
+            <a:r>
+              <a:rPr lang="ru-RU" dirty="0"/>
+              <a:t>на </a:t>
+            </a:r>
+            <a:r>
+              <a:rPr lang="en-US" dirty="0"/>
+              <a:t>AArch64)</a:t>
+            </a:r>
+          </a:p>
+        </p:txBody>
+      </p:sp>
+    </p:spTree>
+    <p:extLst>
+      <p:ext uri="{BB962C8B-B14F-4D97-AF65-F5344CB8AC3E}">
+        <p14:creationId xmlns:p14="http://schemas.microsoft.com/office/powerpoint/2010/main" val="1359780015"/>
+      </p:ext>
+    </p:extLst>
+  </p:cSld>
+  <p:clrMapOvr>
+    <a:masterClrMapping/>
+  </p:clrMapOvr>
+</p:sld>
+</file>
+
+<file path=ppt/slides/slide105.xml><?xml version="1.0" encoding="utf-8"?>
+<p:sld xmlns:a="http://schemas.openxmlformats.org/drawingml/2006/main" xmlns:r="http://schemas.openxmlformats.org/officeDocument/2006/relationships" xmlns:p="http://schemas.openxmlformats.org/presentationml/2006/main">
+  <p:cSld>
+    <p:spTree>
+      <p:nvGrpSpPr>
+        <p:cNvPr id="1" name=""/>
+        <p:cNvGrpSpPr/>
+        <p:nvPr/>
+      </p:nvGrpSpPr>
+      <p:grpSpPr>
+        <a:xfrm>
+          <a:off x="0" y="0"/>
+          <a:ext cx="0" cy="0"/>
+          <a:chOff x="0" y="0"/>
+          <a:chExt cx="0" cy="0"/>
+        </a:xfrm>
+      </p:grpSpPr>
+      <p:sp>
+        <p:nvSpPr>
+          <p:cNvPr id="2" name="Title 1">
+            <a:extLst>
+              <a:ext uri="{FF2B5EF4-FFF2-40B4-BE49-F238E27FC236}">
+                <a16:creationId xmlns:a16="http://schemas.microsoft.com/office/drawing/2014/main" id="{527B94E6-AC75-496A-80B4-C52365ABC84D}"/>
+              </a:ext>
+            </a:extLst>
+          </p:cNvPr>
+          <p:cNvSpPr>
+            <a:spLocks noGrp="1"/>
+          </p:cNvSpPr>
+          <p:nvPr>
+            <p:ph type="title"/>
+          </p:nvPr>
+        </p:nvSpPr>
+        <p:spPr>
+          <a:xfrm>
+            <a:off x="838200" y="18255"/>
+            <a:ext cx="10515600" cy="1325563"/>
+          </a:xfrm>
+        </p:spPr>
+        <p:txBody>
+          <a:bodyPr/>
+          <a:lstStyle/>
+          <a:p>
+            <a:r>
+              <a:rPr lang="ru-RU" dirty="0"/>
+              <a:t>Что стоит сделать </a:t>
+            </a:r>
+            <a:r>
+              <a:rPr lang="en-US" dirty="0"/>
+              <a:t>?</a:t>
+            </a:r>
+          </a:p>
+        </p:txBody>
+      </p:sp>
+      <p:sp>
+        <p:nvSpPr>
           <p:cNvPr id="3" name="Content Placeholder 2">
             <a:extLst>
               <a:ext uri="{FF2B5EF4-FFF2-40B4-BE49-F238E27FC236}">
@@ -5214,11 +5374,11 @@
             <a:pPr lvl="1"/>
             <a:r>
               <a:rPr lang="ru-RU" sz="2000" dirty="0"/>
-              <a:t>Лучше собирать самому (в дистрибутивах старая версия</a:t>
+              <a:t>Обязательно собирать самому (в дистрибутивах устаревшая версия </a:t>
             </a:r>
             <a:r>
               <a:rPr lang="en-US" sz="2000" dirty="0"/>
-              <a:t>)</a:t>
+              <a:t>checksec.sh)</a:t>
             </a:r>
           </a:p>
           <a:p>
@@ -5344,7 +5504,7 @@
           <a:p>
             <a:fld id="{9077AC13-74B0-42BB-979A-B4FD3BCA574B}" type="slidenum">
               <a:rPr lang="en-US" smtClean="0"/>
-              <a:t>104</a:t>
+              <a:t>105</a:t>
             </a:fld>
             <a:endParaRPr lang="en-US"/>
           </a:p>
@@ -5393,7 +5553,7 @@
 </p:sld>
 </file>
 
-<file path=ppt/slides/slide105.xml><?xml version="1.0" encoding="utf-8"?>
+<file path=ppt/slides/slide106.xml><?xml version="1.0" encoding="utf-8"?>
 <p:sld xmlns:a="http://schemas.openxmlformats.org/drawingml/2006/main" xmlns:r="http://schemas.openxmlformats.org/officeDocument/2006/relationships" xmlns:p="http://schemas.openxmlformats.org/presentationml/2006/main">
   <p:cSld>
     <p:spTree>
@@ -5624,7 +5784,7 @@
           <a:p>
             <a:fld id="{9077AC13-74B0-42BB-979A-B4FD3BCA574B}" type="slidenum">
               <a:rPr lang="en-US" smtClean="0"/>
-              <a:t>105</a:t>
+              <a:t>106</a:t>
             </a:fld>
             <a:endParaRPr lang="en-US"/>
           </a:p>
@@ -5643,7 +5803,7 @@
 </p:sld>
 </file>
 
-<file path=ppt/slides/slide106.xml><?xml version="1.0" encoding="utf-8"?>
+<file path=ppt/slides/slide107.xml><?xml version="1.0" encoding="utf-8"?>
 <p:sld xmlns:a="http://schemas.openxmlformats.org/drawingml/2006/main" xmlns:r="http://schemas.openxmlformats.org/officeDocument/2006/relationships" xmlns:p="http://schemas.openxmlformats.org/presentationml/2006/main">
   <p:cSld>
     <p:spTree>
@@ -5757,9 +5917,12 @@
             </a:r>
             <a:r>
               <a:rPr lang="en-US" dirty="0"/>
-              <a:t>:</a:t>
-            </a:r>
-            <a:endParaRPr lang="ru-RU" dirty="0"/>
+              <a:t> </a:t>
+            </a:r>
+            <a:r>
+              <a:rPr lang="ru-RU" dirty="0"/>
+              <a:t>защит</a:t>
+            </a:r>
           </a:p>
           <a:p>
             <a:pPr lvl="1"/>
@@ -5786,12 +5949,9 @@
           <a:p>
             <a:r>
               <a:rPr lang="ru-RU" dirty="0"/>
-              <a:t>Примеры атак</a:t>
-            </a:r>
-            <a:r>
-              <a:rPr lang="en-US" dirty="0"/>
-              <a:t>:</a:t>
-            </a:r>
+              <a:t>Обзоры атак</a:t>
+            </a:r>
+            <a:endParaRPr lang="en-US" dirty="0"/>
           </a:p>
           <a:p>
             <a:pPr lvl="1"/>
@@ -5884,7 +6044,7 @@
           <a:p>
             <a:fld id="{9077AC13-74B0-42BB-979A-B4FD3BCA574B}" type="slidenum">
               <a:rPr lang="en-US" smtClean="0"/>
-              <a:t>106</a:t>
+              <a:t>107</a:t>
             </a:fld>
             <a:endParaRPr lang="en-US"/>
           </a:p>
@@ -5903,7 +6063,7 @@
 </p:sld>
 </file>
 
-<file path=ppt/slides/slide107.xml><?xml version="1.0" encoding="utf-8"?>
+<file path=ppt/slides/slide108.xml><?xml version="1.0" encoding="utf-8"?>
 <p:sld xmlns:a="http://schemas.openxmlformats.org/drawingml/2006/main" xmlns:r="http://schemas.openxmlformats.org/officeDocument/2006/relationships" xmlns:p="http://schemas.openxmlformats.org/presentationml/2006/main">
   <p:cSld>
     <p:spTree>
@@ -6014,7 +6174,7 @@
           <a:p>
             <a:fld id="{9077AC13-74B0-42BB-979A-B4FD3BCA574B}" type="slidenum">
               <a:rPr lang="en-US" smtClean="0"/>
-              <a:t>107</a:t>
+              <a:t>108</a:t>
             </a:fld>
             <a:endParaRPr lang="en-US"/>
           </a:p>
@@ -6033,7 +6193,7 @@
 </p:sld>
 </file>
 
-<file path=ppt/slides/slide108.xml><?xml version="1.0" encoding="utf-8"?>
+<file path=ppt/slides/slide109.xml><?xml version="1.0" encoding="utf-8"?>
 <p:sld xmlns:a="http://schemas.openxmlformats.org/drawingml/2006/main" xmlns:r="http://schemas.openxmlformats.org/officeDocument/2006/relationships" xmlns:p="http://schemas.openxmlformats.org/presentationml/2006/main">
   <p:cSld>
     <p:spTree>
@@ -6162,7 +6322,7 @@
         </p:blipFill>
         <p:spPr>
           <a:xfrm>
-            <a:off x="4048685" y="2932580"/>
+            <a:off x="4317627" y="2905686"/>
             <a:ext cx="2857500" cy="2857500"/>
           </a:xfrm>
           <a:prstGeom prst="rect">
@@ -6193,7 +6353,7 @@
           <a:p>
             <a:fld id="{9077AC13-74B0-42BB-979A-B4FD3BCA574B}" type="slidenum">
               <a:rPr lang="en-US" smtClean="0"/>
-              <a:t>108</a:t>
+              <a:t>109</a:t>
             </a:fld>
             <a:endParaRPr lang="en-US"/>
           </a:p>
@@ -6203,119 +6363,6 @@
     <p:extLst>
       <p:ext uri="{BB962C8B-B14F-4D97-AF65-F5344CB8AC3E}">
         <p14:creationId xmlns:p14="http://schemas.microsoft.com/office/powerpoint/2010/main" val="836139563"/>
-      </p:ext>
-    </p:extLst>
-  </p:cSld>
-  <p:clrMapOvr>
-    <a:masterClrMapping/>
-  </p:clrMapOvr>
-</p:sld>
-</file>
-
-<file path=ppt/slides/slide109.xml><?xml version="1.0" encoding="utf-8"?>
-<p:sld xmlns:a="http://schemas.openxmlformats.org/drawingml/2006/main" xmlns:r="http://schemas.openxmlformats.org/officeDocument/2006/relationships" xmlns:p="http://schemas.openxmlformats.org/presentationml/2006/main">
-  <p:cSld>
-    <p:spTree>
-      <p:nvGrpSpPr>
-        <p:cNvPr id="1" name=""/>
-        <p:cNvGrpSpPr/>
-        <p:nvPr/>
-      </p:nvGrpSpPr>
-      <p:grpSpPr>
-        <a:xfrm>
-          <a:off x="0" y="0"/>
-          <a:ext cx="0" cy="0"/>
-          <a:chOff x="0" y="0"/>
-          <a:chExt cx="0" cy="0"/>
-        </a:xfrm>
-      </p:grpSpPr>
-      <p:sp>
-        <p:nvSpPr>
-          <p:cNvPr id="2" name="Title 1">
-            <a:extLst>
-              <a:ext uri="{FF2B5EF4-FFF2-40B4-BE49-F238E27FC236}">
-                <a16:creationId xmlns:a16="http://schemas.microsoft.com/office/drawing/2014/main" id="{0E8E47BF-47BB-42B9-B025-B0A5D6833D5D}"/>
-              </a:ext>
-            </a:extLst>
-          </p:cNvPr>
-          <p:cNvSpPr>
-            <a:spLocks noGrp="1"/>
-          </p:cNvSpPr>
-          <p:nvPr>
-            <p:ph type="title"/>
-          </p:nvPr>
-        </p:nvSpPr>
-        <p:spPr/>
-        <p:txBody>
-          <a:bodyPr/>
-          <a:lstStyle/>
-          <a:p>
-            <a:r>
-              <a:rPr lang="ru-RU" dirty="0"/>
-              <a:t>Приложения</a:t>
-            </a:r>
-            <a:endParaRPr lang="en-US" dirty="0"/>
-          </a:p>
-        </p:txBody>
-      </p:sp>
-      <p:sp>
-        <p:nvSpPr>
-          <p:cNvPr id="3" name="Text Placeholder 2">
-            <a:extLst>
-              <a:ext uri="{FF2B5EF4-FFF2-40B4-BE49-F238E27FC236}">
-                <a16:creationId xmlns:a16="http://schemas.microsoft.com/office/drawing/2014/main" id="{448D2064-70B6-47CB-BA79-87C67150F18F}"/>
-              </a:ext>
-            </a:extLst>
-          </p:cNvPr>
-          <p:cNvSpPr>
-            <a:spLocks noGrp="1"/>
-          </p:cNvSpPr>
-          <p:nvPr>
-            <p:ph type="body" idx="1"/>
-          </p:nvPr>
-        </p:nvSpPr>
-        <p:spPr/>
-        <p:txBody>
-          <a:bodyPr/>
-          <a:lstStyle/>
-          <a:p>
-            <a:endParaRPr lang="en-US"/>
-          </a:p>
-        </p:txBody>
-      </p:sp>
-      <p:sp>
-        <p:nvSpPr>
-          <p:cNvPr id="4" name="Slide Number Placeholder 3">
-            <a:extLst>
-              <a:ext uri="{FF2B5EF4-FFF2-40B4-BE49-F238E27FC236}">
-                <a16:creationId xmlns:a16="http://schemas.microsoft.com/office/drawing/2014/main" id="{8DF2943A-E379-4742-8C1A-0BAC9F109FE2}"/>
-              </a:ext>
-            </a:extLst>
-          </p:cNvPr>
-          <p:cNvSpPr>
-            <a:spLocks noGrp="1"/>
-          </p:cNvSpPr>
-          <p:nvPr>
-            <p:ph type="sldNum" sz="quarter" idx="12"/>
-          </p:nvPr>
-        </p:nvSpPr>
-        <p:spPr/>
-        <p:txBody>
-          <a:bodyPr/>
-          <a:lstStyle/>
-          <a:p>
-            <a:fld id="{9077AC13-74B0-42BB-979A-B4FD3BCA574B}" type="slidenum">
-              <a:rPr lang="en-US" smtClean="0"/>
-              <a:t>109</a:t>
-            </a:fld>
-            <a:endParaRPr lang="en-US"/>
-          </a:p>
-        </p:txBody>
-      </p:sp>
-    </p:spTree>
-    <p:extLst>
-      <p:ext uri="{BB962C8B-B14F-4D97-AF65-F5344CB8AC3E}">
-        <p14:creationId xmlns:p14="http://schemas.microsoft.com/office/powerpoint/2010/main" val="2401149323"/>
       </p:ext>
     </p:extLst>
   </p:cSld>
@@ -6463,6 +6510,119 @@
           <p:cNvPr id="2" name="Title 1">
             <a:extLst>
               <a:ext uri="{FF2B5EF4-FFF2-40B4-BE49-F238E27FC236}">
+                <a16:creationId xmlns:a16="http://schemas.microsoft.com/office/drawing/2014/main" id="{0E8E47BF-47BB-42B9-B025-B0A5D6833D5D}"/>
+              </a:ext>
+            </a:extLst>
+          </p:cNvPr>
+          <p:cNvSpPr>
+            <a:spLocks noGrp="1"/>
+          </p:cNvSpPr>
+          <p:nvPr>
+            <p:ph type="title"/>
+          </p:nvPr>
+        </p:nvSpPr>
+        <p:spPr/>
+        <p:txBody>
+          <a:bodyPr/>
+          <a:lstStyle/>
+          <a:p>
+            <a:r>
+              <a:rPr lang="ru-RU" dirty="0"/>
+              <a:t>Приложения</a:t>
+            </a:r>
+            <a:endParaRPr lang="en-US" dirty="0"/>
+          </a:p>
+        </p:txBody>
+      </p:sp>
+      <p:sp>
+        <p:nvSpPr>
+          <p:cNvPr id="3" name="Text Placeholder 2">
+            <a:extLst>
+              <a:ext uri="{FF2B5EF4-FFF2-40B4-BE49-F238E27FC236}">
+                <a16:creationId xmlns:a16="http://schemas.microsoft.com/office/drawing/2014/main" id="{448D2064-70B6-47CB-BA79-87C67150F18F}"/>
+              </a:ext>
+            </a:extLst>
+          </p:cNvPr>
+          <p:cNvSpPr>
+            <a:spLocks noGrp="1"/>
+          </p:cNvSpPr>
+          <p:nvPr>
+            <p:ph type="body" idx="1"/>
+          </p:nvPr>
+        </p:nvSpPr>
+        <p:spPr/>
+        <p:txBody>
+          <a:bodyPr/>
+          <a:lstStyle/>
+          <a:p>
+            <a:endParaRPr lang="en-US"/>
+          </a:p>
+        </p:txBody>
+      </p:sp>
+      <p:sp>
+        <p:nvSpPr>
+          <p:cNvPr id="4" name="Slide Number Placeholder 3">
+            <a:extLst>
+              <a:ext uri="{FF2B5EF4-FFF2-40B4-BE49-F238E27FC236}">
+                <a16:creationId xmlns:a16="http://schemas.microsoft.com/office/drawing/2014/main" id="{8DF2943A-E379-4742-8C1A-0BAC9F109FE2}"/>
+              </a:ext>
+            </a:extLst>
+          </p:cNvPr>
+          <p:cNvSpPr>
+            <a:spLocks noGrp="1"/>
+          </p:cNvSpPr>
+          <p:nvPr>
+            <p:ph type="sldNum" sz="quarter" idx="12"/>
+          </p:nvPr>
+        </p:nvSpPr>
+        <p:spPr/>
+        <p:txBody>
+          <a:bodyPr/>
+          <a:lstStyle/>
+          <a:p>
+            <a:fld id="{9077AC13-74B0-42BB-979A-B4FD3BCA574B}" type="slidenum">
+              <a:rPr lang="en-US" smtClean="0"/>
+              <a:t>110</a:t>
+            </a:fld>
+            <a:endParaRPr lang="en-US"/>
+          </a:p>
+        </p:txBody>
+      </p:sp>
+    </p:spTree>
+    <p:extLst>
+      <p:ext uri="{BB962C8B-B14F-4D97-AF65-F5344CB8AC3E}">
+        <p14:creationId xmlns:p14="http://schemas.microsoft.com/office/powerpoint/2010/main" val="2401149323"/>
+      </p:ext>
+    </p:extLst>
+  </p:cSld>
+  <p:clrMapOvr>
+    <a:masterClrMapping/>
+  </p:clrMapOvr>
+</p:sld>
+</file>
+
+<file path=ppt/slides/slide111.xml><?xml version="1.0" encoding="utf-8"?>
+<p:sld xmlns:a="http://schemas.openxmlformats.org/drawingml/2006/main" xmlns:r="http://schemas.openxmlformats.org/officeDocument/2006/relationships" xmlns:p="http://schemas.openxmlformats.org/presentationml/2006/main">
+  <p:cSld>
+    <p:spTree>
+      <p:nvGrpSpPr>
+        <p:cNvPr id="1" name=""/>
+        <p:cNvGrpSpPr/>
+        <p:nvPr/>
+      </p:nvGrpSpPr>
+      <p:grpSpPr>
+        <a:xfrm>
+          <a:off x="0" y="0"/>
+          <a:ext cx="0" cy="0"/>
+          <a:chOff x="0" y="0"/>
+          <a:chExt cx="0" cy="0"/>
+        </a:xfrm>
+      </p:grpSpPr>
+      <p:sp>
+        <p:nvSpPr>
+          <p:cNvPr id="2" name="Title 1">
+            <a:extLst>
+              <a:ext uri="{FF2B5EF4-FFF2-40B4-BE49-F238E27FC236}">
                 <a16:creationId xmlns:a16="http://schemas.microsoft.com/office/drawing/2014/main" id="{CAC7532A-964A-431E-A4F5-80DD903BB997}"/>
               </a:ext>
             </a:extLst>
@@ -6716,7 +6876,7 @@
           <a:p>
             <a:fld id="{9077AC13-74B0-42BB-979A-B4FD3BCA574B}" type="slidenum">
               <a:rPr lang="en-US" smtClean="0"/>
-              <a:t>110</a:t>
+              <a:t>111</a:t>
             </a:fld>
             <a:endParaRPr lang="en-US"/>
           </a:p>
@@ -6735,7 +6895,7 @@
 </p:sld>
 </file>
 
-<file path=ppt/slides/slide111.xml><?xml version="1.0" encoding="utf-8"?>
+<file path=ppt/slides/slide112.xml><?xml version="1.0" encoding="utf-8"?>
 <p:sld xmlns:a="http://schemas.openxmlformats.org/drawingml/2006/main" xmlns:r="http://schemas.openxmlformats.org/officeDocument/2006/relationships" xmlns:p="http://schemas.openxmlformats.org/presentationml/2006/main">
   <p:cSld>
     <p:spTree>
@@ -6984,7 +7144,7 @@
           <a:p>
             <a:fld id="{9077AC13-74B0-42BB-979A-B4FD3BCA574B}" type="slidenum">
               <a:rPr lang="en-US" smtClean="0"/>
-              <a:t>111</a:t>
+              <a:t>112</a:t>
             </a:fld>
             <a:endParaRPr lang="en-US"/>
           </a:p>
@@ -7003,7 +7163,7 @@
 </p:sld>
 </file>
 
-<file path=ppt/slides/slide112.xml><?xml version="1.0" encoding="utf-8"?>
+<file path=ppt/slides/slide113.xml><?xml version="1.0" encoding="utf-8"?>
 <p:sld xmlns:a="http://schemas.openxmlformats.org/drawingml/2006/main" xmlns:r="http://schemas.openxmlformats.org/officeDocument/2006/relationships" xmlns:p="http://schemas.openxmlformats.org/presentationml/2006/main">
   <p:cSld>
     <p:spTree>
@@ -7267,7 +7427,7 @@
           <a:p>
             <a:fld id="{9077AC13-74B0-42BB-979A-B4FD3BCA574B}" type="slidenum">
               <a:rPr lang="en-US" smtClean="0"/>
-              <a:t>112</a:t>
+              <a:t>113</a:t>
             </a:fld>
             <a:endParaRPr lang="en-US"/>
           </a:p>
@@ -7286,7 +7446,7 @@
 </p:sld>
 </file>
 
-<file path=ppt/slides/slide113.xml><?xml version="1.0" encoding="utf-8"?>
+<file path=ppt/slides/slide114.xml><?xml version="1.0" encoding="utf-8"?>
 <p:sld xmlns:a="http://schemas.openxmlformats.org/drawingml/2006/main" xmlns:r="http://schemas.openxmlformats.org/officeDocument/2006/relationships" xmlns:p="http://schemas.openxmlformats.org/presentationml/2006/main">
   <p:cSld>
     <p:spTree>
@@ -7610,7 +7770,7 @@
           <a:p>
             <a:fld id="{9077AC13-74B0-42BB-979A-B4FD3BCA574B}" type="slidenum">
               <a:rPr lang="en-US" smtClean="0"/>
-              <a:t>113</a:t>
+              <a:t>114</a:t>
             </a:fld>
             <a:endParaRPr lang="en-US"/>
           </a:p>
@@ -7629,7 +7789,7 @@
 </p:sld>
 </file>
 
-<file path=ppt/slides/slide114.xml><?xml version="1.0" encoding="utf-8"?>
+<file path=ppt/slides/slide115.xml><?xml version="1.0" encoding="utf-8"?>
 <p:sld xmlns:a="http://schemas.openxmlformats.org/drawingml/2006/main" xmlns:r="http://schemas.openxmlformats.org/officeDocument/2006/relationships" xmlns:p="http://schemas.openxmlformats.org/presentationml/2006/main">
   <p:cSld>
     <p:spTree>
@@ -7995,7 +8155,7 @@
           <a:p>
             <a:fld id="{9077AC13-74B0-42BB-979A-B4FD3BCA574B}" type="slidenum">
               <a:rPr lang="en-US" smtClean="0"/>
-              <a:t>114</a:t>
+              <a:t>115</a:t>
             </a:fld>
             <a:endParaRPr lang="en-US"/>
           </a:p>
@@ -8014,7 +8174,7 @@
 </p:sld>
 </file>
 
-<file path=ppt/slides/slide115.xml><?xml version="1.0" encoding="utf-8"?>
+<file path=ppt/slides/slide116.xml><?xml version="1.0" encoding="utf-8"?>
 <p:sld xmlns:a="http://schemas.openxmlformats.org/drawingml/2006/main" xmlns:r="http://schemas.openxmlformats.org/officeDocument/2006/relationships" xmlns:p="http://schemas.openxmlformats.org/presentationml/2006/main">
   <p:cSld>
     <p:spTree>
@@ -8267,7 +8427,7 @@
           <a:p>
             <a:fld id="{9077AC13-74B0-42BB-979A-B4FD3BCA574B}" type="slidenum">
               <a:rPr lang="en-US" smtClean="0"/>
-              <a:t>115</a:t>
+              <a:t>116</a:t>
             </a:fld>
             <a:endParaRPr lang="en-US"/>
           </a:p>
@@ -8286,7 +8446,7 @@
 </p:sld>
 </file>
 
-<file path=ppt/slides/slide116.xml><?xml version="1.0" encoding="utf-8"?>
+<file path=ppt/slides/slide117.xml><?xml version="1.0" encoding="utf-8"?>
 <p:sld xmlns:a="http://schemas.openxmlformats.org/drawingml/2006/main" xmlns:r="http://schemas.openxmlformats.org/officeDocument/2006/relationships" xmlns:p="http://schemas.openxmlformats.org/presentationml/2006/main">
   <p:cSld>
     <p:spTree>
@@ -8565,7 +8725,7 @@
           <a:p>
             <a:fld id="{9077AC13-74B0-42BB-979A-B4FD3BCA574B}" type="slidenum">
               <a:rPr lang="en-US" smtClean="0"/>
-              <a:t>116</a:t>
+              <a:t>117</a:t>
             </a:fld>
             <a:endParaRPr lang="en-US"/>
           </a:p>
@@ -8584,7 +8744,7 @@
 </p:sld>
 </file>
 
-<file path=ppt/slides/slide117.xml><?xml version="1.0" encoding="utf-8"?>
+<file path=ppt/slides/slide118.xml><?xml version="1.0" encoding="utf-8"?>
 <p:sld xmlns:a="http://schemas.openxmlformats.org/drawingml/2006/main" xmlns:r="http://schemas.openxmlformats.org/officeDocument/2006/relationships" xmlns:p="http://schemas.openxmlformats.org/presentationml/2006/main">
   <p:cSld>
     <p:spTree>
@@ -8839,7 +8999,7 @@
           <a:p>
             <a:fld id="{9077AC13-74B0-42BB-979A-B4FD3BCA574B}" type="slidenum">
               <a:rPr lang="en-US" smtClean="0"/>
-              <a:t>117</a:t>
+              <a:t>118</a:t>
             </a:fld>
             <a:endParaRPr lang="en-US"/>
           </a:p>
@@ -8858,7 +9018,7 @@
 </p:sld>
 </file>
 
-<file path=ppt/slides/slide118.xml><?xml version="1.0" encoding="utf-8"?>
+<file path=ppt/slides/slide119.xml><?xml version="1.0" encoding="utf-8"?>
 <p:sld xmlns:a="http://schemas.openxmlformats.org/drawingml/2006/main" xmlns:r="http://schemas.openxmlformats.org/officeDocument/2006/relationships" xmlns:p="http://schemas.openxmlformats.org/presentationml/2006/main">
   <p:cSld>
     <p:spTree>
@@ -9130,7 +9290,7 @@
           <a:p>
             <a:fld id="{9077AC13-74B0-42BB-979A-B4FD3BCA574B}" type="slidenum">
               <a:rPr lang="en-US" smtClean="0"/>
-              <a:t>118</a:t>
+              <a:t>119</a:t>
             </a:fld>
             <a:endParaRPr lang="en-US"/>
           </a:p>
@@ -9140,397 +9300,6 @@
     <p:extLst>
       <p:ext uri="{BB962C8B-B14F-4D97-AF65-F5344CB8AC3E}">
         <p14:creationId xmlns:p14="http://schemas.microsoft.com/office/powerpoint/2010/main" val="1607254691"/>
-      </p:ext>
-    </p:extLst>
-  </p:cSld>
-  <p:clrMapOvr>
-    <a:masterClrMapping/>
-  </p:clrMapOvr>
-</p:sld>
-</file>
-
-<file path=ppt/slides/slide119.xml><?xml version="1.0" encoding="utf-8"?>
-<p:sld xmlns:a="http://schemas.openxmlformats.org/drawingml/2006/main" xmlns:r="http://schemas.openxmlformats.org/officeDocument/2006/relationships" xmlns:p="http://schemas.openxmlformats.org/presentationml/2006/main">
-  <p:cSld>
-    <p:spTree>
-      <p:nvGrpSpPr>
-        <p:cNvPr id="1" name=""/>
-        <p:cNvGrpSpPr/>
-        <p:nvPr/>
-      </p:nvGrpSpPr>
-      <p:grpSpPr>
-        <a:xfrm>
-          <a:off x="0" y="0"/>
-          <a:ext cx="0" cy="0"/>
-          <a:chOff x="0" y="0"/>
-          <a:chExt cx="0" cy="0"/>
-        </a:xfrm>
-      </p:grpSpPr>
-      <p:sp>
-        <p:nvSpPr>
-          <p:cNvPr id="2" name="Title 1">
-            <a:extLst>
-              <a:ext uri="{FF2B5EF4-FFF2-40B4-BE49-F238E27FC236}">
-                <a16:creationId xmlns:a16="http://schemas.microsoft.com/office/drawing/2014/main" id="{3E390CB5-FF6E-4765-B937-FC6BA0EF02FC}"/>
-              </a:ext>
-            </a:extLst>
-          </p:cNvPr>
-          <p:cNvSpPr>
-            <a:spLocks noGrp="1"/>
-          </p:cNvSpPr>
-          <p:nvPr>
-            <p:ph type="title"/>
-          </p:nvPr>
-        </p:nvSpPr>
-        <p:spPr/>
-        <p:txBody>
-          <a:bodyPr/>
-          <a:lstStyle/>
-          <a:p>
-            <a:r>
-              <a:rPr lang="ru-RU" dirty="0"/>
-              <a:t>Целочисленные переполнения</a:t>
-            </a:r>
-            <a:r>
-              <a:rPr lang="en-US" dirty="0"/>
-              <a:t>: </a:t>
-            </a:r>
-            <a:r>
-              <a:rPr lang="ru-RU" dirty="0"/>
-              <a:t>Как включить </a:t>
-            </a:r>
-            <a:r>
-              <a:rPr lang="en-US" dirty="0"/>
-              <a:t>?</a:t>
-            </a:r>
-          </a:p>
-        </p:txBody>
-      </p:sp>
-      <p:sp>
-        <p:nvSpPr>
-          <p:cNvPr id="3" name="Content Placeholder 2">
-            <a:extLst>
-              <a:ext uri="{FF2B5EF4-FFF2-40B4-BE49-F238E27FC236}">
-                <a16:creationId xmlns:a16="http://schemas.microsoft.com/office/drawing/2014/main" id="{DAADEE4F-0571-446A-90C7-1E44732CD1C9}"/>
-              </a:ext>
-            </a:extLst>
-          </p:cNvPr>
-          <p:cNvSpPr>
-            <a:spLocks noGrp="1"/>
-          </p:cNvSpPr>
-          <p:nvPr>
-            <p:ph idx="1"/>
-          </p:nvPr>
-        </p:nvSpPr>
-        <p:spPr/>
-        <p:txBody>
-          <a:bodyPr>
-            <a:normAutofit fontScale="92500" lnSpcReduction="20000"/>
-          </a:bodyPr>
-          <a:lstStyle/>
-          <a:p>
-            <a:r>
-              <a:rPr lang="en-US" dirty="0"/>
-              <a:t>GCC: </a:t>
-            </a:r>
-            <a:r>
-              <a:rPr lang="en-US" dirty="0">
-                <a:latin typeface="Courier New" panose="02070309020205020404" pitchFamily="49" charset="0"/>
-                <a:cs typeface="Courier New" panose="02070309020205020404" pitchFamily="49" charset="0"/>
-              </a:rPr>
-              <a:t>-</a:t>
-            </a:r>
-            <a:r>
-              <a:rPr lang="en-US" dirty="0" err="1">
-                <a:latin typeface="Courier New" panose="02070309020205020404" pitchFamily="49" charset="0"/>
-                <a:cs typeface="Courier New" panose="02070309020205020404" pitchFamily="49" charset="0"/>
-              </a:rPr>
-              <a:t>fsanitize</a:t>
-            </a:r>
-            <a:r>
-              <a:rPr lang="en-US" dirty="0">
-                <a:latin typeface="Courier New" panose="02070309020205020404" pitchFamily="49" charset="0"/>
-                <a:cs typeface="Courier New" panose="02070309020205020404" pitchFamily="49" charset="0"/>
-              </a:rPr>
-              <a:t>-trap=signed-integer-</a:t>
-            </a:r>
-            <a:r>
-              <a:rPr lang="en-US" dirty="0" err="1">
-                <a:latin typeface="Courier New" panose="02070309020205020404" pitchFamily="49" charset="0"/>
-                <a:cs typeface="Courier New" panose="02070309020205020404" pitchFamily="49" charset="0"/>
-              </a:rPr>
-              <a:t>overflow,pointer</a:t>
-            </a:r>
-            <a:r>
-              <a:rPr lang="en-US" dirty="0">
-                <a:latin typeface="Courier New" panose="02070309020205020404" pitchFamily="49" charset="0"/>
-                <a:cs typeface="Courier New" panose="02070309020205020404" pitchFamily="49" charset="0"/>
-              </a:rPr>
-              <a:t>-overflow</a:t>
-            </a:r>
-          </a:p>
-          <a:p>
-            <a:pPr lvl="1"/>
-            <a:r>
-              <a:rPr lang="en-US" dirty="0"/>
-              <a:t>GCC </a:t>
-            </a:r>
-            <a:r>
-              <a:rPr lang="ru-RU" dirty="0"/>
-              <a:t>не поддерживает </a:t>
-            </a:r>
-            <a:r>
-              <a:rPr lang="en-US" dirty="0">
-                <a:latin typeface="Courier New" panose="02070309020205020404" pitchFamily="49" charset="0"/>
-                <a:cs typeface="Courier New" panose="02070309020205020404" pitchFamily="49" charset="0"/>
-              </a:rPr>
-              <a:t>integer</a:t>
-            </a:r>
-          </a:p>
-          <a:p>
-            <a:pPr lvl="1"/>
-            <a:r>
-              <a:rPr lang="ru-RU" dirty="0"/>
-              <a:t>Ещё раз отметим что </a:t>
-            </a:r>
-            <a:r>
-              <a:rPr lang="en-US" dirty="0">
-                <a:latin typeface="Courier New" panose="02070309020205020404" pitchFamily="49" charset="0"/>
-                <a:cs typeface="Courier New" panose="02070309020205020404" pitchFamily="49" charset="0"/>
-              </a:rPr>
-              <a:t>-</a:t>
-            </a:r>
-            <a:r>
-              <a:rPr lang="en-US" dirty="0" err="1">
-                <a:latin typeface="Courier New" panose="02070309020205020404" pitchFamily="49" charset="0"/>
-                <a:cs typeface="Courier New" panose="02070309020205020404" pitchFamily="49" charset="0"/>
-              </a:rPr>
-              <a:t>ftrapv</a:t>
-            </a:r>
-            <a:r>
-              <a:rPr lang="en-US" dirty="0"/>
-              <a:t> </a:t>
-            </a:r>
-            <a:r>
-              <a:rPr lang="ru-RU" i="1" dirty="0"/>
-              <a:t>неработоспособна</a:t>
-            </a:r>
-          </a:p>
-          <a:p>
-            <a:r>
-              <a:rPr lang="en-US" dirty="0"/>
-              <a:t>Clang: </a:t>
-            </a:r>
-            <a:r>
-              <a:rPr lang="en-US" dirty="0">
-                <a:latin typeface="Courier New" panose="02070309020205020404" pitchFamily="49" charset="0"/>
-                <a:cs typeface="Courier New" panose="02070309020205020404" pitchFamily="49" charset="0"/>
-              </a:rPr>
-              <a:t>-</a:t>
-            </a:r>
-            <a:r>
-              <a:rPr lang="en-US" dirty="0" err="1">
-                <a:latin typeface="Courier New" panose="02070309020205020404" pitchFamily="49" charset="0"/>
-                <a:cs typeface="Courier New" panose="02070309020205020404" pitchFamily="49" charset="0"/>
-              </a:rPr>
-              <a:t>fsanitize</a:t>
-            </a:r>
-            <a:r>
-              <a:rPr lang="en-US" dirty="0">
-                <a:latin typeface="Courier New" panose="02070309020205020404" pitchFamily="49" charset="0"/>
-                <a:cs typeface="Courier New" panose="02070309020205020404" pitchFamily="49" charset="0"/>
-              </a:rPr>
-              <a:t>=signed-integer-</a:t>
-            </a:r>
-            <a:r>
-              <a:rPr lang="en-US" dirty="0" err="1">
-                <a:latin typeface="Courier New" panose="02070309020205020404" pitchFamily="49" charset="0"/>
-                <a:cs typeface="Courier New" panose="02070309020205020404" pitchFamily="49" charset="0"/>
-              </a:rPr>
-              <a:t>overflow,pointer</a:t>
-            </a:r>
-            <a:r>
-              <a:rPr lang="en-US" dirty="0">
-                <a:latin typeface="Courier New" panose="02070309020205020404" pitchFamily="49" charset="0"/>
-                <a:cs typeface="Courier New" panose="02070309020205020404" pitchFamily="49" charset="0"/>
-              </a:rPr>
-              <a:t>-overflow -</a:t>
-            </a:r>
-            <a:r>
-              <a:rPr lang="en-US" dirty="0" err="1">
-                <a:latin typeface="Courier New" panose="02070309020205020404" pitchFamily="49" charset="0"/>
-                <a:cs typeface="Courier New" panose="02070309020205020404" pitchFamily="49" charset="0"/>
-              </a:rPr>
-              <a:t>fsanitize</a:t>
-            </a:r>
-            <a:r>
-              <a:rPr lang="en-US" dirty="0">
-                <a:latin typeface="Courier New" panose="02070309020205020404" pitchFamily="49" charset="0"/>
-                <a:cs typeface="Courier New" panose="02070309020205020404" pitchFamily="49" charset="0"/>
-              </a:rPr>
-              <a:t>-minimal-runtime</a:t>
-            </a:r>
-          </a:p>
-          <a:p>
-            <a:pPr lvl="1"/>
-            <a:r>
-              <a:rPr lang="ru-RU" dirty="0"/>
-              <a:t>Рекомендую также добавлять </a:t>
-            </a:r>
-            <a:r>
-              <a:rPr lang="en-US" dirty="0">
-                <a:latin typeface="Courier New" panose="02070309020205020404" pitchFamily="49" charset="0"/>
-                <a:cs typeface="Courier New" panose="02070309020205020404" pitchFamily="49" charset="0"/>
-              </a:rPr>
-              <a:t>-</a:t>
-            </a:r>
-            <a:r>
-              <a:rPr lang="en-US" dirty="0" err="1">
-                <a:latin typeface="Courier New" panose="02070309020205020404" pitchFamily="49" charset="0"/>
-                <a:cs typeface="Courier New" panose="02070309020205020404" pitchFamily="49" charset="0"/>
-              </a:rPr>
-              <a:t>fsanitize</a:t>
-            </a:r>
-            <a:r>
-              <a:rPr lang="en-US" dirty="0">
-                <a:latin typeface="Courier New" panose="02070309020205020404" pitchFamily="49" charset="0"/>
-                <a:cs typeface="Courier New" panose="02070309020205020404" pitchFamily="49" charset="0"/>
-              </a:rPr>
-              <a:t>=integer</a:t>
-            </a:r>
-            <a:r>
-              <a:rPr lang="en-US" dirty="0"/>
-              <a:t> </a:t>
-            </a:r>
-            <a:r>
-              <a:rPr lang="ru-RU" dirty="0"/>
-              <a:t>(может потребоваться добавить некоторые </a:t>
-            </a:r>
-            <a:r>
-              <a:rPr lang="en-US" dirty="0"/>
-              <a:t>STL </a:t>
-            </a:r>
-            <a:r>
-              <a:rPr lang="ru-RU" dirty="0"/>
-              <a:t>хедеры в </a:t>
-            </a:r>
-            <a:r>
-              <a:rPr lang="en-US" dirty="0"/>
-              <a:t>blacklist</a:t>
-            </a:r>
-            <a:r>
-              <a:rPr lang="ru-RU" dirty="0"/>
-              <a:t>)</a:t>
-            </a:r>
-            <a:endParaRPr lang="en-US" dirty="0">
-              <a:latin typeface="Courier New" panose="02070309020205020404" pitchFamily="49" charset="0"/>
-              <a:cs typeface="Courier New" panose="02070309020205020404" pitchFamily="49" charset="0"/>
-            </a:endParaRPr>
-          </a:p>
-          <a:p>
-            <a:r>
-              <a:rPr lang="ru-RU" dirty="0"/>
-              <a:t>Использование в реальных проектах</a:t>
-            </a:r>
-            <a:r>
-              <a:rPr lang="en-US" dirty="0"/>
-              <a:t>:</a:t>
-            </a:r>
-            <a:endParaRPr lang="ru-RU" dirty="0"/>
-          </a:p>
-          <a:p>
-            <a:pPr lvl="1"/>
-            <a:r>
-              <a:rPr lang="ru-RU" dirty="0"/>
-              <a:t>Защита не используется в </a:t>
-            </a:r>
-            <a:r>
-              <a:rPr lang="en-US" dirty="0"/>
-              <a:t>Ubuntu, Debian, Fedora</a:t>
-            </a:r>
-            <a:r>
-              <a:rPr lang="ru-RU" dirty="0"/>
-              <a:t>, а также в браузерах </a:t>
-            </a:r>
-            <a:r>
-              <a:rPr lang="en-US" dirty="0"/>
-              <a:t>Chrome </a:t>
-            </a:r>
-            <a:r>
-              <a:rPr lang="ru-RU" dirty="0"/>
-              <a:t>и </a:t>
-            </a:r>
-            <a:r>
-              <a:rPr lang="en-US" dirty="0"/>
-              <a:t>Firefox</a:t>
-            </a:r>
-          </a:p>
-          <a:p>
-            <a:pPr lvl="1"/>
-            <a:r>
-              <a:rPr lang="ru-RU" dirty="0"/>
-              <a:t>Включена в </a:t>
-            </a:r>
-            <a:r>
-              <a:rPr lang="en-US" dirty="0"/>
-              <a:t>Android media stack:</a:t>
-            </a:r>
-          </a:p>
-          <a:p>
-            <a:pPr lvl="2"/>
-            <a:r>
-              <a:rPr lang="en-US" dirty="0">
-                <a:hlinkClick r:id="rId2"/>
-              </a:rPr>
-              <a:t>Android Developers Blog: Hardening media stack</a:t>
-            </a:r>
-            <a:endParaRPr lang="en-US" dirty="0"/>
-          </a:p>
-          <a:p>
-            <a:pPr lvl="2"/>
-            <a:r>
-              <a:rPr lang="en-US" dirty="0">
-                <a:hlinkClick r:id="rId3"/>
-              </a:rPr>
-              <a:t>Android Developers Blog: Compiler-based security mitigations in Android P</a:t>
-            </a:r>
-            <a:endParaRPr lang="en-US" dirty="0"/>
-          </a:p>
-        </p:txBody>
-      </p:sp>
-      <p:sp>
-        <p:nvSpPr>
-          <p:cNvPr id="4" name="Slide Number Placeholder 3">
-            <a:extLst>
-              <a:ext uri="{FF2B5EF4-FFF2-40B4-BE49-F238E27FC236}">
-                <a16:creationId xmlns:a16="http://schemas.microsoft.com/office/drawing/2014/main" id="{FD5801BD-7B4E-4514-8AA3-A09D92C0889F}"/>
-              </a:ext>
-            </a:extLst>
-          </p:cNvPr>
-          <p:cNvSpPr>
-            <a:spLocks noGrp="1"/>
-          </p:cNvSpPr>
-          <p:nvPr>
-            <p:ph type="sldNum" sz="quarter" idx="12"/>
-          </p:nvPr>
-        </p:nvSpPr>
-        <p:spPr/>
-        <p:txBody>
-          <a:bodyPr/>
-          <a:lstStyle/>
-          <a:p>
-            <a:fld id="{9077AC13-74B0-42BB-979A-B4FD3BCA574B}" type="slidenum">
-              <a:rPr lang="en-US" smtClean="0"/>
-              <a:t>119</a:t>
-            </a:fld>
-            <a:endParaRPr lang="en-US"/>
-          </a:p>
-        </p:txBody>
-      </p:sp>
-    </p:spTree>
-    <p:extLst>
-      <p:ext uri="{BB962C8B-B14F-4D97-AF65-F5344CB8AC3E}">
-        <p14:creationId xmlns:p14="http://schemas.microsoft.com/office/powerpoint/2010/main" val="2925941201"/>
       </p:ext>
     </p:extLst>
   </p:cSld>
@@ -9828,6 +9597,397 @@
           <p:cNvPr id="2" name="Title 1">
             <a:extLst>
               <a:ext uri="{FF2B5EF4-FFF2-40B4-BE49-F238E27FC236}">
+                <a16:creationId xmlns:a16="http://schemas.microsoft.com/office/drawing/2014/main" id="{3E390CB5-FF6E-4765-B937-FC6BA0EF02FC}"/>
+              </a:ext>
+            </a:extLst>
+          </p:cNvPr>
+          <p:cNvSpPr>
+            <a:spLocks noGrp="1"/>
+          </p:cNvSpPr>
+          <p:nvPr>
+            <p:ph type="title"/>
+          </p:nvPr>
+        </p:nvSpPr>
+        <p:spPr/>
+        <p:txBody>
+          <a:bodyPr/>
+          <a:lstStyle/>
+          <a:p>
+            <a:r>
+              <a:rPr lang="ru-RU" dirty="0"/>
+              <a:t>Целочисленные переполнения</a:t>
+            </a:r>
+            <a:r>
+              <a:rPr lang="en-US" dirty="0"/>
+              <a:t>: </a:t>
+            </a:r>
+            <a:r>
+              <a:rPr lang="ru-RU" dirty="0"/>
+              <a:t>Как включить </a:t>
+            </a:r>
+            <a:r>
+              <a:rPr lang="en-US" dirty="0"/>
+              <a:t>?</a:t>
+            </a:r>
+          </a:p>
+        </p:txBody>
+      </p:sp>
+      <p:sp>
+        <p:nvSpPr>
+          <p:cNvPr id="3" name="Content Placeholder 2">
+            <a:extLst>
+              <a:ext uri="{FF2B5EF4-FFF2-40B4-BE49-F238E27FC236}">
+                <a16:creationId xmlns:a16="http://schemas.microsoft.com/office/drawing/2014/main" id="{DAADEE4F-0571-446A-90C7-1E44732CD1C9}"/>
+              </a:ext>
+            </a:extLst>
+          </p:cNvPr>
+          <p:cNvSpPr>
+            <a:spLocks noGrp="1"/>
+          </p:cNvSpPr>
+          <p:nvPr>
+            <p:ph idx="1"/>
+          </p:nvPr>
+        </p:nvSpPr>
+        <p:spPr/>
+        <p:txBody>
+          <a:bodyPr>
+            <a:normAutofit fontScale="92500" lnSpcReduction="20000"/>
+          </a:bodyPr>
+          <a:lstStyle/>
+          <a:p>
+            <a:r>
+              <a:rPr lang="en-US" dirty="0"/>
+              <a:t>GCC: </a:t>
+            </a:r>
+            <a:r>
+              <a:rPr lang="en-US" dirty="0">
+                <a:latin typeface="Courier New" panose="02070309020205020404" pitchFamily="49" charset="0"/>
+                <a:cs typeface="Courier New" panose="02070309020205020404" pitchFamily="49" charset="0"/>
+              </a:rPr>
+              <a:t>-</a:t>
+            </a:r>
+            <a:r>
+              <a:rPr lang="en-US" dirty="0" err="1">
+                <a:latin typeface="Courier New" panose="02070309020205020404" pitchFamily="49" charset="0"/>
+                <a:cs typeface="Courier New" panose="02070309020205020404" pitchFamily="49" charset="0"/>
+              </a:rPr>
+              <a:t>fsanitize</a:t>
+            </a:r>
+            <a:r>
+              <a:rPr lang="en-US" dirty="0">
+                <a:latin typeface="Courier New" panose="02070309020205020404" pitchFamily="49" charset="0"/>
+                <a:cs typeface="Courier New" panose="02070309020205020404" pitchFamily="49" charset="0"/>
+              </a:rPr>
+              <a:t>-trap=signed-integer-</a:t>
+            </a:r>
+            <a:r>
+              <a:rPr lang="en-US" dirty="0" err="1">
+                <a:latin typeface="Courier New" panose="02070309020205020404" pitchFamily="49" charset="0"/>
+                <a:cs typeface="Courier New" panose="02070309020205020404" pitchFamily="49" charset="0"/>
+              </a:rPr>
+              <a:t>overflow,pointer</a:t>
+            </a:r>
+            <a:r>
+              <a:rPr lang="en-US" dirty="0">
+                <a:latin typeface="Courier New" panose="02070309020205020404" pitchFamily="49" charset="0"/>
+                <a:cs typeface="Courier New" panose="02070309020205020404" pitchFamily="49" charset="0"/>
+              </a:rPr>
+              <a:t>-overflow</a:t>
+            </a:r>
+          </a:p>
+          <a:p>
+            <a:pPr lvl="1"/>
+            <a:r>
+              <a:rPr lang="en-US" dirty="0"/>
+              <a:t>GCC </a:t>
+            </a:r>
+            <a:r>
+              <a:rPr lang="ru-RU" dirty="0"/>
+              <a:t>не поддерживает </a:t>
+            </a:r>
+            <a:r>
+              <a:rPr lang="en-US" dirty="0">
+                <a:latin typeface="Courier New" panose="02070309020205020404" pitchFamily="49" charset="0"/>
+                <a:cs typeface="Courier New" panose="02070309020205020404" pitchFamily="49" charset="0"/>
+              </a:rPr>
+              <a:t>integer</a:t>
+            </a:r>
+          </a:p>
+          <a:p>
+            <a:pPr lvl="1"/>
+            <a:r>
+              <a:rPr lang="ru-RU" dirty="0"/>
+              <a:t>Ещё раз отметим что </a:t>
+            </a:r>
+            <a:r>
+              <a:rPr lang="en-US" dirty="0">
+                <a:latin typeface="Courier New" panose="02070309020205020404" pitchFamily="49" charset="0"/>
+                <a:cs typeface="Courier New" panose="02070309020205020404" pitchFamily="49" charset="0"/>
+              </a:rPr>
+              <a:t>-</a:t>
+            </a:r>
+            <a:r>
+              <a:rPr lang="en-US" dirty="0" err="1">
+                <a:latin typeface="Courier New" panose="02070309020205020404" pitchFamily="49" charset="0"/>
+                <a:cs typeface="Courier New" panose="02070309020205020404" pitchFamily="49" charset="0"/>
+              </a:rPr>
+              <a:t>ftrapv</a:t>
+            </a:r>
+            <a:r>
+              <a:rPr lang="en-US" dirty="0"/>
+              <a:t> </a:t>
+            </a:r>
+            <a:r>
+              <a:rPr lang="ru-RU" i="1" dirty="0"/>
+              <a:t>неработоспособна</a:t>
+            </a:r>
+          </a:p>
+          <a:p>
+            <a:r>
+              <a:rPr lang="en-US" dirty="0"/>
+              <a:t>Clang: </a:t>
+            </a:r>
+            <a:r>
+              <a:rPr lang="en-US" dirty="0">
+                <a:latin typeface="Courier New" panose="02070309020205020404" pitchFamily="49" charset="0"/>
+                <a:cs typeface="Courier New" panose="02070309020205020404" pitchFamily="49" charset="0"/>
+              </a:rPr>
+              <a:t>-</a:t>
+            </a:r>
+            <a:r>
+              <a:rPr lang="en-US" dirty="0" err="1">
+                <a:latin typeface="Courier New" panose="02070309020205020404" pitchFamily="49" charset="0"/>
+                <a:cs typeface="Courier New" panose="02070309020205020404" pitchFamily="49" charset="0"/>
+              </a:rPr>
+              <a:t>fsanitize</a:t>
+            </a:r>
+            <a:r>
+              <a:rPr lang="en-US" dirty="0">
+                <a:latin typeface="Courier New" panose="02070309020205020404" pitchFamily="49" charset="0"/>
+                <a:cs typeface="Courier New" panose="02070309020205020404" pitchFamily="49" charset="0"/>
+              </a:rPr>
+              <a:t>=signed-integer-</a:t>
+            </a:r>
+            <a:r>
+              <a:rPr lang="en-US" dirty="0" err="1">
+                <a:latin typeface="Courier New" panose="02070309020205020404" pitchFamily="49" charset="0"/>
+                <a:cs typeface="Courier New" panose="02070309020205020404" pitchFamily="49" charset="0"/>
+              </a:rPr>
+              <a:t>overflow,pointer</a:t>
+            </a:r>
+            <a:r>
+              <a:rPr lang="en-US" dirty="0">
+                <a:latin typeface="Courier New" panose="02070309020205020404" pitchFamily="49" charset="0"/>
+                <a:cs typeface="Courier New" panose="02070309020205020404" pitchFamily="49" charset="0"/>
+              </a:rPr>
+              <a:t>-overflow -</a:t>
+            </a:r>
+            <a:r>
+              <a:rPr lang="en-US" dirty="0" err="1">
+                <a:latin typeface="Courier New" panose="02070309020205020404" pitchFamily="49" charset="0"/>
+                <a:cs typeface="Courier New" panose="02070309020205020404" pitchFamily="49" charset="0"/>
+              </a:rPr>
+              <a:t>fsanitize</a:t>
+            </a:r>
+            <a:r>
+              <a:rPr lang="en-US" dirty="0">
+                <a:latin typeface="Courier New" panose="02070309020205020404" pitchFamily="49" charset="0"/>
+                <a:cs typeface="Courier New" panose="02070309020205020404" pitchFamily="49" charset="0"/>
+              </a:rPr>
+              <a:t>-minimal-runtime</a:t>
+            </a:r>
+          </a:p>
+          <a:p>
+            <a:pPr lvl="1"/>
+            <a:r>
+              <a:rPr lang="ru-RU" dirty="0"/>
+              <a:t>Рекомендую также добавлять </a:t>
+            </a:r>
+            <a:r>
+              <a:rPr lang="en-US" dirty="0">
+                <a:latin typeface="Courier New" panose="02070309020205020404" pitchFamily="49" charset="0"/>
+                <a:cs typeface="Courier New" panose="02070309020205020404" pitchFamily="49" charset="0"/>
+              </a:rPr>
+              <a:t>-</a:t>
+            </a:r>
+            <a:r>
+              <a:rPr lang="en-US" dirty="0" err="1">
+                <a:latin typeface="Courier New" panose="02070309020205020404" pitchFamily="49" charset="0"/>
+                <a:cs typeface="Courier New" panose="02070309020205020404" pitchFamily="49" charset="0"/>
+              </a:rPr>
+              <a:t>fsanitize</a:t>
+            </a:r>
+            <a:r>
+              <a:rPr lang="en-US" dirty="0">
+                <a:latin typeface="Courier New" panose="02070309020205020404" pitchFamily="49" charset="0"/>
+                <a:cs typeface="Courier New" panose="02070309020205020404" pitchFamily="49" charset="0"/>
+              </a:rPr>
+              <a:t>=integer</a:t>
+            </a:r>
+            <a:r>
+              <a:rPr lang="en-US" dirty="0"/>
+              <a:t> </a:t>
+            </a:r>
+            <a:r>
+              <a:rPr lang="ru-RU" dirty="0"/>
+              <a:t>(может потребоваться добавить некоторые </a:t>
+            </a:r>
+            <a:r>
+              <a:rPr lang="en-US" dirty="0"/>
+              <a:t>STL </a:t>
+            </a:r>
+            <a:r>
+              <a:rPr lang="ru-RU" dirty="0"/>
+              <a:t>хедеры в </a:t>
+            </a:r>
+            <a:r>
+              <a:rPr lang="en-US" dirty="0"/>
+              <a:t>blacklist</a:t>
+            </a:r>
+            <a:r>
+              <a:rPr lang="ru-RU" dirty="0"/>
+              <a:t>)</a:t>
+            </a:r>
+            <a:endParaRPr lang="en-US" dirty="0">
+              <a:latin typeface="Courier New" panose="02070309020205020404" pitchFamily="49" charset="0"/>
+              <a:cs typeface="Courier New" panose="02070309020205020404" pitchFamily="49" charset="0"/>
+            </a:endParaRPr>
+          </a:p>
+          <a:p>
+            <a:r>
+              <a:rPr lang="ru-RU" dirty="0"/>
+              <a:t>Использование в реальных проектах</a:t>
+            </a:r>
+            <a:r>
+              <a:rPr lang="en-US" dirty="0"/>
+              <a:t>:</a:t>
+            </a:r>
+            <a:endParaRPr lang="ru-RU" dirty="0"/>
+          </a:p>
+          <a:p>
+            <a:pPr lvl="1"/>
+            <a:r>
+              <a:rPr lang="ru-RU" dirty="0"/>
+              <a:t>Защита не используется в </a:t>
+            </a:r>
+            <a:r>
+              <a:rPr lang="en-US" dirty="0"/>
+              <a:t>Ubuntu, Debian, Fedora</a:t>
+            </a:r>
+            <a:r>
+              <a:rPr lang="ru-RU" dirty="0"/>
+              <a:t>, а также в браузерах </a:t>
+            </a:r>
+            <a:r>
+              <a:rPr lang="en-US" dirty="0"/>
+              <a:t>Chrome </a:t>
+            </a:r>
+            <a:r>
+              <a:rPr lang="ru-RU" dirty="0"/>
+              <a:t>и </a:t>
+            </a:r>
+            <a:r>
+              <a:rPr lang="en-US" dirty="0"/>
+              <a:t>Firefox</a:t>
+            </a:r>
+          </a:p>
+          <a:p>
+            <a:pPr lvl="1"/>
+            <a:r>
+              <a:rPr lang="ru-RU" dirty="0"/>
+              <a:t>Включена в </a:t>
+            </a:r>
+            <a:r>
+              <a:rPr lang="en-US" dirty="0"/>
+              <a:t>Android media stack:</a:t>
+            </a:r>
+          </a:p>
+          <a:p>
+            <a:pPr lvl="2"/>
+            <a:r>
+              <a:rPr lang="en-US" dirty="0">
+                <a:hlinkClick r:id="rId2"/>
+              </a:rPr>
+              <a:t>Android Developers Blog: Hardening media stack</a:t>
+            </a:r>
+            <a:endParaRPr lang="en-US" dirty="0"/>
+          </a:p>
+          <a:p>
+            <a:pPr lvl="2"/>
+            <a:r>
+              <a:rPr lang="en-US" dirty="0">
+                <a:hlinkClick r:id="rId3"/>
+              </a:rPr>
+              <a:t>Android Developers Blog: Compiler-based security mitigations in Android P</a:t>
+            </a:r>
+            <a:endParaRPr lang="en-US" dirty="0"/>
+          </a:p>
+        </p:txBody>
+      </p:sp>
+      <p:sp>
+        <p:nvSpPr>
+          <p:cNvPr id="4" name="Slide Number Placeholder 3">
+            <a:extLst>
+              <a:ext uri="{FF2B5EF4-FFF2-40B4-BE49-F238E27FC236}">
+                <a16:creationId xmlns:a16="http://schemas.microsoft.com/office/drawing/2014/main" id="{FD5801BD-7B4E-4514-8AA3-A09D92C0889F}"/>
+              </a:ext>
+            </a:extLst>
+          </p:cNvPr>
+          <p:cNvSpPr>
+            <a:spLocks noGrp="1"/>
+          </p:cNvSpPr>
+          <p:nvPr>
+            <p:ph type="sldNum" sz="quarter" idx="12"/>
+          </p:nvPr>
+        </p:nvSpPr>
+        <p:spPr/>
+        <p:txBody>
+          <a:bodyPr/>
+          <a:lstStyle/>
+          <a:p>
+            <a:fld id="{9077AC13-74B0-42BB-979A-B4FD3BCA574B}" type="slidenum">
+              <a:rPr lang="en-US" smtClean="0"/>
+              <a:t>120</a:t>
+            </a:fld>
+            <a:endParaRPr lang="en-US"/>
+          </a:p>
+        </p:txBody>
+      </p:sp>
+    </p:spTree>
+    <p:extLst>
+      <p:ext uri="{BB962C8B-B14F-4D97-AF65-F5344CB8AC3E}">
+        <p14:creationId xmlns:p14="http://schemas.microsoft.com/office/powerpoint/2010/main" val="2925941201"/>
+      </p:ext>
+    </p:extLst>
+  </p:cSld>
+  <p:clrMapOvr>
+    <a:masterClrMapping/>
+  </p:clrMapOvr>
+</p:sld>
+</file>
+
+<file path=ppt/slides/slide121.xml><?xml version="1.0" encoding="utf-8"?>
+<p:sld xmlns:a="http://schemas.openxmlformats.org/drawingml/2006/main" xmlns:r="http://schemas.openxmlformats.org/officeDocument/2006/relationships" xmlns:p="http://schemas.openxmlformats.org/presentationml/2006/main">
+  <p:cSld>
+    <p:spTree>
+      <p:nvGrpSpPr>
+        <p:cNvPr id="1" name=""/>
+        <p:cNvGrpSpPr/>
+        <p:nvPr/>
+      </p:nvGrpSpPr>
+      <p:grpSpPr>
+        <a:xfrm>
+          <a:off x="0" y="0"/>
+          <a:ext cx="0" cy="0"/>
+          <a:chOff x="0" y="0"/>
+          <a:chExt cx="0" cy="0"/>
+        </a:xfrm>
+      </p:grpSpPr>
+      <p:sp>
+        <p:nvSpPr>
+          <p:cNvPr id="2" name="Title 1">
+            <a:extLst>
+              <a:ext uri="{FF2B5EF4-FFF2-40B4-BE49-F238E27FC236}">
                 <a16:creationId xmlns:a16="http://schemas.microsoft.com/office/drawing/2014/main" id="{5A565717-4BAA-4EF0-AE04-1234344C22C6}"/>
               </a:ext>
             </a:extLst>
@@ -10042,7 +10202,7 @@
           <a:p>
             <a:fld id="{9077AC13-74B0-42BB-979A-B4FD3BCA574B}" type="slidenum">
               <a:rPr lang="en-US" smtClean="0"/>
-              <a:t>120</a:t>
+              <a:t>121</a:t>
             </a:fld>
             <a:endParaRPr lang="en-US"/>
           </a:p>
@@ -10061,7 +10221,7 @@
 </p:sld>
 </file>
 
-<file path=ppt/slides/slide121.xml><?xml version="1.0" encoding="utf-8"?>
+<file path=ppt/slides/slide122.xml><?xml version="1.0" encoding="utf-8"?>
 <p:sld xmlns:a="http://schemas.openxmlformats.org/drawingml/2006/main" xmlns:r="http://schemas.openxmlformats.org/officeDocument/2006/relationships" xmlns:p="http://schemas.openxmlformats.org/presentationml/2006/main">
   <p:cSld>
     <p:spTree>
@@ -10567,7 +10727,7 @@
           <a:p>
             <a:fld id="{9077AC13-74B0-42BB-979A-B4FD3BCA574B}" type="slidenum">
               <a:rPr lang="en-US" smtClean="0"/>
-              <a:t>121</a:t>
+              <a:t>122</a:t>
             </a:fld>
             <a:endParaRPr lang="en-US"/>
           </a:p>
@@ -12446,7 +12606,10 @@
               </a:rPr>
               <a:t>Google Project Zero</a:t>
             </a:r>
-            <a:endParaRPr lang="en-US" dirty="0"/>
+            <a:r>
+              <a:rPr lang="en-US" dirty="0"/>
+              <a:t>(2024)</a:t>
+            </a:r>
           </a:p>
           <a:p>
             <a:r>
@@ -14968,16 +15131,10 @@
           <a:p>
             <a:pPr lvl="1"/>
             <a:r>
-              <a:rPr lang="en-US" dirty="0">
-                <a:hlinkClick r:id="rId3"/>
-              </a:rPr>
-              <a:t>C++Russia: </a:t>
-            </a:r>
-            <a:r>
               <a:rPr lang="ru-RU" dirty="0">
                 <a:hlinkClick r:id="rId3"/>
               </a:rPr>
-              <a:t>Динамические библиотеки и способы ускорения их работы</a:t>
+              <a:t>C++Russia 2024: Динамические библиотеки и способы ускорения их работы</a:t>
             </a:r>
             <a:endParaRPr lang="en-US" dirty="0"/>
           </a:p>
@@ -18385,7 +18542,7 @@
         <p:spPr/>
         <p:txBody>
           <a:bodyPr>
-            <a:normAutofit fontScale="92500" lnSpcReduction="10000"/>
+            <a:normAutofit fontScale="92500" lnSpcReduction="20000"/>
           </a:bodyPr>
           <a:lstStyle/>
           <a:p>
@@ -18402,51 +18559,56 @@
             <a:pPr lvl="1"/>
             <a:r>
               <a:rPr lang="ru-RU" dirty="0"/>
-              <a:t>Лидирующие позиции в рейтинге наиболее опасных уязвимостей</a:t>
+              <a:t>70% уязвимостей в продуктах </a:t>
+            </a:r>
+            <a:r>
+              <a:rPr lang="en-US" dirty="0"/>
+              <a:t>Microsoft - </a:t>
+            </a:r>
+            <a:r>
+              <a:rPr lang="ru-RU" dirty="0"/>
+              <a:t>ошибки памяти</a:t>
             </a:r>
             <a:endParaRPr lang="en-US" dirty="0"/>
           </a:p>
           <a:p>
             <a:pPr lvl="2"/>
-            <a:r>
-              <a:rPr lang="en-US" dirty="0" err="1">
-                <a:hlinkClick r:id="rId2"/>
-              </a:rPr>
-              <a:t>Mitre</a:t>
-            </a:r>
             <a:r>
               <a:rPr lang="en-US" dirty="0">
                 <a:hlinkClick r:id="rId2"/>
               </a:rPr>
-              <a:t> CWE Top 25 2024</a:t>
-            </a:r>
-            <a:r>
-              <a:rPr lang="en-US" dirty="0"/>
-              <a:t> (</a:t>
-            </a:r>
-            <a:r>
-              <a:rPr lang="ru-RU" dirty="0"/>
-              <a:t>места 2, 6, 8, 20</a:t>
-            </a:r>
-            <a:r>
-              <a:rPr lang="en-US" dirty="0"/>
-              <a:t>, 21)</a:t>
-            </a:r>
-            <a:endParaRPr lang="ru-RU" dirty="0"/>
+              <a:t>MSRC Blog: A proactive approach to more secure code</a:t>
+            </a:r>
+            <a:r>
+              <a:rPr lang="en-US" dirty="0"/>
+              <a:t> (2019)</a:t>
+            </a:r>
           </a:p>
           <a:p>
             <a:pPr lvl="1"/>
             <a:r>
-              <a:rPr lang="ru-RU" dirty="0"/>
-              <a:t>70% уязвимостей в продуктах </a:t>
-            </a:r>
-            <a:r>
-              <a:rPr lang="en-US" dirty="0"/>
-              <a:t>Microsoft - </a:t>
-            </a:r>
-            <a:r>
-              <a:rPr lang="ru-RU" dirty="0"/>
-              <a:t>ошибки памяти</a:t>
+              <a:rPr lang="en-US" dirty="0"/>
+              <a:t>70% high/critical </a:t>
+            </a:r>
+            <a:r>
+              <a:rPr lang="ru-RU" dirty="0"/>
+              <a:t>багов в </a:t>
+            </a:r>
+            <a:r>
+              <a:rPr lang="en-US" dirty="0"/>
+              <a:t>Chromium – </a:t>
+            </a:r>
+            <a:r>
+              <a:rPr lang="ru-RU" dirty="0"/>
+              <a:t>ошибки</a:t>
+            </a:r>
+            <a:r>
+              <a:rPr lang="en-US" dirty="0"/>
+              <a:t> </a:t>
+            </a:r>
+            <a:r>
+              <a:rPr lang="ru-RU" dirty="0"/>
+              <a:t>памяти</a:t>
             </a:r>
             <a:endParaRPr lang="en-US" dirty="0"/>
           </a:p>
@@ -18456,27 +18618,22 @@
               <a:rPr lang="en-US" dirty="0">
                 <a:hlinkClick r:id="rId3"/>
               </a:rPr>
-              <a:t>MSRC Blog: A proactive approach to more secure code</a:t>
-            </a:r>
-            <a:endParaRPr lang="en-US" dirty="0"/>
+              <a:t>Chromium Security: Memory Safety</a:t>
+            </a:r>
+            <a:r>
+              <a:rPr lang="en-US" dirty="0"/>
+              <a:t> (2025)</a:t>
+            </a:r>
           </a:p>
           <a:p>
             <a:pPr lvl="1"/>
             <a:r>
               <a:rPr lang="en-US" dirty="0"/>
-              <a:t>70% high/critical </a:t>
-            </a:r>
-            <a:r>
-              <a:rPr lang="ru-RU" dirty="0"/>
-              <a:t>багов в </a:t>
-            </a:r>
-            <a:r>
-              <a:rPr lang="en-US" dirty="0"/>
-              <a:t>Chromium – </a:t>
-            </a:r>
-            <a:r>
-              <a:rPr lang="ru-RU" dirty="0"/>
-              <a:t>ошибки</a:t>
+              <a:t>70% </a:t>
+            </a:r>
+            <a:r>
+              <a:rPr lang="ru-RU" dirty="0"/>
+              <a:t>ошибок</a:t>
             </a:r>
             <a:r>
               <a:rPr lang="en-US" dirty="0"/>
@@ -18484,7 +18641,15 @@
             </a:r>
             <a:r>
               <a:rPr lang="ru-RU" dirty="0"/>
-              <a:t>памяти</a:t>
+              <a:t>памяти – 0-</a:t>
+            </a:r>
+            <a:r>
+              <a:rPr lang="en-US" dirty="0"/>
+              <a:t>day </a:t>
+            </a:r>
+            <a:r>
+              <a:rPr lang="ru-RU" dirty="0"/>
+              <a:t>уязвимости</a:t>
             </a:r>
             <a:endParaRPr lang="en-US" dirty="0"/>
           </a:p>
@@ -18494,45 +18659,72 @@
               <a:rPr lang="en-US" dirty="0">
                 <a:hlinkClick r:id="rId4"/>
               </a:rPr>
-              <a:t>Chromium Security: Memory Safety</a:t>
+              <a:t>Improving Memory Safety without a Trillion Dollars</a:t>
+            </a:r>
+            <a:r>
+              <a:rPr lang="en-US" dirty="0"/>
+              <a:t> (2024)</a:t>
+            </a:r>
+          </a:p>
+          <a:p>
+            <a:pPr lvl="1"/>
+            <a:r>
+              <a:rPr lang="en-US" dirty="0"/>
+              <a:t>75% 0-day – </a:t>
+            </a:r>
+            <a:r>
+              <a:rPr lang="ru-RU" dirty="0"/>
+              <a:t>ошибки памяти</a:t>
             </a:r>
             <a:endParaRPr lang="en-US" dirty="0"/>
           </a:p>
           <a:p>
+            <a:pPr lvl="2"/>
+            <a:r>
+              <a:rPr lang="en-US" dirty="0">
+                <a:hlinkClick r:id="rId5"/>
+              </a:rPr>
+              <a:t>Safer with Google: Advancing Memory Safety</a:t>
+            </a:r>
+            <a:r>
+              <a:rPr lang="en-US" dirty="0"/>
+              <a:t> (2024)</a:t>
+            </a:r>
+            <a:endParaRPr lang="ru-RU" dirty="0"/>
+          </a:p>
+          <a:p>
             <a:pPr lvl="1"/>
             <a:r>
-              <a:rPr lang="en-US" dirty="0"/>
-              <a:t>70% </a:t>
-            </a:r>
-            <a:r>
-              <a:rPr lang="ru-RU" dirty="0"/>
-              <a:t>ошибок</a:t>
-            </a:r>
-            <a:r>
-              <a:rPr lang="en-US" dirty="0"/>
-              <a:t> </a:t>
-            </a:r>
-            <a:r>
-              <a:rPr lang="ru-RU" dirty="0"/>
-              <a:t>памяти – 0-</a:t>
-            </a:r>
-            <a:r>
-              <a:rPr lang="en-US" dirty="0"/>
-              <a:t>day </a:t>
-            </a:r>
-            <a:r>
-              <a:rPr lang="ru-RU" dirty="0"/>
-              <a:t>уязвимости</a:t>
+              <a:rPr lang="ru-RU" dirty="0"/>
+              <a:t>Лидирующие позиции в рейтинге наиболее опасных уязвимостей</a:t>
             </a:r>
             <a:endParaRPr lang="en-US" dirty="0"/>
           </a:p>
           <a:p>
             <a:pPr lvl="2"/>
             <a:r>
+              <a:rPr lang="en-US" dirty="0" err="1">
+                <a:hlinkClick r:id="rId6"/>
+              </a:rPr>
+              <a:t>Mitre</a:t>
+            </a:r>
+            <a:r>
               <a:rPr lang="en-US" dirty="0">
-                <a:hlinkClick r:id="rId5" action="ppaction://hlinkfile"/>
-              </a:rPr>
-              <a:t>Improving Memory Safety without a Trillion Dollars</a:t>
+                <a:hlinkClick r:id="rId6"/>
+              </a:rPr>
+              <a:t> CWE Top 25 2024</a:t>
+            </a:r>
+            <a:r>
+              <a:rPr lang="en-US" dirty="0"/>
+              <a:t> (</a:t>
+            </a:r>
+            <a:r>
+              <a:rPr lang="ru-RU" dirty="0"/>
+              <a:t>места 2, 6, 8, 20</a:t>
+            </a:r>
+            <a:r>
+              <a:rPr lang="en-US" dirty="0"/>
+              <a:t>, 21)</a:t>
             </a:r>
             <a:endParaRPr lang="ru-RU" dirty="0"/>
           </a:p>
@@ -18548,7 +18740,15 @@
             <a:pPr lvl="1"/>
             <a:r>
               <a:rPr lang="ru-RU" dirty="0"/>
-              <a:t>Госзаказчики в различных странах рекомендуют использование безопасных языков</a:t>
+              <a:t>Госзаказчики и регуляторы в различных странах </a:t>
+            </a:r>
+            <a:r>
+              <a:rPr lang="ru-RU" i="1" dirty="0"/>
+              <a:t>рекомендуют</a:t>
+            </a:r>
+            <a:r>
+              <a:rPr lang="ru-RU" dirty="0"/>
+              <a:t> использование безопасных языков</a:t>
             </a:r>
           </a:p>
           <a:p>
@@ -22123,19 +22323,7 @@
               <a:rPr lang="ru-RU" dirty="0">
                 <a:hlinkClick r:id="rId2"/>
               </a:rPr>
-              <a:t>С++</a:t>
-            </a:r>
-            <a:r>
-              <a:rPr lang="en-US" dirty="0">
-                <a:hlinkClick r:id="rId2"/>
-              </a:rPr>
-              <a:t>Russia: </a:t>
-            </a:r>
-            <a:r>
-              <a:rPr lang="ru-RU" dirty="0">
-                <a:hlinkClick r:id="rId2"/>
-              </a:rPr>
-              <a:t>Как правильно писать компараторы</a:t>
+              <a:t>С++Russia 2023: Как правильно писать компараторы</a:t>
             </a:r>
             <a:endParaRPr lang="en-US" dirty="0"/>
           </a:p>
@@ -49700,7 +49888,7 @@
                 <a:latin typeface="Courier New" panose="02070309020205020404" pitchFamily="49" charset="0"/>
                 <a:cs typeface="Courier New" panose="02070309020205020404" pitchFamily="49" charset="0"/>
               </a:rPr>
-              <a:t>0x42;</a:t>
+              <a:t>0xdeadbeef;</a:t>
             </a:r>
             <a:r>
               <a:rPr lang="en-US" altLang="en-US" dirty="0">

</xml_diff>

<commit_message>
Fixed invalid wording about SP adoption in Debian.
</commit_message>
<xml_diff>
--- a/CppZeroCost/2025/RU.pptx
+++ b/CppZeroCost/2025/RU.pptx
@@ -321,7 +321,7 @@
           <a:p>
             <a:fld id="{A8F27B54-EFD4-4F1F-9CE4-9A3C368187A4}" type="datetimeFigureOut">
               <a:rPr lang="en-US" smtClean="0"/>
-              <a:t>7/31/2025</a:t>
+              <a:t>8/1/2025</a:t>
             </a:fld>
             <a:endParaRPr lang="en-US"/>
           </a:p>
@@ -735,7 +735,7 @@
           <a:p>
             <a:fld id="{4E570717-CC08-42AC-84F3-7EB74EE2C2EE}" type="datetime1">
               <a:rPr lang="en-US" smtClean="0"/>
-              <a:t>7/31/2025</a:t>
+              <a:t>8/1/2025</a:t>
             </a:fld>
             <a:endParaRPr lang="en-US"/>
           </a:p>
@@ -933,7 +933,7 @@
           <a:p>
             <a:fld id="{E850434B-ABC0-4013-A159-517880C2CE4B}" type="datetime1">
               <a:rPr lang="en-US" smtClean="0"/>
-              <a:t>7/31/2025</a:t>
+              <a:t>8/1/2025</a:t>
             </a:fld>
             <a:endParaRPr lang="en-US"/>
           </a:p>
@@ -1141,7 +1141,7 @@
           <a:p>
             <a:fld id="{307E2251-42B8-4CD0-9F76-CE8A218C5A9B}" type="datetime1">
               <a:rPr lang="en-US" smtClean="0"/>
-              <a:t>7/31/2025</a:t>
+              <a:t>8/1/2025</a:t>
             </a:fld>
             <a:endParaRPr lang="en-US"/>
           </a:p>
@@ -1339,7 +1339,7 @@
           <a:p>
             <a:fld id="{650366BD-2959-43A5-9C43-B178997CA9C1}" type="datetime1">
               <a:rPr lang="en-US" smtClean="0"/>
-              <a:t>7/31/2025</a:t>
+              <a:t>8/1/2025</a:t>
             </a:fld>
             <a:endParaRPr lang="en-US"/>
           </a:p>
@@ -1614,7 +1614,7 @@
           <a:p>
             <a:fld id="{44A443A2-278A-4AA2-A6FA-B813D9AB289B}" type="datetime1">
               <a:rPr lang="en-US" smtClean="0"/>
-              <a:t>7/31/2025</a:t>
+              <a:t>8/1/2025</a:t>
             </a:fld>
             <a:endParaRPr lang="en-US"/>
           </a:p>
@@ -1879,7 +1879,7 @@
           <a:p>
             <a:fld id="{8DB96CD0-8DC9-4D9E-8F97-A64EB549E498}" type="datetime1">
               <a:rPr lang="en-US" smtClean="0"/>
-              <a:t>7/31/2025</a:t>
+              <a:t>8/1/2025</a:t>
             </a:fld>
             <a:endParaRPr lang="en-US"/>
           </a:p>
@@ -2291,7 +2291,7 @@
           <a:p>
             <a:fld id="{8728ABDD-F7C0-49E5-BDEF-78EEAB9D4FF0}" type="datetime1">
               <a:rPr lang="en-US" smtClean="0"/>
-              <a:t>7/31/2025</a:t>
+              <a:t>8/1/2025</a:t>
             </a:fld>
             <a:endParaRPr lang="en-US"/>
           </a:p>
@@ -2432,7 +2432,7 @@
           <a:p>
             <a:fld id="{1815E602-B233-4072-AF5E-EEC16D6A3250}" type="datetime1">
               <a:rPr lang="en-US" smtClean="0"/>
-              <a:t>7/31/2025</a:t>
+              <a:t>8/1/2025</a:t>
             </a:fld>
             <a:endParaRPr lang="en-US"/>
           </a:p>
@@ -2545,7 +2545,7 @@
           <a:p>
             <a:fld id="{B46368E2-0F8E-43F1-B205-4CE4ED81C818}" type="datetime1">
               <a:rPr lang="en-US" smtClean="0"/>
-              <a:t>7/31/2025</a:t>
+              <a:t>8/1/2025</a:t>
             </a:fld>
             <a:endParaRPr lang="en-US"/>
           </a:p>
@@ -2856,7 +2856,7 @@
           <a:p>
             <a:fld id="{A90826D4-3247-4C35-B745-95D9A6527E86}" type="datetime1">
               <a:rPr lang="en-US" smtClean="0"/>
-              <a:t>7/31/2025</a:t>
+              <a:t>8/1/2025</a:t>
             </a:fld>
             <a:endParaRPr lang="en-US"/>
           </a:p>
@@ -3144,7 +3144,7 @@
           <a:p>
             <a:fld id="{F697CA6C-CB8E-4E4E-A40B-CF748107F47F}" type="datetime1">
               <a:rPr lang="en-US" smtClean="0"/>
-              <a:t>7/31/2025</a:t>
+              <a:t>8/1/2025</a:t>
             </a:fld>
             <a:endParaRPr lang="en-US"/>
           </a:p>
@@ -3385,7 +3385,7 @@
           <a:p>
             <a:fld id="{486D2D92-9836-4BF5-99A8-6BBA488E0F07}" type="datetime1">
               <a:rPr lang="en-US" smtClean="0"/>
-              <a:t>7/31/2025</a:t>
+              <a:t>8/1/2025</a:t>
             </a:fld>
             <a:endParaRPr lang="en-US"/>
           </a:p>
@@ -41537,7 +41537,7 @@
         <p:spPr>
           <a:xfrm>
             <a:off x="9448800" y="179249"/>
-            <a:ext cx="2357718" cy="6678751"/>
+            <a:ext cx="2357718" cy="6924973"/>
           </a:xfrm>
           <a:prstGeom prst="rect">
             <a:avLst/>
@@ -41640,7 +41640,15 @@
             </a:r>
             <a:r>
               <a:rPr lang="en-US" sz="1600" dirty="0"/>
-              <a:t>, 85% </a:t>
+              <a:t>, </a:t>
+            </a:r>
+            <a:r>
+              <a:rPr lang="ru-RU" sz="1600" dirty="0"/>
+              <a:t>только </a:t>
+            </a:r>
+            <a:r>
+              <a:rPr lang="en-US" sz="1600" dirty="0"/>
+              <a:t>85% </a:t>
             </a:r>
             <a:r>
               <a:rPr lang="ru-RU" sz="1600" dirty="0"/>
@@ -41654,7 +41662,7 @@
               <a:rPr lang="ru-RU" sz="1600" dirty="0">
                 <a:hlinkClick r:id="rId3"/>
               </a:rPr>
-              <a:t>не имели </a:t>
+              <a:t>имели </a:t>
             </a:r>
             <a:r>
               <a:rPr lang="en-US" sz="1600" dirty="0" err="1">

</xml_diff>

<commit_message>
Updated list of Linux distros for future study.
</commit_message>
<xml_diff>
--- a/CppZeroCost/2025/RU.pptx
+++ b/CppZeroCost/2025/RU.pptx
@@ -321,7 +321,7 @@
           <a:p>
             <a:fld id="{A8F27B54-EFD4-4F1F-9CE4-9A3C368187A4}" type="datetimeFigureOut">
               <a:rPr lang="en-US" smtClean="0"/>
-              <a:t>8/1/2025</a:t>
+              <a:t>8/2/2025</a:t>
             </a:fld>
             <a:endParaRPr lang="en-US"/>
           </a:p>
@@ -735,7 +735,7 @@
           <a:p>
             <a:fld id="{4E570717-CC08-42AC-84F3-7EB74EE2C2EE}" type="datetime1">
               <a:rPr lang="en-US" smtClean="0"/>
-              <a:t>8/1/2025</a:t>
+              <a:t>8/2/2025</a:t>
             </a:fld>
             <a:endParaRPr lang="en-US"/>
           </a:p>
@@ -933,7 +933,7 @@
           <a:p>
             <a:fld id="{E850434B-ABC0-4013-A159-517880C2CE4B}" type="datetime1">
               <a:rPr lang="en-US" smtClean="0"/>
-              <a:t>8/1/2025</a:t>
+              <a:t>8/2/2025</a:t>
             </a:fld>
             <a:endParaRPr lang="en-US"/>
           </a:p>
@@ -1141,7 +1141,7 @@
           <a:p>
             <a:fld id="{307E2251-42B8-4CD0-9F76-CE8A218C5A9B}" type="datetime1">
               <a:rPr lang="en-US" smtClean="0"/>
-              <a:t>8/1/2025</a:t>
+              <a:t>8/2/2025</a:t>
             </a:fld>
             <a:endParaRPr lang="en-US"/>
           </a:p>
@@ -1339,7 +1339,7 @@
           <a:p>
             <a:fld id="{650366BD-2959-43A5-9C43-B178997CA9C1}" type="datetime1">
               <a:rPr lang="en-US" smtClean="0"/>
-              <a:t>8/1/2025</a:t>
+              <a:t>8/2/2025</a:t>
             </a:fld>
             <a:endParaRPr lang="en-US"/>
           </a:p>
@@ -1614,7 +1614,7 @@
           <a:p>
             <a:fld id="{44A443A2-278A-4AA2-A6FA-B813D9AB289B}" type="datetime1">
               <a:rPr lang="en-US" smtClean="0"/>
-              <a:t>8/1/2025</a:t>
+              <a:t>8/2/2025</a:t>
             </a:fld>
             <a:endParaRPr lang="en-US"/>
           </a:p>
@@ -1879,7 +1879,7 @@
           <a:p>
             <a:fld id="{8DB96CD0-8DC9-4D9E-8F97-A64EB549E498}" type="datetime1">
               <a:rPr lang="en-US" smtClean="0"/>
-              <a:t>8/1/2025</a:t>
+              <a:t>8/2/2025</a:t>
             </a:fld>
             <a:endParaRPr lang="en-US"/>
           </a:p>
@@ -2291,7 +2291,7 @@
           <a:p>
             <a:fld id="{8728ABDD-F7C0-49E5-BDEF-78EEAB9D4FF0}" type="datetime1">
               <a:rPr lang="en-US" smtClean="0"/>
-              <a:t>8/1/2025</a:t>
+              <a:t>8/2/2025</a:t>
             </a:fld>
             <a:endParaRPr lang="en-US"/>
           </a:p>
@@ -2432,7 +2432,7 @@
           <a:p>
             <a:fld id="{1815E602-B233-4072-AF5E-EEC16D6A3250}" type="datetime1">
               <a:rPr lang="en-US" smtClean="0"/>
-              <a:t>8/1/2025</a:t>
+              <a:t>8/2/2025</a:t>
             </a:fld>
             <a:endParaRPr lang="en-US"/>
           </a:p>
@@ -2545,7 +2545,7 @@
           <a:p>
             <a:fld id="{B46368E2-0F8E-43F1-B205-4CE4ED81C818}" type="datetime1">
               <a:rPr lang="en-US" smtClean="0"/>
-              <a:t>8/1/2025</a:t>
+              <a:t>8/2/2025</a:t>
             </a:fld>
             <a:endParaRPr lang="en-US"/>
           </a:p>
@@ -2856,7 +2856,7 @@
           <a:p>
             <a:fld id="{A90826D4-3247-4C35-B745-95D9A6527E86}" type="datetime1">
               <a:rPr lang="en-US" smtClean="0"/>
-              <a:t>8/1/2025</a:t>
+              <a:t>8/2/2025</a:t>
             </a:fld>
             <a:endParaRPr lang="en-US"/>
           </a:p>
@@ -3144,7 +3144,7 @@
           <a:p>
             <a:fld id="{F697CA6C-CB8E-4E4E-A40B-CF748107F47F}" type="datetime1">
               <a:rPr lang="en-US" smtClean="0"/>
-              <a:t>8/1/2025</a:t>
+              <a:t>8/2/2025</a:t>
             </a:fld>
             <a:endParaRPr lang="en-US"/>
           </a:p>
@@ -3385,7 +3385,7 @@
           <a:p>
             <a:fld id="{486D2D92-9836-4BF5-99A8-6BBA488E0F07}" type="datetime1">
               <a:rPr lang="en-US" smtClean="0"/>
-              <a:t>8/1/2025</a:t>
+              <a:t>8/2/2025</a:t>
             </a:fld>
             <a:endParaRPr lang="en-US"/>
           </a:p>
@@ -8258,7 +8258,7 @@
             </a:r>
             <a:r>
               <a:rPr lang="en-US" dirty="0"/>
-              <a:t>Linux (RedHat, OpenSUSE, Gentoo, etc.) </a:t>
+              <a:t>Linux (RedHat/Alma, OpenSUSE, Alpine, etc.) </a:t>
             </a:r>
             <a:r>
               <a:rPr lang="ru-RU" dirty="0"/>

</xml_diff>